<commit_message>
Slide 3. Overall 2.86 minutes
</commit_message>
<xml_diff>
--- a/Presentation/Analyzing the StackOverflow2013 Database from 2008 to 2013.pptx
+++ b/Presentation/Analyzing the StackOverflow2013 Database from 2008 to 2013.pptx
@@ -5,16 +5,17 @@
     <p:sldMasterId id="2147483648" r:id="rId4"/>
   </p:sldMasterIdLst>
   <p:notesMasterIdLst>
-    <p:notesMasterId r:id="rId12"/>
+    <p:notesMasterId r:id="rId13"/>
   </p:notesMasterIdLst>
   <p:sldIdLst>
     <p:sldId id="259" r:id="rId5"/>
     <p:sldId id="267" r:id="rId6"/>
-    <p:sldId id="266" r:id="rId7"/>
-    <p:sldId id="265" r:id="rId8"/>
-    <p:sldId id="262" r:id="rId9"/>
-    <p:sldId id="264" r:id="rId10"/>
-    <p:sldId id="263" r:id="rId11"/>
+    <p:sldId id="262" r:id="rId7"/>
+    <p:sldId id="266" r:id="rId8"/>
+    <p:sldId id="265" r:id="rId9"/>
+    <p:sldId id="268" r:id="rId10"/>
+    <p:sldId id="264" r:id="rId11"/>
+    <p:sldId id="263" r:id="rId12"/>
   </p:sldIdLst>
   <p:sldSz cx="12192000" cy="6858000"/>
   <p:notesSz cx="6858000" cy="9144000"/>
@@ -5375,6 +5376,154 @@
       </p:grpSpPr>
       <p:sp>
         <p:nvSpPr>
+          <p:cNvPr id="2" name="Slide Image Placeholder 1"/>
+          <p:cNvSpPr>
+            <a:spLocks noGrp="1" noRot="1" noChangeAspect="1"/>
+          </p:cNvSpPr>
+          <p:nvPr>
+            <p:ph type="sldImg"/>
+          </p:nvPr>
+        </p:nvSpPr>
+        <p:spPr/>
+      </p:sp>
+      <p:sp>
+        <p:nvSpPr>
+          <p:cNvPr id="3" name="Notes Placeholder 2"/>
+          <p:cNvSpPr>
+            <a:spLocks noGrp="1"/>
+          </p:cNvSpPr>
+          <p:nvPr>
+            <p:ph type="body" idx="1"/>
+          </p:nvPr>
+        </p:nvSpPr>
+        <p:spPr/>
+        <p:txBody>
+          <a:bodyPr/>
+          <a:lstStyle/>
+          <a:p>
+            <a:pPr algn="just"/>
+            <a:r>
+              <a:rPr lang="en-US" dirty="0"/>
+              <a:t>In this part of the presentation, I'm focusing on the data source that we'll be using for our analysis. I have chosen the Stack Overflow database for a few key reasons:</a:t>
+            </a:r>
+          </a:p>
+          <a:p>
+            <a:pPr algn="just"/>
+            <a:endParaRPr lang="en-US" dirty="0"/>
+          </a:p>
+          <a:p>
+            <a:pPr algn="just"/>
+            <a:r>
+              <a:rPr lang="en-US" dirty="0"/>
+              <a:t>Firstly, this database is derived from the public Stack Overflow data export, which is </a:t>
+            </a:r>
+            <a:r>
+              <a:rPr lang="en-US" dirty="0" err="1"/>
+              <a:t>arich</a:t>
+            </a:r>
+            <a:r>
+              <a:rPr lang="en-US" dirty="0"/>
+              <a:t> dataset used widely in the tech community for analysis and training. It's not just a  simple dataset; it reflects real-world distributions of numbers, dates, and strings, making it an excellent candidate for realistic data analysis scenarios.</a:t>
+            </a:r>
+          </a:p>
+          <a:p>
+            <a:pPr algn="just"/>
+            <a:endParaRPr lang="en-US" dirty="0"/>
+          </a:p>
+          <a:p>
+            <a:pPr algn="just"/>
+            <a:r>
+              <a:rPr lang="en-US" dirty="0"/>
+              <a:t>For my purposes, I've selected the medium option – the 50GB StackOverflow2013 database, which expands from a 10GB compressed file. This particular dataset contains data from 2008 to 2013.</a:t>
+            </a:r>
+          </a:p>
+          <a:p>
+            <a:pPr algn="just"/>
+            <a:endParaRPr lang="en-US" dirty="0"/>
+          </a:p>
+          <a:p>
+            <a:pPr algn="just"/>
+            <a:r>
+              <a:rPr lang="en-US" dirty="0"/>
+              <a:t>The data comes in the form of .</a:t>
+            </a:r>
+            <a:r>
+              <a:rPr lang="en-US" dirty="0" err="1"/>
+              <a:t>mdf</a:t>
+            </a:r>
+            <a:r>
+              <a:rPr lang="en-US" dirty="0"/>
+              <a:t> files, which are the primary database file types used by SQL Server. This makes it convenient as they can be attached directly to SQL Server without any additional conversion, saving time and simplifying the setup process.</a:t>
+            </a:r>
+          </a:p>
+          <a:p>
+            <a:endParaRPr lang="en-US" dirty="0"/>
+          </a:p>
+          <a:p>
+            <a:r>
+              <a:rPr lang="en-US" dirty="0"/>
+              <a:t>1.25’</a:t>
+            </a:r>
+            <a:endParaRPr lang="pl-PL" dirty="0"/>
+          </a:p>
+        </p:txBody>
+      </p:sp>
+      <p:sp>
+        <p:nvSpPr>
+          <p:cNvPr id="4" name="Slide Number Placeholder 3"/>
+          <p:cNvSpPr>
+            <a:spLocks noGrp="1"/>
+          </p:cNvSpPr>
+          <p:nvPr>
+            <p:ph type="sldNum" sz="quarter" idx="5"/>
+          </p:nvPr>
+        </p:nvSpPr>
+        <p:spPr/>
+        <p:txBody>
+          <a:bodyPr/>
+          <a:lstStyle/>
+          <a:p>
+            <a:pPr rtl="0"/>
+            <a:fld id="{BC0C2C40-CB1C-4820-9151-EC51EC2E7E0F}" type="slidenum">
+              <a:rPr lang="pl-PL" smtClean="0"/>
+              <a:t>3</a:t>
+            </a:fld>
+            <a:endParaRPr lang="pl-PL" dirty="0"/>
+          </a:p>
+        </p:txBody>
+      </p:sp>
+    </p:spTree>
+    <p:extLst>
+      <p:ext uri="{BB962C8B-B14F-4D97-AF65-F5344CB8AC3E}">
+        <p14:creationId xmlns:p14="http://schemas.microsoft.com/office/powerpoint/2010/main" val="1846291849"/>
+      </p:ext>
+    </p:extLst>
+  </p:cSld>
+  <p:clrMapOvr>
+    <a:masterClrMapping/>
+  </p:clrMapOvr>
+</p:notes>
+</file>
+
+<file path=ppt/notesSlides/notesSlide4.xml><?xml version="1.0" encoding="utf-8"?>
+<p:notes xmlns:a="http://schemas.openxmlformats.org/drawingml/2006/main" xmlns:r="http://schemas.openxmlformats.org/officeDocument/2006/relationships" xmlns:p="http://schemas.openxmlformats.org/presentationml/2006/main">
+  <p:cSld>
+    <p:spTree>
+      <p:nvGrpSpPr>
+        <p:cNvPr id="1" name=""/>
+        <p:cNvGrpSpPr/>
+        <p:nvPr/>
+      </p:nvGrpSpPr>
+      <p:grpSpPr>
+        <a:xfrm>
+          <a:off x="0" y="0"/>
+          <a:ext cx="0" cy="0"/>
+          <a:chOff x="0" y="0"/>
+          <a:chExt cx="0" cy="0"/>
+        </a:xfrm>
+      </p:grpSpPr>
+      <p:sp>
+        <p:nvSpPr>
           <p:cNvPr id="2" name="Obraz slajdu — symbol zastępczy 1"/>
           <p:cNvSpPr>
             <a:spLocks noGrp="1" noRot="1" noChangeAspect="1"/>
@@ -5431,7 +5580,7 @@
             <a:pPr rtl="0"/>
             <a:fld id="{BC0C2C40-CB1C-4820-9151-EC51EC2E7E0F}" type="slidenum">
               <a:rPr lang="pl-PL" smtClean="0"/>
-              <a:t>7</a:t>
+              <a:t>8</a:t>
             </a:fld>
             <a:endParaRPr lang="pl-PL" dirty="0"/>
           </a:p>
@@ -9223,7 +9372,7 @@
         </p:nvGrpSpPr>
         <p:grpSpPr>
           <a:xfrm>
-            <a:off x="6059290" y="1031133"/>
+            <a:off x="8421900" y="661130"/>
             <a:ext cx="2386156" cy="2378046"/>
             <a:chOff x="6059289" y="1031132"/>
             <a:chExt cx="4855145" cy="4853637"/>
@@ -9694,6 +9843,168 @@
 </file>
 
 <file path=ppt/slides/slide3.xml><?xml version="1.0" encoding="utf-8"?>
+<p:sld xmlns:a="http://schemas.openxmlformats.org/drawingml/2006/main" xmlns:r="http://schemas.openxmlformats.org/officeDocument/2006/relationships" xmlns:p="http://schemas.openxmlformats.org/presentationml/2006/main">
+  <p:cSld>
+    <p:spTree>
+      <p:nvGrpSpPr>
+        <p:cNvPr id="1" name=""/>
+        <p:cNvGrpSpPr/>
+        <p:nvPr/>
+      </p:nvGrpSpPr>
+      <p:grpSpPr>
+        <a:xfrm>
+          <a:off x="0" y="0"/>
+          <a:ext cx="0" cy="0"/>
+          <a:chOff x="0" y="0"/>
+          <a:chExt cx="0" cy="0"/>
+        </a:xfrm>
+      </p:grpSpPr>
+      <p:sp>
+        <p:nvSpPr>
+          <p:cNvPr id="4" name="Tytuł 3">
+            <a:extLst>
+              <a:ext uri="{FF2B5EF4-FFF2-40B4-BE49-F238E27FC236}">
+                <a16:creationId xmlns:a16="http://schemas.microsoft.com/office/drawing/2014/main" id="{FE7E940F-6D6B-4FE5-8CA2-E8AE96D300C2}"/>
+              </a:ext>
+            </a:extLst>
+          </p:cNvPr>
+          <p:cNvSpPr>
+            <a:spLocks noGrp="1"/>
+          </p:cNvSpPr>
+          <p:nvPr>
+            <p:ph type="title"/>
+          </p:nvPr>
+        </p:nvSpPr>
+        <p:spPr>
+          <a:xfrm>
+            <a:off x="444500" y="414843"/>
+            <a:ext cx="9146972" cy="640080"/>
+          </a:xfrm>
+        </p:spPr>
+        <p:txBody>
+          <a:bodyPr rtlCol="0"/>
+          <a:lstStyle>
+            <a:defPPr>
+              <a:defRPr lang="pl-PL"/>
+            </a:defPPr>
+          </a:lstStyle>
+          <a:p>
+            <a:pPr rtl="0"/>
+            <a:r>
+              <a:rPr lang="en-US" b="1" dirty="0">
+                <a:latin typeface="Segoe UI Semibold" panose="020B0502040204020203" pitchFamily="34" charset="0"/>
+                <a:cs typeface="Segoe UI Semibold" panose="020B0502040204020203" pitchFamily="34" charset="0"/>
+              </a:rPr>
+              <a:t>Data source</a:t>
+            </a:r>
+            <a:endParaRPr lang="pl-PL" b="1" dirty="0">
+              <a:solidFill>
+                <a:schemeClr val="bg2">
+                  <a:lumMod val="50000"/>
+                </a:schemeClr>
+              </a:solidFill>
+              <a:latin typeface="Segoe UI Semibold" panose="020B0502040204020203" pitchFamily="34" charset="0"/>
+              <a:cs typeface="Segoe UI Semibold" panose="020B0502040204020203" pitchFamily="34" charset="0"/>
+            </a:endParaRPr>
+          </a:p>
+        </p:txBody>
+      </p:sp>
+      <p:pic>
+        <p:nvPicPr>
+          <p:cNvPr id="3" name="Picture 2">
+            <a:extLst>
+              <a:ext uri="{FF2B5EF4-FFF2-40B4-BE49-F238E27FC236}">
+                <a16:creationId xmlns:a16="http://schemas.microsoft.com/office/drawing/2014/main" id="{4D268179-E0D0-D336-4F42-BA346DC14107}"/>
+              </a:ext>
+            </a:extLst>
+          </p:cNvPr>
+          <p:cNvPicPr>
+            <a:picLocks noChangeAspect="1"/>
+          </p:cNvPicPr>
+          <p:nvPr/>
+        </p:nvPicPr>
+        <p:blipFill>
+          <a:blip r:embed="rId3"/>
+          <a:stretch>
+            <a:fillRect/>
+          </a:stretch>
+        </p:blipFill>
+        <p:spPr>
+          <a:xfrm>
+            <a:off x="1276626" y="1477856"/>
+            <a:ext cx="9758018" cy="5104960"/>
+          </a:xfrm>
+          <a:prstGeom prst="rect">
+            <a:avLst/>
+          </a:prstGeom>
+        </p:spPr>
+      </p:pic>
+      <p:sp>
+        <p:nvSpPr>
+          <p:cNvPr id="5" name="Oval 4">
+            <a:extLst>
+              <a:ext uri="{FF2B5EF4-FFF2-40B4-BE49-F238E27FC236}">
+                <a16:creationId xmlns:a16="http://schemas.microsoft.com/office/drawing/2014/main" id="{EC9F28B7-A7CE-E5E3-6AAE-28E9770F51DD}"/>
+              </a:ext>
+            </a:extLst>
+          </p:cNvPr>
+          <p:cNvSpPr/>
+          <p:nvPr/>
+        </p:nvSpPr>
+        <p:spPr>
+          <a:xfrm>
+            <a:off x="1020361" y="4545495"/>
+            <a:ext cx="6944196" cy="1038087"/>
+          </a:xfrm>
+          <a:prstGeom prst="ellipse">
+            <a:avLst/>
+          </a:prstGeom>
+          <a:noFill/>
+          <a:ln w="50800">
+            <a:solidFill>
+              <a:schemeClr val="accent2"/>
+            </a:solidFill>
+          </a:ln>
+        </p:spPr>
+        <p:style>
+          <a:lnRef idx="2">
+            <a:schemeClr val="accent1">
+              <a:shade val="15000"/>
+            </a:schemeClr>
+          </a:lnRef>
+          <a:fillRef idx="1">
+            <a:schemeClr val="accent1"/>
+          </a:fillRef>
+          <a:effectRef idx="0">
+            <a:schemeClr val="accent1"/>
+          </a:effectRef>
+          <a:fontRef idx="minor">
+            <a:schemeClr val="lt1"/>
+          </a:fontRef>
+        </p:style>
+        <p:txBody>
+          <a:bodyPr rtlCol="0" anchor="ctr"/>
+          <a:lstStyle/>
+          <a:p>
+            <a:pPr algn="ctr"/>
+            <a:endParaRPr lang="pl-PL"/>
+          </a:p>
+        </p:txBody>
+      </p:sp>
+    </p:spTree>
+    <p:extLst>
+      <p:ext uri="{BB962C8B-B14F-4D97-AF65-F5344CB8AC3E}">
+        <p14:creationId xmlns:p14="http://schemas.microsoft.com/office/powerpoint/2010/main" val="3201932227"/>
+      </p:ext>
+    </p:extLst>
+  </p:cSld>
+  <p:clrMapOvr>
+    <a:masterClrMapping/>
+  </p:clrMapOvr>
+</p:sld>
+</file>
+
+<file path=ppt/slides/slide4.xml><?xml version="1.0" encoding="utf-8"?>
 <p:sld xmlns:a="http://schemas.openxmlformats.org/drawingml/2006/main" xmlns:r="http://schemas.openxmlformats.org/officeDocument/2006/relationships" xmlns:p="http://schemas.openxmlformats.org/presentationml/2006/main">
   <p:cSld>
     <p:spTree>
@@ -10757,7 +11068,7 @@
 </p:sld>
 </file>
 
-<file path=ppt/slides/slide4.xml><?xml version="1.0" encoding="utf-8"?>
+<file path=ppt/slides/slide5.xml><?xml version="1.0" encoding="utf-8"?>
 <p:sld xmlns:a="http://schemas.openxmlformats.org/drawingml/2006/main" xmlns:r="http://schemas.openxmlformats.org/officeDocument/2006/relationships" xmlns:p="http://schemas.openxmlformats.org/presentationml/2006/main">
   <p:cSld>
     <p:spTree>
@@ -12256,7 +12567,7 @@
 </p:sld>
 </file>
 
-<file path=ppt/slides/slide5.xml><?xml version="1.0" encoding="utf-8"?>
+<file path=ppt/slides/slide6.xml><?xml version="1.0" encoding="utf-8"?>
 <p:sld xmlns:a="http://schemas.openxmlformats.org/drawingml/2006/main" xmlns:r="http://schemas.openxmlformats.org/officeDocument/2006/relationships" xmlns:p="http://schemas.openxmlformats.org/presentationml/2006/main">
   <p:cSld>
     <p:spTree>
@@ -14034,7 +14345,7 @@
     </p:spTree>
     <p:extLst>
       <p:ext uri="{BB962C8B-B14F-4D97-AF65-F5344CB8AC3E}">
-        <p14:creationId xmlns:p14="http://schemas.microsoft.com/office/powerpoint/2010/main" val="3201932227"/>
+        <p14:creationId xmlns:p14="http://schemas.microsoft.com/office/powerpoint/2010/main" val="3649938668"/>
       </p:ext>
     </p:extLst>
   </p:cSld>
@@ -14044,7 +14355,7 @@
 </p:sld>
 </file>
 
-<file path=ppt/slides/slide6.xml><?xml version="1.0" encoding="utf-8"?>
+<file path=ppt/slides/slide7.xml><?xml version="1.0" encoding="utf-8"?>
 <p:sld xmlns:a="http://schemas.openxmlformats.org/drawingml/2006/main" xmlns:r="http://schemas.openxmlformats.org/officeDocument/2006/relationships" xmlns:p="http://schemas.openxmlformats.org/presentationml/2006/main">
   <p:cSld>
     <p:spTree>
@@ -16092,7 +16403,7 @@
 </p:sld>
 </file>
 
-<file path=ppt/slides/slide7.xml><?xml version="1.0" encoding="utf-8"?>
+<file path=ppt/slides/slide8.xml><?xml version="1.0" encoding="utf-8"?>
 <p:sld xmlns:a="http://schemas.openxmlformats.org/drawingml/2006/main" xmlns:r="http://schemas.openxmlformats.org/officeDocument/2006/relationships" xmlns:p="http://schemas.openxmlformats.org/presentationml/2006/main">
   <p:cSld>
     <p:spTree>
@@ -19416,25 +19727,6 @@
 </file>
 
 <file path=customXml/item1.xml><?xml version="1.0" encoding="utf-8"?>
-<p:properties xmlns:p="http://schemas.microsoft.com/office/2006/metadata/properties" xmlns:xsi="http://www.w3.org/2001/XMLSchema-instance" xmlns:pc="http://schemas.microsoft.com/office/infopath/2007/PartnerControls">
-  <documentManagement>
-    <Status xmlns="71af3243-3dd4-4a8d-8c0d-dd76da1f02a5">Not started</Status>
-    <_ip_UnifiedCompliancePolicyUIAction xmlns="http://schemas.microsoft.com/sharepoint/v3" xsi:nil="true"/>
-    <Image xmlns="71af3243-3dd4-4a8d-8c0d-dd76da1f02a5">
-      <Url xsi:nil="true"/>
-      <Description xsi:nil="true"/>
-    </Image>
-    <_ip_UnifiedCompliancePolicyProperties xmlns="http://schemas.microsoft.com/sharepoint/v3" xsi:nil="true"/>
-    <ImageTagsTaxHTField xmlns="71af3243-3dd4-4a8d-8c0d-dd76da1f02a5">
-      <Terms xmlns="http://schemas.microsoft.com/office/infopath/2007/PartnerControls"/>
-    </ImageTagsTaxHTField>
-    <TaxCatchAll xmlns="230e9df3-be65-4c73-a93b-d1236ebd677e"/>
-    <MediaServiceKeyPoints xmlns="71af3243-3dd4-4a8d-8c0d-dd76da1f02a5" xsi:nil="true"/>
-  </documentManagement>
-</p:properties>
-</file>
-
-<file path=customXml/item2.xml><?xml version="1.0" encoding="utf-8"?>
 <ct:contentTypeSchema xmlns:ct="http://schemas.microsoft.com/office/2006/metadata/contentType" xmlns:ma="http://schemas.microsoft.com/office/2006/metadata/properties/metaAttributes" ct:_="" ma:_="" ma:contentTypeName="Document" ma:contentTypeID="0x01010079F111ED35F8CC479449609E8A0923A6" ma:contentTypeVersion="20" ma:contentTypeDescription="Create a new document." ma:contentTypeScope="" ma:versionID="1267097ee5f5874adfcc408041ae252e">
   <xsd:schema xmlns:xsd="http://www.w3.org/2001/XMLSchema" xmlns:xs="http://www.w3.org/2001/XMLSchema" xmlns:p="http://schemas.microsoft.com/office/2006/metadata/properties" xmlns:ns1="http://schemas.microsoft.com/sharepoint/v3" xmlns:ns2="71af3243-3dd4-4a8d-8c0d-dd76da1f02a5" xmlns:ns3="16c05727-aa75-4e4a-9b5f-8a80a1165891" xmlns:ns4="230e9df3-be65-4c73-a93b-d1236ebd677e" targetNamespace="http://schemas.microsoft.com/office/2006/metadata/properties" ma:root="true" ma:fieldsID="395891a93df65b14727750f2c06c306c" ns1:_="" ns2:_="" ns3:_="" ns4:_="">
     <xsd:import namespace="http://schemas.microsoft.com/sharepoint/v3"/>
@@ -19710,6 +20002,25 @@
 </ct:contentTypeSchema>
 </file>
 
+<file path=customXml/item2.xml><?xml version="1.0" encoding="utf-8"?>
+<p:properties xmlns:p="http://schemas.microsoft.com/office/2006/metadata/properties" xmlns:xsi="http://www.w3.org/2001/XMLSchema-instance" xmlns:pc="http://schemas.microsoft.com/office/infopath/2007/PartnerControls">
+  <documentManagement>
+    <Status xmlns="71af3243-3dd4-4a8d-8c0d-dd76da1f02a5">Not started</Status>
+    <_ip_UnifiedCompliancePolicyUIAction xmlns="http://schemas.microsoft.com/sharepoint/v3" xsi:nil="true"/>
+    <Image xmlns="71af3243-3dd4-4a8d-8c0d-dd76da1f02a5">
+      <Url xsi:nil="true"/>
+      <Description xsi:nil="true"/>
+    </Image>
+    <_ip_UnifiedCompliancePolicyProperties xmlns="http://schemas.microsoft.com/sharepoint/v3" xsi:nil="true"/>
+    <ImageTagsTaxHTField xmlns="71af3243-3dd4-4a8d-8c0d-dd76da1f02a5">
+      <Terms xmlns="http://schemas.microsoft.com/office/infopath/2007/PartnerControls"/>
+    </ImageTagsTaxHTField>
+    <TaxCatchAll xmlns="230e9df3-be65-4c73-a93b-d1236ebd677e"/>
+    <MediaServiceKeyPoints xmlns="71af3243-3dd4-4a8d-8c0d-dd76da1f02a5" xsi:nil="true"/>
+  </documentManagement>
+</p:properties>
+</file>
+
 <file path=customXml/item3.xml><?xml version="1.0" encoding="utf-8"?>
 <?mso-contentType ?>
 <FormTemplates xmlns="http://schemas.microsoft.com/sharepoint/v3/contenttype/forms">
@@ -19720,18 +20031,6 @@
 </file>
 
 <file path=customXml/itemProps1.xml><?xml version="1.0" encoding="utf-8"?>
-<ds:datastoreItem xmlns:ds="http://schemas.openxmlformats.org/officeDocument/2006/customXml" ds:itemID="{1C44B501-5DE1-46D9-B449-400C46FE1425}">
-  <ds:schemaRefs>
-    <ds:schemaRef ds:uri="http://schemas.microsoft.com/office/2006/metadata/properties"/>
-    <ds:schemaRef ds:uri="http://schemas.microsoft.com/office/infopath/2007/PartnerControls"/>
-    <ds:schemaRef ds:uri="71af3243-3dd4-4a8d-8c0d-dd76da1f02a5"/>
-    <ds:schemaRef ds:uri="http://schemas.microsoft.com/sharepoint/v3"/>
-    <ds:schemaRef ds:uri="230e9df3-be65-4c73-a93b-d1236ebd677e"/>
-  </ds:schemaRefs>
-</ds:datastoreItem>
-</file>
-
-<file path=customXml/itemProps2.xml><?xml version="1.0" encoding="utf-8"?>
 <ds:datastoreItem xmlns:ds="http://schemas.openxmlformats.org/officeDocument/2006/customXml" ds:itemID="{B2A44EB6-3BD3-4FF9-B8D1-D973C54C3ED7}">
   <ds:schemaRefs>
     <ds:schemaRef ds:uri="http://schemas.microsoft.com/office/2006/metadata/contentType"/>
@@ -19752,6 +20051,18 @@
 </ds:datastoreItem>
 </file>
 
+<file path=customXml/itemProps2.xml><?xml version="1.0" encoding="utf-8"?>
+<ds:datastoreItem xmlns:ds="http://schemas.openxmlformats.org/officeDocument/2006/customXml" ds:itemID="{1C44B501-5DE1-46D9-B449-400C46FE1425}">
+  <ds:schemaRefs>
+    <ds:schemaRef ds:uri="http://schemas.microsoft.com/office/2006/metadata/properties"/>
+    <ds:schemaRef ds:uri="http://schemas.microsoft.com/office/infopath/2007/PartnerControls"/>
+    <ds:schemaRef ds:uri="71af3243-3dd4-4a8d-8c0d-dd76da1f02a5"/>
+    <ds:schemaRef ds:uri="http://schemas.microsoft.com/sharepoint/v3"/>
+    <ds:schemaRef ds:uri="230e9df3-be65-4c73-a93b-d1236ebd677e"/>
+  </ds:schemaRefs>
+</ds:datastoreItem>
+</file>
+
 <file path=customXml/itemProps3.xml><?xml version="1.0" encoding="utf-8"?>
 <ds:datastoreItem xmlns:ds="http://schemas.openxmlformats.org/officeDocument/2006/customXml" ds:itemID="{77DD0DBF-30B2-4FC6-A5E7-8374DC718037}">
   <ds:schemaRefs>

</xml_diff>

<commit_message>
Slide 4. Overall 4.84 minutes
</commit_message>
<xml_diff>
--- a/Presentation/Analyzing the StackOverflow2013 Database from 2008 to 2013.pptx
+++ b/Presentation/Analyzing the StackOverflow2013 Database from 2008 to 2013.pptx
@@ -5,17 +5,18 @@
     <p:sldMasterId id="2147483648" r:id="rId4"/>
   </p:sldMasterIdLst>
   <p:notesMasterIdLst>
-    <p:notesMasterId r:id="rId13"/>
+    <p:notesMasterId r:id="rId14"/>
   </p:notesMasterIdLst>
   <p:sldIdLst>
     <p:sldId id="259" r:id="rId5"/>
     <p:sldId id="267" r:id="rId6"/>
     <p:sldId id="262" r:id="rId7"/>
-    <p:sldId id="266" r:id="rId8"/>
-    <p:sldId id="265" r:id="rId9"/>
-    <p:sldId id="268" r:id="rId10"/>
-    <p:sldId id="264" r:id="rId11"/>
-    <p:sldId id="263" r:id="rId12"/>
+    <p:sldId id="268" r:id="rId8"/>
+    <p:sldId id="266" r:id="rId9"/>
+    <p:sldId id="265" r:id="rId10"/>
+    <p:sldId id="269" r:id="rId11"/>
+    <p:sldId id="264" r:id="rId12"/>
+    <p:sldId id="263" r:id="rId13"/>
   </p:sldIdLst>
   <p:sldSz cx="12192000" cy="6858000"/>
   <p:notesSz cx="6858000" cy="9144000"/>
@@ -5415,15 +5416,7 @@
             <a:pPr algn="just"/>
             <a:r>
               <a:rPr lang="en-US" dirty="0"/>
-              <a:t>Firstly, this database is derived from the public Stack Overflow data export, which is </a:t>
-            </a:r>
-            <a:r>
-              <a:rPr lang="en-US" dirty="0" err="1"/>
-              <a:t>arich</a:t>
-            </a:r>
-            <a:r>
-              <a:rPr lang="en-US" dirty="0"/>
-              <a:t> dataset used widely in the tech community for analysis and training. It's not just a  simple dataset; it reflects real-world distributions of numbers, dates, and strings, making it an excellent candidate for realistic data analysis scenarios.</a:t>
+              <a:t>Firstly, this database is derived from the public Stack Overflow data export, which is a rich dataset used widely in the tech community for analysis and training. It's not just a  simple dataset; it reflects real-world distributions of numbers, dates, and strings, making it an excellent candidate for realistic data analysis scenarios.</a:t>
             </a:r>
           </a:p>
           <a:p>
@@ -5506,6 +5499,394 @@
 </file>
 
 <file path=ppt/notesSlides/notesSlide4.xml><?xml version="1.0" encoding="utf-8"?>
+<p:notes xmlns:a="http://schemas.openxmlformats.org/drawingml/2006/main" xmlns:r="http://schemas.openxmlformats.org/officeDocument/2006/relationships" xmlns:p="http://schemas.openxmlformats.org/presentationml/2006/main">
+  <p:cSld>
+    <p:spTree>
+      <p:nvGrpSpPr>
+        <p:cNvPr id="1" name=""/>
+        <p:cNvGrpSpPr/>
+        <p:nvPr/>
+      </p:nvGrpSpPr>
+      <p:grpSpPr>
+        <a:xfrm>
+          <a:off x="0" y="0"/>
+          <a:ext cx="0" cy="0"/>
+          <a:chOff x="0" y="0"/>
+          <a:chExt cx="0" cy="0"/>
+        </a:xfrm>
+      </p:grpSpPr>
+      <p:sp>
+        <p:nvSpPr>
+          <p:cNvPr id="2" name="Slide Image Placeholder 1"/>
+          <p:cNvSpPr>
+            <a:spLocks noGrp="1" noRot="1" noChangeAspect="1"/>
+          </p:cNvSpPr>
+          <p:nvPr>
+            <p:ph type="sldImg"/>
+          </p:nvPr>
+        </p:nvSpPr>
+        <p:spPr/>
+      </p:sp>
+      <p:sp>
+        <p:nvSpPr>
+          <p:cNvPr id="3" name="Notes Placeholder 2"/>
+          <p:cNvSpPr>
+            <a:spLocks noGrp="1"/>
+          </p:cNvSpPr>
+          <p:nvPr>
+            <p:ph type="body" idx="1"/>
+          </p:nvPr>
+        </p:nvSpPr>
+        <p:spPr/>
+        <p:txBody>
+          <a:bodyPr/>
+          <a:lstStyle/>
+          <a:p>
+            <a:pPr algn="just"/>
+            <a:r>
+              <a:rPr lang="en-US" sz="900" dirty="0"/>
+              <a:t>On this slide, you can see the visual representation of the StackOverflow2013 Database's data model. This model is composed of nine tables, which together capture the essence of the Stack Overflow community's interactions.</a:t>
+            </a:r>
+          </a:p>
+          <a:p>
+            <a:pPr algn="just"/>
+            <a:endParaRPr lang="en-US" sz="900" dirty="0"/>
+          </a:p>
+          <a:p>
+            <a:pPr algn="just"/>
+            <a:r>
+              <a:rPr lang="en-US" sz="900" dirty="0"/>
+              <a:t>The 'Posts' table is central to this model, linked directly to '</a:t>
+            </a:r>
+            <a:r>
+              <a:rPr lang="en-US" sz="900" dirty="0" err="1"/>
+              <a:t>PostTypes</a:t>
+            </a:r>
+            <a:r>
+              <a:rPr lang="en-US" sz="900" dirty="0"/>
+              <a:t>', which is composed of two main types of entries: Questions and Answers. </a:t>
+            </a:r>
+          </a:p>
+          <a:p>
+            <a:pPr algn="just"/>
+            <a:endParaRPr lang="en-US" sz="900" dirty="0"/>
+          </a:p>
+          <a:p>
+            <a:pPr algn="just"/>
+            <a:r>
+              <a:rPr lang="en-US" sz="900" dirty="0"/>
+              <a:t>Users are the lifeblood of Stack Overflow, and here you can see their interactions with the system. A user can own a post, meaning they've contributed content to the community, or they can answer posts, providing solutions to questions posed by others.</a:t>
+            </a:r>
+          </a:p>
+          <a:p>
+            <a:pPr algn="just"/>
+            <a:endParaRPr lang="en-US" sz="900" dirty="0"/>
+          </a:p>
+          <a:p>
+            <a:pPr algn="just"/>
+            <a:r>
+              <a:rPr lang="en-US" sz="900" dirty="0"/>
+              <a:t>The 'Comments' table allows for discourse on these posts, enabling users to seek clarification, discuss content, and offer brief insights.</a:t>
+            </a:r>
+          </a:p>
+          <a:p>
+            <a:pPr algn="just"/>
+            <a:endParaRPr lang="en-US" sz="900" dirty="0"/>
+          </a:p>
+          <a:p>
+            <a:pPr algn="just"/>
+            <a:r>
+              <a:rPr lang="en-US" sz="900" dirty="0"/>
+              <a:t>In the 'Votes' table, the community's feedback on posts is </a:t>
+            </a:r>
+            <a:r>
+              <a:rPr lang="en-US" sz="900" dirty="0" err="1"/>
+              <a:t>capytured</a:t>
+            </a:r>
+            <a:r>
+              <a:rPr lang="en-US" sz="900" dirty="0"/>
+              <a:t>, where users can vote to signify the usefulness and accuracy of the content provided. It's connected to '</a:t>
+            </a:r>
+            <a:r>
+              <a:rPr lang="en-US" sz="900" dirty="0" err="1"/>
+              <a:t>VoteTypes</a:t>
+            </a:r>
+            <a:r>
+              <a:rPr lang="en-US" sz="900" dirty="0"/>
+              <a:t>', which defines the nature of these votes.</a:t>
+            </a:r>
+          </a:p>
+          <a:p>
+            <a:pPr algn="just"/>
+            <a:endParaRPr lang="en-US" sz="900" dirty="0"/>
+          </a:p>
+          <a:p>
+            <a:pPr algn="just"/>
+            <a:r>
+              <a:rPr lang="en-US" sz="900" dirty="0"/>
+              <a:t>The 'Users' table holds profiles, reflecting the personal and professional backgrounds of community members, as well as their contributions and reputation within the platform. This table also connects to 'Badges', which are earned by users as a form of recognition for their contributions.</a:t>
+            </a:r>
+          </a:p>
+          <a:p>
+            <a:pPr algn="just"/>
+            <a:endParaRPr lang="en-US" sz="900" dirty="0"/>
+          </a:p>
+          <a:p>
+            <a:pPr algn="just"/>
+            <a:r>
+              <a:rPr lang="en-US" sz="900" dirty="0"/>
+              <a:t>User engagement is further documented through '</a:t>
+            </a:r>
+            <a:r>
+              <a:rPr lang="en-US" sz="900" dirty="0" err="1"/>
+              <a:t>PostLinks</a:t>
+            </a:r>
+            <a:r>
+              <a:rPr lang="en-US" sz="900" dirty="0"/>
+              <a:t>' and '</a:t>
+            </a:r>
+            <a:r>
+              <a:rPr lang="en-US" sz="900" dirty="0" err="1"/>
+              <a:t>LinkTypes</a:t>
+            </a:r>
+            <a:r>
+              <a:rPr lang="en-US" sz="900" dirty="0"/>
+              <a:t>', which trace the relationships between different posts, such as duplicates or related content.</a:t>
+            </a:r>
+          </a:p>
+          <a:p>
+            <a:pPr algn="just"/>
+            <a:endParaRPr lang="en-US" sz="900" dirty="0"/>
+          </a:p>
+          <a:p>
+            <a:pPr algn="just"/>
+            <a:r>
+              <a:rPr lang="en-US" sz="900" dirty="0"/>
+              <a:t>Together, these tables not only store data but also tell the story of how knowledge is built, shared, and valued in one of the largest technical communities online.</a:t>
+            </a:r>
+          </a:p>
+          <a:p>
+            <a:pPr algn="just"/>
+            <a:endParaRPr lang="en-US" sz="900" dirty="0"/>
+          </a:p>
+          <a:p>
+            <a:pPr algn="just"/>
+            <a:r>
+              <a:rPr lang="en-US" sz="900"/>
+              <a:t>1.98’</a:t>
+            </a:r>
+            <a:endParaRPr lang="pl-PL" sz="900" dirty="0"/>
+          </a:p>
+        </p:txBody>
+      </p:sp>
+      <p:sp>
+        <p:nvSpPr>
+          <p:cNvPr id="4" name="Slide Number Placeholder 3"/>
+          <p:cNvSpPr>
+            <a:spLocks noGrp="1"/>
+          </p:cNvSpPr>
+          <p:nvPr>
+            <p:ph type="sldNum" sz="quarter" idx="5"/>
+          </p:nvPr>
+        </p:nvSpPr>
+        <p:spPr/>
+        <p:txBody>
+          <a:bodyPr/>
+          <a:lstStyle/>
+          <a:p>
+            <a:pPr rtl="0"/>
+            <a:fld id="{BC0C2C40-CB1C-4820-9151-EC51EC2E7E0F}" type="slidenum">
+              <a:rPr lang="pl-PL" smtClean="0"/>
+              <a:t>4</a:t>
+            </a:fld>
+            <a:endParaRPr lang="pl-PL" dirty="0"/>
+          </a:p>
+        </p:txBody>
+      </p:sp>
+    </p:spTree>
+    <p:extLst>
+      <p:ext uri="{BB962C8B-B14F-4D97-AF65-F5344CB8AC3E}">
+        <p14:creationId xmlns:p14="http://schemas.microsoft.com/office/powerpoint/2010/main" val="60424827"/>
+      </p:ext>
+    </p:extLst>
+  </p:cSld>
+  <p:clrMapOvr>
+    <a:masterClrMapping/>
+  </p:clrMapOvr>
+</p:notes>
+</file>
+
+<file path=ppt/notesSlides/notesSlide5.xml><?xml version="1.0" encoding="utf-8"?>
+<p:notes xmlns:a="http://schemas.openxmlformats.org/drawingml/2006/main" xmlns:r="http://schemas.openxmlformats.org/officeDocument/2006/relationships" xmlns:p="http://schemas.openxmlformats.org/presentationml/2006/main">
+  <p:cSld>
+    <p:spTree>
+      <p:nvGrpSpPr>
+        <p:cNvPr id="1" name=""/>
+        <p:cNvGrpSpPr/>
+        <p:nvPr/>
+      </p:nvGrpSpPr>
+      <p:grpSpPr>
+        <a:xfrm>
+          <a:off x="0" y="0"/>
+          <a:ext cx="0" cy="0"/>
+          <a:chOff x="0" y="0"/>
+          <a:chExt cx="0" cy="0"/>
+        </a:xfrm>
+      </p:grpSpPr>
+      <p:sp>
+        <p:nvSpPr>
+          <p:cNvPr id="2" name="Slide Image Placeholder 1"/>
+          <p:cNvSpPr>
+            <a:spLocks noGrp="1" noRot="1" noChangeAspect="1"/>
+          </p:cNvSpPr>
+          <p:nvPr>
+            <p:ph type="sldImg"/>
+          </p:nvPr>
+        </p:nvSpPr>
+        <p:spPr/>
+      </p:sp>
+      <p:sp>
+        <p:nvSpPr>
+          <p:cNvPr id="3" name="Notes Placeholder 2"/>
+          <p:cNvSpPr>
+            <a:spLocks noGrp="1"/>
+          </p:cNvSpPr>
+          <p:nvPr>
+            <p:ph type="body" idx="1"/>
+          </p:nvPr>
+        </p:nvSpPr>
+        <p:spPr/>
+        <p:txBody>
+          <a:bodyPr/>
+          <a:lstStyle/>
+          <a:p>
+            <a:endParaRPr lang="pl-PL"/>
+          </a:p>
+        </p:txBody>
+      </p:sp>
+      <p:sp>
+        <p:nvSpPr>
+          <p:cNvPr id="4" name="Slide Number Placeholder 3"/>
+          <p:cNvSpPr>
+            <a:spLocks noGrp="1"/>
+          </p:cNvSpPr>
+          <p:nvPr>
+            <p:ph type="sldNum" sz="quarter" idx="5"/>
+          </p:nvPr>
+        </p:nvSpPr>
+        <p:spPr/>
+        <p:txBody>
+          <a:bodyPr/>
+          <a:lstStyle/>
+          <a:p>
+            <a:pPr rtl="0"/>
+            <a:fld id="{BC0C2C40-CB1C-4820-9151-EC51EC2E7E0F}" type="slidenum">
+              <a:rPr lang="pl-PL" smtClean="0"/>
+              <a:t>5</a:t>
+            </a:fld>
+            <a:endParaRPr lang="pl-PL" dirty="0"/>
+          </a:p>
+        </p:txBody>
+      </p:sp>
+    </p:spTree>
+    <p:extLst>
+      <p:ext uri="{BB962C8B-B14F-4D97-AF65-F5344CB8AC3E}">
+        <p14:creationId xmlns:p14="http://schemas.microsoft.com/office/powerpoint/2010/main" val="3035862332"/>
+      </p:ext>
+    </p:extLst>
+  </p:cSld>
+  <p:clrMapOvr>
+    <a:masterClrMapping/>
+  </p:clrMapOvr>
+</p:notes>
+</file>
+
+<file path=ppt/notesSlides/notesSlide6.xml><?xml version="1.0" encoding="utf-8"?>
+<p:notes xmlns:a="http://schemas.openxmlformats.org/drawingml/2006/main" xmlns:r="http://schemas.openxmlformats.org/officeDocument/2006/relationships" xmlns:p="http://schemas.openxmlformats.org/presentationml/2006/main">
+  <p:cSld>
+    <p:spTree>
+      <p:nvGrpSpPr>
+        <p:cNvPr id="1" name=""/>
+        <p:cNvGrpSpPr/>
+        <p:nvPr/>
+      </p:nvGrpSpPr>
+      <p:grpSpPr>
+        <a:xfrm>
+          <a:off x="0" y="0"/>
+          <a:ext cx="0" cy="0"/>
+          <a:chOff x="0" y="0"/>
+          <a:chExt cx="0" cy="0"/>
+        </a:xfrm>
+      </p:grpSpPr>
+      <p:sp>
+        <p:nvSpPr>
+          <p:cNvPr id="2" name="Slide Image Placeholder 1"/>
+          <p:cNvSpPr>
+            <a:spLocks noGrp="1" noRot="1" noChangeAspect="1"/>
+          </p:cNvSpPr>
+          <p:nvPr>
+            <p:ph type="sldImg"/>
+          </p:nvPr>
+        </p:nvSpPr>
+        <p:spPr/>
+      </p:sp>
+      <p:sp>
+        <p:nvSpPr>
+          <p:cNvPr id="3" name="Notes Placeholder 2"/>
+          <p:cNvSpPr>
+            <a:spLocks noGrp="1"/>
+          </p:cNvSpPr>
+          <p:nvPr>
+            <p:ph type="body" idx="1"/>
+          </p:nvPr>
+        </p:nvSpPr>
+        <p:spPr/>
+        <p:txBody>
+          <a:bodyPr/>
+          <a:lstStyle/>
+          <a:p>
+            <a:endParaRPr lang="pl-PL"/>
+          </a:p>
+        </p:txBody>
+      </p:sp>
+      <p:sp>
+        <p:nvSpPr>
+          <p:cNvPr id="4" name="Slide Number Placeholder 3"/>
+          <p:cNvSpPr>
+            <a:spLocks noGrp="1"/>
+          </p:cNvSpPr>
+          <p:nvPr>
+            <p:ph type="sldNum" sz="quarter" idx="5"/>
+          </p:nvPr>
+        </p:nvSpPr>
+        <p:spPr/>
+        <p:txBody>
+          <a:bodyPr/>
+          <a:lstStyle/>
+          <a:p>
+            <a:pPr rtl="0"/>
+            <a:fld id="{BC0C2C40-CB1C-4820-9151-EC51EC2E7E0F}" type="slidenum">
+              <a:rPr lang="pl-PL" smtClean="0"/>
+              <a:t>6</a:t>
+            </a:fld>
+            <a:endParaRPr lang="pl-PL" dirty="0"/>
+          </a:p>
+        </p:txBody>
+      </p:sp>
+    </p:spTree>
+    <p:extLst>
+      <p:ext uri="{BB962C8B-B14F-4D97-AF65-F5344CB8AC3E}">
+        <p14:creationId xmlns:p14="http://schemas.microsoft.com/office/powerpoint/2010/main" val="2743713819"/>
+      </p:ext>
+    </p:extLst>
+  </p:cSld>
+  <p:clrMapOvr>
+    <a:masterClrMapping/>
+  </p:clrMapOvr>
+</p:notes>
+</file>
+
+<file path=ppt/notesSlides/notesSlide7.xml><?xml version="1.0" encoding="utf-8"?>
 <p:notes xmlns:a="http://schemas.openxmlformats.org/drawingml/2006/main" xmlns:r="http://schemas.openxmlformats.org/officeDocument/2006/relationships" xmlns:p="http://schemas.openxmlformats.org/presentationml/2006/main">
   <p:cSld>
     <p:spTree>
@@ -5580,7 +5961,7 @@
             <a:pPr rtl="0"/>
             <a:fld id="{BC0C2C40-CB1C-4820-9151-EC51EC2E7E0F}" type="slidenum">
               <a:rPr lang="pl-PL" smtClean="0"/>
-              <a:t>8</a:t>
+              <a:t>9</a:t>
             </a:fld>
             <a:endParaRPr lang="pl-PL" dirty="0"/>
           </a:p>
@@ -9895,7 +10276,7 @@
                 <a:latin typeface="Segoe UI Semibold" panose="020B0502040204020203" pitchFamily="34" charset="0"/>
                 <a:cs typeface="Segoe UI Semibold" panose="020B0502040204020203" pitchFamily="34" charset="0"/>
               </a:rPr>
-              <a:t>Data source</a:t>
+              <a:t>Data Source</a:t>
             </a:r>
             <a:endParaRPr lang="pl-PL" b="1" dirty="0">
               <a:solidFill>
@@ -10005,6 +10386,116 @@
 </file>
 
 <file path=ppt/slides/slide4.xml><?xml version="1.0" encoding="utf-8"?>
+<p:sld xmlns:a="http://schemas.openxmlformats.org/drawingml/2006/main" xmlns:r="http://schemas.openxmlformats.org/officeDocument/2006/relationships" xmlns:p="http://schemas.openxmlformats.org/presentationml/2006/main">
+  <p:cSld>
+    <p:spTree>
+      <p:nvGrpSpPr>
+        <p:cNvPr id="1" name=""/>
+        <p:cNvGrpSpPr/>
+        <p:nvPr/>
+      </p:nvGrpSpPr>
+      <p:grpSpPr>
+        <a:xfrm>
+          <a:off x="0" y="0"/>
+          <a:ext cx="0" cy="0"/>
+          <a:chOff x="0" y="0"/>
+          <a:chExt cx="0" cy="0"/>
+        </a:xfrm>
+      </p:grpSpPr>
+      <p:sp>
+        <p:nvSpPr>
+          <p:cNvPr id="4" name="Tytuł 3">
+            <a:extLst>
+              <a:ext uri="{FF2B5EF4-FFF2-40B4-BE49-F238E27FC236}">
+                <a16:creationId xmlns:a16="http://schemas.microsoft.com/office/drawing/2014/main" id="{FE7E940F-6D6B-4FE5-8CA2-E8AE96D300C2}"/>
+              </a:ext>
+            </a:extLst>
+          </p:cNvPr>
+          <p:cNvSpPr>
+            <a:spLocks noGrp="1"/>
+          </p:cNvSpPr>
+          <p:nvPr>
+            <p:ph type="title"/>
+          </p:nvPr>
+        </p:nvSpPr>
+        <p:spPr>
+          <a:xfrm>
+            <a:off x="444500" y="414843"/>
+            <a:ext cx="9146972" cy="640080"/>
+          </a:xfrm>
+        </p:spPr>
+        <p:txBody>
+          <a:bodyPr rtlCol="0"/>
+          <a:lstStyle>
+            <a:defPPr>
+              <a:defRPr lang="pl-PL"/>
+            </a:defPPr>
+          </a:lstStyle>
+          <a:p>
+            <a:pPr rtl="0"/>
+            <a:r>
+              <a:rPr lang="en-US" b="1" dirty="0">
+                <a:latin typeface="Segoe UI Semibold" panose="020B0502040204020203" pitchFamily="34" charset="0"/>
+                <a:cs typeface="Segoe UI Semibold" panose="020B0502040204020203" pitchFamily="34" charset="0"/>
+              </a:rPr>
+              <a:t>Data Model</a:t>
+            </a:r>
+            <a:endParaRPr lang="pl-PL" b="1" dirty="0">
+              <a:solidFill>
+                <a:schemeClr val="bg2">
+                  <a:lumMod val="50000"/>
+                </a:schemeClr>
+              </a:solidFill>
+              <a:latin typeface="Segoe UI Semibold" panose="020B0502040204020203" pitchFamily="34" charset="0"/>
+              <a:cs typeface="Segoe UI Semibold" panose="020B0502040204020203" pitchFamily="34" charset="0"/>
+            </a:endParaRPr>
+          </a:p>
+        </p:txBody>
+      </p:sp>
+      <p:pic>
+        <p:nvPicPr>
+          <p:cNvPr id="11" name="Picture 10">
+            <a:extLst>
+              <a:ext uri="{FF2B5EF4-FFF2-40B4-BE49-F238E27FC236}">
+                <a16:creationId xmlns:a16="http://schemas.microsoft.com/office/drawing/2014/main" id="{CF7F17D2-A006-FB3B-8836-D671BC8F8BB7}"/>
+              </a:ext>
+            </a:extLst>
+          </p:cNvPr>
+          <p:cNvPicPr>
+            <a:picLocks noChangeAspect="1"/>
+          </p:cNvPicPr>
+          <p:nvPr/>
+        </p:nvPicPr>
+        <p:blipFill>
+          <a:blip r:embed="rId3"/>
+          <a:stretch>
+            <a:fillRect/>
+          </a:stretch>
+        </p:blipFill>
+        <p:spPr>
+          <a:xfrm>
+            <a:off x="1346199" y="1162117"/>
+            <a:ext cx="8473017" cy="5546658"/>
+          </a:xfrm>
+          <a:prstGeom prst="rect">
+            <a:avLst/>
+          </a:prstGeom>
+        </p:spPr>
+      </p:pic>
+    </p:spTree>
+    <p:extLst>
+      <p:ext uri="{BB962C8B-B14F-4D97-AF65-F5344CB8AC3E}">
+        <p14:creationId xmlns:p14="http://schemas.microsoft.com/office/powerpoint/2010/main" val="3649938668"/>
+      </p:ext>
+    </p:extLst>
+  </p:cSld>
+  <p:clrMapOvr>
+    <a:masterClrMapping/>
+  </p:clrMapOvr>
+</p:sld>
+</file>
+
+<file path=ppt/slides/slide5.xml><?xml version="1.0" encoding="utf-8"?>
 <p:sld xmlns:a="http://schemas.openxmlformats.org/drawingml/2006/main" xmlns:r="http://schemas.openxmlformats.org/officeDocument/2006/relationships" xmlns:p="http://schemas.openxmlformats.org/presentationml/2006/main">
   <p:cSld>
     <p:spTree>
@@ -10501,13 +10992,13 @@
               <p:nvPr/>
             </p:nvPicPr>
             <p:blipFill>
-              <a:blip r:embed="rId2">
+              <a:blip r:embed="rId3">
                 <a:extLst>
                   <a:ext uri="{28A0092B-C50C-407E-A947-70E740481C1C}">
                     <a14:useLocalDpi xmlns:a14="http://schemas.microsoft.com/office/drawing/2010/main" val="0"/>
                   </a:ext>
                   <a:ext uri="{96DAC541-7B7A-43D3-8B79-37D633B846F1}">
-                    <asvg:svgBlip xmlns:asvg="http://schemas.microsoft.com/office/drawing/2016/SVG/main" r:embed="rId3"/>
+                    <asvg:svgBlip xmlns:asvg="http://schemas.microsoft.com/office/drawing/2016/SVG/main" r:embed="rId4"/>
                   </a:ext>
                 </a:extLst>
               </a:blip>
@@ -10617,13 +11108,13 @@
               <p:nvPr/>
             </p:nvPicPr>
             <p:blipFill>
-              <a:blip r:embed="rId4">
+              <a:blip r:embed="rId5">
                 <a:extLst>
                   <a:ext uri="{28A0092B-C50C-407E-A947-70E740481C1C}">
                     <a14:useLocalDpi xmlns:a14="http://schemas.microsoft.com/office/drawing/2010/main" val="0"/>
                   </a:ext>
                   <a:ext uri="{96DAC541-7B7A-43D3-8B79-37D633B846F1}">
-                    <asvg:svgBlip xmlns:asvg="http://schemas.microsoft.com/office/drawing/2016/SVG/main" r:embed="rId5"/>
+                    <asvg:svgBlip xmlns:asvg="http://schemas.microsoft.com/office/drawing/2016/SVG/main" r:embed="rId6"/>
                   </a:ext>
                 </a:extLst>
               </a:blip>
@@ -10733,13 +11224,13 @@
               <p:nvPr/>
             </p:nvPicPr>
             <p:blipFill>
-              <a:blip r:embed="rId6">
+              <a:blip r:embed="rId7">
                 <a:extLst>
                   <a:ext uri="{28A0092B-C50C-407E-A947-70E740481C1C}">
                     <a14:useLocalDpi xmlns:a14="http://schemas.microsoft.com/office/drawing/2010/main" val="0"/>
                   </a:ext>
                   <a:ext uri="{96DAC541-7B7A-43D3-8B79-37D633B846F1}">
-                    <asvg:svgBlip xmlns:asvg="http://schemas.microsoft.com/office/drawing/2016/SVG/main" r:embed="rId7"/>
+                    <asvg:svgBlip xmlns:asvg="http://schemas.microsoft.com/office/drawing/2016/SVG/main" r:embed="rId8"/>
                   </a:ext>
                 </a:extLst>
               </a:blip>
@@ -11029,13 +11520,13 @@
               <p:nvPr/>
             </p:nvPicPr>
             <p:blipFill>
-              <a:blip r:embed="rId8">
+              <a:blip r:embed="rId9">
                 <a:extLst>
                   <a:ext uri="{28A0092B-C50C-407E-A947-70E740481C1C}">
                     <a14:useLocalDpi xmlns:a14="http://schemas.microsoft.com/office/drawing/2010/main" val="0"/>
                   </a:ext>
                   <a:ext uri="{96DAC541-7B7A-43D3-8B79-37D633B846F1}">
-                    <asvg:svgBlip xmlns:asvg="http://schemas.microsoft.com/office/drawing/2016/SVG/main" r:embed="rId9"/>
+                    <asvg:svgBlip xmlns:asvg="http://schemas.microsoft.com/office/drawing/2016/SVG/main" r:embed="rId10"/>
                   </a:ext>
                 </a:extLst>
               </a:blip>
@@ -11068,7 +11559,7 @@
 </p:sld>
 </file>
 
-<file path=ppt/slides/slide5.xml><?xml version="1.0" encoding="utf-8"?>
+<file path=ppt/slides/slide6.xml><?xml version="1.0" encoding="utf-8"?>
 <p:sld xmlns:a="http://schemas.openxmlformats.org/drawingml/2006/main" xmlns:r="http://schemas.openxmlformats.org/officeDocument/2006/relationships" xmlns:p="http://schemas.openxmlformats.org/presentationml/2006/main">
   <p:cSld>
     <p:spTree>
@@ -12567,7 +13058,7 @@
 </p:sld>
 </file>
 
-<file path=ppt/slides/slide6.xml><?xml version="1.0" encoding="utf-8"?>
+<file path=ppt/slides/slide7.xml><?xml version="1.0" encoding="utf-8"?>
 <p:sld xmlns:a="http://schemas.openxmlformats.org/drawingml/2006/main" xmlns:r="http://schemas.openxmlformats.org/officeDocument/2006/relationships" xmlns:p="http://schemas.openxmlformats.org/presentationml/2006/main">
   <p:cSld>
     <p:spTree>
@@ -14345,7 +14836,7 @@
     </p:spTree>
     <p:extLst>
       <p:ext uri="{BB962C8B-B14F-4D97-AF65-F5344CB8AC3E}">
-        <p14:creationId xmlns:p14="http://schemas.microsoft.com/office/powerpoint/2010/main" val="3649938668"/>
+        <p14:creationId xmlns:p14="http://schemas.microsoft.com/office/powerpoint/2010/main" val="464753761"/>
       </p:ext>
     </p:extLst>
   </p:cSld>
@@ -14355,7 +14846,7 @@
 </p:sld>
 </file>
 
-<file path=ppt/slides/slide7.xml><?xml version="1.0" encoding="utf-8"?>
+<file path=ppt/slides/slide8.xml><?xml version="1.0" encoding="utf-8"?>
 <p:sld xmlns:a="http://schemas.openxmlformats.org/drawingml/2006/main" xmlns:r="http://schemas.openxmlformats.org/officeDocument/2006/relationships" xmlns:p="http://schemas.openxmlformats.org/presentationml/2006/main">
   <p:cSld>
     <p:spTree>
@@ -16403,7 +16894,7 @@
 </p:sld>
 </file>
 
-<file path=ppt/slides/slide8.xml><?xml version="1.0" encoding="utf-8"?>
+<file path=ppt/slides/slide9.xml><?xml version="1.0" encoding="utf-8"?>
 <p:sld xmlns:a="http://schemas.openxmlformats.org/drawingml/2006/main" xmlns:r="http://schemas.openxmlformats.org/officeDocument/2006/relationships" xmlns:p="http://schemas.openxmlformats.org/presentationml/2006/main">
   <p:cSld>
     <p:spTree>
@@ -19727,6 +20218,25 @@
 </file>
 
 <file path=customXml/item1.xml><?xml version="1.0" encoding="utf-8"?>
+<p:properties xmlns:p="http://schemas.microsoft.com/office/2006/metadata/properties" xmlns:xsi="http://www.w3.org/2001/XMLSchema-instance" xmlns:pc="http://schemas.microsoft.com/office/infopath/2007/PartnerControls">
+  <documentManagement>
+    <Status xmlns="71af3243-3dd4-4a8d-8c0d-dd76da1f02a5">Not started</Status>
+    <_ip_UnifiedCompliancePolicyUIAction xmlns="http://schemas.microsoft.com/sharepoint/v3" xsi:nil="true"/>
+    <Image xmlns="71af3243-3dd4-4a8d-8c0d-dd76da1f02a5">
+      <Url xsi:nil="true"/>
+      <Description xsi:nil="true"/>
+    </Image>
+    <_ip_UnifiedCompliancePolicyProperties xmlns="http://schemas.microsoft.com/sharepoint/v3" xsi:nil="true"/>
+    <ImageTagsTaxHTField xmlns="71af3243-3dd4-4a8d-8c0d-dd76da1f02a5">
+      <Terms xmlns="http://schemas.microsoft.com/office/infopath/2007/PartnerControls"/>
+    </ImageTagsTaxHTField>
+    <TaxCatchAll xmlns="230e9df3-be65-4c73-a93b-d1236ebd677e"/>
+    <MediaServiceKeyPoints xmlns="71af3243-3dd4-4a8d-8c0d-dd76da1f02a5" xsi:nil="true"/>
+  </documentManagement>
+</p:properties>
+</file>
+
+<file path=customXml/item2.xml><?xml version="1.0" encoding="utf-8"?>
 <ct:contentTypeSchema xmlns:ct="http://schemas.microsoft.com/office/2006/metadata/contentType" xmlns:ma="http://schemas.microsoft.com/office/2006/metadata/properties/metaAttributes" ct:_="" ma:_="" ma:contentTypeName="Document" ma:contentTypeID="0x01010079F111ED35F8CC479449609E8A0923A6" ma:contentTypeVersion="20" ma:contentTypeDescription="Create a new document." ma:contentTypeScope="" ma:versionID="1267097ee5f5874adfcc408041ae252e">
   <xsd:schema xmlns:xsd="http://www.w3.org/2001/XMLSchema" xmlns:xs="http://www.w3.org/2001/XMLSchema" xmlns:p="http://schemas.microsoft.com/office/2006/metadata/properties" xmlns:ns1="http://schemas.microsoft.com/sharepoint/v3" xmlns:ns2="71af3243-3dd4-4a8d-8c0d-dd76da1f02a5" xmlns:ns3="16c05727-aa75-4e4a-9b5f-8a80a1165891" xmlns:ns4="230e9df3-be65-4c73-a93b-d1236ebd677e" targetNamespace="http://schemas.microsoft.com/office/2006/metadata/properties" ma:root="true" ma:fieldsID="395891a93df65b14727750f2c06c306c" ns1:_="" ns2:_="" ns3:_="" ns4:_="">
     <xsd:import namespace="http://schemas.microsoft.com/sharepoint/v3"/>
@@ -20002,25 +20512,6 @@
 </ct:contentTypeSchema>
 </file>
 
-<file path=customXml/item2.xml><?xml version="1.0" encoding="utf-8"?>
-<p:properties xmlns:p="http://schemas.microsoft.com/office/2006/metadata/properties" xmlns:xsi="http://www.w3.org/2001/XMLSchema-instance" xmlns:pc="http://schemas.microsoft.com/office/infopath/2007/PartnerControls">
-  <documentManagement>
-    <Status xmlns="71af3243-3dd4-4a8d-8c0d-dd76da1f02a5">Not started</Status>
-    <_ip_UnifiedCompliancePolicyUIAction xmlns="http://schemas.microsoft.com/sharepoint/v3" xsi:nil="true"/>
-    <Image xmlns="71af3243-3dd4-4a8d-8c0d-dd76da1f02a5">
-      <Url xsi:nil="true"/>
-      <Description xsi:nil="true"/>
-    </Image>
-    <_ip_UnifiedCompliancePolicyProperties xmlns="http://schemas.microsoft.com/sharepoint/v3" xsi:nil="true"/>
-    <ImageTagsTaxHTField xmlns="71af3243-3dd4-4a8d-8c0d-dd76da1f02a5">
-      <Terms xmlns="http://schemas.microsoft.com/office/infopath/2007/PartnerControls"/>
-    </ImageTagsTaxHTField>
-    <TaxCatchAll xmlns="230e9df3-be65-4c73-a93b-d1236ebd677e"/>
-    <MediaServiceKeyPoints xmlns="71af3243-3dd4-4a8d-8c0d-dd76da1f02a5" xsi:nil="true"/>
-  </documentManagement>
-</p:properties>
-</file>
-
 <file path=customXml/item3.xml><?xml version="1.0" encoding="utf-8"?>
 <?mso-contentType ?>
 <FormTemplates xmlns="http://schemas.microsoft.com/sharepoint/v3/contenttype/forms">
@@ -20031,6 +20522,18 @@
 </file>
 
 <file path=customXml/itemProps1.xml><?xml version="1.0" encoding="utf-8"?>
+<ds:datastoreItem xmlns:ds="http://schemas.openxmlformats.org/officeDocument/2006/customXml" ds:itemID="{1C44B501-5DE1-46D9-B449-400C46FE1425}">
+  <ds:schemaRefs>
+    <ds:schemaRef ds:uri="http://schemas.microsoft.com/office/2006/metadata/properties"/>
+    <ds:schemaRef ds:uri="http://schemas.microsoft.com/office/infopath/2007/PartnerControls"/>
+    <ds:schemaRef ds:uri="71af3243-3dd4-4a8d-8c0d-dd76da1f02a5"/>
+    <ds:schemaRef ds:uri="http://schemas.microsoft.com/sharepoint/v3"/>
+    <ds:schemaRef ds:uri="230e9df3-be65-4c73-a93b-d1236ebd677e"/>
+  </ds:schemaRefs>
+</ds:datastoreItem>
+</file>
+
+<file path=customXml/itemProps2.xml><?xml version="1.0" encoding="utf-8"?>
 <ds:datastoreItem xmlns:ds="http://schemas.openxmlformats.org/officeDocument/2006/customXml" ds:itemID="{B2A44EB6-3BD3-4FF9-B8D1-D973C54C3ED7}">
   <ds:schemaRefs>
     <ds:schemaRef ds:uri="http://schemas.microsoft.com/office/2006/metadata/contentType"/>
@@ -20051,18 +20554,6 @@
 </ds:datastoreItem>
 </file>
 
-<file path=customXml/itemProps2.xml><?xml version="1.0" encoding="utf-8"?>
-<ds:datastoreItem xmlns:ds="http://schemas.openxmlformats.org/officeDocument/2006/customXml" ds:itemID="{1C44B501-5DE1-46D9-B449-400C46FE1425}">
-  <ds:schemaRefs>
-    <ds:schemaRef ds:uri="http://schemas.microsoft.com/office/2006/metadata/properties"/>
-    <ds:schemaRef ds:uri="http://schemas.microsoft.com/office/infopath/2007/PartnerControls"/>
-    <ds:schemaRef ds:uri="71af3243-3dd4-4a8d-8c0d-dd76da1f02a5"/>
-    <ds:schemaRef ds:uri="http://schemas.microsoft.com/sharepoint/v3"/>
-    <ds:schemaRef ds:uri="230e9df3-be65-4c73-a93b-d1236ebd677e"/>
-  </ds:schemaRefs>
-</ds:datastoreItem>
-</file>
-
 <file path=customXml/itemProps3.xml><?xml version="1.0" encoding="utf-8"?>
 <ds:datastoreItem xmlns:ds="http://schemas.openxmlformats.org/officeDocument/2006/customXml" ds:itemID="{77DD0DBF-30B2-4FC6-A5E7-8374DC718037}">
   <ds:schemaRefs>

</xml_diff>

<commit_message>
Slide 6. Overall 7.53 minutes
</commit_message>
<xml_diff>
--- a/Presentation/Analyzing the StackOverflow2013 Database from 2008 to 2013.pptx
+++ b/Presentation/Analyzing the StackOverflow2013 Database from 2008 to 2013.pptx
@@ -5,7 +5,7 @@
     <p:sldMasterId id="2147483648" r:id="rId4"/>
   </p:sldMasterIdLst>
   <p:notesMasterIdLst>
-    <p:notesMasterId r:id="rId15"/>
+    <p:notesMasterId r:id="rId16"/>
   </p:notesMasterIdLst>
   <p:sldIdLst>
     <p:sldId id="259" r:id="rId5"/>
@@ -13,11 +13,12 @@
     <p:sldId id="262" r:id="rId7"/>
     <p:sldId id="268" r:id="rId8"/>
     <p:sldId id="266" r:id="rId9"/>
-    <p:sldId id="271" r:id="rId10"/>
-    <p:sldId id="265" r:id="rId11"/>
-    <p:sldId id="270" r:id="rId12"/>
-    <p:sldId id="264" r:id="rId13"/>
-    <p:sldId id="263" r:id="rId14"/>
+    <p:sldId id="270" r:id="rId10"/>
+    <p:sldId id="271" r:id="rId11"/>
+    <p:sldId id="265" r:id="rId12"/>
+    <p:sldId id="272" r:id="rId13"/>
+    <p:sldId id="264" r:id="rId14"/>
+    <p:sldId id="263" r:id="rId15"/>
   </p:sldIdLst>
   <p:sldSz cx="12192000" cy="6858000"/>
   <p:notesSz cx="6858000" cy="9144000"/>
@@ -4806,7 +4807,7 @@
             <a:pPr rtl="0"/>
             <a:fld id="{3D3DD571-E22F-4A38-B450-8CCBD829A548}" type="datetimeFigureOut">
               <a:rPr lang="pl-PL"/>
-              <a:t>25.12.2023</a:t>
+              <a:t>26.12.2023</a:t>
             </a:fld>
             <a:endParaRPr lang="pl-PL" dirty="0"/>
           </a:p>
@@ -5885,7 +5886,71 @@
           <a:bodyPr/>
           <a:lstStyle/>
           <a:p>
-            <a:endParaRPr lang="pl-PL"/>
+            <a:r>
+              <a:rPr lang="en-US" dirty="0"/>
+              <a:t>In this slide, I'm detailing the efficient process of exporting data from SQL Server to CSV and then compressing it for optimal transfer speed.</a:t>
+            </a:r>
+          </a:p>
+          <a:p>
+            <a:endParaRPr lang="en-US" dirty="0"/>
+          </a:p>
+          <a:p>
+            <a:r>
+              <a:rPr lang="en-US" dirty="0"/>
+              <a:t>I start by using BCP, which stands for Bulk Copy Program, a tool provided by SQL Server. It's the fastest method available to perform large-scale data exports to CSV format, ensuring speed and efficiency. I specify the view names that form the collection of data I wish to export, and then I initiate a loop to process each view individually.</a:t>
+            </a:r>
+          </a:p>
+          <a:p>
+            <a:endParaRPr lang="en-US" dirty="0"/>
+          </a:p>
+          <a:p>
+            <a:r>
+              <a:rPr lang="en-US" dirty="0"/>
+              <a:t>Once the CSV files are generated, I use 7-Zip to compress them into </a:t>
+            </a:r>
+            <a:r>
+              <a:rPr lang="en-US" dirty="0" err="1"/>
+              <a:t>gzip</a:t>
+            </a:r>
+            <a:r>
+              <a:rPr lang="en-US" dirty="0"/>
+              <a:t> format. One of the key advantages of </a:t>
+            </a:r>
+            <a:r>
+              <a:rPr lang="en-US" dirty="0" err="1"/>
+              <a:t>gzip</a:t>
+            </a:r>
+            <a:r>
+              <a:rPr lang="en-US" dirty="0"/>
+              <a:t> is its compatibility with Databricks' file system. It can read </a:t>
+            </a:r>
+            <a:r>
+              <a:rPr lang="en-US" dirty="0" err="1"/>
+              <a:t>gzip</a:t>
+            </a:r>
+            <a:r>
+              <a:rPr lang="en-US" dirty="0"/>
+              <a:t> files directly, which means there's no need to decompress them on the platform, saving valuable processing time and simplifying the data pipeline.</a:t>
+            </a:r>
+          </a:p>
+          <a:p>
+            <a:endParaRPr lang="en-US" dirty="0"/>
+          </a:p>
+          <a:p>
+            <a:r>
+              <a:rPr lang="en-US" dirty="0"/>
+              <a:t>The bottom part of the slide shows the actual script that orchestrates this entire process: from setting environment variables for BCP to executing the compression commands and cleaning up interim files. This script is the backbone of the procedure, handling everything from data extraction to final file compression, ready for sending to Databricks.</a:t>
+            </a:r>
+          </a:p>
+          <a:p>
+            <a:endParaRPr lang="en-US" dirty="0"/>
+          </a:p>
+          <a:p>
+            <a:r>
+              <a:rPr lang="en-US" dirty="0"/>
+              <a:t>1.54’</a:t>
+            </a:r>
+            <a:endParaRPr lang="pl-PL" dirty="0"/>
           </a:p>
         </p:txBody>
       </p:sp>
@@ -5916,7 +5981,7 @@
     </p:spTree>
     <p:extLst>
       <p:ext uri="{BB962C8B-B14F-4D97-AF65-F5344CB8AC3E}">
-        <p14:creationId xmlns:p14="http://schemas.microsoft.com/office/powerpoint/2010/main" val="2667232071"/>
+        <p14:creationId xmlns:p14="http://schemas.microsoft.com/office/powerpoint/2010/main" val="3341483179"/>
       </p:ext>
     </p:extLst>
   </p:cSld>
@@ -6001,6 +6066,91 @@
     </p:spTree>
     <p:extLst>
       <p:ext uri="{BB962C8B-B14F-4D97-AF65-F5344CB8AC3E}">
+        <p14:creationId xmlns:p14="http://schemas.microsoft.com/office/powerpoint/2010/main" val="2667232071"/>
+      </p:ext>
+    </p:extLst>
+  </p:cSld>
+  <p:clrMapOvr>
+    <a:masterClrMapping/>
+  </p:clrMapOvr>
+</p:notes>
+</file>
+
+<file path=ppt/notesSlides/notesSlide8.xml><?xml version="1.0" encoding="utf-8"?>
+<p:notes xmlns:a="http://schemas.openxmlformats.org/drawingml/2006/main" xmlns:r="http://schemas.openxmlformats.org/officeDocument/2006/relationships" xmlns:p="http://schemas.openxmlformats.org/presentationml/2006/main">
+  <p:cSld>
+    <p:spTree>
+      <p:nvGrpSpPr>
+        <p:cNvPr id="1" name=""/>
+        <p:cNvGrpSpPr/>
+        <p:nvPr/>
+      </p:nvGrpSpPr>
+      <p:grpSpPr>
+        <a:xfrm>
+          <a:off x="0" y="0"/>
+          <a:ext cx="0" cy="0"/>
+          <a:chOff x="0" y="0"/>
+          <a:chExt cx="0" cy="0"/>
+        </a:xfrm>
+      </p:grpSpPr>
+      <p:sp>
+        <p:nvSpPr>
+          <p:cNvPr id="2" name="Slide Image Placeholder 1"/>
+          <p:cNvSpPr>
+            <a:spLocks noGrp="1" noRot="1" noChangeAspect="1"/>
+          </p:cNvSpPr>
+          <p:nvPr>
+            <p:ph type="sldImg"/>
+          </p:nvPr>
+        </p:nvSpPr>
+        <p:spPr/>
+      </p:sp>
+      <p:sp>
+        <p:nvSpPr>
+          <p:cNvPr id="3" name="Notes Placeholder 2"/>
+          <p:cNvSpPr>
+            <a:spLocks noGrp="1"/>
+          </p:cNvSpPr>
+          <p:nvPr>
+            <p:ph type="body" idx="1"/>
+          </p:nvPr>
+        </p:nvSpPr>
+        <p:spPr/>
+        <p:txBody>
+          <a:bodyPr/>
+          <a:lstStyle/>
+          <a:p>
+            <a:endParaRPr lang="pl-PL"/>
+          </a:p>
+        </p:txBody>
+      </p:sp>
+      <p:sp>
+        <p:nvSpPr>
+          <p:cNvPr id="4" name="Slide Number Placeholder 3"/>
+          <p:cNvSpPr>
+            <a:spLocks noGrp="1"/>
+          </p:cNvSpPr>
+          <p:nvPr>
+            <p:ph type="sldNum" sz="quarter" idx="5"/>
+          </p:nvPr>
+        </p:nvSpPr>
+        <p:spPr/>
+        <p:txBody>
+          <a:bodyPr/>
+          <a:lstStyle/>
+          <a:p>
+            <a:pPr rtl="0"/>
+            <a:fld id="{BC0C2C40-CB1C-4820-9151-EC51EC2E7E0F}" type="slidenum">
+              <a:rPr lang="pl-PL" smtClean="0"/>
+              <a:t>8</a:t>
+            </a:fld>
+            <a:endParaRPr lang="pl-PL" dirty="0"/>
+          </a:p>
+        </p:txBody>
+      </p:sp>
+    </p:spTree>
+    <p:extLst>
+      <p:ext uri="{BB962C8B-B14F-4D97-AF65-F5344CB8AC3E}">
         <p14:creationId xmlns:p14="http://schemas.microsoft.com/office/powerpoint/2010/main" val="2743713819"/>
       </p:ext>
     </p:extLst>
@@ -6011,7 +6161,7 @@
 </p:notes>
 </file>
 
-<file path=ppt/notesSlides/notesSlide8.xml><?xml version="1.0" encoding="utf-8"?>
+<file path=ppt/notesSlides/notesSlide9.xml><?xml version="1.0" encoding="utf-8"?>
 <p:notes xmlns:a="http://schemas.openxmlformats.org/drawingml/2006/main" xmlns:r="http://schemas.openxmlformats.org/officeDocument/2006/relationships" xmlns:p="http://schemas.openxmlformats.org/presentationml/2006/main">
   <p:cSld>
     <p:spTree>
@@ -6086,7 +6236,7 @@
             <a:pPr rtl="0"/>
             <a:fld id="{BC0C2C40-CB1C-4820-9151-EC51EC2E7E0F}" type="slidenum">
               <a:rPr lang="pl-PL" smtClean="0"/>
-              <a:t>10</a:t>
+              <a:t>11</a:t>
             </a:fld>
             <a:endParaRPr lang="pl-PL" dirty="0"/>
           </a:p>
@@ -6370,7 +6520,7 @@
             <a:pPr rtl="0"/>
             <a:fld id="{703E2F8D-62B3-48AF-BAF5-944399905ED0}" type="datetimeFigureOut">
               <a:rPr lang="pl-PL" smtClean="0"/>
-              <a:t>25.12.2023</a:t>
+              <a:t>26.12.2023</a:t>
             </a:fld>
             <a:endParaRPr lang="pl-PL" dirty="0"/>
           </a:p>
@@ -6610,7 +6760,7 @@
             <a:pPr rtl="0"/>
             <a:fld id="{703E2F8D-62B3-48AF-BAF5-944399905ED0}" type="datetimeFigureOut">
               <a:rPr lang="pl-PL" smtClean="0"/>
-              <a:t>25.12.2023</a:t>
+              <a:t>26.12.2023</a:t>
             </a:fld>
             <a:endParaRPr lang="pl-PL" dirty="0"/>
           </a:p>
@@ -6943,7 +7093,7 @@
             <a:fld id="{8BEEBAAA-29B5-4AF5-BC5F-7E580C29002D}" type="datetimeFigureOut">
               <a:rPr lang="pl-PL" smtClean="0"/>
               <a:pPr rtl="0"/>
-              <a:t>25.12.2023</a:t>
+              <a:t>26.12.2023</a:t>
             </a:fld>
             <a:endParaRPr lang="pl-PL" dirty="0"/>
           </a:p>
@@ -7667,7 +7817,7 @@
             <a:pPr rtl="0"/>
             <a:fld id="{703E2F8D-62B3-48AF-BAF5-944399905ED0}" type="datetimeFigureOut">
               <a:rPr lang="pl-PL" smtClean="0"/>
-              <a:t>25.12.2023</a:t>
+              <a:t>26.12.2023</a:t>
             </a:fld>
             <a:endParaRPr lang="pl-PL" dirty="0"/>
           </a:p>
@@ -8125,7 +8275,7 @@
             <a:pPr rtl="0"/>
             <a:fld id="{703E2F8D-62B3-48AF-BAF5-944399905ED0}" type="datetimeFigureOut">
               <a:rPr lang="pl-PL" smtClean="0"/>
-              <a:t>25.12.2023</a:t>
+              <a:t>26.12.2023</a:t>
             </a:fld>
             <a:endParaRPr lang="pl-PL" dirty="0"/>
           </a:p>
@@ -8295,7 +8445,7 @@
             <a:pPr rtl="0"/>
             <a:fld id="{703E2F8D-62B3-48AF-BAF5-944399905ED0}" type="datetimeFigureOut">
               <a:rPr lang="pl-PL" smtClean="0"/>
-              <a:t>25.12.2023</a:t>
+              <a:t>26.12.2023</a:t>
             </a:fld>
             <a:endParaRPr lang="pl-PL" dirty="0"/>
           </a:p>
@@ -8423,7 +8573,7 @@
             <a:pPr rtl="0"/>
             <a:fld id="{703E2F8D-62B3-48AF-BAF5-944399905ED0}" type="datetimeFigureOut">
               <a:rPr lang="pl-PL" smtClean="0"/>
-              <a:t>25.12.2023</a:t>
+              <a:t>26.12.2023</a:t>
             </a:fld>
             <a:endParaRPr lang="pl-PL" dirty="0"/>
           </a:p>
@@ -8761,7 +8911,7 @@
             <a:pPr rtl="0"/>
             <a:fld id="{703E2F8D-62B3-48AF-BAF5-944399905ED0}" type="datetimeFigureOut">
               <a:rPr lang="pl-PL" smtClean="0"/>
-              <a:t>25.12.2023</a:t>
+              <a:t>26.12.2023</a:t>
             </a:fld>
             <a:endParaRPr lang="pl-PL" dirty="0"/>
           </a:p>
@@ -9080,7 +9230,7 @@
             <a:pPr rtl="0"/>
             <a:fld id="{703E2F8D-62B3-48AF-BAF5-944399905ED0}" type="datetimeFigureOut">
               <a:rPr lang="pl-PL" smtClean="0"/>
-              <a:t>25.12.2023</a:t>
+              <a:t>26.12.2023</a:t>
             </a:fld>
             <a:endParaRPr lang="pl-PL" dirty="0"/>
           </a:p>
@@ -9344,7 +9494,7 @@
             <a:pPr rtl="0"/>
             <a:fld id="{703E2F8D-62B3-48AF-BAF5-944399905ED0}" type="datetimeFigureOut">
               <a:rPr lang="pl-PL" smtClean="0"/>
-              <a:t>25.12.2023</a:t>
+              <a:t>26.12.2023</a:t>
             </a:fld>
             <a:endParaRPr lang="pl-PL" dirty="0"/>
           </a:p>
@@ -10239,6 +10389,2054 @@
 </file>
 
 <file path=ppt/slides/slide10.xml><?xml version="1.0" encoding="utf-8"?>
+<p:sld xmlns:a="http://schemas.openxmlformats.org/drawingml/2006/main" xmlns:r="http://schemas.openxmlformats.org/officeDocument/2006/relationships" xmlns:p="http://schemas.openxmlformats.org/presentationml/2006/main">
+  <p:cSld>
+    <p:spTree>
+      <p:nvGrpSpPr>
+        <p:cNvPr id="1" name=""/>
+        <p:cNvGrpSpPr/>
+        <p:nvPr/>
+      </p:nvGrpSpPr>
+      <p:grpSpPr>
+        <a:xfrm>
+          <a:off x="0" y="0"/>
+          <a:ext cx="0" cy="0"/>
+          <a:chOff x="0" y="0"/>
+          <a:chExt cx="0" cy="0"/>
+        </a:xfrm>
+      </p:grpSpPr>
+      <p:cxnSp>
+        <p:nvCxnSpPr>
+          <p:cNvPr id="59" name="Łącznik prosty 58" descr="linia prosta">
+            <a:extLst>
+              <a:ext uri="{FF2B5EF4-FFF2-40B4-BE49-F238E27FC236}">
+                <a16:creationId xmlns:a16="http://schemas.microsoft.com/office/drawing/2014/main" id="{08A55832-B73A-0349-BEE0-DF570483DF30}"/>
+              </a:ext>
+            </a:extLst>
+          </p:cNvPr>
+          <p:cNvCxnSpPr>
+            <a:cxnSpLocks/>
+          </p:cNvCxnSpPr>
+          <p:nvPr/>
+        </p:nvCxnSpPr>
+        <p:spPr>
+          <a:xfrm flipH="1" flipV="1">
+            <a:off x="8275791" y="2640750"/>
+            <a:ext cx="252079" cy="746356"/>
+          </a:xfrm>
+          <a:prstGeom prst="line">
+            <a:avLst/>
+          </a:prstGeom>
+          <a:ln>
+            <a:solidFill>
+              <a:schemeClr val="bg2">
+                <a:lumMod val="75000"/>
+              </a:schemeClr>
+            </a:solidFill>
+          </a:ln>
+        </p:spPr>
+        <p:style>
+          <a:lnRef idx="3">
+            <a:schemeClr val="dk1"/>
+          </a:lnRef>
+          <a:fillRef idx="0">
+            <a:schemeClr val="dk1"/>
+          </a:fillRef>
+          <a:effectRef idx="2">
+            <a:schemeClr val="dk1"/>
+          </a:effectRef>
+          <a:fontRef idx="minor">
+            <a:schemeClr val="tx1"/>
+          </a:fontRef>
+        </p:style>
+      </p:cxnSp>
+      <p:sp>
+        <p:nvSpPr>
+          <p:cNvPr id="4" name="Tytuł 3">
+            <a:extLst>
+              <a:ext uri="{FF2B5EF4-FFF2-40B4-BE49-F238E27FC236}">
+                <a16:creationId xmlns:a16="http://schemas.microsoft.com/office/drawing/2014/main" id="{FE7E940F-6D6B-4FE5-8CA2-E8AE96D300C2}"/>
+              </a:ext>
+            </a:extLst>
+          </p:cNvPr>
+          <p:cNvSpPr>
+            <a:spLocks noGrp="1"/>
+          </p:cNvSpPr>
+          <p:nvPr>
+            <p:ph type="title"/>
+          </p:nvPr>
+        </p:nvSpPr>
+        <p:spPr>
+          <a:xfrm>
+            <a:off x="444500" y="414843"/>
+            <a:ext cx="9146972" cy="640080"/>
+          </a:xfrm>
+        </p:spPr>
+        <p:txBody>
+          <a:bodyPr rtlCol="0"/>
+          <a:lstStyle>
+            <a:defPPr>
+              <a:defRPr lang="pl-PL"/>
+            </a:defPPr>
+          </a:lstStyle>
+          <a:p>
+            <a:pPr rtl="0"/>
+            <a:r>
+              <a:rPr lang="pl-PL" b="1">
+                <a:latin typeface="Segoe UI Semibold" panose="020B0502040204020203" pitchFamily="34" charset="0"/>
+                <a:cs typeface="Segoe UI Semibold" panose="020B0502040204020203" pitchFamily="34" charset="0"/>
+              </a:rPr>
+              <a:t>Przykład: </a:t>
+            </a:r>
+            <a:r>
+              <a:rPr lang="pl-PL" b="1">
+                <a:solidFill>
+                  <a:schemeClr val="bg2">
+                    <a:lumMod val="50000"/>
+                  </a:schemeClr>
+                </a:solidFill>
+                <a:latin typeface="Segoe UI Semibold" panose="020B0502040204020203" pitchFamily="34" charset="0"/>
+                <a:cs typeface="Segoe UI Semibold" panose="020B0502040204020203" pitchFamily="34" charset="0"/>
+              </a:rPr>
+              <a:t>Planowanie urlopu </a:t>
+            </a:r>
+          </a:p>
+        </p:txBody>
+      </p:sp>
+      <p:cxnSp>
+        <p:nvCxnSpPr>
+          <p:cNvPr id="6" name="Łącznik prosty 5" descr="linia prosta">
+            <a:extLst>
+              <a:ext uri="{FF2B5EF4-FFF2-40B4-BE49-F238E27FC236}">
+                <a16:creationId xmlns:a16="http://schemas.microsoft.com/office/drawing/2014/main" id="{BB3D7D1F-9F99-6544-A2AB-9D8FB2A9BC00}"/>
+              </a:ext>
+            </a:extLst>
+          </p:cNvPr>
+          <p:cNvCxnSpPr>
+            <a:cxnSpLocks/>
+          </p:cNvCxnSpPr>
+          <p:nvPr/>
+        </p:nvCxnSpPr>
+        <p:spPr>
+          <a:xfrm flipH="1" flipV="1">
+            <a:off x="4998766" y="2876580"/>
+            <a:ext cx="865892" cy="618105"/>
+          </a:xfrm>
+          <a:prstGeom prst="line">
+            <a:avLst/>
+          </a:prstGeom>
+          <a:ln/>
+        </p:spPr>
+        <p:style>
+          <a:lnRef idx="3">
+            <a:schemeClr val="dk1"/>
+          </a:lnRef>
+          <a:fillRef idx="0">
+            <a:schemeClr val="dk1"/>
+          </a:fillRef>
+          <a:effectRef idx="2">
+            <a:schemeClr val="dk1"/>
+          </a:effectRef>
+          <a:fontRef idx="minor">
+            <a:schemeClr val="tx1"/>
+          </a:fontRef>
+        </p:style>
+      </p:cxnSp>
+      <p:cxnSp>
+        <p:nvCxnSpPr>
+          <p:cNvPr id="7" name="Łącznik prosty 6" descr="linia prosta">
+            <a:extLst>
+              <a:ext uri="{FF2B5EF4-FFF2-40B4-BE49-F238E27FC236}">
+                <a16:creationId xmlns:a16="http://schemas.microsoft.com/office/drawing/2014/main" id="{FF161E3F-5F97-2145-A359-06236E6F1A17}"/>
+              </a:ext>
+            </a:extLst>
+          </p:cNvPr>
+          <p:cNvCxnSpPr>
+            <a:cxnSpLocks/>
+          </p:cNvCxnSpPr>
+          <p:nvPr/>
+        </p:nvCxnSpPr>
+        <p:spPr>
+          <a:xfrm flipH="1">
+            <a:off x="5149134" y="3972241"/>
+            <a:ext cx="1023302" cy="708753"/>
+          </a:xfrm>
+          <a:prstGeom prst="line">
+            <a:avLst/>
+          </a:prstGeom>
+          <a:ln/>
+        </p:spPr>
+        <p:style>
+          <a:lnRef idx="3">
+            <a:schemeClr val="dk1"/>
+          </a:lnRef>
+          <a:fillRef idx="0">
+            <a:schemeClr val="dk1"/>
+          </a:fillRef>
+          <a:effectRef idx="2">
+            <a:schemeClr val="dk1"/>
+          </a:effectRef>
+          <a:fontRef idx="minor">
+            <a:schemeClr val="tx1"/>
+          </a:fontRef>
+        </p:style>
+      </p:cxnSp>
+      <p:cxnSp>
+        <p:nvCxnSpPr>
+          <p:cNvPr id="8" name="Łącznik prosty 7" descr="linia prosta">
+            <a:extLst>
+              <a:ext uri="{FF2B5EF4-FFF2-40B4-BE49-F238E27FC236}">
+                <a16:creationId xmlns:a16="http://schemas.microsoft.com/office/drawing/2014/main" id="{75E1E8CB-9A55-1840-BD17-1FF20155D259}"/>
+              </a:ext>
+            </a:extLst>
+          </p:cNvPr>
+          <p:cNvCxnSpPr>
+            <a:cxnSpLocks/>
+          </p:cNvCxnSpPr>
+          <p:nvPr/>
+        </p:nvCxnSpPr>
+        <p:spPr>
+          <a:xfrm>
+            <a:off x="6172436" y="3972241"/>
+            <a:ext cx="1211935" cy="750365"/>
+          </a:xfrm>
+          <a:prstGeom prst="line">
+            <a:avLst/>
+          </a:prstGeom>
+          <a:ln/>
+        </p:spPr>
+        <p:style>
+          <a:lnRef idx="3">
+            <a:schemeClr val="dk1"/>
+          </a:lnRef>
+          <a:fillRef idx="0">
+            <a:schemeClr val="dk1"/>
+          </a:fillRef>
+          <a:effectRef idx="2">
+            <a:schemeClr val="dk1"/>
+          </a:effectRef>
+          <a:fontRef idx="minor">
+            <a:schemeClr val="tx1"/>
+          </a:fontRef>
+        </p:style>
+      </p:cxnSp>
+      <p:cxnSp>
+        <p:nvCxnSpPr>
+          <p:cNvPr id="9" name="Łącznik prosty 8" descr="linia prosta">
+            <a:extLst>
+              <a:ext uri="{FF2B5EF4-FFF2-40B4-BE49-F238E27FC236}">
+                <a16:creationId xmlns:a16="http://schemas.microsoft.com/office/drawing/2014/main" id="{CAAA0540-EB2B-7C4E-B6FD-3D2E940A5CBD}"/>
+              </a:ext>
+            </a:extLst>
+          </p:cNvPr>
+          <p:cNvCxnSpPr>
+            <a:cxnSpLocks/>
+          </p:cNvCxnSpPr>
+          <p:nvPr/>
+        </p:nvCxnSpPr>
+        <p:spPr>
+          <a:xfrm flipH="1">
+            <a:off x="6658102" y="2901766"/>
+            <a:ext cx="611786" cy="445658"/>
+          </a:xfrm>
+          <a:prstGeom prst="line">
+            <a:avLst/>
+          </a:prstGeom>
+          <a:ln/>
+        </p:spPr>
+        <p:style>
+          <a:lnRef idx="3">
+            <a:schemeClr val="dk1"/>
+          </a:lnRef>
+          <a:fillRef idx="0">
+            <a:schemeClr val="dk1"/>
+          </a:fillRef>
+          <a:effectRef idx="2">
+            <a:schemeClr val="dk1"/>
+          </a:effectRef>
+          <a:fontRef idx="minor">
+            <a:schemeClr val="tx1"/>
+          </a:fontRef>
+        </p:style>
+      </p:cxnSp>
+      <p:cxnSp>
+        <p:nvCxnSpPr>
+          <p:cNvPr id="10" name="Łącznik prosty 9" descr="linia prosta">
+            <a:extLst>
+              <a:ext uri="{FF2B5EF4-FFF2-40B4-BE49-F238E27FC236}">
+                <a16:creationId xmlns:a16="http://schemas.microsoft.com/office/drawing/2014/main" id="{C3A84B38-3D70-B74D-A3C8-E8C86A229730}"/>
+              </a:ext>
+            </a:extLst>
+          </p:cNvPr>
+          <p:cNvCxnSpPr>
+            <a:cxnSpLocks/>
+          </p:cNvCxnSpPr>
+          <p:nvPr/>
+        </p:nvCxnSpPr>
+        <p:spPr>
+          <a:xfrm flipV="1">
+            <a:off x="2519235" y="4957072"/>
+            <a:ext cx="1543718" cy="441273"/>
+          </a:xfrm>
+          <a:prstGeom prst="line">
+            <a:avLst/>
+          </a:prstGeom>
+          <a:ln>
+            <a:solidFill>
+              <a:schemeClr val="bg2">
+                <a:lumMod val="75000"/>
+              </a:schemeClr>
+            </a:solidFill>
+          </a:ln>
+        </p:spPr>
+        <p:style>
+          <a:lnRef idx="3">
+            <a:schemeClr val="dk1"/>
+          </a:lnRef>
+          <a:fillRef idx="0">
+            <a:schemeClr val="dk1"/>
+          </a:fillRef>
+          <a:effectRef idx="2">
+            <a:schemeClr val="dk1"/>
+          </a:effectRef>
+          <a:fontRef idx="minor">
+            <a:schemeClr val="tx1"/>
+          </a:fontRef>
+        </p:style>
+      </p:cxnSp>
+      <p:cxnSp>
+        <p:nvCxnSpPr>
+          <p:cNvPr id="11" name="Łącznik prosty 10" descr="linia prosta">
+            <a:extLst>
+              <a:ext uri="{FF2B5EF4-FFF2-40B4-BE49-F238E27FC236}">
+                <a16:creationId xmlns:a16="http://schemas.microsoft.com/office/drawing/2014/main" id="{F55FD9E5-8DE2-0347-9277-EAA0E4698685}"/>
+              </a:ext>
+            </a:extLst>
+          </p:cNvPr>
+          <p:cNvCxnSpPr>
+            <a:cxnSpLocks/>
+            <a:endCxn id="25" idx="2"/>
+          </p:cNvCxnSpPr>
+          <p:nvPr/>
+        </p:nvCxnSpPr>
+        <p:spPr>
+          <a:xfrm>
+            <a:off x="3227220" y="4475481"/>
+            <a:ext cx="742920" cy="326322"/>
+          </a:xfrm>
+          <a:prstGeom prst="line">
+            <a:avLst/>
+          </a:prstGeom>
+          <a:ln>
+            <a:solidFill>
+              <a:schemeClr val="bg2">
+                <a:lumMod val="75000"/>
+              </a:schemeClr>
+            </a:solidFill>
+          </a:ln>
+        </p:spPr>
+        <p:style>
+          <a:lnRef idx="3">
+            <a:schemeClr val="dk1"/>
+          </a:lnRef>
+          <a:fillRef idx="0">
+            <a:schemeClr val="dk1"/>
+          </a:fillRef>
+          <a:effectRef idx="2">
+            <a:schemeClr val="dk1"/>
+          </a:effectRef>
+          <a:fontRef idx="minor">
+            <a:schemeClr val="tx1"/>
+          </a:fontRef>
+        </p:style>
+      </p:cxnSp>
+      <p:cxnSp>
+        <p:nvCxnSpPr>
+          <p:cNvPr id="12" name="Łącznik prosty 11" descr="linia prosta">
+            <a:extLst>
+              <a:ext uri="{FF2B5EF4-FFF2-40B4-BE49-F238E27FC236}">
+                <a16:creationId xmlns:a16="http://schemas.microsoft.com/office/drawing/2014/main" id="{60BC2FCC-293B-6C4A-99A5-DD35930F4539}"/>
+              </a:ext>
+            </a:extLst>
+          </p:cNvPr>
+          <p:cNvCxnSpPr>
+            <a:cxnSpLocks/>
+          </p:cNvCxnSpPr>
+          <p:nvPr/>
+        </p:nvCxnSpPr>
+        <p:spPr>
+          <a:xfrm>
+            <a:off x="2986002" y="2100358"/>
+            <a:ext cx="1076951" cy="331757"/>
+          </a:xfrm>
+          <a:prstGeom prst="line">
+            <a:avLst/>
+          </a:prstGeom>
+          <a:ln>
+            <a:solidFill>
+              <a:schemeClr val="bg2">
+                <a:lumMod val="75000"/>
+              </a:schemeClr>
+            </a:solidFill>
+          </a:ln>
+        </p:spPr>
+        <p:style>
+          <a:lnRef idx="3">
+            <a:schemeClr val="dk1"/>
+          </a:lnRef>
+          <a:fillRef idx="0">
+            <a:schemeClr val="dk1"/>
+          </a:fillRef>
+          <a:effectRef idx="2">
+            <a:schemeClr val="dk1"/>
+          </a:effectRef>
+          <a:fontRef idx="minor">
+            <a:schemeClr val="tx1"/>
+          </a:fontRef>
+        </p:style>
+      </p:cxnSp>
+      <p:cxnSp>
+        <p:nvCxnSpPr>
+          <p:cNvPr id="13" name="Łącznik prosty 12" descr="linia prosta">
+            <a:extLst>
+              <a:ext uri="{FF2B5EF4-FFF2-40B4-BE49-F238E27FC236}">
+                <a16:creationId xmlns:a16="http://schemas.microsoft.com/office/drawing/2014/main" id="{9160F3BD-25E5-4B40-B0E8-AAF8665EDB86}"/>
+              </a:ext>
+            </a:extLst>
+          </p:cNvPr>
+          <p:cNvCxnSpPr>
+            <a:cxnSpLocks/>
+          </p:cNvCxnSpPr>
+          <p:nvPr/>
+        </p:nvCxnSpPr>
+        <p:spPr>
+          <a:xfrm flipV="1">
+            <a:off x="2118762" y="2640750"/>
+            <a:ext cx="1851378" cy="723596"/>
+          </a:xfrm>
+          <a:prstGeom prst="line">
+            <a:avLst/>
+          </a:prstGeom>
+          <a:ln>
+            <a:solidFill>
+              <a:schemeClr val="bg2">
+                <a:lumMod val="75000"/>
+              </a:schemeClr>
+            </a:solidFill>
+          </a:ln>
+        </p:spPr>
+        <p:style>
+          <a:lnRef idx="3">
+            <a:schemeClr val="dk1"/>
+          </a:lnRef>
+          <a:fillRef idx="0">
+            <a:schemeClr val="dk1"/>
+          </a:fillRef>
+          <a:effectRef idx="2">
+            <a:schemeClr val="dk1"/>
+          </a:effectRef>
+          <a:fontRef idx="minor">
+            <a:schemeClr val="tx1"/>
+          </a:fontRef>
+        </p:style>
+      </p:cxnSp>
+      <p:cxnSp>
+        <p:nvCxnSpPr>
+          <p:cNvPr id="14" name="Łącznik prosty 13" descr="linia prosta">
+            <a:extLst>
+              <a:ext uri="{FF2B5EF4-FFF2-40B4-BE49-F238E27FC236}">
+                <a16:creationId xmlns:a16="http://schemas.microsoft.com/office/drawing/2014/main" id="{453F2895-73F9-1B43-A821-7AF60AD81C5E}"/>
+              </a:ext>
+            </a:extLst>
+          </p:cNvPr>
+          <p:cNvCxnSpPr>
+            <a:cxnSpLocks/>
+          </p:cNvCxnSpPr>
+          <p:nvPr/>
+        </p:nvCxnSpPr>
+        <p:spPr>
+          <a:xfrm flipH="1">
+            <a:off x="8275791" y="2039304"/>
+            <a:ext cx="1808799" cy="392811"/>
+          </a:xfrm>
+          <a:prstGeom prst="line">
+            <a:avLst/>
+          </a:prstGeom>
+          <a:ln>
+            <a:solidFill>
+              <a:schemeClr val="bg2">
+                <a:lumMod val="75000"/>
+              </a:schemeClr>
+            </a:solidFill>
+          </a:ln>
+        </p:spPr>
+        <p:style>
+          <a:lnRef idx="3">
+            <a:schemeClr val="dk1"/>
+          </a:lnRef>
+          <a:fillRef idx="0">
+            <a:schemeClr val="dk1"/>
+          </a:fillRef>
+          <a:effectRef idx="2">
+            <a:schemeClr val="dk1"/>
+          </a:effectRef>
+          <a:fontRef idx="minor">
+            <a:schemeClr val="tx1"/>
+          </a:fontRef>
+        </p:style>
+      </p:cxnSp>
+      <p:cxnSp>
+        <p:nvCxnSpPr>
+          <p:cNvPr id="15" name="Łącznik prosty 14" descr="linia prosta">
+            <a:extLst>
+              <a:ext uri="{FF2B5EF4-FFF2-40B4-BE49-F238E27FC236}">
+                <a16:creationId xmlns:a16="http://schemas.microsoft.com/office/drawing/2014/main" id="{16881FA3-57E1-7047-A9D0-BBB18E1F17FC}"/>
+              </a:ext>
+            </a:extLst>
+          </p:cNvPr>
+          <p:cNvCxnSpPr>
+            <a:cxnSpLocks/>
+          </p:cNvCxnSpPr>
+          <p:nvPr/>
+        </p:nvCxnSpPr>
+        <p:spPr>
+          <a:xfrm flipH="1" flipV="1">
+            <a:off x="8227283" y="2523602"/>
+            <a:ext cx="2141062" cy="565559"/>
+          </a:xfrm>
+          <a:prstGeom prst="line">
+            <a:avLst/>
+          </a:prstGeom>
+          <a:ln>
+            <a:solidFill>
+              <a:schemeClr val="bg2">
+                <a:lumMod val="75000"/>
+              </a:schemeClr>
+            </a:solidFill>
+          </a:ln>
+        </p:spPr>
+        <p:style>
+          <a:lnRef idx="3">
+            <a:schemeClr val="dk1"/>
+          </a:lnRef>
+          <a:fillRef idx="0">
+            <a:schemeClr val="dk1"/>
+          </a:fillRef>
+          <a:effectRef idx="2">
+            <a:schemeClr val="dk1"/>
+          </a:effectRef>
+          <a:fontRef idx="minor">
+            <a:schemeClr val="tx1"/>
+          </a:fontRef>
+        </p:style>
+      </p:cxnSp>
+      <p:cxnSp>
+        <p:nvCxnSpPr>
+          <p:cNvPr id="16" name="Łącznik prosty 15" descr="linia prosta">
+            <a:extLst>
+              <a:ext uri="{FF2B5EF4-FFF2-40B4-BE49-F238E27FC236}">
+                <a16:creationId xmlns:a16="http://schemas.microsoft.com/office/drawing/2014/main" id="{CD049ECD-6305-2243-A1AE-ECD535FFABCE}"/>
+              </a:ext>
+            </a:extLst>
+          </p:cNvPr>
+          <p:cNvCxnSpPr>
+            <a:cxnSpLocks/>
+            <a:endCxn id="40" idx="6"/>
+          </p:cNvCxnSpPr>
+          <p:nvPr/>
+        </p:nvCxnSpPr>
+        <p:spPr>
+          <a:xfrm flipH="1">
+            <a:off x="8375681" y="4605458"/>
+            <a:ext cx="2020374" cy="196345"/>
+          </a:xfrm>
+          <a:prstGeom prst="line">
+            <a:avLst/>
+          </a:prstGeom>
+          <a:ln>
+            <a:solidFill>
+              <a:schemeClr val="bg2">
+                <a:lumMod val="75000"/>
+              </a:schemeClr>
+            </a:solidFill>
+          </a:ln>
+        </p:spPr>
+        <p:style>
+          <a:lnRef idx="3">
+            <a:schemeClr val="dk1"/>
+          </a:lnRef>
+          <a:fillRef idx="0">
+            <a:schemeClr val="dk1"/>
+          </a:fillRef>
+          <a:effectRef idx="2">
+            <a:schemeClr val="dk1"/>
+          </a:effectRef>
+          <a:fontRef idx="minor">
+            <a:schemeClr val="tx1"/>
+          </a:fontRef>
+        </p:style>
+      </p:cxnSp>
+      <p:cxnSp>
+        <p:nvCxnSpPr>
+          <p:cNvPr id="17" name="Łącznik prosty 16" descr="linia prosta">
+            <a:extLst>
+              <a:ext uri="{FF2B5EF4-FFF2-40B4-BE49-F238E27FC236}">
+                <a16:creationId xmlns:a16="http://schemas.microsoft.com/office/drawing/2014/main" id="{B44A1FD7-E9EF-0144-B1AB-CE93F8C903E0}"/>
+              </a:ext>
+            </a:extLst>
+          </p:cNvPr>
+          <p:cNvCxnSpPr>
+            <a:cxnSpLocks/>
+          </p:cNvCxnSpPr>
+          <p:nvPr/>
+        </p:nvCxnSpPr>
+        <p:spPr>
+          <a:xfrm flipH="1" flipV="1">
+            <a:off x="8275791" y="4957072"/>
+            <a:ext cx="623442" cy="516023"/>
+          </a:xfrm>
+          <a:prstGeom prst="line">
+            <a:avLst/>
+          </a:prstGeom>
+          <a:ln>
+            <a:solidFill>
+              <a:schemeClr val="bg2">
+                <a:lumMod val="75000"/>
+              </a:schemeClr>
+            </a:solidFill>
+          </a:ln>
+        </p:spPr>
+        <p:style>
+          <a:lnRef idx="3">
+            <a:schemeClr val="dk1"/>
+          </a:lnRef>
+          <a:fillRef idx="0">
+            <a:schemeClr val="dk1"/>
+          </a:fillRef>
+          <a:effectRef idx="2">
+            <a:schemeClr val="dk1"/>
+          </a:effectRef>
+          <a:fontRef idx="minor">
+            <a:schemeClr val="tx1"/>
+          </a:fontRef>
+        </p:style>
+      </p:cxnSp>
+      <p:sp>
+        <p:nvSpPr>
+          <p:cNvPr id="27" name="Pole tekstowe 26">
+            <a:extLst>
+              <a:ext uri="{FF2B5EF4-FFF2-40B4-BE49-F238E27FC236}">
+                <a16:creationId xmlns:a16="http://schemas.microsoft.com/office/drawing/2014/main" id="{AC03EAFB-FBF3-D94D-90FB-35CA892A2228}"/>
+              </a:ext>
+            </a:extLst>
+          </p:cNvPr>
+          <p:cNvSpPr txBox="1"/>
+          <p:nvPr/>
+        </p:nvSpPr>
+        <p:spPr>
+          <a:xfrm>
+            <a:off x="3504392" y="1423001"/>
+            <a:ext cx="2303096" cy="369332"/>
+          </a:xfrm>
+          <a:prstGeom prst="rect">
+            <a:avLst/>
+          </a:prstGeom>
+          <a:noFill/>
+        </p:spPr>
+        <p:txBody>
+          <a:bodyPr wrap="square" rtlCol="0">
+            <a:spAutoFit/>
+          </a:bodyPr>
+          <a:lstStyle>
+            <a:defPPr>
+              <a:defRPr lang="pl-PL"/>
+            </a:defPPr>
+          </a:lstStyle>
+          <a:p>
+            <a:pPr algn="ctr" rtl="0"/>
+            <a:r>
+              <a:rPr lang="pl-PL" dirty="0">
+                <a:latin typeface="Posterama" panose="020B0504020200020000" pitchFamily="34" charset="0"/>
+                <a:cs typeface="Posterama" panose="020B0504020200020000" pitchFamily="34" charset="0"/>
+              </a:rPr>
+              <a:t>Utrzymanie domu</a:t>
+            </a:r>
+          </a:p>
+        </p:txBody>
+      </p:sp>
+      <p:sp>
+        <p:nvSpPr>
+          <p:cNvPr id="28" name="Pole tekstowe 27">
+            <a:extLst>
+              <a:ext uri="{FF2B5EF4-FFF2-40B4-BE49-F238E27FC236}">
+                <a16:creationId xmlns:a16="http://schemas.microsoft.com/office/drawing/2014/main" id="{BF276233-08ED-DE47-96B6-C094BAB275A4}"/>
+              </a:ext>
+            </a:extLst>
+          </p:cNvPr>
+          <p:cNvSpPr txBox="1"/>
+          <p:nvPr/>
+        </p:nvSpPr>
+        <p:spPr>
+          <a:xfrm>
+            <a:off x="6927156" y="1401682"/>
+            <a:ext cx="1607159" cy="369332"/>
+          </a:xfrm>
+          <a:prstGeom prst="rect">
+            <a:avLst/>
+          </a:prstGeom>
+          <a:noFill/>
+        </p:spPr>
+        <p:txBody>
+          <a:bodyPr wrap="square" rtlCol="0">
+            <a:spAutoFit/>
+          </a:bodyPr>
+          <a:lstStyle>
+            <a:defPPr>
+              <a:defRPr lang="pl-PL"/>
+            </a:defPPr>
+          </a:lstStyle>
+          <a:p>
+            <a:pPr algn="ctr" rtl="0"/>
+            <a:r>
+              <a:rPr lang="pl-PL">
+                <a:latin typeface="Posterama" panose="020B0504020200020000" pitchFamily="34" charset="0"/>
+                <a:cs typeface="Posterama" panose="020B0504020200020000" pitchFamily="34" charset="0"/>
+              </a:rPr>
+              <a:t>Działania</a:t>
+            </a:r>
+          </a:p>
+        </p:txBody>
+      </p:sp>
+      <p:sp>
+        <p:nvSpPr>
+          <p:cNvPr id="31" name="Pole tekstowe 30">
+            <a:extLst>
+              <a:ext uri="{FF2B5EF4-FFF2-40B4-BE49-F238E27FC236}">
+                <a16:creationId xmlns:a16="http://schemas.microsoft.com/office/drawing/2014/main" id="{B92E1B93-579B-4B4B-94A2-66B177C30C35}"/>
+              </a:ext>
+            </a:extLst>
+          </p:cNvPr>
+          <p:cNvSpPr txBox="1"/>
+          <p:nvPr/>
+        </p:nvSpPr>
+        <p:spPr>
+          <a:xfrm>
+            <a:off x="6886301" y="5538266"/>
+            <a:ext cx="1607159" cy="369332"/>
+          </a:xfrm>
+          <a:prstGeom prst="rect">
+            <a:avLst/>
+          </a:prstGeom>
+          <a:noFill/>
+        </p:spPr>
+        <p:txBody>
+          <a:bodyPr wrap="square" rtlCol="0">
+            <a:spAutoFit/>
+          </a:bodyPr>
+          <a:lstStyle>
+            <a:defPPr>
+              <a:defRPr lang="pl-PL"/>
+            </a:defPPr>
+          </a:lstStyle>
+          <a:p>
+            <a:pPr algn="ctr" rtl="0"/>
+            <a:r>
+              <a:rPr lang="pl-PL">
+                <a:latin typeface="Posterama" panose="020B0504020200020000" pitchFamily="34" charset="0"/>
+                <a:cs typeface="Posterama" panose="020B0504020200020000" pitchFamily="34" charset="0"/>
+              </a:rPr>
+              <a:t>Żywność</a:t>
+            </a:r>
+          </a:p>
+        </p:txBody>
+      </p:sp>
+      <p:sp>
+        <p:nvSpPr>
+          <p:cNvPr id="32" name="Pole tekstowe 31">
+            <a:extLst>
+              <a:ext uri="{FF2B5EF4-FFF2-40B4-BE49-F238E27FC236}">
+                <a16:creationId xmlns:a16="http://schemas.microsoft.com/office/drawing/2014/main" id="{C9BB7D8F-8EA6-D649-AB3E-8C89F61C7FFB}"/>
+              </a:ext>
+            </a:extLst>
+          </p:cNvPr>
+          <p:cNvSpPr txBox="1"/>
+          <p:nvPr/>
+        </p:nvSpPr>
+        <p:spPr>
+          <a:xfrm>
+            <a:off x="3839551" y="5538266"/>
+            <a:ext cx="1607159" cy="369332"/>
+          </a:xfrm>
+          <a:prstGeom prst="rect">
+            <a:avLst/>
+          </a:prstGeom>
+          <a:noFill/>
+        </p:spPr>
+        <p:txBody>
+          <a:bodyPr wrap="square" rtlCol="0">
+            <a:spAutoFit/>
+          </a:bodyPr>
+          <a:lstStyle>
+            <a:defPPr>
+              <a:defRPr lang="pl-PL"/>
+            </a:defPPr>
+          </a:lstStyle>
+          <a:p>
+            <a:pPr algn="ctr" rtl="0"/>
+            <a:r>
+              <a:rPr lang="pl-PL">
+                <a:latin typeface="Posterama" panose="020B0504020200020000" pitchFamily="34" charset="0"/>
+                <a:cs typeface="Posterama" panose="020B0504020200020000" pitchFamily="34" charset="0"/>
+              </a:rPr>
+              <a:t>Podróże</a:t>
+            </a:r>
+          </a:p>
+        </p:txBody>
+      </p:sp>
+      <p:sp>
+        <p:nvSpPr>
+          <p:cNvPr id="33" name="Owal 32" descr="kształt owalny">
+            <a:extLst>
+              <a:ext uri="{FF2B5EF4-FFF2-40B4-BE49-F238E27FC236}">
+                <a16:creationId xmlns:a16="http://schemas.microsoft.com/office/drawing/2014/main" id="{FC89EC71-2C1C-2749-944B-43F9DDD0178E}"/>
+              </a:ext>
+            </a:extLst>
+          </p:cNvPr>
+          <p:cNvSpPr>
+            <a:spLocks noChangeAspect="1"/>
+          </p:cNvSpPr>
+          <p:nvPr/>
+        </p:nvSpPr>
+        <p:spPr>
+          <a:xfrm>
+            <a:off x="2049488" y="1413271"/>
+            <a:ext cx="1177732" cy="1177732"/>
+          </a:xfrm>
+          <a:prstGeom prst="ellipse">
+            <a:avLst/>
+          </a:prstGeom>
+          <a:solidFill>
+            <a:schemeClr val="accent2"/>
+          </a:solidFill>
+          <a:ln>
+            <a:noFill/>
+          </a:ln>
+        </p:spPr>
+        <p:style>
+          <a:lnRef idx="2">
+            <a:schemeClr val="accent1">
+              <a:shade val="50000"/>
+            </a:schemeClr>
+          </a:lnRef>
+          <a:fillRef idx="1">
+            <a:schemeClr val="accent1"/>
+          </a:fillRef>
+          <a:effectRef idx="0">
+            <a:schemeClr val="accent1"/>
+          </a:effectRef>
+          <a:fontRef idx="minor">
+            <a:schemeClr val="lt1"/>
+          </a:fontRef>
+        </p:style>
+        <p:txBody>
+          <a:bodyPr rtlCol="0" anchor="ctr"/>
+          <a:lstStyle>
+            <a:defPPr>
+              <a:defRPr lang="pl-PL"/>
+            </a:defPPr>
+          </a:lstStyle>
+          <a:p>
+            <a:pPr algn="ctr" rtl="0"/>
+            <a:r>
+              <a:rPr lang="pl-PL" sz="1100" dirty="0">
+                <a:solidFill>
+                  <a:schemeClr val="bg1"/>
+                </a:solidFill>
+                <a:latin typeface="Posterama" panose="020B0504020200020000" pitchFamily="34" charset="0"/>
+                <a:cs typeface="Posterama" panose="020B0504020200020000" pitchFamily="34" charset="0"/>
+              </a:rPr>
+              <a:t>Wynajem mieszkań</a:t>
+            </a:r>
+          </a:p>
+        </p:txBody>
+      </p:sp>
+      <p:sp>
+        <p:nvSpPr>
+          <p:cNvPr id="34" name="Owal 33" descr="kształt owalny">
+            <a:extLst>
+              <a:ext uri="{FF2B5EF4-FFF2-40B4-BE49-F238E27FC236}">
+                <a16:creationId xmlns:a16="http://schemas.microsoft.com/office/drawing/2014/main" id="{A57BD9B6-D0BA-7F41-8726-F88C61892631}"/>
+              </a:ext>
+            </a:extLst>
+          </p:cNvPr>
+          <p:cNvSpPr>
+            <a:spLocks noChangeAspect="1"/>
+          </p:cNvSpPr>
+          <p:nvPr/>
+        </p:nvSpPr>
+        <p:spPr>
+          <a:xfrm>
+            <a:off x="1301701" y="2876580"/>
+            <a:ext cx="1036234" cy="1036234"/>
+          </a:xfrm>
+          <a:prstGeom prst="ellipse">
+            <a:avLst/>
+          </a:prstGeom>
+          <a:solidFill>
+            <a:schemeClr val="accent2"/>
+          </a:solidFill>
+          <a:ln>
+            <a:noFill/>
+          </a:ln>
+        </p:spPr>
+        <p:style>
+          <a:lnRef idx="2">
+            <a:schemeClr val="accent1">
+              <a:shade val="50000"/>
+            </a:schemeClr>
+          </a:lnRef>
+          <a:fillRef idx="1">
+            <a:schemeClr val="accent1"/>
+          </a:fillRef>
+          <a:effectRef idx="0">
+            <a:schemeClr val="accent1"/>
+          </a:effectRef>
+          <a:fontRef idx="minor">
+            <a:schemeClr val="lt1"/>
+          </a:fontRef>
+        </p:style>
+        <p:txBody>
+          <a:bodyPr rtlCol="0" anchor="ctr"/>
+          <a:lstStyle>
+            <a:defPPr>
+              <a:defRPr lang="pl-PL"/>
+            </a:defPPr>
+          </a:lstStyle>
+          <a:p>
+            <a:pPr algn="ctr" rtl="0"/>
+            <a:r>
+              <a:rPr lang="pl-PL" sz="1100" dirty="0">
+                <a:solidFill>
+                  <a:schemeClr val="bg1"/>
+                </a:solidFill>
+                <a:latin typeface="Posterama" panose="020B0504020200020000" pitchFamily="34" charset="0"/>
+                <a:cs typeface="Posterama" panose="020B0504020200020000" pitchFamily="34" charset="0"/>
+              </a:rPr>
+              <a:t>Hotel</a:t>
+            </a:r>
+          </a:p>
+        </p:txBody>
+      </p:sp>
+      <p:sp>
+        <p:nvSpPr>
+          <p:cNvPr id="35" name="Owal 34" descr="kształt owalny">
+            <a:extLst>
+              <a:ext uri="{FF2B5EF4-FFF2-40B4-BE49-F238E27FC236}">
+                <a16:creationId xmlns:a16="http://schemas.microsoft.com/office/drawing/2014/main" id="{6CF459CB-7500-4D4F-912E-DD650809CCEE}"/>
+              </a:ext>
+            </a:extLst>
+          </p:cNvPr>
+          <p:cNvSpPr>
+            <a:spLocks noChangeAspect="1"/>
+          </p:cNvSpPr>
+          <p:nvPr/>
+        </p:nvSpPr>
+        <p:spPr>
+          <a:xfrm>
+            <a:off x="1832911" y="5174997"/>
+            <a:ext cx="1002374" cy="1002374"/>
+          </a:xfrm>
+          <a:prstGeom prst="ellipse">
+            <a:avLst/>
+          </a:prstGeom>
+          <a:solidFill>
+            <a:schemeClr val="accent4">
+              <a:lumMod val="75000"/>
+            </a:schemeClr>
+          </a:solidFill>
+          <a:ln w="38100">
+            <a:solidFill>
+              <a:schemeClr val="accent4"/>
+            </a:solidFill>
+          </a:ln>
+        </p:spPr>
+        <p:style>
+          <a:lnRef idx="2">
+            <a:schemeClr val="accent1">
+              <a:shade val="50000"/>
+            </a:schemeClr>
+          </a:lnRef>
+          <a:fillRef idx="1">
+            <a:schemeClr val="accent1"/>
+          </a:fillRef>
+          <a:effectRef idx="0">
+            <a:schemeClr val="accent1"/>
+          </a:effectRef>
+          <a:fontRef idx="minor">
+            <a:schemeClr val="lt1"/>
+          </a:fontRef>
+        </p:style>
+        <p:txBody>
+          <a:bodyPr lIns="0" rIns="0" rtlCol="0" anchor="ctr"/>
+          <a:lstStyle>
+            <a:defPPr>
+              <a:defRPr lang="pl-PL"/>
+            </a:defPPr>
+          </a:lstStyle>
+          <a:p>
+            <a:pPr algn="ctr" rtl="0"/>
+            <a:r>
+              <a:rPr lang="pl-PL" sz="1100" spc="-40" dirty="0" err="1">
+                <a:solidFill>
+                  <a:schemeClr val="bg1"/>
+                </a:solidFill>
+                <a:latin typeface="Posterama" panose="020B0504020200020000" pitchFamily="34" charset="0"/>
+                <a:cs typeface="Posterama" panose="020B0504020200020000" pitchFamily="34" charset="0"/>
+              </a:rPr>
+              <a:t>Wypoży-czenie</a:t>
+            </a:r>
+            <a:r>
+              <a:rPr lang="pl-PL" sz="1100" spc="-40" dirty="0">
+                <a:solidFill>
+                  <a:schemeClr val="bg1"/>
+                </a:solidFill>
+                <a:latin typeface="Posterama" panose="020B0504020200020000" pitchFamily="34" charset="0"/>
+                <a:cs typeface="Posterama" panose="020B0504020200020000" pitchFamily="34" charset="0"/>
+              </a:rPr>
+              <a:t> samochodu</a:t>
+            </a:r>
+          </a:p>
+        </p:txBody>
+      </p:sp>
+      <p:sp>
+        <p:nvSpPr>
+          <p:cNvPr id="36" name="Owal 35" descr="kształt owalny">
+            <a:extLst>
+              <a:ext uri="{FF2B5EF4-FFF2-40B4-BE49-F238E27FC236}">
+                <a16:creationId xmlns:a16="http://schemas.microsoft.com/office/drawing/2014/main" id="{5E955AE7-4056-2047-B369-89376D6640C0}"/>
+              </a:ext>
+            </a:extLst>
+          </p:cNvPr>
+          <p:cNvSpPr>
+            <a:spLocks noChangeAspect="1"/>
+          </p:cNvSpPr>
+          <p:nvPr/>
+        </p:nvSpPr>
+        <p:spPr>
+          <a:xfrm>
+            <a:off x="2356297" y="3878939"/>
+            <a:ext cx="1078133" cy="1078133"/>
+          </a:xfrm>
+          <a:prstGeom prst="ellipse">
+            <a:avLst/>
+          </a:prstGeom>
+          <a:solidFill>
+            <a:schemeClr val="accent4">
+              <a:lumMod val="75000"/>
+            </a:schemeClr>
+          </a:solidFill>
+          <a:ln w="38100">
+            <a:solidFill>
+              <a:schemeClr val="accent4"/>
+            </a:solidFill>
+          </a:ln>
+        </p:spPr>
+        <p:style>
+          <a:lnRef idx="2">
+            <a:schemeClr val="accent1">
+              <a:shade val="50000"/>
+            </a:schemeClr>
+          </a:lnRef>
+          <a:fillRef idx="1">
+            <a:schemeClr val="accent1"/>
+          </a:fillRef>
+          <a:effectRef idx="0">
+            <a:schemeClr val="accent1"/>
+          </a:effectRef>
+          <a:fontRef idx="minor">
+            <a:schemeClr val="lt1"/>
+          </a:fontRef>
+        </p:style>
+        <p:txBody>
+          <a:bodyPr rtlCol="0" anchor="ctr"/>
+          <a:lstStyle>
+            <a:defPPr>
+              <a:defRPr lang="pl-PL"/>
+            </a:defPPr>
+          </a:lstStyle>
+          <a:p>
+            <a:pPr algn="ctr" rtl="0"/>
+            <a:r>
+              <a:rPr lang="pl-PL" sz="1100" dirty="0">
+                <a:solidFill>
+                  <a:schemeClr val="bg1"/>
+                </a:solidFill>
+                <a:latin typeface="Posterama" panose="020B0504020200020000" pitchFamily="34" charset="0"/>
+                <a:cs typeface="Posterama" panose="020B0504020200020000" pitchFamily="34" charset="0"/>
+              </a:rPr>
+              <a:t>Loty</a:t>
+            </a:r>
+          </a:p>
+        </p:txBody>
+      </p:sp>
+      <p:sp>
+        <p:nvSpPr>
+          <p:cNvPr id="37" name="Owal 36" descr="kształt owalny">
+            <a:extLst>
+              <a:ext uri="{FF2B5EF4-FFF2-40B4-BE49-F238E27FC236}">
+                <a16:creationId xmlns:a16="http://schemas.microsoft.com/office/drawing/2014/main" id="{B3F8555D-CB6E-2844-BFD7-0286B672D707}"/>
+              </a:ext>
+            </a:extLst>
+          </p:cNvPr>
+          <p:cNvSpPr>
+            <a:spLocks noChangeAspect="1"/>
+          </p:cNvSpPr>
+          <p:nvPr/>
+        </p:nvSpPr>
+        <p:spPr>
+          <a:xfrm>
+            <a:off x="9785406" y="4131394"/>
+            <a:ext cx="1063259" cy="1063259"/>
+          </a:xfrm>
+          <a:prstGeom prst="ellipse">
+            <a:avLst/>
+          </a:prstGeom>
+          <a:solidFill>
+            <a:schemeClr val="accent5">
+              <a:lumMod val="75000"/>
+            </a:schemeClr>
+          </a:solidFill>
+          <a:ln>
+            <a:noFill/>
+          </a:ln>
+        </p:spPr>
+        <p:style>
+          <a:lnRef idx="2">
+            <a:schemeClr val="accent1">
+              <a:shade val="50000"/>
+            </a:schemeClr>
+          </a:lnRef>
+          <a:fillRef idx="1">
+            <a:schemeClr val="accent1"/>
+          </a:fillRef>
+          <a:effectRef idx="0">
+            <a:schemeClr val="accent1"/>
+          </a:effectRef>
+          <a:fontRef idx="minor">
+            <a:schemeClr val="lt1"/>
+          </a:fontRef>
+        </p:style>
+        <p:txBody>
+          <a:bodyPr rtlCol="0" anchor="ctr"/>
+          <a:lstStyle>
+            <a:defPPr>
+              <a:defRPr lang="pl-PL"/>
+            </a:defPPr>
+          </a:lstStyle>
+          <a:p>
+            <a:pPr algn="ctr" rtl="0"/>
+            <a:r>
+              <a:rPr lang="pl-PL" sz="1100" dirty="0">
+                <a:solidFill>
+                  <a:schemeClr val="bg1"/>
+                </a:solidFill>
+                <a:latin typeface="Posterama" panose="020B0504020200020000" pitchFamily="34" charset="0"/>
+                <a:cs typeface="Posterama" panose="020B0504020200020000" pitchFamily="34" charset="0"/>
+              </a:rPr>
+              <a:t>Wyjmij</a:t>
+            </a:r>
+          </a:p>
+        </p:txBody>
+      </p:sp>
+      <p:sp>
+        <p:nvSpPr>
+          <p:cNvPr id="38" name="Owal 37" descr="kształt owalny">
+            <a:extLst>
+              <a:ext uri="{FF2B5EF4-FFF2-40B4-BE49-F238E27FC236}">
+                <a16:creationId xmlns:a16="http://schemas.microsoft.com/office/drawing/2014/main" id="{D66AFE90-EB93-FC49-BFC9-C8F420C586E9}"/>
+              </a:ext>
+            </a:extLst>
+          </p:cNvPr>
+          <p:cNvSpPr>
+            <a:spLocks noChangeAspect="1"/>
+          </p:cNvSpPr>
+          <p:nvPr/>
+        </p:nvSpPr>
+        <p:spPr>
+          <a:xfrm>
+            <a:off x="8440027" y="5194653"/>
+            <a:ext cx="1232738" cy="1232738"/>
+          </a:xfrm>
+          <a:prstGeom prst="ellipse">
+            <a:avLst/>
+          </a:prstGeom>
+          <a:solidFill>
+            <a:schemeClr val="accent5">
+              <a:lumMod val="75000"/>
+            </a:schemeClr>
+          </a:solidFill>
+          <a:ln>
+            <a:noFill/>
+          </a:ln>
+        </p:spPr>
+        <p:style>
+          <a:lnRef idx="2">
+            <a:schemeClr val="accent1">
+              <a:shade val="50000"/>
+            </a:schemeClr>
+          </a:lnRef>
+          <a:fillRef idx="1">
+            <a:schemeClr val="accent1"/>
+          </a:fillRef>
+          <a:effectRef idx="0">
+            <a:schemeClr val="accent1"/>
+          </a:effectRef>
+          <a:fontRef idx="minor">
+            <a:schemeClr val="lt1"/>
+          </a:fontRef>
+        </p:style>
+        <p:txBody>
+          <a:bodyPr lIns="0" rIns="0" rtlCol="0" anchor="ctr"/>
+          <a:lstStyle>
+            <a:defPPr>
+              <a:defRPr lang="pl-PL"/>
+            </a:defPPr>
+          </a:lstStyle>
+          <a:p>
+            <a:pPr algn="ctr" rtl="0"/>
+            <a:r>
+              <a:rPr lang="pl-PL" sz="1100" dirty="0">
+                <a:solidFill>
+                  <a:schemeClr val="bg1"/>
+                </a:solidFill>
+                <a:latin typeface="Posterama" panose="020B0504020200020000" pitchFamily="34" charset="0"/>
+                <a:cs typeface="Posterama" panose="020B0504020200020000" pitchFamily="34" charset="0"/>
+              </a:rPr>
+              <a:t>Lista artykułów spożywczych</a:t>
+            </a:r>
+          </a:p>
+        </p:txBody>
+      </p:sp>
+      <p:sp>
+        <p:nvSpPr>
+          <p:cNvPr id="42" name="Owal 41" descr="kształt owalny">
+            <a:extLst>
+              <a:ext uri="{FF2B5EF4-FFF2-40B4-BE49-F238E27FC236}">
+                <a16:creationId xmlns:a16="http://schemas.microsoft.com/office/drawing/2014/main" id="{DFFA2471-0261-6F43-B090-962BEAD73189}"/>
+              </a:ext>
+            </a:extLst>
+          </p:cNvPr>
+          <p:cNvSpPr>
+            <a:spLocks noChangeAspect="1"/>
+          </p:cNvSpPr>
+          <p:nvPr/>
+        </p:nvSpPr>
+        <p:spPr>
+          <a:xfrm>
+            <a:off x="10278459" y="2601368"/>
+            <a:ext cx="1047281" cy="1047281"/>
+          </a:xfrm>
+          <a:prstGeom prst="ellipse">
+            <a:avLst/>
+          </a:prstGeom>
+          <a:solidFill>
+            <a:schemeClr val="accent5"/>
+          </a:solidFill>
+          <a:ln w="38100">
+            <a:noFill/>
+          </a:ln>
+        </p:spPr>
+        <p:style>
+          <a:lnRef idx="2">
+            <a:schemeClr val="accent1">
+              <a:shade val="50000"/>
+            </a:schemeClr>
+          </a:lnRef>
+          <a:fillRef idx="1">
+            <a:schemeClr val="accent1"/>
+          </a:fillRef>
+          <a:effectRef idx="0">
+            <a:schemeClr val="accent1"/>
+          </a:effectRef>
+          <a:fontRef idx="minor">
+            <a:schemeClr val="lt1"/>
+          </a:fontRef>
+        </p:style>
+        <p:txBody>
+          <a:bodyPr lIns="0" rIns="0" rtlCol="0" anchor="ctr"/>
+          <a:lstStyle>
+            <a:defPPr>
+              <a:defRPr lang="pl-PL"/>
+            </a:defPPr>
+          </a:lstStyle>
+          <a:p>
+            <a:pPr algn="ctr" rtl="0"/>
+            <a:r>
+              <a:rPr lang="pl-PL" sz="1100" dirty="0">
+                <a:solidFill>
+                  <a:schemeClr val="bg1"/>
+                </a:solidFill>
+                <a:latin typeface="Posterama" panose="020B0504020200020000" pitchFamily="34" charset="0"/>
+                <a:cs typeface="Posterama" panose="020B0504020200020000" pitchFamily="34" charset="0"/>
+              </a:rPr>
+              <a:t>Surfowanie</a:t>
+            </a:r>
+          </a:p>
+        </p:txBody>
+      </p:sp>
+      <p:sp>
+        <p:nvSpPr>
+          <p:cNvPr id="43" name="Owal 42" descr="kształt owalny">
+            <a:extLst>
+              <a:ext uri="{FF2B5EF4-FFF2-40B4-BE49-F238E27FC236}">
+                <a16:creationId xmlns:a16="http://schemas.microsoft.com/office/drawing/2014/main" id="{E6AE1701-8A12-5748-8A0E-34D25955041F}"/>
+              </a:ext>
+            </a:extLst>
+          </p:cNvPr>
+          <p:cNvSpPr>
+            <a:spLocks noChangeAspect="1"/>
+          </p:cNvSpPr>
+          <p:nvPr/>
+        </p:nvSpPr>
+        <p:spPr>
+          <a:xfrm>
+            <a:off x="9267398" y="1453550"/>
+            <a:ext cx="1187200" cy="1187200"/>
+          </a:xfrm>
+          <a:prstGeom prst="ellipse">
+            <a:avLst/>
+          </a:prstGeom>
+          <a:solidFill>
+            <a:schemeClr val="accent5"/>
+          </a:solidFill>
+          <a:ln w="38100">
+            <a:solidFill>
+              <a:schemeClr val="accent5">
+                <a:lumMod val="40000"/>
+                <a:lumOff val="60000"/>
+              </a:schemeClr>
+            </a:solidFill>
+          </a:ln>
+        </p:spPr>
+        <p:style>
+          <a:lnRef idx="2">
+            <a:schemeClr val="accent1">
+              <a:shade val="50000"/>
+            </a:schemeClr>
+          </a:lnRef>
+          <a:fillRef idx="1">
+            <a:schemeClr val="accent1"/>
+          </a:fillRef>
+          <a:effectRef idx="0">
+            <a:schemeClr val="accent1"/>
+          </a:effectRef>
+          <a:fontRef idx="minor">
+            <a:schemeClr val="lt1"/>
+          </a:fontRef>
+        </p:style>
+        <p:txBody>
+          <a:bodyPr lIns="0" rIns="0" rtlCol="0" anchor="ctr"/>
+          <a:lstStyle>
+            <a:defPPr>
+              <a:defRPr lang="pl-PL"/>
+            </a:defPPr>
+          </a:lstStyle>
+          <a:p>
+            <a:pPr algn="ctr" rtl="0"/>
+            <a:r>
+              <a:rPr lang="pl-PL" sz="1100" dirty="0">
+                <a:solidFill>
+                  <a:schemeClr val="bg1"/>
+                </a:solidFill>
+                <a:latin typeface="Posterama" panose="020B0504020200020000" pitchFamily="34" charset="0"/>
+                <a:cs typeface="Posterama" panose="020B0504020200020000" pitchFamily="34" charset="0"/>
+              </a:rPr>
+              <a:t>Fajka do nurkowania</a:t>
+            </a:r>
+          </a:p>
+        </p:txBody>
+      </p:sp>
+      <p:grpSp>
+        <p:nvGrpSpPr>
+          <p:cNvPr id="46" name="Grupa 45" descr="kształt owalny">
+            <a:extLst>
+              <a:ext uri="{FF2B5EF4-FFF2-40B4-BE49-F238E27FC236}">
+                <a16:creationId xmlns:a16="http://schemas.microsoft.com/office/drawing/2014/main" id="{2A46F5F6-260C-C441-8452-090543369D10}"/>
+              </a:ext>
+            </a:extLst>
+          </p:cNvPr>
+          <p:cNvGrpSpPr>
+            <a:grpSpLocks noChangeAspect="1"/>
+          </p:cNvGrpSpPr>
+          <p:nvPr/>
+        </p:nvGrpSpPr>
+        <p:grpSpPr>
+          <a:xfrm>
+            <a:off x="7004081" y="4116003"/>
+            <a:ext cx="1371600" cy="1371600"/>
+            <a:chOff x="7086652" y="4344655"/>
+            <a:chExt cx="1078992" cy="1078993"/>
+          </a:xfrm>
+        </p:grpSpPr>
+        <p:sp>
+          <p:nvSpPr>
+            <p:cNvPr id="40" name="Owal 39">
+              <a:extLst>
+                <a:ext uri="{FF2B5EF4-FFF2-40B4-BE49-F238E27FC236}">
+                  <a16:creationId xmlns:a16="http://schemas.microsoft.com/office/drawing/2014/main" id="{1551440A-38A1-CF46-BC56-9717612E78DF}"/>
+                </a:ext>
+              </a:extLst>
+            </p:cNvPr>
+            <p:cNvSpPr>
+              <a:spLocks noChangeAspect="1"/>
+            </p:cNvSpPr>
+            <p:nvPr/>
+          </p:nvSpPr>
+          <p:spPr>
+            <a:xfrm>
+              <a:off x="7086652" y="4344655"/>
+              <a:ext cx="1078992" cy="1078993"/>
+            </a:xfrm>
+            <a:prstGeom prst="ellipse">
+              <a:avLst/>
+            </a:prstGeom>
+            <a:solidFill>
+              <a:schemeClr val="accent5">
+                <a:lumMod val="75000"/>
+              </a:schemeClr>
+            </a:solidFill>
+            <a:ln>
+              <a:noFill/>
+            </a:ln>
+          </p:spPr>
+          <p:style>
+            <a:lnRef idx="2">
+              <a:schemeClr val="accent1">
+                <a:shade val="50000"/>
+              </a:schemeClr>
+            </a:lnRef>
+            <a:fillRef idx="1">
+              <a:schemeClr val="accent1"/>
+            </a:fillRef>
+            <a:effectRef idx="0">
+              <a:schemeClr val="accent1"/>
+            </a:effectRef>
+            <a:fontRef idx="minor">
+              <a:schemeClr val="lt1"/>
+            </a:fontRef>
+          </p:style>
+          <p:txBody>
+            <a:bodyPr lIns="0" tIns="0" rIns="0" bIns="0" rtlCol="0" anchor="t"/>
+            <a:lstStyle>
+              <a:defPPr>
+                <a:defRPr lang="pl-PL"/>
+              </a:defPPr>
+            </a:lstStyle>
+            <a:p>
+              <a:pPr algn="ctr" rtl="0"/>
+              <a:endParaRPr lang="pl-PL" dirty="0"/>
+            </a:p>
+          </p:txBody>
+        </p:sp>
+        <p:pic>
+          <p:nvPicPr>
+            <p:cNvPr id="45" name="Grafika 44" descr="Noga kurczaka z pełnym wypełnieniem">
+              <a:extLst>
+                <a:ext uri="{FF2B5EF4-FFF2-40B4-BE49-F238E27FC236}">
+                  <a16:creationId xmlns:a16="http://schemas.microsoft.com/office/drawing/2014/main" id="{252CF0DA-9B01-B04E-9FFF-BCC11ED58A41}"/>
+                </a:ext>
+              </a:extLst>
+            </p:cNvPr>
+            <p:cNvPicPr>
+              <a:picLocks noChangeAspect="1"/>
+            </p:cNvPicPr>
+            <p:nvPr/>
+          </p:nvPicPr>
+          <p:blipFill>
+            <a:blip r:embed="rId2">
+              <a:extLst>
+                <a:ext uri="{28A0092B-C50C-407E-A947-70E740481C1C}">
+                  <a14:useLocalDpi xmlns:a14="http://schemas.microsoft.com/office/drawing/2010/main" val="0"/>
+                </a:ext>
+                <a:ext uri="{96DAC541-7B7A-43D3-8B79-37D633B846F1}">
+                  <asvg:svgBlip xmlns:asvg="http://schemas.microsoft.com/office/drawing/2016/SVG/main" r:embed="rId3"/>
+                </a:ext>
+              </a:extLst>
+            </a:blip>
+            <a:stretch>
+              <a:fillRect/>
+            </a:stretch>
+          </p:blipFill>
+          <p:spPr>
+            <a:xfrm>
+              <a:off x="7304508" y="4530372"/>
+              <a:ext cx="707558" cy="707558"/>
+            </a:xfrm>
+            <a:prstGeom prst="rect">
+              <a:avLst/>
+            </a:prstGeom>
+          </p:spPr>
+        </p:pic>
+      </p:grpSp>
+      <p:grpSp>
+        <p:nvGrpSpPr>
+          <p:cNvPr id="49" name="Grupa 48" descr="kształt owalny">
+            <a:extLst>
+              <a:ext uri="{FF2B5EF4-FFF2-40B4-BE49-F238E27FC236}">
+                <a16:creationId xmlns:a16="http://schemas.microsoft.com/office/drawing/2014/main" id="{D72B275A-B0B3-3742-AC01-802A101A6AB7}"/>
+              </a:ext>
+            </a:extLst>
+          </p:cNvPr>
+          <p:cNvGrpSpPr>
+            <a:grpSpLocks noChangeAspect="1"/>
+          </p:cNvGrpSpPr>
+          <p:nvPr/>
+        </p:nvGrpSpPr>
+        <p:grpSpPr>
+          <a:xfrm>
+            <a:off x="7026882" y="1850134"/>
+            <a:ext cx="1371600" cy="1371600"/>
+            <a:chOff x="7092625" y="2061872"/>
+            <a:chExt cx="1078991" cy="1078992"/>
+          </a:xfrm>
+        </p:grpSpPr>
+        <p:sp>
+          <p:nvSpPr>
+            <p:cNvPr id="22" name="Owal 21">
+              <a:extLst>
+                <a:ext uri="{FF2B5EF4-FFF2-40B4-BE49-F238E27FC236}">
+                  <a16:creationId xmlns:a16="http://schemas.microsoft.com/office/drawing/2014/main" id="{7B2B36E5-25D5-6648-A4B0-1844A83199E5}"/>
+                </a:ext>
+              </a:extLst>
+            </p:cNvPr>
+            <p:cNvSpPr>
+              <a:spLocks noChangeAspect="1"/>
+            </p:cNvSpPr>
+            <p:nvPr/>
+          </p:nvSpPr>
+          <p:spPr>
+            <a:xfrm>
+              <a:off x="7092625" y="2061872"/>
+              <a:ext cx="1078991" cy="1078992"/>
+            </a:xfrm>
+            <a:prstGeom prst="ellipse">
+              <a:avLst/>
+            </a:prstGeom>
+            <a:solidFill>
+              <a:schemeClr val="accent5"/>
+            </a:solidFill>
+            <a:ln w="38100">
+              <a:solidFill>
+                <a:schemeClr val="accent5">
+                  <a:lumMod val="40000"/>
+                  <a:lumOff val="60000"/>
+                </a:schemeClr>
+              </a:solidFill>
+            </a:ln>
+          </p:spPr>
+          <p:style>
+            <a:lnRef idx="2">
+              <a:schemeClr val="accent1">
+                <a:shade val="50000"/>
+              </a:schemeClr>
+            </a:lnRef>
+            <a:fillRef idx="1">
+              <a:schemeClr val="accent1"/>
+            </a:fillRef>
+            <a:effectRef idx="0">
+              <a:schemeClr val="accent1"/>
+            </a:effectRef>
+            <a:fontRef idx="minor">
+              <a:schemeClr val="lt1"/>
+            </a:fontRef>
+          </p:style>
+          <p:txBody>
+            <a:bodyPr lIns="0" tIns="0" rIns="0" bIns="0" rtlCol="0" anchor="t"/>
+            <a:lstStyle>
+              <a:defPPr>
+                <a:defRPr lang="pl-PL"/>
+              </a:defPPr>
+            </a:lstStyle>
+            <a:p>
+              <a:pPr algn="ctr" rtl="0"/>
+              <a:endParaRPr lang="pl-PL" dirty="0"/>
+            </a:p>
+          </p:txBody>
+        </p:sp>
+        <p:pic>
+          <p:nvPicPr>
+            <p:cNvPr id="48" name="Grafika 47" descr="Maska do nurkowania z pełnym wypełnieniem">
+              <a:extLst>
+                <a:ext uri="{FF2B5EF4-FFF2-40B4-BE49-F238E27FC236}">
+                  <a16:creationId xmlns:a16="http://schemas.microsoft.com/office/drawing/2014/main" id="{09EF273F-F791-4741-9B28-D49D79D8AED5}"/>
+                </a:ext>
+              </a:extLst>
+            </p:cNvPr>
+            <p:cNvPicPr>
+              <a:picLocks noChangeAspect="1"/>
+            </p:cNvPicPr>
+            <p:nvPr/>
+          </p:nvPicPr>
+          <p:blipFill>
+            <a:blip r:embed="rId4">
+              <a:extLst>
+                <a:ext uri="{28A0092B-C50C-407E-A947-70E740481C1C}">
+                  <a14:useLocalDpi xmlns:a14="http://schemas.microsoft.com/office/drawing/2010/main" val="0"/>
+                </a:ext>
+                <a:ext uri="{96DAC541-7B7A-43D3-8B79-37D633B846F1}">
+                  <asvg:svgBlip xmlns:asvg="http://schemas.microsoft.com/office/drawing/2016/SVG/main" r:embed="rId5"/>
+                </a:ext>
+              </a:extLst>
+            </a:blip>
+            <a:stretch>
+              <a:fillRect/>
+            </a:stretch>
+          </p:blipFill>
+          <p:spPr>
+            <a:xfrm>
+              <a:off x="7261371" y="2274480"/>
+              <a:ext cx="676206" cy="676206"/>
+            </a:xfrm>
+            <a:prstGeom prst="rect">
+              <a:avLst/>
+            </a:prstGeom>
+          </p:spPr>
+        </p:pic>
+      </p:grpSp>
+      <p:grpSp>
+        <p:nvGrpSpPr>
+          <p:cNvPr id="52" name="Grupa 51" descr="kształt owalny">
+            <a:extLst>
+              <a:ext uri="{FF2B5EF4-FFF2-40B4-BE49-F238E27FC236}">
+                <a16:creationId xmlns:a16="http://schemas.microsoft.com/office/drawing/2014/main" id="{55324BBE-6FC8-F642-99EB-70C5F501A335}"/>
+              </a:ext>
+            </a:extLst>
+          </p:cNvPr>
+          <p:cNvGrpSpPr>
+            <a:grpSpLocks noChangeAspect="1"/>
+          </p:cNvGrpSpPr>
+          <p:nvPr/>
+        </p:nvGrpSpPr>
+        <p:grpSpPr>
+          <a:xfrm>
+            <a:off x="3947760" y="1850134"/>
+            <a:ext cx="1371600" cy="1371600"/>
+            <a:chOff x="4209356" y="2090058"/>
+            <a:chExt cx="1078067" cy="1078067"/>
+          </a:xfrm>
+        </p:grpSpPr>
+        <p:sp>
+          <p:nvSpPr>
+            <p:cNvPr id="19" name="Owal 18">
+              <a:extLst>
+                <a:ext uri="{FF2B5EF4-FFF2-40B4-BE49-F238E27FC236}">
+                  <a16:creationId xmlns:a16="http://schemas.microsoft.com/office/drawing/2014/main" id="{259AF8AE-644B-F145-BE68-9CACB0EEFBD9}"/>
+                </a:ext>
+              </a:extLst>
+            </p:cNvPr>
+            <p:cNvSpPr/>
+            <p:nvPr/>
+          </p:nvSpPr>
+          <p:spPr>
+            <a:xfrm>
+              <a:off x="4209356" y="2090058"/>
+              <a:ext cx="1078067" cy="1078067"/>
+            </a:xfrm>
+            <a:prstGeom prst="ellipse">
+              <a:avLst/>
+            </a:prstGeom>
+            <a:solidFill>
+              <a:schemeClr val="accent2"/>
+            </a:solidFill>
+            <a:ln>
+              <a:noFill/>
+            </a:ln>
+          </p:spPr>
+          <p:style>
+            <a:lnRef idx="2">
+              <a:schemeClr val="accent1">
+                <a:shade val="50000"/>
+              </a:schemeClr>
+            </a:lnRef>
+            <a:fillRef idx="1">
+              <a:schemeClr val="accent1"/>
+            </a:fillRef>
+            <a:effectRef idx="0">
+              <a:schemeClr val="accent1"/>
+            </a:effectRef>
+            <a:fontRef idx="minor">
+              <a:schemeClr val="lt1"/>
+            </a:fontRef>
+          </p:style>
+          <p:txBody>
+            <a:bodyPr lIns="0" tIns="0" rIns="0" bIns="0" rtlCol="0" anchor="t"/>
+            <a:lstStyle>
+              <a:defPPr>
+                <a:defRPr lang="pl-PL"/>
+              </a:defPPr>
+            </a:lstStyle>
+            <a:p>
+              <a:pPr algn="ctr" rtl="0"/>
+              <a:endParaRPr lang="pl-PL" dirty="0"/>
+            </a:p>
+          </p:txBody>
+        </p:sp>
+        <p:pic>
+          <p:nvPicPr>
+            <p:cNvPr id="51" name="Grafika 50" descr="Dom z pełnym wypełnieniem">
+              <a:extLst>
+                <a:ext uri="{FF2B5EF4-FFF2-40B4-BE49-F238E27FC236}">
+                  <a16:creationId xmlns:a16="http://schemas.microsoft.com/office/drawing/2014/main" id="{03791593-4209-B844-837B-3D480806B405}"/>
+                </a:ext>
+              </a:extLst>
+            </p:cNvPr>
+            <p:cNvPicPr>
+              <a:picLocks noChangeAspect="1"/>
+            </p:cNvPicPr>
+            <p:nvPr/>
+          </p:nvPicPr>
+          <p:blipFill>
+            <a:blip r:embed="rId6">
+              <a:extLst>
+                <a:ext uri="{28A0092B-C50C-407E-A947-70E740481C1C}">
+                  <a14:useLocalDpi xmlns:a14="http://schemas.microsoft.com/office/drawing/2010/main" val="0"/>
+                </a:ext>
+                <a:ext uri="{96DAC541-7B7A-43D3-8B79-37D633B846F1}">
+                  <asvg:svgBlip xmlns:asvg="http://schemas.microsoft.com/office/drawing/2016/SVG/main" r:embed="rId7"/>
+                </a:ext>
+              </a:extLst>
+            </a:blip>
+            <a:stretch>
+              <a:fillRect/>
+            </a:stretch>
+          </p:blipFill>
+          <p:spPr>
+            <a:xfrm>
+              <a:off x="4392991" y="2244911"/>
+              <a:ext cx="700008" cy="700008"/>
+            </a:xfrm>
+            <a:prstGeom prst="rect">
+              <a:avLst/>
+            </a:prstGeom>
+          </p:spPr>
+        </p:pic>
+      </p:grpSp>
+      <p:grpSp>
+        <p:nvGrpSpPr>
+          <p:cNvPr id="55" name="Grupa 54" descr="kształt owalny">
+            <a:extLst>
+              <a:ext uri="{FF2B5EF4-FFF2-40B4-BE49-F238E27FC236}">
+                <a16:creationId xmlns:a16="http://schemas.microsoft.com/office/drawing/2014/main" id="{BD92CEDD-CAE4-1A45-B8D5-25D25147BCE5}"/>
+              </a:ext>
+            </a:extLst>
+          </p:cNvPr>
+          <p:cNvGrpSpPr>
+            <a:grpSpLocks noChangeAspect="1"/>
+          </p:cNvGrpSpPr>
+          <p:nvPr/>
+        </p:nvGrpSpPr>
+        <p:grpSpPr>
+          <a:xfrm>
+            <a:off x="3970140" y="4116003"/>
+            <a:ext cx="1371600" cy="1371600"/>
+            <a:chOff x="4228012" y="4344657"/>
+            <a:chExt cx="1078993" cy="1078993"/>
+          </a:xfrm>
+        </p:grpSpPr>
+        <p:sp>
+          <p:nvSpPr>
+            <p:cNvPr id="25" name="Owal 24">
+              <a:extLst>
+                <a:ext uri="{FF2B5EF4-FFF2-40B4-BE49-F238E27FC236}">
+                  <a16:creationId xmlns:a16="http://schemas.microsoft.com/office/drawing/2014/main" id="{ED72CC41-B639-5345-8EA2-4D63B0006586}"/>
+                </a:ext>
+              </a:extLst>
+            </p:cNvPr>
+            <p:cNvSpPr>
+              <a:spLocks noChangeAspect="1"/>
+            </p:cNvSpPr>
+            <p:nvPr/>
+          </p:nvSpPr>
+          <p:spPr>
+            <a:xfrm>
+              <a:off x="4228012" y="4344657"/>
+              <a:ext cx="1078993" cy="1078993"/>
+            </a:xfrm>
+            <a:prstGeom prst="ellipse">
+              <a:avLst/>
+            </a:prstGeom>
+            <a:solidFill>
+              <a:schemeClr val="accent4">
+                <a:lumMod val="75000"/>
+              </a:schemeClr>
+            </a:solidFill>
+            <a:ln w="38100">
+              <a:solidFill>
+                <a:schemeClr val="accent4"/>
+              </a:solidFill>
+            </a:ln>
+          </p:spPr>
+          <p:style>
+            <a:lnRef idx="2">
+              <a:schemeClr val="accent1">
+                <a:shade val="50000"/>
+              </a:schemeClr>
+            </a:lnRef>
+            <a:fillRef idx="1">
+              <a:schemeClr val="accent1"/>
+            </a:fillRef>
+            <a:effectRef idx="0">
+              <a:schemeClr val="accent1"/>
+            </a:effectRef>
+            <a:fontRef idx="minor">
+              <a:schemeClr val="lt1"/>
+            </a:fontRef>
+          </p:style>
+          <p:txBody>
+            <a:bodyPr lIns="0" tIns="0" rIns="0" bIns="0" rtlCol="0" anchor="t"/>
+            <a:lstStyle>
+              <a:defPPr>
+                <a:defRPr lang="pl-PL"/>
+              </a:defPPr>
+            </a:lstStyle>
+            <a:p>
+              <a:pPr algn="ctr" rtl="0"/>
+              <a:endParaRPr lang="pl-PL" dirty="0"/>
+            </a:p>
+          </p:txBody>
+        </p:sp>
+        <p:pic>
+          <p:nvPicPr>
+            <p:cNvPr id="54" name="Grafika 53" descr="Samolot z pełnym wypełnieniem">
+              <a:extLst>
+                <a:ext uri="{FF2B5EF4-FFF2-40B4-BE49-F238E27FC236}">
+                  <a16:creationId xmlns:a16="http://schemas.microsoft.com/office/drawing/2014/main" id="{425F2876-A213-114D-986C-A9C3ECBD8620}"/>
+                </a:ext>
+              </a:extLst>
+            </p:cNvPr>
+            <p:cNvPicPr>
+              <a:picLocks noChangeAspect="1"/>
+            </p:cNvPicPr>
+            <p:nvPr/>
+          </p:nvPicPr>
+          <p:blipFill>
+            <a:blip r:embed="rId8">
+              <a:extLst>
+                <a:ext uri="{28A0092B-C50C-407E-A947-70E740481C1C}">
+                  <a14:useLocalDpi xmlns:a14="http://schemas.microsoft.com/office/drawing/2010/main" val="0"/>
+                </a:ext>
+                <a:ext uri="{96DAC541-7B7A-43D3-8B79-37D633B846F1}">
+                  <asvg:svgBlip xmlns:asvg="http://schemas.microsoft.com/office/drawing/2016/SVG/main" r:embed="rId9"/>
+                </a:ext>
+              </a:extLst>
+            </a:blip>
+            <a:stretch>
+              <a:fillRect/>
+            </a:stretch>
+          </p:blipFill>
+          <p:spPr>
+            <a:xfrm>
+              <a:off x="4391063" y="4496358"/>
+              <a:ext cx="741572" cy="741572"/>
+            </a:xfrm>
+            <a:prstGeom prst="rect">
+              <a:avLst/>
+            </a:prstGeom>
+          </p:spPr>
+        </p:pic>
+      </p:grpSp>
+      <p:sp>
+        <p:nvSpPr>
+          <p:cNvPr id="57" name="Owal 56" descr="kształt owalny">
+            <a:extLst>
+              <a:ext uri="{FF2B5EF4-FFF2-40B4-BE49-F238E27FC236}">
+                <a16:creationId xmlns:a16="http://schemas.microsoft.com/office/drawing/2014/main" id="{4E959DED-A35A-AF4E-A641-1AB03E6BE0AA}"/>
+              </a:ext>
+            </a:extLst>
+          </p:cNvPr>
+          <p:cNvSpPr>
+            <a:spLocks noChangeAspect="1"/>
+          </p:cNvSpPr>
+          <p:nvPr/>
+        </p:nvSpPr>
+        <p:spPr>
+          <a:xfrm>
+            <a:off x="8275791" y="3140864"/>
+            <a:ext cx="1179606" cy="1179606"/>
+          </a:xfrm>
+          <a:prstGeom prst="ellipse">
+            <a:avLst/>
+          </a:prstGeom>
+          <a:solidFill>
+            <a:schemeClr val="accent5"/>
+          </a:solidFill>
+          <a:ln w="38100">
+            <a:solidFill>
+              <a:schemeClr val="accent5">
+                <a:lumMod val="40000"/>
+                <a:lumOff val="60000"/>
+              </a:schemeClr>
+            </a:solidFill>
+          </a:ln>
+        </p:spPr>
+        <p:style>
+          <a:lnRef idx="2">
+            <a:schemeClr val="accent1">
+              <a:shade val="50000"/>
+            </a:schemeClr>
+          </a:lnRef>
+          <a:fillRef idx="1">
+            <a:schemeClr val="accent1"/>
+          </a:fillRef>
+          <a:effectRef idx="0">
+            <a:schemeClr val="accent1"/>
+          </a:effectRef>
+          <a:fontRef idx="minor">
+            <a:schemeClr val="lt1"/>
+          </a:fontRef>
+        </p:style>
+        <p:txBody>
+          <a:bodyPr lIns="0" rIns="0" rtlCol="0" anchor="ctr"/>
+          <a:lstStyle>
+            <a:defPPr>
+              <a:defRPr lang="pl-PL"/>
+            </a:defPPr>
+          </a:lstStyle>
+          <a:p>
+            <a:pPr algn="ctr" rtl="0"/>
+            <a:r>
+              <a:rPr lang="pl-PL" sz="1100" dirty="0">
+                <a:solidFill>
+                  <a:schemeClr val="bg1"/>
+                </a:solidFill>
+                <a:latin typeface="Posterama" panose="020B0504020200020000" pitchFamily="34" charset="0"/>
+                <a:cs typeface="Posterama" panose="020B0504020200020000" pitchFamily="34" charset="0"/>
+              </a:rPr>
+              <a:t>Pilnowanie wielorybów</a:t>
+            </a:r>
+          </a:p>
+        </p:txBody>
+      </p:sp>
+      <p:sp>
+        <p:nvSpPr>
+          <p:cNvPr id="53" name="Owal 52" descr="kształt owalny">
+            <a:extLst>
+              <a:ext uri="{FF2B5EF4-FFF2-40B4-BE49-F238E27FC236}">
+                <a16:creationId xmlns:a16="http://schemas.microsoft.com/office/drawing/2014/main" id="{B875FB20-B887-BB48-B4C8-877130C43C26}"/>
+              </a:ext>
+            </a:extLst>
+          </p:cNvPr>
+          <p:cNvSpPr>
+            <a:spLocks noChangeAspect="1"/>
+          </p:cNvSpPr>
+          <p:nvPr/>
+        </p:nvSpPr>
+        <p:spPr>
+          <a:xfrm>
+            <a:off x="5467196" y="3039012"/>
+            <a:ext cx="1371600" cy="1371600"/>
+          </a:xfrm>
+          <a:prstGeom prst="ellipse">
+            <a:avLst/>
+          </a:prstGeom>
+          <a:solidFill>
+            <a:schemeClr val="bg1"/>
+          </a:solidFill>
+          <a:ln w="38100">
+            <a:solidFill>
+              <a:schemeClr val="accent2"/>
+            </a:solidFill>
+          </a:ln>
+        </p:spPr>
+        <p:style>
+          <a:lnRef idx="2">
+            <a:schemeClr val="accent1">
+              <a:shade val="50000"/>
+            </a:schemeClr>
+          </a:lnRef>
+          <a:fillRef idx="1">
+            <a:schemeClr val="accent1"/>
+          </a:fillRef>
+          <a:effectRef idx="0">
+            <a:schemeClr val="accent1"/>
+          </a:effectRef>
+          <a:fontRef idx="minor">
+            <a:schemeClr val="lt1"/>
+          </a:fontRef>
+        </p:style>
+        <p:txBody>
+          <a:bodyPr lIns="0" tIns="0" rIns="0" bIns="0" rtlCol="0" anchor="t"/>
+          <a:lstStyle>
+            <a:defPPr>
+              <a:defRPr lang="pl-PL"/>
+            </a:defPPr>
+          </a:lstStyle>
+          <a:p>
+            <a:pPr algn="ctr" rtl="0"/>
+            <a:endParaRPr lang="pl-PL" dirty="0"/>
+          </a:p>
+        </p:txBody>
+      </p:sp>
+      <p:sp>
+        <p:nvSpPr>
+          <p:cNvPr id="24" name="Pole tekstowe 23">
+            <a:extLst>
+              <a:ext uri="{FF2B5EF4-FFF2-40B4-BE49-F238E27FC236}">
+                <a16:creationId xmlns:a16="http://schemas.microsoft.com/office/drawing/2014/main" id="{4EACDC13-7A41-1A4D-A46D-375C4ECC3359}"/>
+              </a:ext>
+            </a:extLst>
+          </p:cNvPr>
+          <p:cNvSpPr txBox="1"/>
+          <p:nvPr/>
+        </p:nvSpPr>
+        <p:spPr>
+          <a:xfrm>
+            <a:off x="5467196" y="3510576"/>
+            <a:ext cx="1371600" cy="461665"/>
+          </a:xfrm>
+          <a:prstGeom prst="rect">
+            <a:avLst/>
+          </a:prstGeom>
+          <a:noFill/>
+        </p:spPr>
+        <p:txBody>
+          <a:bodyPr wrap="square" rtlCol="0">
+            <a:spAutoFit/>
+          </a:bodyPr>
+          <a:lstStyle>
+            <a:defPPr>
+              <a:defRPr lang="pl-PL"/>
+            </a:defPPr>
+          </a:lstStyle>
+          <a:p>
+            <a:pPr algn="ctr" rtl="0"/>
+            <a:r>
+              <a:rPr lang="pl-PL" sz="2400" b="1">
+                <a:solidFill>
+                  <a:schemeClr val="accent2"/>
+                </a:solidFill>
+                <a:latin typeface="Posterama" panose="020B0504020200020000" pitchFamily="34" charset="0"/>
+                <a:cs typeface="Posterama" panose="020B0504020200020000" pitchFamily="34" charset="0"/>
+              </a:rPr>
+              <a:t>Hawaje</a:t>
+            </a:r>
+          </a:p>
+        </p:txBody>
+      </p:sp>
+    </p:spTree>
+    <p:extLst>
+      <p:ext uri="{BB962C8B-B14F-4D97-AF65-F5344CB8AC3E}">
+        <p14:creationId xmlns:p14="http://schemas.microsoft.com/office/powerpoint/2010/main" val="517615182"/>
+      </p:ext>
+    </p:extLst>
+  </p:cSld>
+  <p:clrMapOvr>
+    <a:masterClrMapping/>
+  </p:clrMapOvr>
+</p:sld>
+</file>
+
+<file path=ppt/slides/slide11.xml><?xml version="1.0" encoding="utf-8"?>
 <p:sld xmlns:a="http://schemas.openxmlformats.org/drawingml/2006/main" xmlns:r="http://schemas.openxmlformats.org/officeDocument/2006/relationships" xmlns:p="http://schemas.openxmlformats.org/presentationml/2006/main">
   <p:cSld>
     <p:spTree>
@@ -13713,6 +15911,330 @@
       </p:grpSpPr>
       <p:sp>
         <p:nvSpPr>
+          <p:cNvPr id="4" name="Tytuł 3">
+            <a:extLst>
+              <a:ext uri="{FF2B5EF4-FFF2-40B4-BE49-F238E27FC236}">
+                <a16:creationId xmlns:a16="http://schemas.microsoft.com/office/drawing/2014/main" id="{FE7E940F-6D6B-4FE5-8CA2-E8AE96D300C2}"/>
+              </a:ext>
+            </a:extLst>
+          </p:cNvPr>
+          <p:cNvSpPr>
+            <a:spLocks noGrp="1"/>
+          </p:cNvSpPr>
+          <p:nvPr>
+            <p:ph type="title"/>
+          </p:nvPr>
+        </p:nvSpPr>
+        <p:spPr>
+          <a:xfrm>
+            <a:off x="444500" y="430609"/>
+            <a:ext cx="9146972" cy="640080"/>
+          </a:xfrm>
+        </p:spPr>
+        <p:txBody>
+          <a:bodyPr rtlCol="0" anchor="ctr">
+            <a:normAutofit/>
+          </a:bodyPr>
+          <a:lstStyle>
+            <a:defPPr>
+              <a:defRPr lang="pl-PL"/>
+            </a:defPPr>
+          </a:lstStyle>
+          <a:p>
+            <a:pPr rtl="0"/>
+            <a:r>
+              <a:rPr lang="en-US" sz="2600" b="1"/>
+              <a:t>Using BCP to convert to CSV, Data Compression to GZIP</a:t>
+            </a:r>
+            <a:endParaRPr lang="pl-PL" sz="2600" b="1"/>
+          </a:p>
+        </p:txBody>
+      </p:sp>
+      <p:pic>
+        <p:nvPicPr>
+          <p:cNvPr id="11" name="Picture 10">
+            <a:extLst>
+              <a:ext uri="{FF2B5EF4-FFF2-40B4-BE49-F238E27FC236}">
+                <a16:creationId xmlns:a16="http://schemas.microsoft.com/office/drawing/2014/main" id="{6FB5E719-8A5A-1985-6CF5-ACBA258F8A1D}"/>
+              </a:ext>
+            </a:extLst>
+          </p:cNvPr>
+          <p:cNvPicPr>
+            <a:picLocks noChangeAspect="1"/>
+          </p:cNvPicPr>
+          <p:nvPr/>
+        </p:nvPicPr>
+        <p:blipFill>
+          <a:blip r:embed="rId3"/>
+          <a:stretch>
+            <a:fillRect/>
+          </a:stretch>
+        </p:blipFill>
+        <p:spPr>
+          <a:xfrm>
+            <a:off x="3969408" y="1422400"/>
+            <a:ext cx="7846713" cy="3526188"/>
+          </a:xfrm>
+          <a:prstGeom prst="rect">
+            <a:avLst/>
+          </a:prstGeom>
+        </p:spPr>
+      </p:pic>
+      <p:sp>
+        <p:nvSpPr>
+          <p:cNvPr id="19" name="Zawartość — symbol zastępczy 2">
+            <a:extLst>
+              <a:ext uri="{FF2B5EF4-FFF2-40B4-BE49-F238E27FC236}">
+                <a16:creationId xmlns:a16="http://schemas.microsoft.com/office/drawing/2014/main" id="{E67915F3-31F5-105E-2C51-8B4573FA557F}"/>
+              </a:ext>
+            </a:extLst>
+          </p:cNvPr>
+          <p:cNvSpPr>
+            <a:spLocks noGrp="1"/>
+          </p:cNvSpPr>
+          <p:nvPr>
+            <p:ph sz="quarter" idx="10"/>
+          </p:nvPr>
+        </p:nvSpPr>
+        <p:spPr>
+          <a:xfrm>
+            <a:off x="444501" y="1509612"/>
+            <a:ext cx="3594099" cy="3977640"/>
+          </a:xfrm>
+        </p:spPr>
+        <p:txBody>
+          <a:bodyPr rtlCol="0">
+            <a:noAutofit/>
+          </a:bodyPr>
+          <a:lstStyle>
+            <a:defPPr>
+              <a:defRPr lang="pl-PL"/>
+            </a:defPPr>
+          </a:lstStyle>
+          <a:p>
+            <a:pPr rtl="0"/>
+            <a:r>
+              <a:rPr lang="en-US" dirty="0">
+                <a:latin typeface="Segoe UI" panose="020B0502040204020203" pitchFamily="34" charset="0"/>
+                <a:cs typeface="Segoe UI" panose="020B0502040204020203" pitchFamily="34" charset="0"/>
+              </a:rPr>
+              <a:t>Setting a collection of view names</a:t>
+            </a:r>
+          </a:p>
+          <a:p>
+            <a:pPr rtl="0"/>
+            <a:r>
+              <a:rPr lang="en-US" dirty="0">
+                <a:latin typeface="Segoe UI" panose="020B0502040204020203" pitchFamily="34" charset="0"/>
+                <a:cs typeface="Segoe UI" panose="020B0502040204020203" pitchFamily="34" charset="0"/>
+              </a:rPr>
+              <a:t>Looping through all the views</a:t>
+            </a:r>
+          </a:p>
+          <a:p>
+            <a:pPr rtl="0"/>
+            <a:r>
+              <a:rPr lang="en-US" dirty="0">
+                <a:latin typeface="Segoe UI" panose="020B0502040204020203" pitchFamily="34" charset="0"/>
+                <a:cs typeface="Segoe UI" panose="020B0502040204020203" pitchFamily="34" charset="0"/>
+              </a:rPr>
+              <a:t>Combining views metadata (column names) with the actual data from two files into one file</a:t>
+            </a:r>
+          </a:p>
+          <a:p>
+            <a:pPr rtl="0"/>
+            <a:r>
+              <a:rPr lang="en-US" dirty="0">
+                <a:latin typeface="Segoe UI" panose="020B0502040204020203" pitchFamily="34" charset="0"/>
+                <a:cs typeface="Segoe UI" panose="020B0502040204020203" pitchFamily="34" charset="0"/>
+              </a:rPr>
+              <a:t>Using 7-Zip to compress to </a:t>
+            </a:r>
+            <a:r>
+              <a:rPr lang="en-US" dirty="0" err="1">
+                <a:latin typeface="Segoe UI" panose="020B0502040204020203" pitchFamily="34" charset="0"/>
+                <a:cs typeface="Segoe UI" panose="020B0502040204020203" pitchFamily="34" charset="0"/>
+              </a:rPr>
+              <a:t>gzip</a:t>
+            </a:r>
+            <a:r>
+              <a:rPr lang="en-US" dirty="0">
+                <a:latin typeface="Segoe UI" panose="020B0502040204020203" pitchFamily="34" charset="0"/>
+                <a:cs typeface="Segoe UI" panose="020B0502040204020203" pitchFamily="34" charset="0"/>
+              </a:rPr>
+              <a:t> format (</a:t>
+            </a:r>
+            <a:r>
+              <a:rPr lang="en-US" dirty="0" err="1">
+                <a:latin typeface="Segoe UI" panose="020B0502040204020203" pitchFamily="34" charset="0"/>
+                <a:cs typeface="Segoe UI" panose="020B0502040204020203" pitchFamily="34" charset="0"/>
+              </a:rPr>
+              <a:t>gzip</a:t>
+            </a:r>
+            <a:r>
+              <a:rPr lang="en-US" dirty="0">
+                <a:latin typeface="Segoe UI" panose="020B0502040204020203" pitchFamily="34" charset="0"/>
+                <a:cs typeface="Segoe UI" panose="020B0502040204020203" pitchFamily="34" charset="0"/>
+              </a:rPr>
+              <a:t> is directly readable by Spark)</a:t>
+            </a:r>
+          </a:p>
+          <a:p>
+            <a:pPr rtl="0"/>
+            <a:r>
+              <a:rPr lang="pl-PL" dirty="0" err="1">
+                <a:latin typeface="Segoe UI" panose="020B0502040204020203" pitchFamily="34" charset="0"/>
+                <a:cs typeface="Segoe UI" panose="020B0502040204020203" pitchFamily="34" charset="0"/>
+              </a:rPr>
+              <a:t>Deleting</a:t>
+            </a:r>
+            <a:r>
+              <a:rPr lang="pl-PL" dirty="0">
+                <a:latin typeface="Segoe UI" panose="020B0502040204020203" pitchFamily="34" charset="0"/>
+                <a:cs typeface="Segoe UI" panose="020B0502040204020203" pitchFamily="34" charset="0"/>
+              </a:rPr>
+              <a:t> </a:t>
+            </a:r>
+            <a:r>
+              <a:rPr lang="pl-PL" dirty="0" err="1">
+                <a:latin typeface="Segoe UI" panose="020B0502040204020203" pitchFamily="34" charset="0"/>
+                <a:cs typeface="Segoe UI" panose="020B0502040204020203" pitchFamily="34" charset="0"/>
+              </a:rPr>
+              <a:t>unnecessary</a:t>
+            </a:r>
+            <a:r>
+              <a:rPr lang="pl-PL" dirty="0">
+                <a:latin typeface="Segoe UI" panose="020B0502040204020203" pitchFamily="34" charset="0"/>
+                <a:cs typeface="Segoe UI" panose="020B0502040204020203" pitchFamily="34" charset="0"/>
+              </a:rPr>
+              <a:t> </a:t>
+            </a:r>
+            <a:r>
+              <a:rPr lang="pl-PL" dirty="0" err="1">
+                <a:latin typeface="Segoe UI" panose="020B0502040204020203" pitchFamily="34" charset="0"/>
+                <a:cs typeface="Segoe UI" panose="020B0502040204020203" pitchFamily="34" charset="0"/>
+              </a:rPr>
+              <a:t>files</a:t>
+            </a:r>
+            <a:endParaRPr lang="pl-PL" dirty="0">
+              <a:latin typeface="Segoe UI" panose="020B0502040204020203" pitchFamily="34" charset="0"/>
+              <a:cs typeface="Segoe UI" panose="020B0502040204020203" pitchFamily="34" charset="0"/>
+            </a:endParaRPr>
+          </a:p>
+        </p:txBody>
+      </p:sp>
+      <p:pic>
+        <p:nvPicPr>
+          <p:cNvPr id="21" name="Picture 20">
+            <a:extLst>
+              <a:ext uri="{FF2B5EF4-FFF2-40B4-BE49-F238E27FC236}">
+                <a16:creationId xmlns:a16="http://schemas.microsoft.com/office/drawing/2014/main" id="{FD4A34A5-E178-4C37-9AA9-CCB73462ED6D}"/>
+              </a:ext>
+            </a:extLst>
+          </p:cNvPr>
+          <p:cNvPicPr>
+            <a:picLocks noChangeAspect="1"/>
+          </p:cNvPicPr>
+          <p:nvPr/>
+        </p:nvPicPr>
+        <p:blipFill>
+          <a:blip r:embed="rId4"/>
+          <a:stretch>
+            <a:fillRect/>
+          </a:stretch>
+        </p:blipFill>
+        <p:spPr>
+          <a:xfrm>
+            <a:off x="319623" y="4435657"/>
+            <a:ext cx="3653797" cy="2103189"/>
+          </a:xfrm>
+          <a:prstGeom prst="rect">
+            <a:avLst/>
+          </a:prstGeom>
+        </p:spPr>
+      </p:pic>
+      <p:sp>
+        <p:nvSpPr>
+          <p:cNvPr id="23" name="Arrow: Bent 22">
+            <a:extLst>
+              <a:ext uri="{FF2B5EF4-FFF2-40B4-BE49-F238E27FC236}">
+                <a16:creationId xmlns:a16="http://schemas.microsoft.com/office/drawing/2014/main" id="{800958DE-AEB9-FE38-6406-9BB1841CE07D}"/>
+              </a:ext>
+            </a:extLst>
+          </p:cNvPr>
+          <p:cNvSpPr/>
+          <p:nvPr/>
+        </p:nvSpPr>
+        <p:spPr>
+          <a:xfrm rot="10800000">
+            <a:off x="4652433" y="5165518"/>
+            <a:ext cx="2167466" cy="824647"/>
+          </a:xfrm>
+          <a:prstGeom prst="bentArrow">
+            <a:avLst/>
+          </a:prstGeom>
+        </p:spPr>
+        <p:style>
+          <a:lnRef idx="2">
+            <a:schemeClr val="accent1">
+              <a:shade val="15000"/>
+            </a:schemeClr>
+          </a:lnRef>
+          <a:fillRef idx="1">
+            <a:schemeClr val="accent1"/>
+          </a:fillRef>
+          <a:effectRef idx="0">
+            <a:schemeClr val="accent1"/>
+          </a:effectRef>
+          <a:fontRef idx="minor">
+            <a:schemeClr val="lt1"/>
+          </a:fontRef>
+        </p:style>
+        <p:txBody>
+          <a:bodyPr rtlCol="0" anchor="ctr"/>
+          <a:lstStyle/>
+          <a:p>
+            <a:pPr algn="ctr"/>
+            <a:endParaRPr lang="pl-PL">
+              <a:solidFill>
+                <a:schemeClr val="tx1"/>
+              </a:solidFill>
+            </a:endParaRPr>
+          </a:p>
+        </p:txBody>
+      </p:sp>
+    </p:spTree>
+    <p:extLst>
+      <p:ext uri="{BB962C8B-B14F-4D97-AF65-F5344CB8AC3E}">
+        <p14:creationId xmlns:p14="http://schemas.microsoft.com/office/powerpoint/2010/main" val="354463102"/>
+      </p:ext>
+    </p:extLst>
+  </p:cSld>
+  <p:clrMapOvr>
+    <a:masterClrMapping/>
+  </p:clrMapOvr>
+</p:sld>
+</file>
+
+<file path=ppt/slides/slide7.xml><?xml version="1.0" encoding="utf-8"?>
+<p:sld xmlns:a="http://schemas.openxmlformats.org/drawingml/2006/main" xmlns:r="http://schemas.openxmlformats.org/officeDocument/2006/relationships" xmlns:p="http://schemas.openxmlformats.org/presentationml/2006/main">
+  <p:cSld>
+    <p:spTree>
+      <p:nvGrpSpPr>
+        <p:cNvPr id="1" name=""/>
+        <p:cNvGrpSpPr/>
+        <p:nvPr/>
+      </p:nvGrpSpPr>
+      <p:grpSpPr>
+        <a:xfrm>
+          <a:off x="0" y="0"/>
+          <a:ext cx="0" cy="0"/>
+          <a:chOff x="0" y="0"/>
+          <a:chExt cx="0" cy="0"/>
+        </a:xfrm>
+      </p:grpSpPr>
+      <p:sp>
+        <p:nvSpPr>
           <p:cNvPr id="2" name="Tytuł 1">
             <a:extLst>
               <a:ext uri="{FF2B5EF4-FFF2-40B4-BE49-F238E27FC236}">
@@ -13791,7 +16313,7 @@
               <a:buNone/>
             </a:pPr>
             <a:r>
-              <a:rPr lang="pl-PL" sz="1600">
+              <a:rPr lang="pl-PL" sz="1600" dirty="0">
                 <a:latin typeface="Segoe UI" panose="020B0502040204020203" pitchFamily="34" charset="0"/>
                 <a:cs typeface="Segoe UI" panose="020B0502040204020203" pitchFamily="34" charset="0"/>
               </a:rPr>
@@ -13801,7 +16323,7 @@
           <a:p>
             <a:pPr rtl="0"/>
             <a:r>
-              <a:rPr lang="pl-PL" sz="1600">
+              <a:rPr lang="pl-PL" sz="1600" dirty="0">
                 <a:latin typeface="Segoe UI" panose="020B0502040204020203" pitchFamily="34" charset="0"/>
                 <a:cs typeface="Segoe UI" panose="020B0502040204020203" pitchFamily="34" charset="0"/>
               </a:rPr>
@@ -13811,7 +16333,7 @@
           <a:p>
             <a:pPr rtl="0"/>
             <a:r>
-              <a:rPr lang="pl-PL" sz="1600">
+              <a:rPr lang="pl-PL" sz="1600" dirty="0">
                 <a:latin typeface="Segoe UI" panose="020B0502040204020203" pitchFamily="34" charset="0"/>
                 <a:cs typeface="Segoe UI" panose="020B0502040204020203" pitchFamily="34" charset="0"/>
               </a:rPr>
@@ -13821,7 +16343,7 @@
           <a:p>
             <a:pPr rtl="0"/>
             <a:r>
-              <a:rPr lang="pl-PL" sz="1600">
+              <a:rPr lang="pl-PL" sz="1600" dirty="0">
                 <a:latin typeface="Segoe UI" panose="020B0502040204020203" pitchFamily="34" charset="0"/>
                 <a:cs typeface="Segoe UI" panose="020B0502040204020203" pitchFamily="34" charset="0"/>
               </a:rPr>
@@ -13831,7 +16353,7 @@
           <a:p>
             <a:pPr rtl="0"/>
             <a:r>
-              <a:rPr lang="pl-PL" sz="1600">
+              <a:rPr lang="pl-PL" sz="1600" dirty="0">
                 <a:latin typeface="Segoe UI" panose="020B0502040204020203" pitchFamily="34" charset="0"/>
                 <a:cs typeface="Segoe UI" panose="020B0502040204020203" pitchFamily="34" charset="0"/>
               </a:rPr>
@@ -14758,7 +17280,7 @@
 </p:sld>
 </file>
 
-<file path=ppt/slides/slide7.xml><?xml version="1.0" encoding="utf-8"?>
+<file path=ppt/slides/slide8.xml><?xml version="1.0" encoding="utf-8"?>
 <p:sld xmlns:a="http://schemas.openxmlformats.org/drawingml/2006/main" xmlns:r="http://schemas.openxmlformats.org/officeDocument/2006/relationships" xmlns:p="http://schemas.openxmlformats.org/presentationml/2006/main">
   <p:cSld>
     <p:spTree>
@@ -16257,7 +18779,7 @@
 </p:sld>
 </file>
 
-<file path=ppt/slides/slide8.xml><?xml version="1.0" encoding="utf-8"?>
+<file path=ppt/slides/slide9.xml><?xml version="1.0" encoding="utf-8"?>
 <p:sld xmlns:a="http://schemas.openxmlformats.org/drawingml/2006/main" xmlns:r="http://schemas.openxmlformats.org/officeDocument/2006/relationships" xmlns:p="http://schemas.openxmlformats.org/presentationml/2006/main">
   <p:cSld>
     <p:spTree>
@@ -18035,2055 +20557,7 @@
     </p:spTree>
     <p:extLst>
       <p:ext uri="{BB962C8B-B14F-4D97-AF65-F5344CB8AC3E}">
-        <p14:creationId xmlns:p14="http://schemas.microsoft.com/office/powerpoint/2010/main" val="354463102"/>
-      </p:ext>
-    </p:extLst>
-  </p:cSld>
-  <p:clrMapOvr>
-    <a:masterClrMapping/>
-  </p:clrMapOvr>
-</p:sld>
-</file>
-
-<file path=ppt/slides/slide9.xml><?xml version="1.0" encoding="utf-8"?>
-<p:sld xmlns:a="http://schemas.openxmlformats.org/drawingml/2006/main" xmlns:r="http://schemas.openxmlformats.org/officeDocument/2006/relationships" xmlns:p="http://schemas.openxmlformats.org/presentationml/2006/main">
-  <p:cSld>
-    <p:spTree>
-      <p:nvGrpSpPr>
-        <p:cNvPr id="1" name=""/>
-        <p:cNvGrpSpPr/>
-        <p:nvPr/>
-      </p:nvGrpSpPr>
-      <p:grpSpPr>
-        <a:xfrm>
-          <a:off x="0" y="0"/>
-          <a:ext cx="0" cy="0"/>
-          <a:chOff x="0" y="0"/>
-          <a:chExt cx="0" cy="0"/>
-        </a:xfrm>
-      </p:grpSpPr>
-      <p:cxnSp>
-        <p:nvCxnSpPr>
-          <p:cNvPr id="59" name="Łącznik prosty 58" descr="linia prosta">
-            <a:extLst>
-              <a:ext uri="{FF2B5EF4-FFF2-40B4-BE49-F238E27FC236}">
-                <a16:creationId xmlns:a16="http://schemas.microsoft.com/office/drawing/2014/main" id="{08A55832-B73A-0349-BEE0-DF570483DF30}"/>
-              </a:ext>
-            </a:extLst>
-          </p:cNvPr>
-          <p:cNvCxnSpPr>
-            <a:cxnSpLocks/>
-          </p:cNvCxnSpPr>
-          <p:nvPr/>
-        </p:nvCxnSpPr>
-        <p:spPr>
-          <a:xfrm flipH="1" flipV="1">
-            <a:off x="8275791" y="2640750"/>
-            <a:ext cx="252079" cy="746356"/>
-          </a:xfrm>
-          <a:prstGeom prst="line">
-            <a:avLst/>
-          </a:prstGeom>
-          <a:ln>
-            <a:solidFill>
-              <a:schemeClr val="bg2">
-                <a:lumMod val="75000"/>
-              </a:schemeClr>
-            </a:solidFill>
-          </a:ln>
-        </p:spPr>
-        <p:style>
-          <a:lnRef idx="3">
-            <a:schemeClr val="dk1"/>
-          </a:lnRef>
-          <a:fillRef idx="0">
-            <a:schemeClr val="dk1"/>
-          </a:fillRef>
-          <a:effectRef idx="2">
-            <a:schemeClr val="dk1"/>
-          </a:effectRef>
-          <a:fontRef idx="minor">
-            <a:schemeClr val="tx1"/>
-          </a:fontRef>
-        </p:style>
-      </p:cxnSp>
-      <p:sp>
-        <p:nvSpPr>
-          <p:cNvPr id="4" name="Tytuł 3">
-            <a:extLst>
-              <a:ext uri="{FF2B5EF4-FFF2-40B4-BE49-F238E27FC236}">
-                <a16:creationId xmlns:a16="http://schemas.microsoft.com/office/drawing/2014/main" id="{FE7E940F-6D6B-4FE5-8CA2-E8AE96D300C2}"/>
-              </a:ext>
-            </a:extLst>
-          </p:cNvPr>
-          <p:cNvSpPr>
-            <a:spLocks noGrp="1"/>
-          </p:cNvSpPr>
-          <p:nvPr>
-            <p:ph type="title"/>
-          </p:nvPr>
-        </p:nvSpPr>
-        <p:spPr>
-          <a:xfrm>
-            <a:off x="444500" y="414843"/>
-            <a:ext cx="9146972" cy="640080"/>
-          </a:xfrm>
-        </p:spPr>
-        <p:txBody>
-          <a:bodyPr rtlCol="0"/>
-          <a:lstStyle>
-            <a:defPPr>
-              <a:defRPr lang="pl-PL"/>
-            </a:defPPr>
-          </a:lstStyle>
-          <a:p>
-            <a:pPr rtl="0"/>
-            <a:r>
-              <a:rPr lang="pl-PL" b="1">
-                <a:latin typeface="Segoe UI Semibold" panose="020B0502040204020203" pitchFamily="34" charset="0"/>
-                <a:cs typeface="Segoe UI Semibold" panose="020B0502040204020203" pitchFamily="34" charset="0"/>
-              </a:rPr>
-              <a:t>Przykład: </a:t>
-            </a:r>
-            <a:r>
-              <a:rPr lang="pl-PL" b="1">
-                <a:solidFill>
-                  <a:schemeClr val="bg2">
-                    <a:lumMod val="50000"/>
-                  </a:schemeClr>
-                </a:solidFill>
-                <a:latin typeface="Segoe UI Semibold" panose="020B0502040204020203" pitchFamily="34" charset="0"/>
-                <a:cs typeface="Segoe UI Semibold" panose="020B0502040204020203" pitchFamily="34" charset="0"/>
-              </a:rPr>
-              <a:t>Planowanie urlopu </a:t>
-            </a:r>
-          </a:p>
-        </p:txBody>
-      </p:sp>
-      <p:cxnSp>
-        <p:nvCxnSpPr>
-          <p:cNvPr id="6" name="Łącznik prosty 5" descr="linia prosta">
-            <a:extLst>
-              <a:ext uri="{FF2B5EF4-FFF2-40B4-BE49-F238E27FC236}">
-                <a16:creationId xmlns:a16="http://schemas.microsoft.com/office/drawing/2014/main" id="{BB3D7D1F-9F99-6544-A2AB-9D8FB2A9BC00}"/>
-              </a:ext>
-            </a:extLst>
-          </p:cNvPr>
-          <p:cNvCxnSpPr>
-            <a:cxnSpLocks/>
-          </p:cNvCxnSpPr>
-          <p:nvPr/>
-        </p:nvCxnSpPr>
-        <p:spPr>
-          <a:xfrm flipH="1" flipV="1">
-            <a:off x="4998766" y="2876580"/>
-            <a:ext cx="865892" cy="618105"/>
-          </a:xfrm>
-          <a:prstGeom prst="line">
-            <a:avLst/>
-          </a:prstGeom>
-          <a:ln/>
-        </p:spPr>
-        <p:style>
-          <a:lnRef idx="3">
-            <a:schemeClr val="dk1"/>
-          </a:lnRef>
-          <a:fillRef idx="0">
-            <a:schemeClr val="dk1"/>
-          </a:fillRef>
-          <a:effectRef idx="2">
-            <a:schemeClr val="dk1"/>
-          </a:effectRef>
-          <a:fontRef idx="minor">
-            <a:schemeClr val="tx1"/>
-          </a:fontRef>
-        </p:style>
-      </p:cxnSp>
-      <p:cxnSp>
-        <p:nvCxnSpPr>
-          <p:cNvPr id="7" name="Łącznik prosty 6" descr="linia prosta">
-            <a:extLst>
-              <a:ext uri="{FF2B5EF4-FFF2-40B4-BE49-F238E27FC236}">
-                <a16:creationId xmlns:a16="http://schemas.microsoft.com/office/drawing/2014/main" id="{FF161E3F-5F97-2145-A359-06236E6F1A17}"/>
-              </a:ext>
-            </a:extLst>
-          </p:cNvPr>
-          <p:cNvCxnSpPr>
-            <a:cxnSpLocks/>
-          </p:cNvCxnSpPr>
-          <p:nvPr/>
-        </p:nvCxnSpPr>
-        <p:spPr>
-          <a:xfrm flipH="1">
-            <a:off x="5149134" y="3972241"/>
-            <a:ext cx="1023302" cy="708753"/>
-          </a:xfrm>
-          <a:prstGeom prst="line">
-            <a:avLst/>
-          </a:prstGeom>
-          <a:ln/>
-        </p:spPr>
-        <p:style>
-          <a:lnRef idx="3">
-            <a:schemeClr val="dk1"/>
-          </a:lnRef>
-          <a:fillRef idx="0">
-            <a:schemeClr val="dk1"/>
-          </a:fillRef>
-          <a:effectRef idx="2">
-            <a:schemeClr val="dk1"/>
-          </a:effectRef>
-          <a:fontRef idx="minor">
-            <a:schemeClr val="tx1"/>
-          </a:fontRef>
-        </p:style>
-      </p:cxnSp>
-      <p:cxnSp>
-        <p:nvCxnSpPr>
-          <p:cNvPr id="8" name="Łącznik prosty 7" descr="linia prosta">
-            <a:extLst>
-              <a:ext uri="{FF2B5EF4-FFF2-40B4-BE49-F238E27FC236}">
-                <a16:creationId xmlns:a16="http://schemas.microsoft.com/office/drawing/2014/main" id="{75E1E8CB-9A55-1840-BD17-1FF20155D259}"/>
-              </a:ext>
-            </a:extLst>
-          </p:cNvPr>
-          <p:cNvCxnSpPr>
-            <a:cxnSpLocks/>
-          </p:cNvCxnSpPr>
-          <p:nvPr/>
-        </p:nvCxnSpPr>
-        <p:spPr>
-          <a:xfrm>
-            <a:off x="6172436" y="3972241"/>
-            <a:ext cx="1211935" cy="750365"/>
-          </a:xfrm>
-          <a:prstGeom prst="line">
-            <a:avLst/>
-          </a:prstGeom>
-          <a:ln/>
-        </p:spPr>
-        <p:style>
-          <a:lnRef idx="3">
-            <a:schemeClr val="dk1"/>
-          </a:lnRef>
-          <a:fillRef idx="0">
-            <a:schemeClr val="dk1"/>
-          </a:fillRef>
-          <a:effectRef idx="2">
-            <a:schemeClr val="dk1"/>
-          </a:effectRef>
-          <a:fontRef idx="minor">
-            <a:schemeClr val="tx1"/>
-          </a:fontRef>
-        </p:style>
-      </p:cxnSp>
-      <p:cxnSp>
-        <p:nvCxnSpPr>
-          <p:cNvPr id="9" name="Łącznik prosty 8" descr="linia prosta">
-            <a:extLst>
-              <a:ext uri="{FF2B5EF4-FFF2-40B4-BE49-F238E27FC236}">
-                <a16:creationId xmlns:a16="http://schemas.microsoft.com/office/drawing/2014/main" id="{CAAA0540-EB2B-7C4E-B6FD-3D2E940A5CBD}"/>
-              </a:ext>
-            </a:extLst>
-          </p:cNvPr>
-          <p:cNvCxnSpPr>
-            <a:cxnSpLocks/>
-          </p:cNvCxnSpPr>
-          <p:nvPr/>
-        </p:nvCxnSpPr>
-        <p:spPr>
-          <a:xfrm flipH="1">
-            <a:off x="6658102" y="2901766"/>
-            <a:ext cx="611786" cy="445658"/>
-          </a:xfrm>
-          <a:prstGeom prst="line">
-            <a:avLst/>
-          </a:prstGeom>
-          <a:ln/>
-        </p:spPr>
-        <p:style>
-          <a:lnRef idx="3">
-            <a:schemeClr val="dk1"/>
-          </a:lnRef>
-          <a:fillRef idx="0">
-            <a:schemeClr val="dk1"/>
-          </a:fillRef>
-          <a:effectRef idx="2">
-            <a:schemeClr val="dk1"/>
-          </a:effectRef>
-          <a:fontRef idx="minor">
-            <a:schemeClr val="tx1"/>
-          </a:fontRef>
-        </p:style>
-      </p:cxnSp>
-      <p:cxnSp>
-        <p:nvCxnSpPr>
-          <p:cNvPr id="10" name="Łącznik prosty 9" descr="linia prosta">
-            <a:extLst>
-              <a:ext uri="{FF2B5EF4-FFF2-40B4-BE49-F238E27FC236}">
-                <a16:creationId xmlns:a16="http://schemas.microsoft.com/office/drawing/2014/main" id="{C3A84B38-3D70-B74D-A3C8-E8C86A229730}"/>
-              </a:ext>
-            </a:extLst>
-          </p:cNvPr>
-          <p:cNvCxnSpPr>
-            <a:cxnSpLocks/>
-          </p:cNvCxnSpPr>
-          <p:nvPr/>
-        </p:nvCxnSpPr>
-        <p:spPr>
-          <a:xfrm flipV="1">
-            <a:off x="2519235" y="4957072"/>
-            <a:ext cx="1543718" cy="441273"/>
-          </a:xfrm>
-          <a:prstGeom prst="line">
-            <a:avLst/>
-          </a:prstGeom>
-          <a:ln>
-            <a:solidFill>
-              <a:schemeClr val="bg2">
-                <a:lumMod val="75000"/>
-              </a:schemeClr>
-            </a:solidFill>
-          </a:ln>
-        </p:spPr>
-        <p:style>
-          <a:lnRef idx="3">
-            <a:schemeClr val="dk1"/>
-          </a:lnRef>
-          <a:fillRef idx="0">
-            <a:schemeClr val="dk1"/>
-          </a:fillRef>
-          <a:effectRef idx="2">
-            <a:schemeClr val="dk1"/>
-          </a:effectRef>
-          <a:fontRef idx="minor">
-            <a:schemeClr val="tx1"/>
-          </a:fontRef>
-        </p:style>
-      </p:cxnSp>
-      <p:cxnSp>
-        <p:nvCxnSpPr>
-          <p:cNvPr id="11" name="Łącznik prosty 10" descr="linia prosta">
-            <a:extLst>
-              <a:ext uri="{FF2B5EF4-FFF2-40B4-BE49-F238E27FC236}">
-                <a16:creationId xmlns:a16="http://schemas.microsoft.com/office/drawing/2014/main" id="{F55FD9E5-8DE2-0347-9277-EAA0E4698685}"/>
-              </a:ext>
-            </a:extLst>
-          </p:cNvPr>
-          <p:cNvCxnSpPr>
-            <a:cxnSpLocks/>
-            <a:endCxn id="25" idx="2"/>
-          </p:cNvCxnSpPr>
-          <p:nvPr/>
-        </p:nvCxnSpPr>
-        <p:spPr>
-          <a:xfrm>
-            <a:off x="3227220" y="4475481"/>
-            <a:ext cx="742920" cy="326322"/>
-          </a:xfrm>
-          <a:prstGeom prst="line">
-            <a:avLst/>
-          </a:prstGeom>
-          <a:ln>
-            <a:solidFill>
-              <a:schemeClr val="bg2">
-                <a:lumMod val="75000"/>
-              </a:schemeClr>
-            </a:solidFill>
-          </a:ln>
-        </p:spPr>
-        <p:style>
-          <a:lnRef idx="3">
-            <a:schemeClr val="dk1"/>
-          </a:lnRef>
-          <a:fillRef idx="0">
-            <a:schemeClr val="dk1"/>
-          </a:fillRef>
-          <a:effectRef idx="2">
-            <a:schemeClr val="dk1"/>
-          </a:effectRef>
-          <a:fontRef idx="minor">
-            <a:schemeClr val="tx1"/>
-          </a:fontRef>
-        </p:style>
-      </p:cxnSp>
-      <p:cxnSp>
-        <p:nvCxnSpPr>
-          <p:cNvPr id="12" name="Łącznik prosty 11" descr="linia prosta">
-            <a:extLst>
-              <a:ext uri="{FF2B5EF4-FFF2-40B4-BE49-F238E27FC236}">
-                <a16:creationId xmlns:a16="http://schemas.microsoft.com/office/drawing/2014/main" id="{60BC2FCC-293B-6C4A-99A5-DD35930F4539}"/>
-              </a:ext>
-            </a:extLst>
-          </p:cNvPr>
-          <p:cNvCxnSpPr>
-            <a:cxnSpLocks/>
-          </p:cNvCxnSpPr>
-          <p:nvPr/>
-        </p:nvCxnSpPr>
-        <p:spPr>
-          <a:xfrm>
-            <a:off x="2986002" y="2100358"/>
-            <a:ext cx="1076951" cy="331757"/>
-          </a:xfrm>
-          <a:prstGeom prst="line">
-            <a:avLst/>
-          </a:prstGeom>
-          <a:ln>
-            <a:solidFill>
-              <a:schemeClr val="bg2">
-                <a:lumMod val="75000"/>
-              </a:schemeClr>
-            </a:solidFill>
-          </a:ln>
-        </p:spPr>
-        <p:style>
-          <a:lnRef idx="3">
-            <a:schemeClr val="dk1"/>
-          </a:lnRef>
-          <a:fillRef idx="0">
-            <a:schemeClr val="dk1"/>
-          </a:fillRef>
-          <a:effectRef idx="2">
-            <a:schemeClr val="dk1"/>
-          </a:effectRef>
-          <a:fontRef idx="minor">
-            <a:schemeClr val="tx1"/>
-          </a:fontRef>
-        </p:style>
-      </p:cxnSp>
-      <p:cxnSp>
-        <p:nvCxnSpPr>
-          <p:cNvPr id="13" name="Łącznik prosty 12" descr="linia prosta">
-            <a:extLst>
-              <a:ext uri="{FF2B5EF4-FFF2-40B4-BE49-F238E27FC236}">
-                <a16:creationId xmlns:a16="http://schemas.microsoft.com/office/drawing/2014/main" id="{9160F3BD-25E5-4B40-B0E8-AAF8665EDB86}"/>
-              </a:ext>
-            </a:extLst>
-          </p:cNvPr>
-          <p:cNvCxnSpPr>
-            <a:cxnSpLocks/>
-          </p:cNvCxnSpPr>
-          <p:nvPr/>
-        </p:nvCxnSpPr>
-        <p:spPr>
-          <a:xfrm flipV="1">
-            <a:off x="2118762" y="2640750"/>
-            <a:ext cx="1851378" cy="723596"/>
-          </a:xfrm>
-          <a:prstGeom prst="line">
-            <a:avLst/>
-          </a:prstGeom>
-          <a:ln>
-            <a:solidFill>
-              <a:schemeClr val="bg2">
-                <a:lumMod val="75000"/>
-              </a:schemeClr>
-            </a:solidFill>
-          </a:ln>
-        </p:spPr>
-        <p:style>
-          <a:lnRef idx="3">
-            <a:schemeClr val="dk1"/>
-          </a:lnRef>
-          <a:fillRef idx="0">
-            <a:schemeClr val="dk1"/>
-          </a:fillRef>
-          <a:effectRef idx="2">
-            <a:schemeClr val="dk1"/>
-          </a:effectRef>
-          <a:fontRef idx="minor">
-            <a:schemeClr val="tx1"/>
-          </a:fontRef>
-        </p:style>
-      </p:cxnSp>
-      <p:cxnSp>
-        <p:nvCxnSpPr>
-          <p:cNvPr id="14" name="Łącznik prosty 13" descr="linia prosta">
-            <a:extLst>
-              <a:ext uri="{FF2B5EF4-FFF2-40B4-BE49-F238E27FC236}">
-                <a16:creationId xmlns:a16="http://schemas.microsoft.com/office/drawing/2014/main" id="{453F2895-73F9-1B43-A821-7AF60AD81C5E}"/>
-              </a:ext>
-            </a:extLst>
-          </p:cNvPr>
-          <p:cNvCxnSpPr>
-            <a:cxnSpLocks/>
-          </p:cNvCxnSpPr>
-          <p:nvPr/>
-        </p:nvCxnSpPr>
-        <p:spPr>
-          <a:xfrm flipH="1">
-            <a:off x="8275791" y="2039304"/>
-            <a:ext cx="1808799" cy="392811"/>
-          </a:xfrm>
-          <a:prstGeom prst="line">
-            <a:avLst/>
-          </a:prstGeom>
-          <a:ln>
-            <a:solidFill>
-              <a:schemeClr val="bg2">
-                <a:lumMod val="75000"/>
-              </a:schemeClr>
-            </a:solidFill>
-          </a:ln>
-        </p:spPr>
-        <p:style>
-          <a:lnRef idx="3">
-            <a:schemeClr val="dk1"/>
-          </a:lnRef>
-          <a:fillRef idx="0">
-            <a:schemeClr val="dk1"/>
-          </a:fillRef>
-          <a:effectRef idx="2">
-            <a:schemeClr val="dk1"/>
-          </a:effectRef>
-          <a:fontRef idx="minor">
-            <a:schemeClr val="tx1"/>
-          </a:fontRef>
-        </p:style>
-      </p:cxnSp>
-      <p:cxnSp>
-        <p:nvCxnSpPr>
-          <p:cNvPr id="15" name="Łącznik prosty 14" descr="linia prosta">
-            <a:extLst>
-              <a:ext uri="{FF2B5EF4-FFF2-40B4-BE49-F238E27FC236}">
-                <a16:creationId xmlns:a16="http://schemas.microsoft.com/office/drawing/2014/main" id="{16881FA3-57E1-7047-A9D0-BBB18E1F17FC}"/>
-              </a:ext>
-            </a:extLst>
-          </p:cNvPr>
-          <p:cNvCxnSpPr>
-            <a:cxnSpLocks/>
-          </p:cNvCxnSpPr>
-          <p:nvPr/>
-        </p:nvCxnSpPr>
-        <p:spPr>
-          <a:xfrm flipH="1" flipV="1">
-            <a:off x="8227283" y="2523602"/>
-            <a:ext cx="2141062" cy="565559"/>
-          </a:xfrm>
-          <a:prstGeom prst="line">
-            <a:avLst/>
-          </a:prstGeom>
-          <a:ln>
-            <a:solidFill>
-              <a:schemeClr val="bg2">
-                <a:lumMod val="75000"/>
-              </a:schemeClr>
-            </a:solidFill>
-          </a:ln>
-        </p:spPr>
-        <p:style>
-          <a:lnRef idx="3">
-            <a:schemeClr val="dk1"/>
-          </a:lnRef>
-          <a:fillRef idx="0">
-            <a:schemeClr val="dk1"/>
-          </a:fillRef>
-          <a:effectRef idx="2">
-            <a:schemeClr val="dk1"/>
-          </a:effectRef>
-          <a:fontRef idx="minor">
-            <a:schemeClr val="tx1"/>
-          </a:fontRef>
-        </p:style>
-      </p:cxnSp>
-      <p:cxnSp>
-        <p:nvCxnSpPr>
-          <p:cNvPr id="16" name="Łącznik prosty 15" descr="linia prosta">
-            <a:extLst>
-              <a:ext uri="{FF2B5EF4-FFF2-40B4-BE49-F238E27FC236}">
-                <a16:creationId xmlns:a16="http://schemas.microsoft.com/office/drawing/2014/main" id="{CD049ECD-6305-2243-A1AE-ECD535FFABCE}"/>
-              </a:ext>
-            </a:extLst>
-          </p:cNvPr>
-          <p:cNvCxnSpPr>
-            <a:cxnSpLocks/>
-            <a:endCxn id="40" idx="6"/>
-          </p:cNvCxnSpPr>
-          <p:nvPr/>
-        </p:nvCxnSpPr>
-        <p:spPr>
-          <a:xfrm flipH="1">
-            <a:off x="8375681" y="4605458"/>
-            <a:ext cx="2020374" cy="196345"/>
-          </a:xfrm>
-          <a:prstGeom prst="line">
-            <a:avLst/>
-          </a:prstGeom>
-          <a:ln>
-            <a:solidFill>
-              <a:schemeClr val="bg2">
-                <a:lumMod val="75000"/>
-              </a:schemeClr>
-            </a:solidFill>
-          </a:ln>
-        </p:spPr>
-        <p:style>
-          <a:lnRef idx="3">
-            <a:schemeClr val="dk1"/>
-          </a:lnRef>
-          <a:fillRef idx="0">
-            <a:schemeClr val="dk1"/>
-          </a:fillRef>
-          <a:effectRef idx="2">
-            <a:schemeClr val="dk1"/>
-          </a:effectRef>
-          <a:fontRef idx="minor">
-            <a:schemeClr val="tx1"/>
-          </a:fontRef>
-        </p:style>
-      </p:cxnSp>
-      <p:cxnSp>
-        <p:nvCxnSpPr>
-          <p:cNvPr id="17" name="Łącznik prosty 16" descr="linia prosta">
-            <a:extLst>
-              <a:ext uri="{FF2B5EF4-FFF2-40B4-BE49-F238E27FC236}">
-                <a16:creationId xmlns:a16="http://schemas.microsoft.com/office/drawing/2014/main" id="{B44A1FD7-E9EF-0144-B1AB-CE93F8C903E0}"/>
-              </a:ext>
-            </a:extLst>
-          </p:cNvPr>
-          <p:cNvCxnSpPr>
-            <a:cxnSpLocks/>
-          </p:cNvCxnSpPr>
-          <p:nvPr/>
-        </p:nvCxnSpPr>
-        <p:spPr>
-          <a:xfrm flipH="1" flipV="1">
-            <a:off x="8275791" y="4957072"/>
-            <a:ext cx="623442" cy="516023"/>
-          </a:xfrm>
-          <a:prstGeom prst="line">
-            <a:avLst/>
-          </a:prstGeom>
-          <a:ln>
-            <a:solidFill>
-              <a:schemeClr val="bg2">
-                <a:lumMod val="75000"/>
-              </a:schemeClr>
-            </a:solidFill>
-          </a:ln>
-        </p:spPr>
-        <p:style>
-          <a:lnRef idx="3">
-            <a:schemeClr val="dk1"/>
-          </a:lnRef>
-          <a:fillRef idx="0">
-            <a:schemeClr val="dk1"/>
-          </a:fillRef>
-          <a:effectRef idx="2">
-            <a:schemeClr val="dk1"/>
-          </a:effectRef>
-          <a:fontRef idx="minor">
-            <a:schemeClr val="tx1"/>
-          </a:fontRef>
-        </p:style>
-      </p:cxnSp>
-      <p:sp>
-        <p:nvSpPr>
-          <p:cNvPr id="27" name="Pole tekstowe 26">
-            <a:extLst>
-              <a:ext uri="{FF2B5EF4-FFF2-40B4-BE49-F238E27FC236}">
-                <a16:creationId xmlns:a16="http://schemas.microsoft.com/office/drawing/2014/main" id="{AC03EAFB-FBF3-D94D-90FB-35CA892A2228}"/>
-              </a:ext>
-            </a:extLst>
-          </p:cNvPr>
-          <p:cNvSpPr txBox="1"/>
-          <p:nvPr/>
-        </p:nvSpPr>
-        <p:spPr>
-          <a:xfrm>
-            <a:off x="3504392" y="1423001"/>
-            <a:ext cx="2303096" cy="369332"/>
-          </a:xfrm>
-          <a:prstGeom prst="rect">
-            <a:avLst/>
-          </a:prstGeom>
-          <a:noFill/>
-        </p:spPr>
-        <p:txBody>
-          <a:bodyPr wrap="square" rtlCol="0">
-            <a:spAutoFit/>
-          </a:bodyPr>
-          <a:lstStyle>
-            <a:defPPr>
-              <a:defRPr lang="pl-PL"/>
-            </a:defPPr>
-          </a:lstStyle>
-          <a:p>
-            <a:pPr algn="ctr" rtl="0"/>
-            <a:r>
-              <a:rPr lang="pl-PL" dirty="0">
-                <a:latin typeface="Posterama" panose="020B0504020200020000" pitchFamily="34" charset="0"/>
-                <a:cs typeface="Posterama" panose="020B0504020200020000" pitchFamily="34" charset="0"/>
-              </a:rPr>
-              <a:t>Utrzymanie domu</a:t>
-            </a:r>
-          </a:p>
-        </p:txBody>
-      </p:sp>
-      <p:sp>
-        <p:nvSpPr>
-          <p:cNvPr id="28" name="Pole tekstowe 27">
-            <a:extLst>
-              <a:ext uri="{FF2B5EF4-FFF2-40B4-BE49-F238E27FC236}">
-                <a16:creationId xmlns:a16="http://schemas.microsoft.com/office/drawing/2014/main" id="{BF276233-08ED-DE47-96B6-C094BAB275A4}"/>
-              </a:ext>
-            </a:extLst>
-          </p:cNvPr>
-          <p:cNvSpPr txBox="1"/>
-          <p:nvPr/>
-        </p:nvSpPr>
-        <p:spPr>
-          <a:xfrm>
-            <a:off x="6927156" y="1401682"/>
-            <a:ext cx="1607159" cy="369332"/>
-          </a:xfrm>
-          <a:prstGeom prst="rect">
-            <a:avLst/>
-          </a:prstGeom>
-          <a:noFill/>
-        </p:spPr>
-        <p:txBody>
-          <a:bodyPr wrap="square" rtlCol="0">
-            <a:spAutoFit/>
-          </a:bodyPr>
-          <a:lstStyle>
-            <a:defPPr>
-              <a:defRPr lang="pl-PL"/>
-            </a:defPPr>
-          </a:lstStyle>
-          <a:p>
-            <a:pPr algn="ctr" rtl="0"/>
-            <a:r>
-              <a:rPr lang="pl-PL">
-                <a:latin typeface="Posterama" panose="020B0504020200020000" pitchFamily="34" charset="0"/>
-                <a:cs typeface="Posterama" panose="020B0504020200020000" pitchFamily="34" charset="0"/>
-              </a:rPr>
-              <a:t>Działania</a:t>
-            </a:r>
-          </a:p>
-        </p:txBody>
-      </p:sp>
-      <p:sp>
-        <p:nvSpPr>
-          <p:cNvPr id="31" name="Pole tekstowe 30">
-            <a:extLst>
-              <a:ext uri="{FF2B5EF4-FFF2-40B4-BE49-F238E27FC236}">
-                <a16:creationId xmlns:a16="http://schemas.microsoft.com/office/drawing/2014/main" id="{B92E1B93-579B-4B4B-94A2-66B177C30C35}"/>
-              </a:ext>
-            </a:extLst>
-          </p:cNvPr>
-          <p:cNvSpPr txBox="1"/>
-          <p:nvPr/>
-        </p:nvSpPr>
-        <p:spPr>
-          <a:xfrm>
-            <a:off x="6886301" y="5538266"/>
-            <a:ext cx="1607159" cy="369332"/>
-          </a:xfrm>
-          <a:prstGeom prst="rect">
-            <a:avLst/>
-          </a:prstGeom>
-          <a:noFill/>
-        </p:spPr>
-        <p:txBody>
-          <a:bodyPr wrap="square" rtlCol="0">
-            <a:spAutoFit/>
-          </a:bodyPr>
-          <a:lstStyle>
-            <a:defPPr>
-              <a:defRPr lang="pl-PL"/>
-            </a:defPPr>
-          </a:lstStyle>
-          <a:p>
-            <a:pPr algn="ctr" rtl="0"/>
-            <a:r>
-              <a:rPr lang="pl-PL">
-                <a:latin typeface="Posterama" panose="020B0504020200020000" pitchFamily="34" charset="0"/>
-                <a:cs typeface="Posterama" panose="020B0504020200020000" pitchFamily="34" charset="0"/>
-              </a:rPr>
-              <a:t>Żywność</a:t>
-            </a:r>
-          </a:p>
-        </p:txBody>
-      </p:sp>
-      <p:sp>
-        <p:nvSpPr>
-          <p:cNvPr id="32" name="Pole tekstowe 31">
-            <a:extLst>
-              <a:ext uri="{FF2B5EF4-FFF2-40B4-BE49-F238E27FC236}">
-                <a16:creationId xmlns:a16="http://schemas.microsoft.com/office/drawing/2014/main" id="{C9BB7D8F-8EA6-D649-AB3E-8C89F61C7FFB}"/>
-              </a:ext>
-            </a:extLst>
-          </p:cNvPr>
-          <p:cNvSpPr txBox="1"/>
-          <p:nvPr/>
-        </p:nvSpPr>
-        <p:spPr>
-          <a:xfrm>
-            <a:off x="3839551" y="5538266"/>
-            <a:ext cx="1607159" cy="369332"/>
-          </a:xfrm>
-          <a:prstGeom prst="rect">
-            <a:avLst/>
-          </a:prstGeom>
-          <a:noFill/>
-        </p:spPr>
-        <p:txBody>
-          <a:bodyPr wrap="square" rtlCol="0">
-            <a:spAutoFit/>
-          </a:bodyPr>
-          <a:lstStyle>
-            <a:defPPr>
-              <a:defRPr lang="pl-PL"/>
-            </a:defPPr>
-          </a:lstStyle>
-          <a:p>
-            <a:pPr algn="ctr" rtl="0"/>
-            <a:r>
-              <a:rPr lang="pl-PL">
-                <a:latin typeface="Posterama" panose="020B0504020200020000" pitchFamily="34" charset="0"/>
-                <a:cs typeface="Posterama" panose="020B0504020200020000" pitchFamily="34" charset="0"/>
-              </a:rPr>
-              <a:t>Podróże</a:t>
-            </a:r>
-          </a:p>
-        </p:txBody>
-      </p:sp>
-      <p:sp>
-        <p:nvSpPr>
-          <p:cNvPr id="33" name="Owal 32" descr="kształt owalny">
-            <a:extLst>
-              <a:ext uri="{FF2B5EF4-FFF2-40B4-BE49-F238E27FC236}">
-                <a16:creationId xmlns:a16="http://schemas.microsoft.com/office/drawing/2014/main" id="{FC89EC71-2C1C-2749-944B-43F9DDD0178E}"/>
-              </a:ext>
-            </a:extLst>
-          </p:cNvPr>
-          <p:cNvSpPr>
-            <a:spLocks noChangeAspect="1"/>
-          </p:cNvSpPr>
-          <p:nvPr/>
-        </p:nvSpPr>
-        <p:spPr>
-          <a:xfrm>
-            <a:off x="2049488" y="1413271"/>
-            <a:ext cx="1177732" cy="1177732"/>
-          </a:xfrm>
-          <a:prstGeom prst="ellipse">
-            <a:avLst/>
-          </a:prstGeom>
-          <a:solidFill>
-            <a:schemeClr val="accent2"/>
-          </a:solidFill>
-          <a:ln>
-            <a:noFill/>
-          </a:ln>
-        </p:spPr>
-        <p:style>
-          <a:lnRef idx="2">
-            <a:schemeClr val="accent1">
-              <a:shade val="50000"/>
-            </a:schemeClr>
-          </a:lnRef>
-          <a:fillRef idx="1">
-            <a:schemeClr val="accent1"/>
-          </a:fillRef>
-          <a:effectRef idx="0">
-            <a:schemeClr val="accent1"/>
-          </a:effectRef>
-          <a:fontRef idx="minor">
-            <a:schemeClr val="lt1"/>
-          </a:fontRef>
-        </p:style>
-        <p:txBody>
-          <a:bodyPr rtlCol="0" anchor="ctr"/>
-          <a:lstStyle>
-            <a:defPPr>
-              <a:defRPr lang="pl-PL"/>
-            </a:defPPr>
-          </a:lstStyle>
-          <a:p>
-            <a:pPr algn="ctr" rtl="0"/>
-            <a:r>
-              <a:rPr lang="pl-PL" sz="1100" dirty="0">
-                <a:solidFill>
-                  <a:schemeClr val="bg1"/>
-                </a:solidFill>
-                <a:latin typeface="Posterama" panose="020B0504020200020000" pitchFamily="34" charset="0"/>
-                <a:cs typeface="Posterama" panose="020B0504020200020000" pitchFamily="34" charset="0"/>
-              </a:rPr>
-              <a:t>Wynajem mieszkań</a:t>
-            </a:r>
-          </a:p>
-        </p:txBody>
-      </p:sp>
-      <p:sp>
-        <p:nvSpPr>
-          <p:cNvPr id="34" name="Owal 33" descr="kształt owalny">
-            <a:extLst>
-              <a:ext uri="{FF2B5EF4-FFF2-40B4-BE49-F238E27FC236}">
-                <a16:creationId xmlns:a16="http://schemas.microsoft.com/office/drawing/2014/main" id="{A57BD9B6-D0BA-7F41-8726-F88C61892631}"/>
-              </a:ext>
-            </a:extLst>
-          </p:cNvPr>
-          <p:cNvSpPr>
-            <a:spLocks noChangeAspect="1"/>
-          </p:cNvSpPr>
-          <p:nvPr/>
-        </p:nvSpPr>
-        <p:spPr>
-          <a:xfrm>
-            <a:off x="1301701" y="2876580"/>
-            <a:ext cx="1036234" cy="1036234"/>
-          </a:xfrm>
-          <a:prstGeom prst="ellipse">
-            <a:avLst/>
-          </a:prstGeom>
-          <a:solidFill>
-            <a:schemeClr val="accent2"/>
-          </a:solidFill>
-          <a:ln>
-            <a:noFill/>
-          </a:ln>
-        </p:spPr>
-        <p:style>
-          <a:lnRef idx="2">
-            <a:schemeClr val="accent1">
-              <a:shade val="50000"/>
-            </a:schemeClr>
-          </a:lnRef>
-          <a:fillRef idx="1">
-            <a:schemeClr val="accent1"/>
-          </a:fillRef>
-          <a:effectRef idx="0">
-            <a:schemeClr val="accent1"/>
-          </a:effectRef>
-          <a:fontRef idx="minor">
-            <a:schemeClr val="lt1"/>
-          </a:fontRef>
-        </p:style>
-        <p:txBody>
-          <a:bodyPr rtlCol="0" anchor="ctr"/>
-          <a:lstStyle>
-            <a:defPPr>
-              <a:defRPr lang="pl-PL"/>
-            </a:defPPr>
-          </a:lstStyle>
-          <a:p>
-            <a:pPr algn="ctr" rtl="0"/>
-            <a:r>
-              <a:rPr lang="pl-PL" sz="1100" dirty="0">
-                <a:solidFill>
-                  <a:schemeClr val="bg1"/>
-                </a:solidFill>
-                <a:latin typeface="Posterama" panose="020B0504020200020000" pitchFamily="34" charset="0"/>
-                <a:cs typeface="Posterama" panose="020B0504020200020000" pitchFamily="34" charset="0"/>
-              </a:rPr>
-              <a:t>Hotel</a:t>
-            </a:r>
-          </a:p>
-        </p:txBody>
-      </p:sp>
-      <p:sp>
-        <p:nvSpPr>
-          <p:cNvPr id="35" name="Owal 34" descr="kształt owalny">
-            <a:extLst>
-              <a:ext uri="{FF2B5EF4-FFF2-40B4-BE49-F238E27FC236}">
-                <a16:creationId xmlns:a16="http://schemas.microsoft.com/office/drawing/2014/main" id="{6CF459CB-7500-4D4F-912E-DD650809CCEE}"/>
-              </a:ext>
-            </a:extLst>
-          </p:cNvPr>
-          <p:cNvSpPr>
-            <a:spLocks noChangeAspect="1"/>
-          </p:cNvSpPr>
-          <p:nvPr/>
-        </p:nvSpPr>
-        <p:spPr>
-          <a:xfrm>
-            <a:off x="1832911" y="5174997"/>
-            <a:ext cx="1002374" cy="1002374"/>
-          </a:xfrm>
-          <a:prstGeom prst="ellipse">
-            <a:avLst/>
-          </a:prstGeom>
-          <a:solidFill>
-            <a:schemeClr val="accent4">
-              <a:lumMod val="75000"/>
-            </a:schemeClr>
-          </a:solidFill>
-          <a:ln w="38100">
-            <a:solidFill>
-              <a:schemeClr val="accent4"/>
-            </a:solidFill>
-          </a:ln>
-        </p:spPr>
-        <p:style>
-          <a:lnRef idx="2">
-            <a:schemeClr val="accent1">
-              <a:shade val="50000"/>
-            </a:schemeClr>
-          </a:lnRef>
-          <a:fillRef idx="1">
-            <a:schemeClr val="accent1"/>
-          </a:fillRef>
-          <a:effectRef idx="0">
-            <a:schemeClr val="accent1"/>
-          </a:effectRef>
-          <a:fontRef idx="minor">
-            <a:schemeClr val="lt1"/>
-          </a:fontRef>
-        </p:style>
-        <p:txBody>
-          <a:bodyPr lIns="0" rIns="0" rtlCol="0" anchor="ctr"/>
-          <a:lstStyle>
-            <a:defPPr>
-              <a:defRPr lang="pl-PL"/>
-            </a:defPPr>
-          </a:lstStyle>
-          <a:p>
-            <a:pPr algn="ctr" rtl="0"/>
-            <a:r>
-              <a:rPr lang="pl-PL" sz="1100" spc="-40" dirty="0" err="1">
-                <a:solidFill>
-                  <a:schemeClr val="bg1"/>
-                </a:solidFill>
-                <a:latin typeface="Posterama" panose="020B0504020200020000" pitchFamily="34" charset="0"/>
-                <a:cs typeface="Posterama" panose="020B0504020200020000" pitchFamily="34" charset="0"/>
-              </a:rPr>
-              <a:t>Wypoży-czenie</a:t>
-            </a:r>
-            <a:r>
-              <a:rPr lang="pl-PL" sz="1100" spc="-40" dirty="0">
-                <a:solidFill>
-                  <a:schemeClr val="bg1"/>
-                </a:solidFill>
-                <a:latin typeface="Posterama" panose="020B0504020200020000" pitchFamily="34" charset="0"/>
-                <a:cs typeface="Posterama" panose="020B0504020200020000" pitchFamily="34" charset="0"/>
-              </a:rPr>
-              <a:t> samochodu</a:t>
-            </a:r>
-          </a:p>
-        </p:txBody>
-      </p:sp>
-      <p:sp>
-        <p:nvSpPr>
-          <p:cNvPr id="36" name="Owal 35" descr="kształt owalny">
-            <a:extLst>
-              <a:ext uri="{FF2B5EF4-FFF2-40B4-BE49-F238E27FC236}">
-                <a16:creationId xmlns:a16="http://schemas.microsoft.com/office/drawing/2014/main" id="{5E955AE7-4056-2047-B369-89376D6640C0}"/>
-              </a:ext>
-            </a:extLst>
-          </p:cNvPr>
-          <p:cNvSpPr>
-            <a:spLocks noChangeAspect="1"/>
-          </p:cNvSpPr>
-          <p:nvPr/>
-        </p:nvSpPr>
-        <p:spPr>
-          <a:xfrm>
-            <a:off x="2356297" y="3878939"/>
-            <a:ext cx="1078133" cy="1078133"/>
-          </a:xfrm>
-          <a:prstGeom prst="ellipse">
-            <a:avLst/>
-          </a:prstGeom>
-          <a:solidFill>
-            <a:schemeClr val="accent4">
-              <a:lumMod val="75000"/>
-            </a:schemeClr>
-          </a:solidFill>
-          <a:ln w="38100">
-            <a:solidFill>
-              <a:schemeClr val="accent4"/>
-            </a:solidFill>
-          </a:ln>
-        </p:spPr>
-        <p:style>
-          <a:lnRef idx="2">
-            <a:schemeClr val="accent1">
-              <a:shade val="50000"/>
-            </a:schemeClr>
-          </a:lnRef>
-          <a:fillRef idx="1">
-            <a:schemeClr val="accent1"/>
-          </a:fillRef>
-          <a:effectRef idx="0">
-            <a:schemeClr val="accent1"/>
-          </a:effectRef>
-          <a:fontRef idx="minor">
-            <a:schemeClr val="lt1"/>
-          </a:fontRef>
-        </p:style>
-        <p:txBody>
-          <a:bodyPr rtlCol="0" anchor="ctr"/>
-          <a:lstStyle>
-            <a:defPPr>
-              <a:defRPr lang="pl-PL"/>
-            </a:defPPr>
-          </a:lstStyle>
-          <a:p>
-            <a:pPr algn="ctr" rtl="0"/>
-            <a:r>
-              <a:rPr lang="pl-PL" sz="1100" dirty="0">
-                <a:solidFill>
-                  <a:schemeClr val="bg1"/>
-                </a:solidFill>
-                <a:latin typeface="Posterama" panose="020B0504020200020000" pitchFamily="34" charset="0"/>
-                <a:cs typeface="Posterama" panose="020B0504020200020000" pitchFamily="34" charset="0"/>
-              </a:rPr>
-              <a:t>Loty</a:t>
-            </a:r>
-          </a:p>
-        </p:txBody>
-      </p:sp>
-      <p:sp>
-        <p:nvSpPr>
-          <p:cNvPr id="37" name="Owal 36" descr="kształt owalny">
-            <a:extLst>
-              <a:ext uri="{FF2B5EF4-FFF2-40B4-BE49-F238E27FC236}">
-                <a16:creationId xmlns:a16="http://schemas.microsoft.com/office/drawing/2014/main" id="{B3F8555D-CB6E-2844-BFD7-0286B672D707}"/>
-              </a:ext>
-            </a:extLst>
-          </p:cNvPr>
-          <p:cNvSpPr>
-            <a:spLocks noChangeAspect="1"/>
-          </p:cNvSpPr>
-          <p:nvPr/>
-        </p:nvSpPr>
-        <p:spPr>
-          <a:xfrm>
-            <a:off x="9785406" y="4131394"/>
-            <a:ext cx="1063259" cy="1063259"/>
-          </a:xfrm>
-          <a:prstGeom prst="ellipse">
-            <a:avLst/>
-          </a:prstGeom>
-          <a:solidFill>
-            <a:schemeClr val="accent5">
-              <a:lumMod val="75000"/>
-            </a:schemeClr>
-          </a:solidFill>
-          <a:ln>
-            <a:noFill/>
-          </a:ln>
-        </p:spPr>
-        <p:style>
-          <a:lnRef idx="2">
-            <a:schemeClr val="accent1">
-              <a:shade val="50000"/>
-            </a:schemeClr>
-          </a:lnRef>
-          <a:fillRef idx="1">
-            <a:schemeClr val="accent1"/>
-          </a:fillRef>
-          <a:effectRef idx="0">
-            <a:schemeClr val="accent1"/>
-          </a:effectRef>
-          <a:fontRef idx="minor">
-            <a:schemeClr val="lt1"/>
-          </a:fontRef>
-        </p:style>
-        <p:txBody>
-          <a:bodyPr rtlCol="0" anchor="ctr"/>
-          <a:lstStyle>
-            <a:defPPr>
-              <a:defRPr lang="pl-PL"/>
-            </a:defPPr>
-          </a:lstStyle>
-          <a:p>
-            <a:pPr algn="ctr" rtl="0"/>
-            <a:r>
-              <a:rPr lang="pl-PL" sz="1100" dirty="0">
-                <a:solidFill>
-                  <a:schemeClr val="bg1"/>
-                </a:solidFill>
-                <a:latin typeface="Posterama" panose="020B0504020200020000" pitchFamily="34" charset="0"/>
-                <a:cs typeface="Posterama" panose="020B0504020200020000" pitchFamily="34" charset="0"/>
-              </a:rPr>
-              <a:t>Wyjmij</a:t>
-            </a:r>
-          </a:p>
-        </p:txBody>
-      </p:sp>
-      <p:sp>
-        <p:nvSpPr>
-          <p:cNvPr id="38" name="Owal 37" descr="kształt owalny">
-            <a:extLst>
-              <a:ext uri="{FF2B5EF4-FFF2-40B4-BE49-F238E27FC236}">
-                <a16:creationId xmlns:a16="http://schemas.microsoft.com/office/drawing/2014/main" id="{D66AFE90-EB93-FC49-BFC9-C8F420C586E9}"/>
-              </a:ext>
-            </a:extLst>
-          </p:cNvPr>
-          <p:cNvSpPr>
-            <a:spLocks noChangeAspect="1"/>
-          </p:cNvSpPr>
-          <p:nvPr/>
-        </p:nvSpPr>
-        <p:spPr>
-          <a:xfrm>
-            <a:off x="8440027" y="5194653"/>
-            <a:ext cx="1232738" cy="1232738"/>
-          </a:xfrm>
-          <a:prstGeom prst="ellipse">
-            <a:avLst/>
-          </a:prstGeom>
-          <a:solidFill>
-            <a:schemeClr val="accent5">
-              <a:lumMod val="75000"/>
-            </a:schemeClr>
-          </a:solidFill>
-          <a:ln>
-            <a:noFill/>
-          </a:ln>
-        </p:spPr>
-        <p:style>
-          <a:lnRef idx="2">
-            <a:schemeClr val="accent1">
-              <a:shade val="50000"/>
-            </a:schemeClr>
-          </a:lnRef>
-          <a:fillRef idx="1">
-            <a:schemeClr val="accent1"/>
-          </a:fillRef>
-          <a:effectRef idx="0">
-            <a:schemeClr val="accent1"/>
-          </a:effectRef>
-          <a:fontRef idx="minor">
-            <a:schemeClr val="lt1"/>
-          </a:fontRef>
-        </p:style>
-        <p:txBody>
-          <a:bodyPr lIns="0" rIns="0" rtlCol="0" anchor="ctr"/>
-          <a:lstStyle>
-            <a:defPPr>
-              <a:defRPr lang="pl-PL"/>
-            </a:defPPr>
-          </a:lstStyle>
-          <a:p>
-            <a:pPr algn="ctr" rtl="0"/>
-            <a:r>
-              <a:rPr lang="pl-PL" sz="1100" dirty="0">
-                <a:solidFill>
-                  <a:schemeClr val="bg1"/>
-                </a:solidFill>
-                <a:latin typeface="Posterama" panose="020B0504020200020000" pitchFamily="34" charset="0"/>
-                <a:cs typeface="Posterama" panose="020B0504020200020000" pitchFamily="34" charset="0"/>
-              </a:rPr>
-              <a:t>Lista artykułów spożywczych</a:t>
-            </a:r>
-          </a:p>
-        </p:txBody>
-      </p:sp>
-      <p:sp>
-        <p:nvSpPr>
-          <p:cNvPr id="42" name="Owal 41" descr="kształt owalny">
-            <a:extLst>
-              <a:ext uri="{FF2B5EF4-FFF2-40B4-BE49-F238E27FC236}">
-                <a16:creationId xmlns:a16="http://schemas.microsoft.com/office/drawing/2014/main" id="{DFFA2471-0261-6F43-B090-962BEAD73189}"/>
-              </a:ext>
-            </a:extLst>
-          </p:cNvPr>
-          <p:cNvSpPr>
-            <a:spLocks noChangeAspect="1"/>
-          </p:cNvSpPr>
-          <p:nvPr/>
-        </p:nvSpPr>
-        <p:spPr>
-          <a:xfrm>
-            <a:off x="10278459" y="2601368"/>
-            <a:ext cx="1047281" cy="1047281"/>
-          </a:xfrm>
-          <a:prstGeom prst="ellipse">
-            <a:avLst/>
-          </a:prstGeom>
-          <a:solidFill>
-            <a:schemeClr val="accent5"/>
-          </a:solidFill>
-          <a:ln w="38100">
-            <a:noFill/>
-          </a:ln>
-        </p:spPr>
-        <p:style>
-          <a:lnRef idx="2">
-            <a:schemeClr val="accent1">
-              <a:shade val="50000"/>
-            </a:schemeClr>
-          </a:lnRef>
-          <a:fillRef idx="1">
-            <a:schemeClr val="accent1"/>
-          </a:fillRef>
-          <a:effectRef idx="0">
-            <a:schemeClr val="accent1"/>
-          </a:effectRef>
-          <a:fontRef idx="minor">
-            <a:schemeClr val="lt1"/>
-          </a:fontRef>
-        </p:style>
-        <p:txBody>
-          <a:bodyPr lIns="0" rIns="0" rtlCol="0" anchor="ctr"/>
-          <a:lstStyle>
-            <a:defPPr>
-              <a:defRPr lang="pl-PL"/>
-            </a:defPPr>
-          </a:lstStyle>
-          <a:p>
-            <a:pPr algn="ctr" rtl="0"/>
-            <a:r>
-              <a:rPr lang="pl-PL" sz="1100" dirty="0">
-                <a:solidFill>
-                  <a:schemeClr val="bg1"/>
-                </a:solidFill>
-                <a:latin typeface="Posterama" panose="020B0504020200020000" pitchFamily="34" charset="0"/>
-                <a:cs typeface="Posterama" panose="020B0504020200020000" pitchFamily="34" charset="0"/>
-              </a:rPr>
-              <a:t>Surfowanie</a:t>
-            </a:r>
-          </a:p>
-        </p:txBody>
-      </p:sp>
-      <p:sp>
-        <p:nvSpPr>
-          <p:cNvPr id="43" name="Owal 42" descr="kształt owalny">
-            <a:extLst>
-              <a:ext uri="{FF2B5EF4-FFF2-40B4-BE49-F238E27FC236}">
-                <a16:creationId xmlns:a16="http://schemas.microsoft.com/office/drawing/2014/main" id="{E6AE1701-8A12-5748-8A0E-34D25955041F}"/>
-              </a:ext>
-            </a:extLst>
-          </p:cNvPr>
-          <p:cNvSpPr>
-            <a:spLocks noChangeAspect="1"/>
-          </p:cNvSpPr>
-          <p:nvPr/>
-        </p:nvSpPr>
-        <p:spPr>
-          <a:xfrm>
-            <a:off x="9267398" y="1453550"/>
-            <a:ext cx="1187200" cy="1187200"/>
-          </a:xfrm>
-          <a:prstGeom prst="ellipse">
-            <a:avLst/>
-          </a:prstGeom>
-          <a:solidFill>
-            <a:schemeClr val="accent5"/>
-          </a:solidFill>
-          <a:ln w="38100">
-            <a:solidFill>
-              <a:schemeClr val="accent5">
-                <a:lumMod val="40000"/>
-                <a:lumOff val="60000"/>
-              </a:schemeClr>
-            </a:solidFill>
-          </a:ln>
-        </p:spPr>
-        <p:style>
-          <a:lnRef idx="2">
-            <a:schemeClr val="accent1">
-              <a:shade val="50000"/>
-            </a:schemeClr>
-          </a:lnRef>
-          <a:fillRef idx="1">
-            <a:schemeClr val="accent1"/>
-          </a:fillRef>
-          <a:effectRef idx="0">
-            <a:schemeClr val="accent1"/>
-          </a:effectRef>
-          <a:fontRef idx="minor">
-            <a:schemeClr val="lt1"/>
-          </a:fontRef>
-        </p:style>
-        <p:txBody>
-          <a:bodyPr lIns="0" rIns="0" rtlCol="0" anchor="ctr"/>
-          <a:lstStyle>
-            <a:defPPr>
-              <a:defRPr lang="pl-PL"/>
-            </a:defPPr>
-          </a:lstStyle>
-          <a:p>
-            <a:pPr algn="ctr" rtl="0"/>
-            <a:r>
-              <a:rPr lang="pl-PL" sz="1100" dirty="0">
-                <a:solidFill>
-                  <a:schemeClr val="bg1"/>
-                </a:solidFill>
-                <a:latin typeface="Posterama" panose="020B0504020200020000" pitchFamily="34" charset="0"/>
-                <a:cs typeface="Posterama" panose="020B0504020200020000" pitchFamily="34" charset="0"/>
-              </a:rPr>
-              <a:t>Fajka do nurkowania</a:t>
-            </a:r>
-          </a:p>
-        </p:txBody>
-      </p:sp>
-      <p:grpSp>
-        <p:nvGrpSpPr>
-          <p:cNvPr id="46" name="Grupa 45" descr="kształt owalny">
-            <a:extLst>
-              <a:ext uri="{FF2B5EF4-FFF2-40B4-BE49-F238E27FC236}">
-                <a16:creationId xmlns:a16="http://schemas.microsoft.com/office/drawing/2014/main" id="{2A46F5F6-260C-C441-8452-090543369D10}"/>
-              </a:ext>
-            </a:extLst>
-          </p:cNvPr>
-          <p:cNvGrpSpPr>
-            <a:grpSpLocks noChangeAspect="1"/>
-          </p:cNvGrpSpPr>
-          <p:nvPr/>
-        </p:nvGrpSpPr>
-        <p:grpSpPr>
-          <a:xfrm>
-            <a:off x="7004081" y="4116003"/>
-            <a:ext cx="1371600" cy="1371600"/>
-            <a:chOff x="7086652" y="4344655"/>
-            <a:chExt cx="1078992" cy="1078993"/>
-          </a:xfrm>
-        </p:grpSpPr>
-        <p:sp>
-          <p:nvSpPr>
-            <p:cNvPr id="40" name="Owal 39">
-              <a:extLst>
-                <a:ext uri="{FF2B5EF4-FFF2-40B4-BE49-F238E27FC236}">
-                  <a16:creationId xmlns:a16="http://schemas.microsoft.com/office/drawing/2014/main" id="{1551440A-38A1-CF46-BC56-9717612E78DF}"/>
-                </a:ext>
-              </a:extLst>
-            </p:cNvPr>
-            <p:cNvSpPr>
-              <a:spLocks noChangeAspect="1"/>
-            </p:cNvSpPr>
-            <p:nvPr/>
-          </p:nvSpPr>
-          <p:spPr>
-            <a:xfrm>
-              <a:off x="7086652" y="4344655"/>
-              <a:ext cx="1078992" cy="1078993"/>
-            </a:xfrm>
-            <a:prstGeom prst="ellipse">
-              <a:avLst/>
-            </a:prstGeom>
-            <a:solidFill>
-              <a:schemeClr val="accent5">
-                <a:lumMod val="75000"/>
-              </a:schemeClr>
-            </a:solidFill>
-            <a:ln>
-              <a:noFill/>
-            </a:ln>
-          </p:spPr>
-          <p:style>
-            <a:lnRef idx="2">
-              <a:schemeClr val="accent1">
-                <a:shade val="50000"/>
-              </a:schemeClr>
-            </a:lnRef>
-            <a:fillRef idx="1">
-              <a:schemeClr val="accent1"/>
-            </a:fillRef>
-            <a:effectRef idx="0">
-              <a:schemeClr val="accent1"/>
-            </a:effectRef>
-            <a:fontRef idx="minor">
-              <a:schemeClr val="lt1"/>
-            </a:fontRef>
-          </p:style>
-          <p:txBody>
-            <a:bodyPr lIns="0" tIns="0" rIns="0" bIns="0" rtlCol="0" anchor="t"/>
-            <a:lstStyle>
-              <a:defPPr>
-                <a:defRPr lang="pl-PL"/>
-              </a:defPPr>
-            </a:lstStyle>
-            <a:p>
-              <a:pPr algn="ctr" rtl="0"/>
-              <a:endParaRPr lang="pl-PL" dirty="0"/>
-            </a:p>
-          </p:txBody>
-        </p:sp>
-        <p:pic>
-          <p:nvPicPr>
-            <p:cNvPr id="45" name="Grafika 44" descr="Noga kurczaka z pełnym wypełnieniem">
-              <a:extLst>
-                <a:ext uri="{FF2B5EF4-FFF2-40B4-BE49-F238E27FC236}">
-                  <a16:creationId xmlns:a16="http://schemas.microsoft.com/office/drawing/2014/main" id="{252CF0DA-9B01-B04E-9FFF-BCC11ED58A41}"/>
-                </a:ext>
-              </a:extLst>
-            </p:cNvPr>
-            <p:cNvPicPr>
-              <a:picLocks noChangeAspect="1"/>
-            </p:cNvPicPr>
-            <p:nvPr/>
-          </p:nvPicPr>
-          <p:blipFill>
-            <a:blip r:embed="rId2">
-              <a:extLst>
-                <a:ext uri="{28A0092B-C50C-407E-A947-70E740481C1C}">
-                  <a14:useLocalDpi xmlns:a14="http://schemas.microsoft.com/office/drawing/2010/main" val="0"/>
-                </a:ext>
-                <a:ext uri="{96DAC541-7B7A-43D3-8B79-37D633B846F1}">
-                  <asvg:svgBlip xmlns:asvg="http://schemas.microsoft.com/office/drawing/2016/SVG/main" r:embed="rId3"/>
-                </a:ext>
-              </a:extLst>
-            </a:blip>
-            <a:stretch>
-              <a:fillRect/>
-            </a:stretch>
-          </p:blipFill>
-          <p:spPr>
-            <a:xfrm>
-              <a:off x="7304508" y="4530372"/>
-              <a:ext cx="707558" cy="707558"/>
-            </a:xfrm>
-            <a:prstGeom prst="rect">
-              <a:avLst/>
-            </a:prstGeom>
-          </p:spPr>
-        </p:pic>
-      </p:grpSp>
-      <p:grpSp>
-        <p:nvGrpSpPr>
-          <p:cNvPr id="49" name="Grupa 48" descr="kształt owalny">
-            <a:extLst>
-              <a:ext uri="{FF2B5EF4-FFF2-40B4-BE49-F238E27FC236}">
-                <a16:creationId xmlns:a16="http://schemas.microsoft.com/office/drawing/2014/main" id="{D72B275A-B0B3-3742-AC01-802A101A6AB7}"/>
-              </a:ext>
-            </a:extLst>
-          </p:cNvPr>
-          <p:cNvGrpSpPr>
-            <a:grpSpLocks noChangeAspect="1"/>
-          </p:cNvGrpSpPr>
-          <p:nvPr/>
-        </p:nvGrpSpPr>
-        <p:grpSpPr>
-          <a:xfrm>
-            <a:off x="7026882" y="1850134"/>
-            <a:ext cx="1371600" cy="1371600"/>
-            <a:chOff x="7092625" y="2061872"/>
-            <a:chExt cx="1078991" cy="1078992"/>
-          </a:xfrm>
-        </p:grpSpPr>
-        <p:sp>
-          <p:nvSpPr>
-            <p:cNvPr id="22" name="Owal 21">
-              <a:extLst>
-                <a:ext uri="{FF2B5EF4-FFF2-40B4-BE49-F238E27FC236}">
-                  <a16:creationId xmlns:a16="http://schemas.microsoft.com/office/drawing/2014/main" id="{7B2B36E5-25D5-6648-A4B0-1844A83199E5}"/>
-                </a:ext>
-              </a:extLst>
-            </p:cNvPr>
-            <p:cNvSpPr>
-              <a:spLocks noChangeAspect="1"/>
-            </p:cNvSpPr>
-            <p:nvPr/>
-          </p:nvSpPr>
-          <p:spPr>
-            <a:xfrm>
-              <a:off x="7092625" y="2061872"/>
-              <a:ext cx="1078991" cy="1078992"/>
-            </a:xfrm>
-            <a:prstGeom prst="ellipse">
-              <a:avLst/>
-            </a:prstGeom>
-            <a:solidFill>
-              <a:schemeClr val="accent5"/>
-            </a:solidFill>
-            <a:ln w="38100">
-              <a:solidFill>
-                <a:schemeClr val="accent5">
-                  <a:lumMod val="40000"/>
-                  <a:lumOff val="60000"/>
-                </a:schemeClr>
-              </a:solidFill>
-            </a:ln>
-          </p:spPr>
-          <p:style>
-            <a:lnRef idx="2">
-              <a:schemeClr val="accent1">
-                <a:shade val="50000"/>
-              </a:schemeClr>
-            </a:lnRef>
-            <a:fillRef idx="1">
-              <a:schemeClr val="accent1"/>
-            </a:fillRef>
-            <a:effectRef idx="0">
-              <a:schemeClr val="accent1"/>
-            </a:effectRef>
-            <a:fontRef idx="minor">
-              <a:schemeClr val="lt1"/>
-            </a:fontRef>
-          </p:style>
-          <p:txBody>
-            <a:bodyPr lIns="0" tIns="0" rIns="0" bIns="0" rtlCol="0" anchor="t"/>
-            <a:lstStyle>
-              <a:defPPr>
-                <a:defRPr lang="pl-PL"/>
-              </a:defPPr>
-            </a:lstStyle>
-            <a:p>
-              <a:pPr algn="ctr" rtl="0"/>
-              <a:endParaRPr lang="pl-PL" dirty="0"/>
-            </a:p>
-          </p:txBody>
-        </p:sp>
-        <p:pic>
-          <p:nvPicPr>
-            <p:cNvPr id="48" name="Grafika 47" descr="Maska do nurkowania z pełnym wypełnieniem">
-              <a:extLst>
-                <a:ext uri="{FF2B5EF4-FFF2-40B4-BE49-F238E27FC236}">
-                  <a16:creationId xmlns:a16="http://schemas.microsoft.com/office/drawing/2014/main" id="{09EF273F-F791-4741-9B28-D49D79D8AED5}"/>
-                </a:ext>
-              </a:extLst>
-            </p:cNvPr>
-            <p:cNvPicPr>
-              <a:picLocks noChangeAspect="1"/>
-            </p:cNvPicPr>
-            <p:nvPr/>
-          </p:nvPicPr>
-          <p:blipFill>
-            <a:blip r:embed="rId4">
-              <a:extLst>
-                <a:ext uri="{28A0092B-C50C-407E-A947-70E740481C1C}">
-                  <a14:useLocalDpi xmlns:a14="http://schemas.microsoft.com/office/drawing/2010/main" val="0"/>
-                </a:ext>
-                <a:ext uri="{96DAC541-7B7A-43D3-8B79-37D633B846F1}">
-                  <asvg:svgBlip xmlns:asvg="http://schemas.microsoft.com/office/drawing/2016/SVG/main" r:embed="rId5"/>
-                </a:ext>
-              </a:extLst>
-            </a:blip>
-            <a:stretch>
-              <a:fillRect/>
-            </a:stretch>
-          </p:blipFill>
-          <p:spPr>
-            <a:xfrm>
-              <a:off x="7261371" y="2274480"/>
-              <a:ext cx="676206" cy="676206"/>
-            </a:xfrm>
-            <a:prstGeom prst="rect">
-              <a:avLst/>
-            </a:prstGeom>
-          </p:spPr>
-        </p:pic>
-      </p:grpSp>
-      <p:grpSp>
-        <p:nvGrpSpPr>
-          <p:cNvPr id="52" name="Grupa 51" descr="kształt owalny">
-            <a:extLst>
-              <a:ext uri="{FF2B5EF4-FFF2-40B4-BE49-F238E27FC236}">
-                <a16:creationId xmlns:a16="http://schemas.microsoft.com/office/drawing/2014/main" id="{55324BBE-6FC8-F642-99EB-70C5F501A335}"/>
-              </a:ext>
-            </a:extLst>
-          </p:cNvPr>
-          <p:cNvGrpSpPr>
-            <a:grpSpLocks noChangeAspect="1"/>
-          </p:cNvGrpSpPr>
-          <p:nvPr/>
-        </p:nvGrpSpPr>
-        <p:grpSpPr>
-          <a:xfrm>
-            <a:off x="3947760" y="1850134"/>
-            <a:ext cx="1371600" cy="1371600"/>
-            <a:chOff x="4209356" y="2090058"/>
-            <a:chExt cx="1078067" cy="1078067"/>
-          </a:xfrm>
-        </p:grpSpPr>
-        <p:sp>
-          <p:nvSpPr>
-            <p:cNvPr id="19" name="Owal 18">
-              <a:extLst>
-                <a:ext uri="{FF2B5EF4-FFF2-40B4-BE49-F238E27FC236}">
-                  <a16:creationId xmlns:a16="http://schemas.microsoft.com/office/drawing/2014/main" id="{259AF8AE-644B-F145-BE68-9CACB0EEFBD9}"/>
-                </a:ext>
-              </a:extLst>
-            </p:cNvPr>
-            <p:cNvSpPr/>
-            <p:nvPr/>
-          </p:nvSpPr>
-          <p:spPr>
-            <a:xfrm>
-              <a:off x="4209356" y="2090058"/>
-              <a:ext cx="1078067" cy="1078067"/>
-            </a:xfrm>
-            <a:prstGeom prst="ellipse">
-              <a:avLst/>
-            </a:prstGeom>
-            <a:solidFill>
-              <a:schemeClr val="accent2"/>
-            </a:solidFill>
-            <a:ln>
-              <a:noFill/>
-            </a:ln>
-          </p:spPr>
-          <p:style>
-            <a:lnRef idx="2">
-              <a:schemeClr val="accent1">
-                <a:shade val="50000"/>
-              </a:schemeClr>
-            </a:lnRef>
-            <a:fillRef idx="1">
-              <a:schemeClr val="accent1"/>
-            </a:fillRef>
-            <a:effectRef idx="0">
-              <a:schemeClr val="accent1"/>
-            </a:effectRef>
-            <a:fontRef idx="minor">
-              <a:schemeClr val="lt1"/>
-            </a:fontRef>
-          </p:style>
-          <p:txBody>
-            <a:bodyPr lIns="0" tIns="0" rIns="0" bIns="0" rtlCol="0" anchor="t"/>
-            <a:lstStyle>
-              <a:defPPr>
-                <a:defRPr lang="pl-PL"/>
-              </a:defPPr>
-            </a:lstStyle>
-            <a:p>
-              <a:pPr algn="ctr" rtl="0"/>
-              <a:endParaRPr lang="pl-PL" dirty="0"/>
-            </a:p>
-          </p:txBody>
-        </p:sp>
-        <p:pic>
-          <p:nvPicPr>
-            <p:cNvPr id="51" name="Grafika 50" descr="Dom z pełnym wypełnieniem">
-              <a:extLst>
-                <a:ext uri="{FF2B5EF4-FFF2-40B4-BE49-F238E27FC236}">
-                  <a16:creationId xmlns:a16="http://schemas.microsoft.com/office/drawing/2014/main" id="{03791593-4209-B844-837B-3D480806B405}"/>
-                </a:ext>
-              </a:extLst>
-            </p:cNvPr>
-            <p:cNvPicPr>
-              <a:picLocks noChangeAspect="1"/>
-            </p:cNvPicPr>
-            <p:nvPr/>
-          </p:nvPicPr>
-          <p:blipFill>
-            <a:blip r:embed="rId6">
-              <a:extLst>
-                <a:ext uri="{28A0092B-C50C-407E-A947-70E740481C1C}">
-                  <a14:useLocalDpi xmlns:a14="http://schemas.microsoft.com/office/drawing/2010/main" val="0"/>
-                </a:ext>
-                <a:ext uri="{96DAC541-7B7A-43D3-8B79-37D633B846F1}">
-                  <asvg:svgBlip xmlns:asvg="http://schemas.microsoft.com/office/drawing/2016/SVG/main" r:embed="rId7"/>
-                </a:ext>
-              </a:extLst>
-            </a:blip>
-            <a:stretch>
-              <a:fillRect/>
-            </a:stretch>
-          </p:blipFill>
-          <p:spPr>
-            <a:xfrm>
-              <a:off x="4392991" y="2244911"/>
-              <a:ext cx="700008" cy="700008"/>
-            </a:xfrm>
-            <a:prstGeom prst="rect">
-              <a:avLst/>
-            </a:prstGeom>
-          </p:spPr>
-        </p:pic>
-      </p:grpSp>
-      <p:grpSp>
-        <p:nvGrpSpPr>
-          <p:cNvPr id="55" name="Grupa 54" descr="kształt owalny">
-            <a:extLst>
-              <a:ext uri="{FF2B5EF4-FFF2-40B4-BE49-F238E27FC236}">
-                <a16:creationId xmlns:a16="http://schemas.microsoft.com/office/drawing/2014/main" id="{BD92CEDD-CAE4-1A45-B8D5-25D25147BCE5}"/>
-              </a:ext>
-            </a:extLst>
-          </p:cNvPr>
-          <p:cNvGrpSpPr>
-            <a:grpSpLocks noChangeAspect="1"/>
-          </p:cNvGrpSpPr>
-          <p:nvPr/>
-        </p:nvGrpSpPr>
-        <p:grpSpPr>
-          <a:xfrm>
-            <a:off x="3970140" y="4116003"/>
-            <a:ext cx="1371600" cy="1371600"/>
-            <a:chOff x="4228012" y="4344657"/>
-            <a:chExt cx="1078993" cy="1078993"/>
-          </a:xfrm>
-        </p:grpSpPr>
-        <p:sp>
-          <p:nvSpPr>
-            <p:cNvPr id="25" name="Owal 24">
-              <a:extLst>
-                <a:ext uri="{FF2B5EF4-FFF2-40B4-BE49-F238E27FC236}">
-                  <a16:creationId xmlns:a16="http://schemas.microsoft.com/office/drawing/2014/main" id="{ED72CC41-B639-5345-8EA2-4D63B0006586}"/>
-                </a:ext>
-              </a:extLst>
-            </p:cNvPr>
-            <p:cNvSpPr>
-              <a:spLocks noChangeAspect="1"/>
-            </p:cNvSpPr>
-            <p:nvPr/>
-          </p:nvSpPr>
-          <p:spPr>
-            <a:xfrm>
-              <a:off x="4228012" y="4344657"/>
-              <a:ext cx="1078993" cy="1078993"/>
-            </a:xfrm>
-            <a:prstGeom prst="ellipse">
-              <a:avLst/>
-            </a:prstGeom>
-            <a:solidFill>
-              <a:schemeClr val="accent4">
-                <a:lumMod val="75000"/>
-              </a:schemeClr>
-            </a:solidFill>
-            <a:ln w="38100">
-              <a:solidFill>
-                <a:schemeClr val="accent4"/>
-              </a:solidFill>
-            </a:ln>
-          </p:spPr>
-          <p:style>
-            <a:lnRef idx="2">
-              <a:schemeClr val="accent1">
-                <a:shade val="50000"/>
-              </a:schemeClr>
-            </a:lnRef>
-            <a:fillRef idx="1">
-              <a:schemeClr val="accent1"/>
-            </a:fillRef>
-            <a:effectRef idx="0">
-              <a:schemeClr val="accent1"/>
-            </a:effectRef>
-            <a:fontRef idx="minor">
-              <a:schemeClr val="lt1"/>
-            </a:fontRef>
-          </p:style>
-          <p:txBody>
-            <a:bodyPr lIns="0" tIns="0" rIns="0" bIns="0" rtlCol="0" anchor="t"/>
-            <a:lstStyle>
-              <a:defPPr>
-                <a:defRPr lang="pl-PL"/>
-              </a:defPPr>
-            </a:lstStyle>
-            <a:p>
-              <a:pPr algn="ctr" rtl="0"/>
-              <a:endParaRPr lang="pl-PL" dirty="0"/>
-            </a:p>
-          </p:txBody>
-        </p:sp>
-        <p:pic>
-          <p:nvPicPr>
-            <p:cNvPr id="54" name="Grafika 53" descr="Samolot z pełnym wypełnieniem">
-              <a:extLst>
-                <a:ext uri="{FF2B5EF4-FFF2-40B4-BE49-F238E27FC236}">
-                  <a16:creationId xmlns:a16="http://schemas.microsoft.com/office/drawing/2014/main" id="{425F2876-A213-114D-986C-A9C3ECBD8620}"/>
-                </a:ext>
-              </a:extLst>
-            </p:cNvPr>
-            <p:cNvPicPr>
-              <a:picLocks noChangeAspect="1"/>
-            </p:cNvPicPr>
-            <p:nvPr/>
-          </p:nvPicPr>
-          <p:blipFill>
-            <a:blip r:embed="rId8">
-              <a:extLst>
-                <a:ext uri="{28A0092B-C50C-407E-A947-70E740481C1C}">
-                  <a14:useLocalDpi xmlns:a14="http://schemas.microsoft.com/office/drawing/2010/main" val="0"/>
-                </a:ext>
-                <a:ext uri="{96DAC541-7B7A-43D3-8B79-37D633B846F1}">
-                  <asvg:svgBlip xmlns:asvg="http://schemas.microsoft.com/office/drawing/2016/SVG/main" r:embed="rId9"/>
-                </a:ext>
-              </a:extLst>
-            </a:blip>
-            <a:stretch>
-              <a:fillRect/>
-            </a:stretch>
-          </p:blipFill>
-          <p:spPr>
-            <a:xfrm>
-              <a:off x="4391063" y="4496358"/>
-              <a:ext cx="741572" cy="741572"/>
-            </a:xfrm>
-            <a:prstGeom prst="rect">
-              <a:avLst/>
-            </a:prstGeom>
-          </p:spPr>
-        </p:pic>
-      </p:grpSp>
-      <p:sp>
-        <p:nvSpPr>
-          <p:cNvPr id="57" name="Owal 56" descr="kształt owalny">
-            <a:extLst>
-              <a:ext uri="{FF2B5EF4-FFF2-40B4-BE49-F238E27FC236}">
-                <a16:creationId xmlns:a16="http://schemas.microsoft.com/office/drawing/2014/main" id="{4E959DED-A35A-AF4E-A641-1AB03E6BE0AA}"/>
-              </a:ext>
-            </a:extLst>
-          </p:cNvPr>
-          <p:cNvSpPr>
-            <a:spLocks noChangeAspect="1"/>
-          </p:cNvSpPr>
-          <p:nvPr/>
-        </p:nvSpPr>
-        <p:spPr>
-          <a:xfrm>
-            <a:off x="8275791" y="3140864"/>
-            <a:ext cx="1179606" cy="1179606"/>
-          </a:xfrm>
-          <a:prstGeom prst="ellipse">
-            <a:avLst/>
-          </a:prstGeom>
-          <a:solidFill>
-            <a:schemeClr val="accent5"/>
-          </a:solidFill>
-          <a:ln w="38100">
-            <a:solidFill>
-              <a:schemeClr val="accent5">
-                <a:lumMod val="40000"/>
-                <a:lumOff val="60000"/>
-              </a:schemeClr>
-            </a:solidFill>
-          </a:ln>
-        </p:spPr>
-        <p:style>
-          <a:lnRef idx="2">
-            <a:schemeClr val="accent1">
-              <a:shade val="50000"/>
-            </a:schemeClr>
-          </a:lnRef>
-          <a:fillRef idx="1">
-            <a:schemeClr val="accent1"/>
-          </a:fillRef>
-          <a:effectRef idx="0">
-            <a:schemeClr val="accent1"/>
-          </a:effectRef>
-          <a:fontRef idx="minor">
-            <a:schemeClr val="lt1"/>
-          </a:fontRef>
-        </p:style>
-        <p:txBody>
-          <a:bodyPr lIns="0" rIns="0" rtlCol="0" anchor="ctr"/>
-          <a:lstStyle>
-            <a:defPPr>
-              <a:defRPr lang="pl-PL"/>
-            </a:defPPr>
-          </a:lstStyle>
-          <a:p>
-            <a:pPr algn="ctr" rtl="0"/>
-            <a:r>
-              <a:rPr lang="pl-PL" sz="1100" dirty="0">
-                <a:solidFill>
-                  <a:schemeClr val="bg1"/>
-                </a:solidFill>
-                <a:latin typeface="Posterama" panose="020B0504020200020000" pitchFamily="34" charset="0"/>
-                <a:cs typeface="Posterama" panose="020B0504020200020000" pitchFamily="34" charset="0"/>
-              </a:rPr>
-              <a:t>Pilnowanie wielorybów</a:t>
-            </a:r>
-          </a:p>
-        </p:txBody>
-      </p:sp>
-      <p:sp>
-        <p:nvSpPr>
-          <p:cNvPr id="53" name="Owal 52" descr="kształt owalny">
-            <a:extLst>
-              <a:ext uri="{FF2B5EF4-FFF2-40B4-BE49-F238E27FC236}">
-                <a16:creationId xmlns:a16="http://schemas.microsoft.com/office/drawing/2014/main" id="{B875FB20-B887-BB48-B4C8-877130C43C26}"/>
-              </a:ext>
-            </a:extLst>
-          </p:cNvPr>
-          <p:cNvSpPr>
-            <a:spLocks noChangeAspect="1"/>
-          </p:cNvSpPr>
-          <p:nvPr/>
-        </p:nvSpPr>
-        <p:spPr>
-          <a:xfrm>
-            <a:off x="5467196" y="3039012"/>
-            <a:ext cx="1371600" cy="1371600"/>
-          </a:xfrm>
-          <a:prstGeom prst="ellipse">
-            <a:avLst/>
-          </a:prstGeom>
-          <a:solidFill>
-            <a:schemeClr val="bg1"/>
-          </a:solidFill>
-          <a:ln w="38100">
-            <a:solidFill>
-              <a:schemeClr val="accent2"/>
-            </a:solidFill>
-          </a:ln>
-        </p:spPr>
-        <p:style>
-          <a:lnRef idx="2">
-            <a:schemeClr val="accent1">
-              <a:shade val="50000"/>
-            </a:schemeClr>
-          </a:lnRef>
-          <a:fillRef idx="1">
-            <a:schemeClr val="accent1"/>
-          </a:fillRef>
-          <a:effectRef idx="0">
-            <a:schemeClr val="accent1"/>
-          </a:effectRef>
-          <a:fontRef idx="minor">
-            <a:schemeClr val="lt1"/>
-          </a:fontRef>
-        </p:style>
-        <p:txBody>
-          <a:bodyPr lIns="0" tIns="0" rIns="0" bIns="0" rtlCol="0" anchor="t"/>
-          <a:lstStyle>
-            <a:defPPr>
-              <a:defRPr lang="pl-PL"/>
-            </a:defPPr>
-          </a:lstStyle>
-          <a:p>
-            <a:pPr algn="ctr" rtl="0"/>
-            <a:endParaRPr lang="pl-PL" dirty="0"/>
-          </a:p>
-        </p:txBody>
-      </p:sp>
-      <p:sp>
-        <p:nvSpPr>
-          <p:cNvPr id="24" name="Pole tekstowe 23">
-            <a:extLst>
-              <a:ext uri="{FF2B5EF4-FFF2-40B4-BE49-F238E27FC236}">
-                <a16:creationId xmlns:a16="http://schemas.microsoft.com/office/drawing/2014/main" id="{4EACDC13-7A41-1A4D-A46D-375C4ECC3359}"/>
-              </a:ext>
-            </a:extLst>
-          </p:cNvPr>
-          <p:cNvSpPr txBox="1"/>
-          <p:nvPr/>
-        </p:nvSpPr>
-        <p:spPr>
-          <a:xfrm>
-            <a:off x="5467196" y="3510576"/>
-            <a:ext cx="1371600" cy="461665"/>
-          </a:xfrm>
-          <a:prstGeom prst="rect">
-            <a:avLst/>
-          </a:prstGeom>
-          <a:noFill/>
-        </p:spPr>
-        <p:txBody>
-          <a:bodyPr wrap="square" rtlCol="0">
-            <a:spAutoFit/>
-          </a:bodyPr>
-          <a:lstStyle>
-            <a:defPPr>
-              <a:defRPr lang="pl-PL"/>
-            </a:defPPr>
-          </a:lstStyle>
-          <a:p>
-            <a:pPr algn="ctr" rtl="0"/>
-            <a:r>
-              <a:rPr lang="pl-PL" sz="2400" b="1">
-                <a:solidFill>
-                  <a:schemeClr val="accent2"/>
-                </a:solidFill>
-                <a:latin typeface="Posterama" panose="020B0504020200020000" pitchFamily="34" charset="0"/>
-                <a:cs typeface="Posterama" panose="020B0504020200020000" pitchFamily="34" charset="0"/>
-              </a:rPr>
-              <a:t>Hawaje</a:t>
-            </a:r>
-          </a:p>
-        </p:txBody>
-      </p:sp>
-    </p:spTree>
-    <p:extLst>
-      <p:ext uri="{BB962C8B-B14F-4D97-AF65-F5344CB8AC3E}">
-        <p14:creationId xmlns:p14="http://schemas.microsoft.com/office/powerpoint/2010/main" val="517615182"/>
+        <p14:creationId xmlns:p14="http://schemas.microsoft.com/office/powerpoint/2010/main" val="3613320851"/>
       </p:ext>
     </p:extLst>
   </p:cSld>
@@ -20590,6 +21064,25 @@
 </file>
 
 <file path=customXml/item1.xml><?xml version="1.0" encoding="utf-8"?>
+<p:properties xmlns:p="http://schemas.microsoft.com/office/2006/metadata/properties" xmlns:xsi="http://www.w3.org/2001/XMLSchema-instance" xmlns:pc="http://schemas.microsoft.com/office/infopath/2007/PartnerControls">
+  <documentManagement>
+    <Status xmlns="71af3243-3dd4-4a8d-8c0d-dd76da1f02a5">Not started</Status>
+    <_ip_UnifiedCompliancePolicyUIAction xmlns="http://schemas.microsoft.com/sharepoint/v3" xsi:nil="true"/>
+    <Image xmlns="71af3243-3dd4-4a8d-8c0d-dd76da1f02a5">
+      <Url xsi:nil="true"/>
+      <Description xsi:nil="true"/>
+    </Image>
+    <_ip_UnifiedCompliancePolicyProperties xmlns="http://schemas.microsoft.com/sharepoint/v3" xsi:nil="true"/>
+    <ImageTagsTaxHTField xmlns="71af3243-3dd4-4a8d-8c0d-dd76da1f02a5">
+      <Terms xmlns="http://schemas.microsoft.com/office/infopath/2007/PartnerControls"/>
+    </ImageTagsTaxHTField>
+    <TaxCatchAll xmlns="230e9df3-be65-4c73-a93b-d1236ebd677e"/>
+    <MediaServiceKeyPoints xmlns="71af3243-3dd4-4a8d-8c0d-dd76da1f02a5" xsi:nil="true"/>
+  </documentManagement>
+</p:properties>
+</file>
+
+<file path=customXml/item2.xml><?xml version="1.0" encoding="utf-8"?>
 <ct:contentTypeSchema xmlns:ct="http://schemas.microsoft.com/office/2006/metadata/contentType" xmlns:ma="http://schemas.microsoft.com/office/2006/metadata/properties/metaAttributes" ct:_="" ma:_="" ma:contentTypeName="Document" ma:contentTypeID="0x01010079F111ED35F8CC479449609E8A0923A6" ma:contentTypeVersion="20" ma:contentTypeDescription="Create a new document." ma:contentTypeScope="" ma:versionID="1267097ee5f5874adfcc408041ae252e">
   <xsd:schema xmlns:xsd="http://www.w3.org/2001/XMLSchema" xmlns:xs="http://www.w3.org/2001/XMLSchema" xmlns:p="http://schemas.microsoft.com/office/2006/metadata/properties" xmlns:ns1="http://schemas.microsoft.com/sharepoint/v3" xmlns:ns2="71af3243-3dd4-4a8d-8c0d-dd76da1f02a5" xmlns:ns3="16c05727-aa75-4e4a-9b5f-8a80a1165891" xmlns:ns4="230e9df3-be65-4c73-a93b-d1236ebd677e" targetNamespace="http://schemas.microsoft.com/office/2006/metadata/properties" ma:root="true" ma:fieldsID="395891a93df65b14727750f2c06c306c" ns1:_="" ns2:_="" ns3:_="" ns4:_="">
     <xsd:import namespace="http://schemas.microsoft.com/sharepoint/v3"/>
@@ -20865,25 +21358,6 @@
 </ct:contentTypeSchema>
 </file>
 
-<file path=customXml/item2.xml><?xml version="1.0" encoding="utf-8"?>
-<p:properties xmlns:p="http://schemas.microsoft.com/office/2006/metadata/properties" xmlns:xsi="http://www.w3.org/2001/XMLSchema-instance" xmlns:pc="http://schemas.microsoft.com/office/infopath/2007/PartnerControls">
-  <documentManagement>
-    <Status xmlns="71af3243-3dd4-4a8d-8c0d-dd76da1f02a5">Not started</Status>
-    <_ip_UnifiedCompliancePolicyUIAction xmlns="http://schemas.microsoft.com/sharepoint/v3" xsi:nil="true"/>
-    <Image xmlns="71af3243-3dd4-4a8d-8c0d-dd76da1f02a5">
-      <Url xsi:nil="true"/>
-      <Description xsi:nil="true"/>
-    </Image>
-    <_ip_UnifiedCompliancePolicyProperties xmlns="http://schemas.microsoft.com/sharepoint/v3" xsi:nil="true"/>
-    <ImageTagsTaxHTField xmlns="71af3243-3dd4-4a8d-8c0d-dd76da1f02a5">
-      <Terms xmlns="http://schemas.microsoft.com/office/infopath/2007/PartnerControls"/>
-    </ImageTagsTaxHTField>
-    <TaxCatchAll xmlns="230e9df3-be65-4c73-a93b-d1236ebd677e"/>
-    <MediaServiceKeyPoints xmlns="71af3243-3dd4-4a8d-8c0d-dd76da1f02a5" xsi:nil="true"/>
-  </documentManagement>
-</p:properties>
-</file>
-
 <file path=customXml/item3.xml><?xml version="1.0" encoding="utf-8"?>
 <?mso-contentType ?>
 <FormTemplates xmlns="http://schemas.microsoft.com/sharepoint/v3/contenttype/forms">
@@ -20894,6 +21368,18 @@
 </file>
 
 <file path=customXml/itemProps1.xml><?xml version="1.0" encoding="utf-8"?>
+<ds:datastoreItem xmlns:ds="http://schemas.openxmlformats.org/officeDocument/2006/customXml" ds:itemID="{1C44B501-5DE1-46D9-B449-400C46FE1425}">
+  <ds:schemaRefs>
+    <ds:schemaRef ds:uri="http://schemas.microsoft.com/office/2006/metadata/properties"/>
+    <ds:schemaRef ds:uri="http://schemas.microsoft.com/office/infopath/2007/PartnerControls"/>
+    <ds:schemaRef ds:uri="71af3243-3dd4-4a8d-8c0d-dd76da1f02a5"/>
+    <ds:schemaRef ds:uri="http://schemas.microsoft.com/sharepoint/v3"/>
+    <ds:schemaRef ds:uri="230e9df3-be65-4c73-a93b-d1236ebd677e"/>
+  </ds:schemaRefs>
+</ds:datastoreItem>
+</file>
+
+<file path=customXml/itemProps2.xml><?xml version="1.0" encoding="utf-8"?>
 <ds:datastoreItem xmlns:ds="http://schemas.openxmlformats.org/officeDocument/2006/customXml" ds:itemID="{B2A44EB6-3BD3-4FF9-B8D1-D973C54C3ED7}">
   <ds:schemaRefs>
     <ds:schemaRef ds:uri="http://schemas.microsoft.com/office/2006/metadata/contentType"/>
@@ -20914,18 +21400,6 @@
 </ds:datastoreItem>
 </file>
 
-<file path=customXml/itemProps2.xml><?xml version="1.0" encoding="utf-8"?>
-<ds:datastoreItem xmlns:ds="http://schemas.openxmlformats.org/officeDocument/2006/customXml" ds:itemID="{1C44B501-5DE1-46D9-B449-400C46FE1425}">
-  <ds:schemaRefs>
-    <ds:schemaRef ds:uri="http://schemas.microsoft.com/office/2006/metadata/properties"/>
-    <ds:schemaRef ds:uri="http://schemas.microsoft.com/office/infopath/2007/PartnerControls"/>
-    <ds:schemaRef ds:uri="71af3243-3dd4-4a8d-8c0d-dd76da1f02a5"/>
-    <ds:schemaRef ds:uri="http://schemas.microsoft.com/sharepoint/v3"/>
-    <ds:schemaRef ds:uri="230e9df3-be65-4c73-a93b-d1236ebd677e"/>
-  </ds:schemaRefs>
-</ds:datastoreItem>
-</file>
-
 <file path=customXml/itemProps3.xml><?xml version="1.0" encoding="utf-8"?>
 <ds:datastoreItem xmlns:ds="http://schemas.openxmlformats.org/officeDocument/2006/customXml" ds:itemID="{77DD0DBF-30B2-4FC6-A5E7-8374DC718037}">
   <ds:schemaRefs>

</xml_diff>

<commit_message>
SLide 8. 10.39 minutes
</commit_message>
<xml_diff>
--- a/Presentation/Analyzing the StackOverflow2013 Database from 2008 to 2013.pptx
+++ b/Presentation/Analyzing the StackOverflow2013 Database from 2008 to 2013.pptx
@@ -5,7 +5,7 @@
     <p:sldMasterId id="2147483648" r:id="rId4"/>
   </p:sldMasterIdLst>
   <p:notesMasterIdLst>
-    <p:notesMasterId r:id="rId17"/>
+    <p:notesMasterId r:id="rId18"/>
   </p:notesMasterIdLst>
   <p:sldIdLst>
     <p:sldId id="259" r:id="rId5"/>
@@ -16,10 +16,11 @@
     <p:sldId id="270" r:id="rId10"/>
     <p:sldId id="273" r:id="rId11"/>
     <p:sldId id="271" r:id="rId12"/>
-    <p:sldId id="265" r:id="rId13"/>
-    <p:sldId id="272" r:id="rId14"/>
-    <p:sldId id="264" r:id="rId15"/>
-    <p:sldId id="263" r:id="rId16"/>
+    <p:sldId id="274" r:id="rId13"/>
+    <p:sldId id="265" r:id="rId14"/>
+    <p:sldId id="272" r:id="rId15"/>
+    <p:sldId id="264" r:id="rId16"/>
+    <p:sldId id="263" r:id="rId17"/>
   </p:sldIdLst>
   <p:sldSz cx="12192000" cy="6858000"/>
   <p:notesSz cx="6858000" cy="9144000"/>
@@ -5219,6 +5220,91 @@
       </p:grpSpPr>
       <p:sp>
         <p:nvSpPr>
+          <p:cNvPr id="2" name="Slide Image Placeholder 1"/>
+          <p:cNvSpPr>
+            <a:spLocks noGrp="1" noRot="1" noChangeAspect="1"/>
+          </p:cNvSpPr>
+          <p:nvPr>
+            <p:ph type="sldImg"/>
+          </p:nvPr>
+        </p:nvSpPr>
+        <p:spPr/>
+      </p:sp>
+      <p:sp>
+        <p:nvSpPr>
+          <p:cNvPr id="3" name="Notes Placeholder 2"/>
+          <p:cNvSpPr>
+            <a:spLocks noGrp="1"/>
+          </p:cNvSpPr>
+          <p:nvPr>
+            <p:ph type="body" idx="1"/>
+          </p:nvPr>
+        </p:nvSpPr>
+        <p:spPr/>
+        <p:txBody>
+          <a:bodyPr/>
+          <a:lstStyle/>
+          <a:p>
+            <a:endParaRPr lang="pl-PL"/>
+          </a:p>
+        </p:txBody>
+      </p:sp>
+      <p:sp>
+        <p:nvSpPr>
+          <p:cNvPr id="4" name="Slide Number Placeholder 3"/>
+          <p:cNvSpPr>
+            <a:spLocks noGrp="1"/>
+          </p:cNvSpPr>
+          <p:nvPr>
+            <p:ph type="sldNum" sz="quarter" idx="5"/>
+          </p:nvPr>
+        </p:nvSpPr>
+        <p:spPr/>
+        <p:txBody>
+          <a:bodyPr/>
+          <a:lstStyle/>
+          <a:p>
+            <a:pPr rtl="0"/>
+            <a:fld id="{BC0C2C40-CB1C-4820-9151-EC51EC2E7E0F}" type="slidenum">
+              <a:rPr lang="pl-PL" smtClean="0"/>
+              <a:t>10</a:t>
+            </a:fld>
+            <a:endParaRPr lang="pl-PL" dirty="0"/>
+          </a:p>
+        </p:txBody>
+      </p:sp>
+    </p:spTree>
+    <p:extLst>
+      <p:ext uri="{BB962C8B-B14F-4D97-AF65-F5344CB8AC3E}">
+        <p14:creationId xmlns:p14="http://schemas.microsoft.com/office/powerpoint/2010/main" val="2743713819"/>
+      </p:ext>
+    </p:extLst>
+  </p:cSld>
+  <p:clrMapOvr>
+    <a:masterClrMapping/>
+  </p:clrMapOvr>
+</p:notes>
+</file>
+
+<file path=ppt/notesSlides/notesSlide11.xml><?xml version="1.0" encoding="utf-8"?>
+<p:notes xmlns:a="http://schemas.openxmlformats.org/drawingml/2006/main" xmlns:r="http://schemas.openxmlformats.org/officeDocument/2006/relationships" xmlns:p="http://schemas.openxmlformats.org/presentationml/2006/main">
+  <p:cSld>
+    <p:spTree>
+      <p:nvGrpSpPr>
+        <p:cNvPr id="1" name=""/>
+        <p:cNvGrpSpPr/>
+        <p:nvPr/>
+      </p:nvGrpSpPr>
+      <p:grpSpPr>
+        <a:xfrm>
+          <a:off x="0" y="0"/>
+          <a:ext cx="0" cy="0"/>
+          <a:chOff x="0" y="0"/>
+          <a:chExt cx="0" cy="0"/>
+        </a:xfrm>
+      </p:grpSpPr>
+      <p:sp>
+        <p:nvSpPr>
           <p:cNvPr id="2" name="Obraz slajdu — symbol zastępczy 1"/>
           <p:cNvSpPr>
             <a:spLocks noGrp="1" noRot="1" noChangeAspect="1"/>
@@ -5275,7 +5361,7 @@
             <a:pPr rtl="0"/>
             <a:fld id="{BC0C2C40-CB1C-4820-9151-EC51EC2E7E0F}" type="slidenum">
               <a:rPr lang="pl-PL" smtClean="0"/>
-              <a:t>12</a:t>
+              <a:t>13</a:t>
             </a:fld>
             <a:endParaRPr lang="pl-PL" dirty="0"/>
           </a:p>
@@ -6299,7 +6385,84 @@
           <a:bodyPr/>
           <a:lstStyle/>
           <a:p>
-            <a:endParaRPr lang="pl-PL"/>
+            <a:pPr algn="just"/>
+            <a:r>
+              <a:rPr lang="en-US" dirty="0"/>
+              <a:t>This slide illustrates the functions I've prepared for converting compressed CSV files to the Parquet format, optimized for processing with Apache Spark.</a:t>
+            </a:r>
+          </a:p>
+          <a:p>
+            <a:pPr algn="just"/>
+            <a:endParaRPr lang="en-US" dirty="0"/>
+          </a:p>
+          <a:p>
+            <a:pPr algn="just"/>
+            <a:r>
+              <a:rPr lang="en-US" dirty="0"/>
+              <a:t>The first function, </a:t>
+            </a:r>
+            <a:r>
+              <a:rPr lang="en-US" dirty="0" err="1"/>
+              <a:t>readCSV</a:t>
+            </a:r>
+            <a:r>
+              <a:rPr lang="en-US" dirty="0"/>
+              <a:t>, is a Scala function that reads a CSV file into a Spark </a:t>
+            </a:r>
+            <a:r>
+              <a:rPr lang="en-US" dirty="0" err="1"/>
+              <a:t>DataFrame</a:t>
+            </a:r>
+            <a:r>
+              <a:rPr lang="en-US" dirty="0"/>
+              <a:t>, enforcing a predefined schema. It's essential for ensuring the data conforms to the expected format, which facilitates reliable analysis and processing.</a:t>
+            </a:r>
+          </a:p>
+          <a:p>
+            <a:pPr algn="just"/>
+            <a:endParaRPr lang="en-US" dirty="0"/>
+          </a:p>
+          <a:p>
+            <a:pPr algn="just"/>
+            <a:r>
+              <a:rPr lang="en-US" dirty="0"/>
+              <a:t>To manage file paths easier, I use the </a:t>
+            </a:r>
+            <a:r>
+              <a:rPr lang="en-US" dirty="0" err="1"/>
+              <a:t>getCSVPath</a:t>
+            </a:r>
+            <a:r>
+              <a:rPr lang="en-US" dirty="0"/>
+              <a:t> and </a:t>
+            </a:r>
+            <a:r>
+              <a:rPr lang="en-US" dirty="0" err="1"/>
+              <a:t>getParquetPath</a:t>
+            </a:r>
+            <a:r>
+              <a:rPr lang="en-US" dirty="0"/>
+              <a:t> functions. They generate the storage paths for the CSV and Parquet files, respectively. </a:t>
+            </a:r>
+          </a:p>
+          <a:p>
+            <a:pPr algn="just"/>
+            <a:endParaRPr lang="en-US" dirty="0"/>
+          </a:p>
+          <a:p>
+            <a:pPr algn="just"/>
+            <a:r>
+              <a:rPr lang="en-US" dirty="0"/>
+              <a:t>By applying these functions, I ensure that the data transformation pipeline is not only automated but also integrated, setting the stage for the subsequent analytics tasks in Spark without any manual intervention.</a:t>
+            </a:r>
+          </a:p>
+          <a:p>
+            <a:pPr algn="just"/>
+            <a:endParaRPr lang="en-US"/>
+          </a:p>
+          <a:p>
+            <a:pPr algn="just"/>
+            <a:endParaRPr lang="pl-PL" dirty="0"/>
           </a:p>
         </p:txBody>
       </p:sp>
@@ -6415,7 +6578,7 @@
     </p:spTree>
     <p:extLst>
       <p:ext uri="{BB962C8B-B14F-4D97-AF65-F5344CB8AC3E}">
-        <p14:creationId xmlns:p14="http://schemas.microsoft.com/office/powerpoint/2010/main" val="2743713819"/>
+        <p14:creationId xmlns:p14="http://schemas.microsoft.com/office/powerpoint/2010/main" val="2751627742"/>
       </p:ext>
     </p:extLst>
   </p:cSld>
@@ -10559,6 +10722,1505 @@
 </file>
 
 <file path=ppt/slides/slide10.xml><?xml version="1.0" encoding="utf-8"?>
+<p:sld xmlns:a="http://schemas.openxmlformats.org/drawingml/2006/main" xmlns:r="http://schemas.openxmlformats.org/officeDocument/2006/relationships" xmlns:p="http://schemas.openxmlformats.org/presentationml/2006/main">
+  <p:cSld>
+    <p:spTree>
+      <p:nvGrpSpPr>
+        <p:cNvPr id="1" name=""/>
+        <p:cNvGrpSpPr/>
+        <p:nvPr/>
+      </p:nvGrpSpPr>
+      <p:grpSpPr>
+        <a:xfrm>
+          <a:off x="0" y="0"/>
+          <a:ext cx="0" cy="0"/>
+          <a:chOff x="0" y="0"/>
+          <a:chExt cx="0" cy="0"/>
+        </a:xfrm>
+      </p:grpSpPr>
+      <p:sp>
+        <p:nvSpPr>
+          <p:cNvPr id="2" name="Tytuł 1">
+            <a:extLst>
+              <a:ext uri="{FF2B5EF4-FFF2-40B4-BE49-F238E27FC236}">
+                <a16:creationId xmlns:a16="http://schemas.microsoft.com/office/drawing/2014/main" id="{F07E19FF-DAD9-4AB4-9D83-993EE9FE6846}"/>
+              </a:ext>
+            </a:extLst>
+          </p:cNvPr>
+          <p:cNvSpPr>
+            <a:spLocks noGrp="1"/>
+          </p:cNvSpPr>
+          <p:nvPr>
+            <p:ph type="title"/>
+          </p:nvPr>
+        </p:nvSpPr>
+        <p:spPr>
+          <a:xfrm>
+            <a:off x="444500" y="412137"/>
+            <a:ext cx="9146972" cy="640080"/>
+          </a:xfrm>
+        </p:spPr>
+        <p:txBody>
+          <a:bodyPr rtlCol="0">
+            <a:normAutofit/>
+          </a:bodyPr>
+          <a:lstStyle>
+            <a:defPPr>
+              <a:defRPr lang="pl-PL"/>
+            </a:defPPr>
+          </a:lstStyle>
+          <a:p>
+            <a:pPr rtl="0"/>
+            <a:r>
+              <a:rPr lang="pl-PL" b="1">
+                <a:latin typeface="Segoe UI Semibold" panose="020B0502040204020203" pitchFamily="34" charset="0"/>
+                <a:cs typeface="Segoe UI Semibold" panose="020B0502040204020203" pitchFamily="34" charset="0"/>
+              </a:rPr>
+              <a:t>Wypróbuj!</a:t>
+            </a:r>
+          </a:p>
+        </p:txBody>
+      </p:sp>
+      <p:sp>
+        <p:nvSpPr>
+          <p:cNvPr id="40" name="Owal 39" descr="Mały okrąg">
+            <a:extLst>
+              <a:ext uri="{FF2B5EF4-FFF2-40B4-BE49-F238E27FC236}">
+                <a16:creationId xmlns:a16="http://schemas.microsoft.com/office/drawing/2014/main" id="{0C3A28BB-9675-8648-9563-A663628F48F5}"/>
+              </a:ext>
+            </a:extLst>
+          </p:cNvPr>
+          <p:cNvSpPr>
+            <a:spLocks noChangeAspect="1"/>
+          </p:cNvSpPr>
+          <p:nvPr/>
+        </p:nvSpPr>
+        <p:spPr bwMode="blackWhite">
+          <a:xfrm>
+            <a:off x="530197" y="1503788"/>
+            <a:ext cx="409838" cy="409838"/>
+          </a:xfrm>
+          <a:prstGeom prst="ellipse">
+            <a:avLst/>
+          </a:prstGeom>
+          <a:solidFill>
+            <a:schemeClr val="accent2"/>
+          </a:solidFill>
+          <a:ln>
+            <a:noFill/>
+          </a:ln>
+        </p:spPr>
+        <p:style>
+          <a:lnRef idx="2">
+            <a:schemeClr val="accent1">
+              <a:shade val="50000"/>
+            </a:schemeClr>
+          </a:lnRef>
+          <a:fillRef idx="1">
+            <a:schemeClr val="accent1"/>
+          </a:fillRef>
+          <a:effectRef idx="0">
+            <a:schemeClr val="accent1"/>
+          </a:effectRef>
+          <a:fontRef idx="minor">
+            <a:schemeClr val="lt1"/>
+          </a:fontRef>
+        </p:style>
+        <p:txBody>
+          <a:bodyPr rtlCol="0" anchor="ctr"/>
+          <a:lstStyle>
+            <a:defPPr>
+              <a:defRPr lang="pl-PL"/>
+            </a:defPPr>
+          </a:lstStyle>
+          <a:p>
+            <a:pPr algn="ctr" rtl="0"/>
+            <a:endParaRPr lang="pl-PL"/>
+          </a:p>
+        </p:txBody>
+      </p:sp>
+      <p:sp>
+        <p:nvSpPr>
+          <p:cNvPr id="41" name="Pole tekstowe 40" descr="Liczba 1">
+            <a:extLst>
+              <a:ext uri="{FF2B5EF4-FFF2-40B4-BE49-F238E27FC236}">
+                <a16:creationId xmlns:a16="http://schemas.microsoft.com/office/drawing/2014/main" id="{516D502C-EEB8-7641-9141-D6049BAE3252}"/>
+              </a:ext>
+            </a:extLst>
+          </p:cNvPr>
+          <p:cNvSpPr txBox="1">
+            <a:spLocks noChangeAspect="1"/>
+          </p:cNvSpPr>
+          <p:nvPr/>
+        </p:nvSpPr>
+        <p:spPr bwMode="blackWhite">
+          <a:xfrm>
+            <a:off x="457571" y="1520182"/>
+            <a:ext cx="558179" cy="369332"/>
+          </a:xfrm>
+          <a:prstGeom prst="rect">
+            <a:avLst/>
+          </a:prstGeom>
+          <a:noFill/>
+        </p:spPr>
+        <p:txBody>
+          <a:bodyPr wrap="square" rtlCol="0">
+            <a:spAutoFit/>
+          </a:bodyPr>
+          <a:lstStyle>
+            <a:defPPr>
+              <a:defRPr lang="pl-PL"/>
+            </a:defPPr>
+          </a:lstStyle>
+          <a:p>
+            <a:pPr algn="ctr" rtl="0"/>
+            <a:r>
+              <a:rPr lang="pl-PL">
+                <a:solidFill>
+                  <a:schemeClr val="bg1"/>
+                </a:solidFill>
+                <a:cs typeface="Segoe UI Semibold" panose="020B0702040204020203" pitchFamily="34" charset="0"/>
+              </a:rPr>
+              <a:t>1</a:t>
+            </a:r>
+          </a:p>
+        </p:txBody>
+      </p:sp>
+      <p:sp>
+        <p:nvSpPr>
+          <p:cNvPr id="43" name="Owal 42" descr="Mały okrąg">
+            <a:extLst>
+              <a:ext uri="{FF2B5EF4-FFF2-40B4-BE49-F238E27FC236}">
+                <a16:creationId xmlns:a16="http://schemas.microsoft.com/office/drawing/2014/main" id="{E3BF4CBA-96D8-844A-846E-482C93C4A9BA}"/>
+              </a:ext>
+            </a:extLst>
+          </p:cNvPr>
+          <p:cNvSpPr>
+            <a:spLocks noChangeAspect="1"/>
+          </p:cNvSpPr>
+          <p:nvPr/>
+        </p:nvSpPr>
+        <p:spPr bwMode="blackWhite">
+          <a:xfrm>
+            <a:off x="523507" y="2496858"/>
+            <a:ext cx="409838" cy="409838"/>
+          </a:xfrm>
+          <a:prstGeom prst="ellipse">
+            <a:avLst/>
+          </a:prstGeom>
+          <a:solidFill>
+            <a:schemeClr val="accent2"/>
+          </a:solidFill>
+          <a:ln>
+            <a:noFill/>
+          </a:ln>
+        </p:spPr>
+        <p:style>
+          <a:lnRef idx="2">
+            <a:schemeClr val="accent1">
+              <a:shade val="50000"/>
+            </a:schemeClr>
+          </a:lnRef>
+          <a:fillRef idx="1">
+            <a:schemeClr val="accent1"/>
+          </a:fillRef>
+          <a:effectRef idx="0">
+            <a:schemeClr val="accent1"/>
+          </a:effectRef>
+          <a:fontRef idx="minor">
+            <a:schemeClr val="lt1"/>
+          </a:fontRef>
+        </p:style>
+        <p:txBody>
+          <a:bodyPr rtlCol="0" anchor="ctr"/>
+          <a:lstStyle>
+            <a:defPPr>
+              <a:defRPr lang="pl-PL"/>
+            </a:defPPr>
+          </a:lstStyle>
+          <a:p>
+            <a:pPr algn="ctr" rtl="0"/>
+            <a:endParaRPr lang="pl-PL"/>
+          </a:p>
+        </p:txBody>
+      </p:sp>
+      <p:sp>
+        <p:nvSpPr>
+          <p:cNvPr id="44" name="Pole tekstowe 43" descr="Liczba 2">
+            <a:extLst>
+              <a:ext uri="{FF2B5EF4-FFF2-40B4-BE49-F238E27FC236}">
+                <a16:creationId xmlns:a16="http://schemas.microsoft.com/office/drawing/2014/main" id="{4EE65486-1766-B74A-9043-DE141DDF4363}"/>
+              </a:ext>
+            </a:extLst>
+          </p:cNvPr>
+          <p:cNvSpPr txBox="1">
+            <a:spLocks noChangeAspect="1"/>
+          </p:cNvSpPr>
+          <p:nvPr/>
+        </p:nvSpPr>
+        <p:spPr bwMode="blackWhite">
+          <a:xfrm>
+            <a:off x="488894" y="2503896"/>
+            <a:ext cx="493917" cy="369332"/>
+          </a:xfrm>
+          <a:prstGeom prst="rect">
+            <a:avLst/>
+          </a:prstGeom>
+          <a:noFill/>
+        </p:spPr>
+        <p:txBody>
+          <a:bodyPr wrap="square" rtlCol="0">
+            <a:spAutoFit/>
+          </a:bodyPr>
+          <a:lstStyle>
+            <a:defPPr>
+              <a:defRPr lang="pl-PL"/>
+            </a:defPPr>
+          </a:lstStyle>
+          <a:p>
+            <a:pPr algn="ctr" rtl="0"/>
+            <a:r>
+              <a:rPr lang="pl-PL">
+                <a:solidFill>
+                  <a:schemeClr val="bg1"/>
+                </a:solidFill>
+                <a:cs typeface="Segoe UI Semibold" panose="020B0702040204020203" pitchFamily="34" charset="0"/>
+              </a:rPr>
+              <a:t>2</a:t>
+            </a:r>
+          </a:p>
+        </p:txBody>
+      </p:sp>
+      <p:sp>
+        <p:nvSpPr>
+          <p:cNvPr id="45" name="Owal 44" descr="Mały okrąg">
+            <a:extLst>
+              <a:ext uri="{FF2B5EF4-FFF2-40B4-BE49-F238E27FC236}">
+                <a16:creationId xmlns:a16="http://schemas.microsoft.com/office/drawing/2014/main" id="{7BB2B4E3-317E-FC4B-B166-28E804B11BF6}"/>
+              </a:ext>
+            </a:extLst>
+          </p:cNvPr>
+          <p:cNvSpPr>
+            <a:spLocks noChangeAspect="1"/>
+          </p:cNvSpPr>
+          <p:nvPr/>
+        </p:nvSpPr>
+        <p:spPr bwMode="blackWhite">
+          <a:xfrm>
+            <a:off x="511049" y="3127810"/>
+            <a:ext cx="409838" cy="409838"/>
+          </a:xfrm>
+          <a:prstGeom prst="ellipse">
+            <a:avLst/>
+          </a:prstGeom>
+          <a:solidFill>
+            <a:schemeClr val="accent2"/>
+          </a:solidFill>
+          <a:ln>
+            <a:noFill/>
+          </a:ln>
+        </p:spPr>
+        <p:style>
+          <a:lnRef idx="2">
+            <a:schemeClr val="accent1">
+              <a:shade val="50000"/>
+            </a:schemeClr>
+          </a:lnRef>
+          <a:fillRef idx="1">
+            <a:schemeClr val="accent1"/>
+          </a:fillRef>
+          <a:effectRef idx="0">
+            <a:schemeClr val="accent1"/>
+          </a:effectRef>
+          <a:fontRef idx="minor">
+            <a:schemeClr val="lt1"/>
+          </a:fontRef>
+        </p:style>
+        <p:txBody>
+          <a:bodyPr rtlCol="0" anchor="ctr"/>
+          <a:lstStyle>
+            <a:defPPr>
+              <a:defRPr lang="pl-PL"/>
+            </a:defPPr>
+          </a:lstStyle>
+          <a:p>
+            <a:pPr algn="ctr" rtl="0"/>
+            <a:endParaRPr lang="pl-PL"/>
+          </a:p>
+        </p:txBody>
+      </p:sp>
+      <p:sp>
+        <p:nvSpPr>
+          <p:cNvPr id="47" name="Pole tekstowe 46" descr="Liczba 3">
+            <a:extLst>
+              <a:ext uri="{FF2B5EF4-FFF2-40B4-BE49-F238E27FC236}">
+                <a16:creationId xmlns:a16="http://schemas.microsoft.com/office/drawing/2014/main" id="{04248951-1086-2B45-ACBA-B055B8A9B128}"/>
+              </a:ext>
+            </a:extLst>
+          </p:cNvPr>
+          <p:cNvSpPr txBox="1">
+            <a:spLocks noChangeAspect="1"/>
+          </p:cNvSpPr>
+          <p:nvPr/>
+        </p:nvSpPr>
+        <p:spPr bwMode="blackWhite">
+          <a:xfrm>
+            <a:off x="444500" y="3151746"/>
+            <a:ext cx="558179" cy="369332"/>
+          </a:xfrm>
+          <a:prstGeom prst="rect">
+            <a:avLst/>
+          </a:prstGeom>
+          <a:noFill/>
+        </p:spPr>
+        <p:txBody>
+          <a:bodyPr wrap="square" rtlCol="0">
+            <a:spAutoFit/>
+          </a:bodyPr>
+          <a:lstStyle>
+            <a:defPPr>
+              <a:defRPr lang="pl-PL"/>
+            </a:defPPr>
+          </a:lstStyle>
+          <a:p>
+            <a:pPr algn="ctr" rtl="0"/>
+            <a:r>
+              <a:rPr lang="pl-PL">
+                <a:solidFill>
+                  <a:schemeClr val="bg1"/>
+                </a:solidFill>
+                <a:cs typeface="Segoe UI Semibold" panose="020B0702040204020203" pitchFamily="34" charset="0"/>
+              </a:rPr>
+              <a:t>3</a:t>
+            </a:r>
+          </a:p>
+        </p:txBody>
+      </p:sp>
+      <p:sp>
+        <p:nvSpPr>
+          <p:cNvPr id="48" name="Owal 47" descr="Mały okrąg">
+            <a:extLst>
+              <a:ext uri="{FF2B5EF4-FFF2-40B4-BE49-F238E27FC236}">
+                <a16:creationId xmlns:a16="http://schemas.microsoft.com/office/drawing/2014/main" id="{F1C23E2A-8D82-9F46-B7C2-83771AA0906F}"/>
+              </a:ext>
+            </a:extLst>
+          </p:cNvPr>
+          <p:cNvSpPr>
+            <a:spLocks noChangeAspect="1"/>
+          </p:cNvSpPr>
+          <p:nvPr/>
+        </p:nvSpPr>
+        <p:spPr bwMode="blackWhite">
+          <a:xfrm>
+            <a:off x="530159" y="3890648"/>
+            <a:ext cx="409838" cy="409838"/>
+          </a:xfrm>
+          <a:prstGeom prst="ellipse">
+            <a:avLst/>
+          </a:prstGeom>
+          <a:solidFill>
+            <a:schemeClr val="accent2"/>
+          </a:solidFill>
+          <a:ln>
+            <a:noFill/>
+          </a:ln>
+        </p:spPr>
+        <p:style>
+          <a:lnRef idx="2">
+            <a:schemeClr val="accent1">
+              <a:shade val="50000"/>
+            </a:schemeClr>
+          </a:lnRef>
+          <a:fillRef idx="1">
+            <a:schemeClr val="accent1"/>
+          </a:fillRef>
+          <a:effectRef idx="0">
+            <a:schemeClr val="accent1"/>
+          </a:effectRef>
+          <a:fontRef idx="minor">
+            <a:schemeClr val="lt1"/>
+          </a:fontRef>
+        </p:style>
+        <p:txBody>
+          <a:bodyPr rtlCol="0" anchor="ctr"/>
+          <a:lstStyle>
+            <a:defPPr>
+              <a:defRPr lang="pl-PL"/>
+            </a:defPPr>
+          </a:lstStyle>
+          <a:p>
+            <a:pPr algn="ctr" rtl="0"/>
+            <a:endParaRPr lang="pl-PL"/>
+          </a:p>
+        </p:txBody>
+      </p:sp>
+      <p:sp>
+        <p:nvSpPr>
+          <p:cNvPr id="50" name="Pole tekstowe 49" descr="Liczba 3">
+            <a:extLst>
+              <a:ext uri="{FF2B5EF4-FFF2-40B4-BE49-F238E27FC236}">
+                <a16:creationId xmlns:a16="http://schemas.microsoft.com/office/drawing/2014/main" id="{985448E7-EE20-F14F-97AC-EA8BFD8FBA7F}"/>
+              </a:ext>
+            </a:extLst>
+          </p:cNvPr>
+          <p:cNvSpPr txBox="1">
+            <a:spLocks noChangeAspect="1"/>
+          </p:cNvSpPr>
+          <p:nvPr/>
+        </p:nvSpPr>
+        <p:spPr bwMode="blackWhite">
+          <a:xfrm>
+            <a:off x="449185" y="3910901"/>
+            <a:ext cx="558179" cy="369332"/>
+          </a:xfrm>
+          <a:prstGeom prst="rect">
+            <a:avLst/>
+          </a:prstGeom>
+          <a:noFill/>
+        </p:spPr>
+        <p:txBody>
+          <a:bodyPr wrap="square" rtlCol="0">
+            <a:spAutoFit/>
+          </a:bodyPr>
+          <a:lstStyle>
+            <a:defPPr>
+              <a:defRPr lang="pl-PL"/>
+            </a:defPPr>
+          </a:lstStyle>
+          <a:p>
+            <a:pPr algn="ctr" rtl="0"/>
+            <a:r>
+              <a:rPr lang="pl-PL">
+                <a:solidFill>
+                  <a:schemeClr val="bg1"/>
+                </a:solidFill>
+                <a:cs typeface="Segoe UI Semibold" panose="020B0702040204020203" pitchFamily="34" charset="0"/>
+              </a:rPr>
+              <a:t>4</a:t>
+            </a:r>
+          </a:p>
+        </p:txBody>
+      </p:sp>
+      <p:sp>
+        <p:nvSpPr>
+          <p:cNvPr id="51" name="Zawartość — symbol zastępczy 7">
+            <a:extLst>
+              <a:ext uri="{FF2B5EF4-FFF2-40B4-BE49-F238E27FC236}">
+                <a16:creationId xmlns:a16="http://schemas.microsoft.com/office/drawing/2014/main" id="{A6D40621-9F60-B248-A84C-7DCBF898D4DB}"/>
+              </a:ext>
+            </a:extLst>
+          </p:cNvPr>
+          <p:cNvSpPr txBox="1">
+            <a:spLocks/>
+          </p:cNvSpPr>
+          <p:nvPr/>
+        </p:nvSpPr>
+        <p:spPr>
+          <a:xfrm>
+            <a:off x="1039854" y="1509612"/>
+            <a:ext cx="4380515" cy="3652194"/>
+          </a:xfrm>
+          <a:prstGeom prst="rect">
+            <a:avLst/>
+          </a:prstGeom>
+        </p:spPr>
+        <p:txBody>
+          <a:bodyPr vert="horz" lIns="91440" tIns="45720" rIns="91440" bIns="45720" rtlCol="0">
+            <a:normAutofit/>
+          </a:bodyPr>
+          <a:lstStyle>
+            <a:lvl1pPr marL="228598" indent="-228598" algn="l" defTabSz="914391" rtl="0" eaLnBrk="1" latinLnBrk="0" hangingPunct="1">
+              <a:lnSpc>
+                <a:spcPct val="100000"/>
+              </a:lnSpc>
+              <a:spcBef>
+                <a:spcPts val="1000"/>
+              </a:spcBef>
+              <a:buFont typeface="Arial" panose="020B0604020202020204" pitchFamily="34" charset="0"/>
+              <a:buChar char="•"/>
+              <a:defRPr lang="pl-PL" sz="1400" kern="1200" smtClean="0">
+                <a:solidFill>
+                  <a:schemeClr val="tx1">
+                    <a:lumMod val="75000"/>
+                    <a:lumOff val="25000"/>
+                  </a:schemeClr>
+                </a:solidFill>
+                <a:latin typeface="+mn-lt"/>
+                <a:ea typeface="+mn-ea"/>
+                <a:cs typeface="+mn-cs"/>
+              </a:defRPr>
+            </a:lvl1pPr>
+            <a:lvl2pPr marL="685793" indent="-228598" algn="l" defTabSz="914391" rtl="0" eaLnBrk="1" latinLnBrk="0" hangingPunct="1">
+              <a:lnSpc>
+                <a:spcPct val="100000"/>
+              </a:lnSpc>
+              <a:spcBef>
+                <a:spcPts val="500"/>
+              </a:spcBef>
+              <a:buFont typeface="Arial" panose="020B0604020202020204" pitchFamily="34" charset="0"/>
+              <a:buChar char="•"/>
+              <a:defRPr lang="pl-PL" sz="1400" kern="1200" smtClean="0">
+                <a:solidFill>
+                  <a:schemeClr val="tx1">
+                    <a:lumMod val="75000"/>
+                    <a:lumOff val="25000"/>
+                  </a:schemeClr>
+                </a:solidFill>
+                <a:latin typeface="+mn-lt"/>
+                <a:ea typeface="+mn-ea"/>
+                <a:cs typeface="+mn-cs"/>
+              </a:defRPr>
+            </a:lvl2pPr>
+            <a:lvl3pPr marL="1142989" indent="-228598" algn="l" defTabSz="914391" rtl="0" eaLnBrk="1" latinLnBrk="0" hangingPunct="1">
+              <a:lnSpc>
+                <a:spcPct val="100000"/>
+              </a:lnSpc>
+              <a:spcBef>
+                <a:spcPts val="500"/>
+              </a:spcBef>
+              <a:buFont typeface="Arial" panose="020B0604020202020204" pitchFamily="34" charset="0"/>
+              <a:buChar char="•"/>
+              <a:defRPr lang="pl-PL" sz="1400" kern="1200" smtClean="0">
+                <a:solidFill>
+                  <a:schemeClr val="tx1">
+                    <a:lumMod val="75000"/>
+                    <a:lumOff val="25000"/>
+                  </a:schemeClr>
+                </a:solidFill>
+                <a:latin typeface="+mn-lt"/>
+                <a:ea typeface="+mn-ea"/>
+                <a:cs typeface="+mn-cs"/>
+              </a:defRPr>
+            </a:lvl3pPr>
+            <a:lvl4pPr marL="1600185" indent="-228598" algn="l" defTabSz="914391" rtl="0" eaLnBrk="1" latinLnBrk="0" hangingPunct="1">
+              <a:lnSpc>
+                <a:spcPct val="100000"/>
+              </a:lnSpc>
+              <a:spcBef>
+                <a:spcPts val="500"/>
+              </a:spcBef>
+              <a:buFont typeface="Arial" panose="020B0604020202020204" pitchFamily="34" charset="0"/>
+              <a:buChar char="•"/>
+              <a:defRPr lang="pl-PL" sz="1400" kern="1200" smtClean="0">
+                <a:solidFill>
+                  <a:schemeClr val="tx1">
+                    <a:lumMod val="75000"/>
+                    <a:lumOff val="25000"/>
+                  </a:schemeClr>
+                </a:solidFill>
+                <a:latin typeface="+mn-lt"/>
+                <a:ea typeface="+mn-ea"/>
+                <a:cs typeface="+mn-cs"/>
+              </a:defRPr>
+            </a:lvl4pPr>
+            <a:lvl5pPr marL="2057380" indent="-228598" algn="l" defTabSz="914391" rtl="0" eaLnBrk="1" latinLnBrk="0" hangingPunct="1">
+              <a:lnSpc>
+                <a:spcPct val="100000"/>
+              </a:lnSpc>
+              <a:spcBef>
+                <a:spcPts val="500"/>
+              </a:spcBef>
+              <a:buFont typeface="Arial" panose="020B0604020202020204" pitchFamily="34" charset="0"/>
+              <a:buChar char="•"/>
+              <a:defRPr lang="pl-PL" sz="1400" kern="1200">
+                <a:solidFill>
+                  <a:schemeClr val="tx1">
+                    <a:lumMod val="75000"/>
+                    <a:lumOff val="25000"/>
+                  </a:schemeClr>
+                </a:solidFill>
+                <a:latin typeface="+mn-lt"/>
+                <a:ea typeface="+mn-ea"/>
+                <a:cs typeface="+mn-cs"/>
+              </a:defRPr>
+            </a:lvl5pPr>
+            <a:lvl6pPr marL="2514576" indent="-228598" algn="l" defTabSz="914391" rtl="0" eaLnBrk="1" latinLnBrk="0" hangingPunct="1">
+              <a:lnSpc>
+                <a:spcPct val="90000"/>
+              </a:lnSpc>
+              <a:spcBef>
+                <a:spcPts val="500"/>
+              </a:spcBef>
+              <a:buFont typeface="Arial" panose="020B0604020202020204" pitchFamily="34" charset="0"/>
+              <a:buChar char="•"/>
+              <a:defRPr lang="pl-PL" sz="1800" kern="1200">
+                <a:solidFill>
+                  <a:schemeClr val="tx1"/>
+                </a:solidFill>
+                <a:latin typeface="+mn-lt"/>
+                <a:ea typeface="+mn-ea"/>
+                <a:cs typeface="+mn-cs"/>
+              </a:defRPr>
+            </a:lvl6pPr>
+            <a:lvl7pPr marL="2971772" indent="-228598" algn="l" defTabSz="914391" rtl="0" eaLnBrk="1" latinLnBrk="0" hangingPunct="1">
+              <a:lnSpc>
+                <a:spcPct val="90000"/>
+              </a:lnSpc>
+              <a:spcBef>
+                <a:spcPts val="500"/>
+              </a:spcBef>
+              <a:buFont typeface="Arial" panose="020B0604020202020204" pitchFamily="34" charset="0"/>
+              <a:buChar char="•"/>
+              <a:defRPr lang="pl-PL" sz="1800" kern="1200">
+                <a:solidFill>
+                  <a:schemeClr val="tx1"/>
+                </a:solidFill>
+                <a:latin typeface="+mn-lt"/>
+                <a:ea typeface="+mn-ea"/>
+                <a:cs typeface="+mn-cs"/>
+              </a:defRPr>
+            </a:lvl7pPr>
+            <a:lvl8pPr marL="3428967" indent="-228598" algn="l" defTabSz="914391" rtl="0" eaLnBrk="1" latinLnBrk="0" hangingPunct="1">
+              <a:lnSpc>
+                <a:spcPct val="90000"/>
+              </a:lnSpc>
+              <a:spcBef>
+                <a:spcPts val="500"/>
+              </a:spcBef>
+              <a:buFont typeface="Arial" panose="020B0604020202020204" pitchFamily="34" charset="0"/>
+              <a:buChar char="•"/>
+              <a:defRPr lang="pl-PL" sz="1800" kern="1200">
+                <a:solidFill>
+                  <a:schemeClr val="tx1"/>
+                </a:solidFill>
+                <a:latin typeface="+mn-lt"/>
+                <a:ea typeface="+mn-ea"/>
+                <a:cs typeface="+mn-cs"/>
+              </a:defRPr>
+            </a:lvl8pPr>
+            <a:lvl9pPr marL="3886163" indent="-228598" algn="l" defTabSz="914391" rtl="0" eaLnBrk="1" latinLnBrk="0" hangingPunct="1">
+              <a:lnSpc>
+                <a:spcPct val="90000"/>
+              </a:lnSpc>
+              <a:spcBef>
+                <a:spcPts val="500"/>
+              </a:spcBef>
+              <a:buFont typeface="Arial" panose="020B0604020202020204" pitchFamily="34" charset="0"/>
+              <a:buChar char="•"/>
+              <a:defRPr lang="pl-PL" sz="1800" kern="1200">
+                <a:solidFill>
+                  <a:schemeClr val="tx1"/>
+                </a:solidFill>
+                <a:latin typeface="+mn-lt"/>
+                <a:ea typeface="+mn-ea"/>
+                <a:cs typeface="+mn-cs"/>
+              </a:defRPr>
+            </a:lvl9pPr>
+          </a:lstStyle>
+          <a:p>
+            <a:pPr marL="0" indent="0" rtl="0">
+              <a:spcAft>
+                <a:spcPts val="1200"/>
+              </a:spcAft>
+              <a:buNone/>
+            </a:pPr>
+            <a:r>
+              <a:rPr lang="pl-PL" sz="1600">
+                <a:solidFill>
+                  <a:schemeClr val="tx1"/>
+                </a:solidFill>
+              </a:rPr>
+              <a:t>Kliknij pozycję </a:t>
+            </a:r>
+            <a:r>
+              <a:rPr lang="pl-PL" sz="1600" b="1">
+                <a:solidFill>
+                  <a:schemeClr val="tx1"/>
+                </a:solidFill>
+              </a:rPr>
+              <a:t>Wstaw &gt; Kształty</a:t>
+            </a:r>
+            <a:r>
+              <a:rPr lang="pl-PL" sz="1600">
+                <a:solidFill>
+                  <a:schemeClr val="tx1"/>
+                </a:solidFill>
+              </a:rPr>
+              <a:t>, aby wybrać kształty gałęzi i wstawiać linie, aby połączyć każdy temat.</a:t>
+            </a:r>
+          </a:p>
+          <a:p>
+            <a:pPr marL="0" indent="0" rtl="0">
+              <a:spcAft>
+                <a:spcPts val="1200"/>
+              </a:spcAft>
+              <a:buNone/>
+            </a:pPr>
+            <a:r>
+              <a:rPr lang="pl-PL" sz="1600">
+                <a:solidFill>
+                  <a:schemeClr val="tx1"/>
+                </a:solidFill>
+              </a:rPr>
+              <a:t>Kliknij prawym przyciskiem myszy kształt, aby zmienić jego kolor.</a:t>
+            </a:r>
+          </a:p>
+          <a:p>
+            <a:pPr marL="0" indent="0" rtl="0">
+              <a:spcAft>
+                <a:spcPts val="1200"/>
+              </a:spcAft>
+              <a:buNone/>
+            </a:pPr>
+            <a:r>
+              <a:rPr lang="pl-PL" sz="1600">
+                <a:solidFill>
+                  <a:schemeClr val="tx1"/>
+                </a:solidFill>
+              </a:rPr>
+              <a:t>Następnie przejdź do pozycji </a:t>
+            </a:r>
+            <a:r>
+              <a:rPr lang="pl-PL" sz="1600" b="1">
+                <a:solidFill>
+                  <a:schemeClr val="tx1"/>
+                </a:solidFill>
+                <a:cs typeface="Segoe UI Semibold" panose="020B0702040204020203" pitchFamily="34" charset="0"/>
+              </a:rPr>
+              <a:t>Wstaw </a:t>
+            </a:r>
+            <a:r>
+              <a:rPr lang="pl-PL" sz="1600">
+                <a:solidFill>
+                  <a:schemeClr val="tx1"/>
+                </a:solidFill>
+                <a:cs typeface="Segoe UI Semibold" panose="020B0702040204020203" pitchFamily="34" charset="0"/>
+              </a:rPr>
+              <a:t>&gt;</a:t>
+            </a:r>
+            <a:r>
+              <a:rPr lang="pl-PL" sz="1600" b="1">
+                <a:solidFill>
+                  <a:schemeClr val="tx1"/>
+                </a:solidFill>
+                <a:cs typeface="Segoe UI Semibold" panose="020B0702040204020203" pitchFamily="34" charset="0"/>
+              </a:rPr>
+              <a:t> Tekst</a:t>
+            </a:r>
+            <a:r>
+              <a:rPr lang="pl-PL" sz="1600">
+                <a:solidFill>
+                  <a:schemeClr val="tx1"/>
+                </a:solidFill>
+              </a:rPr>
+              <a:t> i wpisz 1 lub 2 słowa kluczowe dla każdej gałęzi.</a:t>
+            </a:r>
+          </a:p>
+          <a:p>
+            <a:pPr marL="0" indent="0" rtl="0">
+              <a:spcAft>
+                <a:spcPts val="1200"/>
+              </a:spcAft>
+              <a:buNone/>
+            </a:pPr>
+            <a:r>
+              <a:rPr lang="pl-PL" sz="1600">
+                <a:solidFill>
+                  <a:schemeClr val="tx1"/>
+                </a:solidFill>
+              </a:rPr>
+              <a:t>Przejdź do pozycji </a:t>
+            </a:r>
+            <a:r>
+              <a:rPr lang="pl-PL" sz="1600" b="1">
+                <a:solidFill>
+                  <a:schemeClr val="tx1"/>
+                </a:solidFill>
+              </a:rPr>
+              <a:t>Wstaw &gt; Obraz</a:t>
+            </a:r>
+            <a:r>
+              <a:rPr lang="pl-PL" sz="1600">
+                <a:solidFill>
+                  <a:schemeClr val="tx1"/>
+                </a:solidFill>
+              </a:rPr>
+              <a:t>, aby dodać obrazy i ikony do kształtów gałęzi.</a:t>
+            </a:r>
+          </a:p>
+        </p:txBody>
+      </p:sp>
+      <p:grpSp>
+        <p:nvGrpSpPr>
+          <p:cNvPr id="3" name="Grupa 2" descr="okręgi połączone liniami z polami tekstowymi">
+            <a:extLst>
+              <a:ext uri="{FF2B5EF4-FFF2-40B4-BE49-F238E27FC236}">
+                <a16:creationId xmlns:a16="http://schemas.microsoft.com/office/drawing/2014/main" id="{1D4EB0E6-31C2-46F7-ABD3-ECF41DD1412C}"/>
+              </a:ext>
+            </a:extLst>
+          </p:cNvPr>
+          <p:cNvGrpSpPr/>
+          <p:nvPr/>
+        </p:nvGrpSpPr>
+        <p:grpSpPr>
+          <a:xfrm>
+            <a:off x="6083842" y="1939633"/>
+            <a:ext cx="5318758" cy="4622299"/>
+            <a:chOff x="6083842" y="1939633"/>
+            <a:chExt cx="5318758" cy="4622299"/>
+          </a:xfrm>
+        </p:grpSpPr>
+        <p:cxnSp>
+          <p:nvCxnSpPr>
+            <p:cNvPr id="30" name="Łącznik prosty 29" descr="linia prosta">
+              <a:extLst>
+                <a:ext uri="{FF2B5EF4-FFF2-40B4-BE49-F238E27FC236}">
+                  <a16:creationId xmlns:a16="http://schemas.microsoft.com/office/drawing/2014/main" id="{63BB2123-A449-8E4F-BBD9-71E27CECBF94}"/>
+                </a:ext>
+              </a:extLst>
+            </p:cNvPr>
+            <p:cNvCxnSpPr>
+              <a:cxnSpLocks/>
+            </p:cNvCxnSpPr>
+            <p:nvPr/>
+          </p:nvCxnSpPr>
+          <p:spPr>
+            <a:xfrm flipH="1">
+              <a:off x="7188401" y="2785215"/>
+              <a:ext cx="768986" cy="88013"/>
+            </a:xfrm>
+            <a:prstGeom prst="line">
+              <a:avLst/>
+            </a:prstGeom>
+            <a:ln/>
+          </p:spPr>
+          <p:style>
+            <a:lnRef idx="3">
+              <a:schemeClr val="dk1"/>
+            </a:lnRef>
+            <a:fillRef idx="0">
+              <a:schemeClr val="dk1"/>
+            </a:fillRef>
+            <a:effectRef idx="2">
+              <a:schemeClr val="dk1"/>
+            </a:effectRef>
+            <a:fontRef idx="minor">
+              <a:schemeClr val="tx1"/>
+            </a:fontRef>
+          </p:style>
+        </p:cxnSp>
+        <p:cxnSp>
+          <p:nvCxnSpPr>
+            <p:cNvPr id="31" name="Łącznik prosty 30" descr="linia prosta">
+              <a:extLst>
+                <a:ext uri="{FF2B5EF4-FFF2-40B4-BE49-F238E27FC236}">
+                  <a16:creationId xmlns:a16="http://schemas.microsoft.com/office/drawing/2014/main" id="{D39C1A7A-D3C2-4440-A9CA-24ECB53715BB}"/>
+                </a:ext>
+              </a:extLst>
+            </p:cNvPr>
+            <p:cNvCxnSpPr>
+              <a:cxnSpLocks/>
+            </p:cNvCxnSpPr>
+            <p:nvPr/>
+          </p:nvCxnSpPr>
+          <p:spPr>
+            <a:xfrm flipH="1">
+              <a:off x="7742360" y="3349872"/>
+              <a:ext cx="552624" cy="945903"/>
+            </a:xfrm>
+            <a:prstGeom prst="line">
+              <a:avLst/>
+            </a:prstGeom>
+            <a:ln/>
+          </p:spPr>
+          <p:style>
+            <a:lnRef idx="3">
+              <a:schemeClr val="dk1"/>
+            </a:lnRef>
+            <a:fillRef idx="0">
+              <a:schemeClr val="dk1"/>
+            </a:fillRef>
+            <a:effectRef idx="2">
+              <a:schemeClr val="dk1"/>
+            </a:effectRef>
+            <a:fontRef idx="minor">
+              <a:schemeClr val="tx1"/>
+            </a:fontRef>
+          </p:style>
+        </p:cxnSp>
+        <p:cxnSp>
+          <p:nvCxnSpPr>
+            <p:cNvPr id="32" name="Łącznik prosty 31" descr="linia prosta">
+              <a:extLst>
+                <a:ext uri="{FF2B5EF4-FFF2-40B4-BE49-F238E27FC236}">
+                  <a16:creationId xmlns:a16="http://schemas.microsoft.com/office/drawing/2014/main" id="{5CAB83FA-6282-AE4B-ABB9-619FD4620C40}"/>
+                </a:ext>
+              </a:extLst>
+            </p:cNvPr>
+            <p:cNvCxnSpPr>
+              <a:cxnSpLocks/>
+            </p:cNvCxnSpPr>
+            <p:nvPr/>
+          </p:nvCxnSpPr>
+          <p:spPr>
+            <a:xfrm>
+              <a:off x="9181218" y="3429000"/>
+              <a:ext cx="836715" cy="1277695"/>
+            </a:xfrm>
+            <a:prstGeom prst="line">
+              <a:avLst/>
+            </a:prstGeom>
+            <a:ln/>
+          </p:spPr>
+          <p:style>
+            <a:lnRef idx="3">
+              <a:schemeClr val="dk1"/>
+            </a:lnRef>
+            <a:fillRef idx="0">
+              <a:schemeClr val="dk1"/>
+            </a:fillRef>
+            <a:effectRef idx="2">
+              <a:schemeClr val="dk1"/>
+            </a:effectRef>
+            <a:fontRef idx="minor">
+              <a:schemeClr val="tx1"/>
+            </a:fontRef>
+          </p:style>
+        </p:cxnSp>
+        <p:cxnSp>
+          <p:nvCxnSpPr>
+            <p:cNvPr id="33" name="Łącznik prosty 32" descr="linia prosta">
+              <a:extLst>
+                <a:ext uri="{FF2B5EF4-FFF2-40B4-BE49-F238E27FC236}">
+                  <a16:creationId xmlns:a16="http://schemas.microsoft.com/office/drawing/2014/main" id="{8D0C2EA0-627C-7346-86F2-A9A5BFEA9186}"/>
+                </a:ext>
+              </a:extLst>
+            </p:cNvPr>
+            <p:cNvCxnSpPr>
+              <a:cxnSpLocks/>
+              <a:stCxn id="55" idx="3"/>
+              <a:endCxn id="49" idx="2"/>
+            </p:cNvCxnSpPr>
+            <p:nvPr/>
+          </p:nvCxnSpPr>
+          <p:spPr>
+            <a:xfrm>
+              <a:off x="9427475" y="2768725"/>
+              <a:ext cx="934835" cy="81085"/>
+            </a:xfrm>
+            <a:prstGeom prst="line">
+              <a:avLst/>
+            </a:prstGeom>
+            <a:ln/>
+          </p:spPr>
+          <p:style>
+            <a:lnRef idx="3">
+              <a:schemeClr val="dk1"/>
+            </a:lnRef>
+            <a:fillRef idx="0">
+              <a:schemeClr val="dk1"/>
+            </a:fillRef>
+            <a:effectRef idx="2">
+              <a:schemeClr val="dk1"/>
+            </a:effectRef>
+            <a:fontRef idx="minor">
+              <a:schemeClr val="tx1"/>
+            </a:fontRef>
+          </p:style>
+        </p:cxnSp>
+        <p:sp>
+          <p:nvSpPr>
+            <p:cNvPr id="34" name="Pole tekstowe 33">
+              <a:extLst>
+                <a:ext uri="{FF2B5EF4-FFF2-40B4-BE49-F238E27FC236}">
+                  <a16:creationId xmlns:a16="http://schemas.microsoft.com/office/drawing/2014/main" id="{A8A858EF-9FF5-2144-9B16-EF5C1A8749A1}"/>
+                </a:ext>
+              </a:extLst>
+            </p:cNvPr>
+            <p:cNvSpPr txBox="1"/>
+            <p:nvPr/>
+          </p:nvSpPr>
+          <p:spPr>
+            <a:xfrm>
+              <a:off x="6083842" y="3410881"/>
+              <a:ext cx="1198880" cy="923330"/>
+            </a:xfrm>
+            <a:prstGeom prst="rect">
+              <a:avLst/>
+            </a:prstGeom>
+            <a:noFill/>
+          </p:spPr>
+          <p:txBody>
+            <a:bodyPr wrap="square" rtlCol="0">
+              <a:spAutoFit/>
+            </a:bodyPr>
+            <a:lstStyle>
+              <a:defPPr>
+                <a:defRPr lang="pl-PL"/>
+              </a:defPPr>
+            </a:lstStyle>
+            <a:p>
+              <a:pPr algn="ctr" rtl="0"/>
+              <a:r>
+                <a:rPr lang="pl-PL"/>
+                <a:t>Dodaj słowo kluczowe</a:t>
+              </a:r>
+            </a:p>
+          </p:txBody>
+        </p:sp>
+        <p:sp>
+          <p:nvSpPr>
+            <p:cNvPr id="35" name="Pole tekstowe 34">
+              <a:extLst>
+                <a:ext uri="{FF2B5EF4-FFF2-40B4-BE49-F238E27FC236}">
+                  <a16:creationId xmlns:a16="http://schemas.microsoft.com/office/drawing/2014/main" id="{A9F78683-D595-A942-B236-4AFF1FD95A8C}"/>
+                </a:ext>
+              </a:extLst>
+            </p:cNvPr>
+            <p:cNvSpPr txBox="1"/>
+            <p:nvPr/>
+          </p:nvSpPr>
+          <p:spPr>
+            <a:xfrm>
+              <a:off x="6973454" y="5320732"/>
+              <a:ext cx="1198880" cy="923330"/>
+            </a:xfrm>
+            <a:prstGeom prst="rect">
+              <a:avLst/>
+            </a:prstGeom>
+            <a:noFill/>
+          </p:spPr>
+          <p:txBody>
+            <a:bodyPr wrap="square" rtlCol="0">
+              <a:spAutoFit/>
+            </a:bodyPr>
+            <a:lstStyle>
+              <a:defPPr>
+                <a:defRPr lang="pl-PL"/>
+              </a:defPPr>
+            </a:lstStyle>
+            <a:p>
+              <a:pPr algn="ctr" rtl="0"/>
+              <a:r>
+                <a:rPr lang="pl-PL"/>
+                <a:t>Dodaj słowo kluczowe</a:t>
+              </a:r>
+            </a:p>
+          </p:txBody>
+        </p:sp>
+        <p:sp>
+          <p:nvSpPr>
+            <p:cNvPr id="37" name="Pole tekstowe 36">
+              <a:extLst>
+                <a:ext uri="{FF2B5EF4-FFF2-40B4-BE49-F238E27FC236}">
+                  <a16:creationId xmlns:a16="http://schemas.microsoft.com/office/drawing/2014/main" id="{EB5412BD-6F42-1645-94A1-A2F98C8F56F0}"/>
+                </a:ext>
+              </a:extLst>
+            </p:cNvPr>
+            <p:cNvSpPr txBox="1"/>
+            <p:nvPr/>
+          </p:nvSpPr>
+          <p:spPr>
+            <a:xfrm>
+              <a:off x="9591472" y="5638602"/>
+              <a:ext cx="1198880" cy="923330"/>
+            </a:xfrm>
+            <a:prstGeom prst="rect">
+              <a:avLst/>
+            </a:prstGeom>
+            <a:noFill/>
+          </p:spPr>
+          <p:txBody>
+            <a:bodyPr wrap="square" rtlCol="0">
+              <a:spAutoFit/>
+            </a:bodyPr>
+            <a:lstStyle>
+              <a:defPPr>
+                <a:defRPr lang="pl-PL"/>
+              </a:defPPr>
+            </a:lstStyle>
+            <a:p>
+              <a:pPr algn="ctr" rtl="0"/>
+              <a:r>
+                <a:rPr lang="pl-PL"/>
+                <a:t>Dodaj słowo kluczowe</a:t>
+              </a:r>
+            </a:p>
+          </p:txBody>
+        </p:sp>
+        <p:sp>
+          <p:nvSpPr>
+            <p:cNvPr id="38" name="Pole tekstowe 37">
+              <a:extLst>
+                <a:ext uri="{FF2B5EF4-FFF2-40B4-BE49-F238E27FC236}">
+                  <a16:creationId xmlns:a16="http://schemas.microsoft.com/office/drawing/2014/main" id="{20DDFF3D-5E90-9D40-86A9-817E6162C0FB}"/>
+                </a:ext>
+              </a:extLst>
+            </p:cNvPr>
+            <p:cNvSpPr txBox="1"/>
+            <p:nvPr/>
+          </p:nvSpPr>
+          <p:spPr>
+            <a:xfrm>
+              <a:off x="10241590" y="3412384"/>
+              <a:ext cx="1161010" cy="923330"/>
+            </a:xfrm>
+            <a:prstGeom prst="rect">
+              <a:avLst/>
+            </a:prstGeom>
+            <a:noFill/>
+          </p:spPr>
+          <p:txBody>
+            <a:bodyPr wrap="square" rtlCol="0">
+              <a:spAutoFit/>
+            </a:bodyPr>
+            <a:lstStyle>
+              <a:defPPr>
+                <a:defRPr lang="pl-PL"/>
+              </a:defPPr>
+            </a:lstStyle>
+            <a:p>
+              <a:pPr algn="ctr" rtl="0"/>
+              <a:r>
+                <a:rPr lang="pl-PL"/>
+                <a:t>Dodaj słowo kluczowe</a:t>
+              </a:r>
+            </a:p>
+          </p:txBody>
+        </p:sp>
+        <p:sp>
+          <p:nvSpPr>
+            <p:cNvPr id="42" name="Owal 41" descr="kształt owalny">
+              <a:extLst>
+                <a:ext uri="{FF2B5EF4-FFF2-40B4-BE49-F238E27FC236}">
+                  <a16:creationId xmlns:a16="http://schemas.microsoft.com/office/drawing/2014/main" id="{10D91E47-9024-2544-A774-5F83E2700F0A}"/>
+                </a:ext>
+              </a:extLst>
+            </p:cNvPr>
+            <p:cNvSpPr/>
+            <p:nvPr/>
+          </p:nvSpPr>
+          <p:spPr>
+            <a:xfrm>
+              <a:off x="9681281" y="4575965"/>
+              <a:ext cx="1000125" cy="1000125"/>
+            </a:xfrm>
+            <a:prstGeom prst="ellipse">
+              <a:avLst/>
+            </a:prstGeom>
+            <a:solidFill>
+              <a:schemeClr val="accent3"/>
+            </a:solidFill>
+            <a:ln>
+              <a:noFill/>
+            </a:ln>
+          </p:spPr>
+          <p:style>
+            <a:lnRef idx="2">
+              <a:schemeClr val="accent1">
+                <a:shade val="50000"/>
+              </a:schemeClr>
+            </a:lnRef>
+            <a:fillRef idx="1">
+              <a:schemeClr val="accent1"/>
+            </a:fillRef>
+            <a:effectRef idx="0">
+              <a:schemeClr val="accent1"/>
+            </a:effectRef>
+            <a:fontRef idx="minor">
+              <a:schemeClr val="lt1"/>
+            </a:fontRef>
+          </p:style>
+          <p:txBody>
+            <a:bodyPr lIns="0" tIns="0" rIns="0" bIns="0" rtlCol="0" anchor="t"/>
+            <a:lstStyle>
+              <a:defPPr>
+                <a:defRPr lang="pl-PL"/>
+              </a:defPPr>
+            </a:lstStyle>
+            <a:p>
+              <a:pPr algn="ctr" rtl="0"/>
+              <a:endParaRPr lang="pl-PL" sz="1000"/>
+            </a:p>
+          </p:txBody>
+        </p:sp>
+        <p:sp>
+          <p:nvSpPr>
+            <p:cNvPr id="46" name="Owal 45" descr="kształt owalny">
+              <a:extLst>
+                <a:ext uri="{FF2B5EF4-FFF2-40B4-BE49-F238E27FC236}">
+                  <a16:creationId xmlns:a16="http://schemas.microsoft.com/office/drawing/2014/main" id="{8CC00D4F-2FB0-C340-B932-176E1760E489}"/>
+                </a:ext>
+              </a:extLst>
+            </p:cNvPr>
+            <p:cNvSpPr/>
+            <p:nvPr/>
+          </p:nvSpPr>
+          <p:spPr>
+            <a:xfrm>
+              <a:off x="6191627" y="2349747"/>
+              <a:ext cx="1000125" cy="1000125"/>
+            </a:xfrm>
+            <a:prstGeom prst="ellipse">
+              <a:avLst/>
+            </a:prstGeom>
+            <a:noFill/>
+            <a:ln w="25400">
+              <a:solidFill>
+                <a:schemeClr val="accent1"/>
+              </a:solidFill>
+              <a:prstDash val="dash"/>
+            </a:ln>
+          </p:spPr>
+          <p:style>
+            <a:lnRef idx="2">
+              <a:schemeClr val="accent1">
+                <a:shade val="50000"/>
+              </a:schemeClr>
+            </a:lnRef>
+            <a:fillRef idx="1">
+              <a:schemeClr val="accent1"/>
+            </a:fillRef>
+            <a:effectRef idx="0">
+              <a:schemeClr val="accent1"/>
+            </a:effectRef>
+            <a:fontRef idx="minor">
+              <a:schemeClr val="lt1"/>
+            </a:fontRef>
+          </p:style>
+          <p:txBody>
+            <a:bodyPr lIns="0" tIns="0" rIns="0" bIns="0" rtlCol="0" anchor="t"/>
+            <a:lstStyle>
+              <a:defPPr>
+                <a:defRPr lang="pl-PL"/>
+              </a:defPPr>
+            </a:lstStyle>
+            <a:p>
+              <a:pPr algn="ctr" rtl="0"/>
+              <a:endParaRPr lang="pl-PL" sz="1000"/>
+            </a:p>
+          </p:txBody>
+        </p:sp>
+        <p:sp>
+          <p:nvSpPr>
+            <p:cNvPr id="49" name="Owal 48" descr="kształt owalny">
+              <a:extLst>
+                <a:ext uri="{FF2B5EF4-FFF2-40B4-BE49-F238E27FC236}">
+                  <a16:creationId xmlns:a16="http://schemas.microsoft.com/office/drawing/2014/main" id="{CDE26E72-3C77-3041-AAF3-D537C0C190BB}"/>
+                </a:ext>
+              </a:extLst>
+            </p:cNvPr>
+            <p:cNvSpPr/>
+            <p:nvPr/>
+          </p:nvSpPr>
+          <p:spPr>
+            <a:xfrm>
+              <a:off x="10362310" y="2349747"/>
+              <a:ext cx="1000125" cy="1000125"/>
+            </a:xfrm>
+            <a:prstGeom prst="ellipse">
+              <a:avLst/>
+            </a:prstGeom>
+            <a:solidFill>
+              <a:schemeClr val="accent2"/>
+            </a:solidFill>
+            <a:ln>
+              <a:noFill/>
+            </a:ln>
+          </p:spPr>
+          <p:style>
+            <a:lnRef idx="2">
+              <a:schemeClr val="accent1">
+                <a:shade val="50000"/>
+              </a:schemeClr>
+            </a:lnRef>
+            <a:fillRef idx="1">
+              <a:schemeClr val="accent1"/>
+            </a:fillRef>
+            <a:effectRef idx="0">
+              <a:schemeClr val="accent1"/>
+            </a:effectRef>
+            <a:fontRef idx="minor">
+              <a:schemeClr val="lt1"/>
+            </a:fontRef>
+          </p:style>
+          <p:txBody>
+            <a:bodyPr lIns="0" tIns="0" rIns="0" bIns="0" rtlCol="0" anchor="t"/>
+            <a:lstStyle>
+              <a:defPPr>
+                <a:defRPr lang="pl-PL"/>
+              </a:defPPr>
+            </a:lstStyle>
+            <a:p>
+              <a:pPr algn="ctr" rtl="0"/>
+              <a:endParaRPr lang="pl-PL" sz="1000"/>
+            </a:p>
+          </p:txBody>
+        </p:sp>
+        <p:sp>
+          <p:nvSpPr>
+            <p:cNvPr id="53" name="Owal 52" descr="kształt owalny">
+              <a:extLst>
+                <a:ext uri="{FF2B5EF4-FFF2-40B4-BE49-F238E27FC236}">
+                  <a16:creationId xmlns:a16="http://schemas.microsoft.com/office/drawing/2014/main" id="{66A5825C-2801-A14C-9E83-5D06EC19285B}"/>
+                </a:ext>
+              </a:extLst>
+            </p:cNvPr>
+            <p:cNvSpPr/>
+            <p:nvPr/>
+          </p:nvSpPr>
+          <p:spPr>
+            <a:xfrm>
+              <a:off x="7960738" y="1939633"/>
+              <a:ext cx="1630734" cy="1630734"/>
+            </a:xfrm>
+            <a:prstGeom prst="ellipse">
+              <a:avLst/>
+            </a:prstGeom>
+            <a:solidFill>
+              <a:schemeClr val="bg2">
+                <a:lumMod val="25000"/>
+              </a:schemeClr>
+            </a:solidFill>
+            <a:ln>
+              <a:noFill/>
+            </a:ln>
+          </p:spPr>
+          <p:style>
+            <a:lnRef idx="2">
+              <a:schemeClr val="accent1">
+                <a:shade val="50000"/>
+              </a:schemeClr>
+            </a:lnRef>
+            <a:fillRef idx="1">
+              <a:schemeClr val="accent1"/>
+            </a:fillRef>
+            <a:effectRef idx="0">
+              <a:schemeClr val="accent1"/>
+            </a:effectRef>
+            <a:fontRef idx="minor">
+              <a:schemeClr val="lt1"/>
+            </a:fontRef>
+          </p:style>
+          <p:txBody>
+            <a:bodyPr rtlCol="0" anchor="ctr"/>
+            <a:lstStyle>
+              <a:defPPr>
+                <a:defRPr lang="pl-PL"/>
+              </a:defPPr>
+            </a:lstStyle>
+            <a:p>
+              <a:pPr algn="ctr" rtl="0"/>
+              <a:endParaRPr lang="pl-PL"/>
+            </a:p>
+          </p:txBody>
+        </p:sp>
+        <p:sp>
+          <p:nvSpPr>
+            <p:cNvPr id="55" name="Pole tekstowe 54">
+              <a:extLst>
+                <a:ext uri="{FF2B5EF4-FFF2-40B4-BE49-F238E27FC236}">
+                  <a16:creationId xmlns:a16="http://schemas.microsoft.com/office/drawing/2014/main" id="{D9B441DE-399E-EA46-A84F-0D58A73CFF03}"/>
+                </a:ext>
+              </a:extLst>
+            </p:cNvPr>
+            <p:cNvSpPr txBox="1"/>
+            <p:nvPr/>
+          </p:nvSpPr>
+          <p:spPr>
+            <a:xfrm>
+              <a:off x="8100607" y="2307060"/>
+              <a:ext cx="1326868" cy="923330"/>
+            </a:xfrm>
+            <a:prstGeom prst="rect">
+              <a:avLst/>
+            </a:prstGeom>
+            <a:noFill/>
+          </p:spPr>
+          <p:txBody>
+            <a:bodyPr wrap="square" rtlCol="0">
+              <a:spAutoFit/>
+            </a:bodyPr>
+            <a:lstStyle>
+              <a:defPPr>
+                <a:defRPr lang="pl-PL"/>
+              </a:defPPr>
+            </a:lstStyle>
+            <a:p>
+              <a:pPr algn="ctr" rtl="0"/>
+              <a:r>
+                <a:rPr lang="pl-PL">
+                  <a:solidFill>
+                    <a:schemeClr val="bg1"/>
+                  </a:solidFill>
+                </a:rPr>
+                <a:t>Dodaj swój centralny pomysł</a:t>
+              </a:r>
+            </a:p>
+          </p:txBody>
+        </p:sp>
+        <p:sp>
+          <p:nvSpPr>
+            <p:cNvPr id="57" name="Owal 56" descr="kształt owalny">
+              <a:extLst>
+                <a:ext uri="{FF2B5EF4-FFF2-40B4-BE49-F238E27FC236}">
+                  <a16:creationId xmlns:a16="http://schemas.microsoft.com/office/drawing/2014/main" id="{BF8329D4-5928-2B49-81AA-F9FA7137D89D}"/>
+                </a:ext>
+              </a:extLst>
+            </p:cNvPr>
+            <p:cNvSpPr/>
+            <p:nvPr/>
+          </p:nvSpPr>
+          <p:spPr>
+            <a:xfrm>
+              <a:off x="7081628" y="4258095"/>
+              <a:ext cx="1000125" cy="1000125"/>
+            </a:xfrm>
+            <a:prstGeom prst="ellipse">
+              <a:avLst/>
+            </a:prstGeom>
+            <a:noFill/>
+            <a:ln w="25400">
+              <a:solidFill>
+                <a:schemeClr val="accent6"/>
+              </a:solidFill>
+              <a:prstDash val="dash"/>
+            </a:ln>
+          </p:spPr>
+          <p:style>
+            <a:lnRef idx="2">
+              <a:schemeClr val="accent1">
+                <a:shade val="50000"/>
+              </a:schemeClr>
+            </a:lnRef>
+            <a:fillRef idx="1">
+              <a:schemeClr val="accent1"/>
+            </a:fillRef>
+            <a:effectRef idx="0">
+              <a:schemeClr val="accent1"/>
+            </a:effectRef>
+            <a:fontRef idx="minor">
+              <a:schemeClr val="lt1"/>
+            </a:fontRef>
+          </p:style>
+          <p:txBody>
+            <a:bodyPr lIns="0" tIns="0" rIns="0" bIns="0" rtlCol="0" anchor="t"/>
+            <a:lstStyle>
+              <a:defPPr>
+                <a:defRPr lang="pl-PL"/>
+              </a:defPPr>
+            </a:lstStyle>
+            <a:p>
+              <a:pPr algn="ctr" rtl="0"/>
+              <a:endParaRPr lang="pl-PL" sz="1000"/>
+            </a:p>
+          </p:txBody>
+        </p:sp>
+      </p:grpSp>
+    </p:spTree>
+    <p:extLst>
+      <p:ext uri="{BB962C8B-B14F-4D97-AF65-F5344CB8AC3E}">
+        <p14:creationId xmlns:p14="http://schemas.microsoft.com/office/powerpoint/2010/main" val="4052214363"/>
+      </p:ext>
+    </p:extLst>
+  </p:cSld>
+  <p:clrMapOvr>
+    <a:masterClrMapping/>
+  </p:clrMapOvr>
+</p:sld>
+</file>
+
+<file path=ppt/slides/slide11.xml><?xml version="1.0" encoding="utf-8"?>
 <p:sld xmlns:a="http://schemas.openxmlformats.org/drawingml/2006/main" xmlns:r="http://schemas.openxmlformats.org/officeDocument/2006/relationships" xmlns:p="http://schemas.openxmlformats.org/presentationml/2006/main">
   <p:cSld>
     <p:spTree>
@@ -12346,7 +14008,7 @@
 </p:sld>
 </file>
 
-<file path=ppt/slides/slide11.xml><?xml version="1.0" encoding="utf-8"?>
+<file path=ppt/slides/slide12.xml><?xml version="1.0" encoding="utf-8"?>
 <p:sld xmlns:a="http://schemas.openxmlformats.org/drawingml/2006/main" xmlns:r="http://schemas.openxmlformats.org/officeDocument/2006/relationships" xmlns:p="http://schemas.openxmlformats.org/presentationml/2006/main">
   <p:cSld>
     <p:spTree>
@@ -14394,7 +16056,7 @@
 </p:sld>
 </file>
 
-<file path=ppt/slides/slide12.xml><?xml version="1.0" encoding="utf-8"?>
+<file path=ppt/slides/slide13.xml><?xml version="1.0" encoding="utf-8"?>
 <p:sld xmlns:a="http://schemas.openxmlformats.org/drawingml/2006/main" xmlns:r="http://schemas.openxmlformats.org/officeDocument/2006/relationships" xmlns:p="http://schemas.openxmlformats.org/presentationml/2006/main">
   <p:cSld>
     <p:spTree>
@@ -19173,6 +20835,171 @@
 </file>
 
 <file path=ppt/slides/slide8.xml><?xml version="1.0" encoding="utf-8"?>
+<p:sld xmlns:a="http://schemas.openxmlformats.org/drawingml/2006/main" xmlns:r="http://schemas.openxmlformats.org/officeDocument/2006/relationships" xmlns:p="http://schemas.openxmlformats.org/presentationml/2006/main">
+  <p:cSld>
+    <p:spTree>
+      <p:nvGrpSpPr>
+        <p:cNvPr id="1" name=""/>
+        <p:cNvGrpSpPr/>
+        <p:nvPr/>
+      </p:nvGrpSpPr>
+      <p:grpSpPr>
+        <a:xfrm>
+          <a:off x="0" y="0"/>
+          <a:ext cx="0" cy="0"/>
+          <a:chOff x="0" y="0"/>
+          <a:chExt cx="0" cy="0"/>
+        </a:xfrm>
+      </p:grpSpPr>
+      <p:sp>
+        <p:nvSpPr>
+          <p:cNvPr id="2" name="Tytuł 1">
+            <a:extLst>
+              <a:ext uri="{FF2B5EF4-FFF2-40B4-BE49-F238E27FC236}">
+                <a16:creationId xmlns:a16="http://schemas.microsoft.com/office/drawing/2014/main" id="{0953BD17-A7FE-4352-9D7A-10482C6865A6}"/>
+              </a:ext>
+            </a:extLst>
+          </p:cNvPr>
+          <p:cNvSpPr>
+            <a:spLocks noGrp="1"/>
+          </p:cNvSpPr>
+          <p:nvPr>
+            <p:ph type="title"/>
+          </p:nvPr>
+        </p:nvSpPr>
+        <p:spPr>
+          <a:xfrm>
+            <a:off x="444500" y="412137"/>
+            <a:ext cx="9146972" cy="640080"/>
+          </a:xfrm>
+        </p:spPr>
+        <p:txBody>
+          <a:bodyPr rtlCol="0"/>
+          <a:lstStyle>
+            <a:defPPr>
+              <a:defRPr lang="pl-PL"/>
+            </a:defPPr>
+          </a:lstStyle>
+          <a:p>
+            <a:pPr lvl="0"/>
+            <a:r>
+              <a:rPr lang="en-US" dirty="0"/>
+              <a:t>C</a:t>
+            </a:r>
+            <a:r>
+              <a:rPr lang="en-US" b="0" i="0" u="none" noProof="0" dirty="0" err="1"/>
+              <a:t>onverting</a:t>
+            </a:r>
+            <a:r>
+              <a:rPr lang="en-US" b="0" i="0" u="none" noProof="0" dirty="0"/>
+              <a:t> the Compressed CSV Files to Parquet files.</a:t>
+            </a:r>
+            <a:endParaRPr lang="pl-PL" dirty="0"/>
+          </a:p>
+        </p:txBody>
+      </p:sp>
+      <p:sp>
+        <p:nvSpPr>
+          <p:cNvPr id="3" name="Zawartość — symbol zastępczy 2">
+            <a:extLst>
+              <a:ext uri="{FF2B5EF4-FFF2-40B4-BE49-F238E27FC236}">
+                <a16:creationId xmlns:a16="http://schemas.microsoft.com/office/drawing/2014/main" id="{4B3C1D5B-11AC-48D7-B0A0-63BC88617D64}"/>
+              </a:ext>
+            </a:extLst>
+          </p:cNvPr>
+          <p:cNvSpPr>
+            <a:spLocks noGrp="1"/>
+          </p:cNvSpPr>
+          <p:nvPr>
+            <p:ph sz="quarter" idx="10"/>
+          </p:nvPr>
+        </p:nvSpPr>
+        <p:spPr>
+          <a:xfrm>
+            <a:off x="444500" y="1509612"/>
+            <a:ext cx="5875867" cy="454655"/>
+          </a:xfrm>
+        </p:spPr>
+        <p:txBody>
+          <a:bodyPr rtlCol="0">
+            <a:noAutofit/>
+          </a:bodyPr>
+          <a:lstStyle>
+            <a:defPPr>
+              <a:defRPr lang="pl-PL"/>
+            </a:defPPr>
+          </a:lstStyle>
+          <a:p>
+            <a:pPr marL="0" indent="0" rtl="0">
+              <a:spcAft>
+                <a:spcPts val="1200"/>
+              </a:spcAft>
+              <a:buNone/>
+            </a:pPr>
+            <a:r>
+              <a:rPr lang="en-US" sz="2000" b="0" i="0" dirty="0">
+                <a:solidFill>
+                  <a:srgbClr val="374151"/>
+                </a:solidFill>
+                <a:effectLst/>
+                <a:latin typeface="Söhne"/>
+              </a:rPr>
+              <a:t>Preparing functions to be used during the conversion</a:t>
+            </a:r>
+            <a:r>
+              <a:rPr lang="pl-PL" sz="1600" dirty="0">
+                <a:latin typeface="Segoe UI" panose="020B0502040204020203" pitchFamily="34" charset="0"/>
+                <a:cs typeface="Segoe UI" panose="020B0502040204020203" pitchFamily="34" charset="0"/>
+              </a:rPr>
+              <a:t>:</a:t>
+            </a:r>
+          </a:p>
+        </p:txBody>
+      </p:sp>
+      <p:pic>
+        <p:nvPicPr>
+          <p:cNvPr id="20" name="Picture 19">
+            <a:extLst>
+              <a:ext uri="{FF2B5EF4-FFF2-40B4-BE49-F238E27FC236}">
+                <a16:creationId xmlns:a16="http://schemas.microsoft.com/office/drawing/2014/main" id="{F703EEBA-4CD4-4BE1-2A99-343FD19D6A3D}"/>
+              </a:ext>
+            </a:extLst>
+          </p:cNvPr>
+          <p:cNvPicPr>
+            <a:picLocks noChangeAspect="1"/>
+          </p:cNvPicPr>
+          <p:nvPr/>
+        </p:nvPicPr>
+        <p:blipFill>
+          <a:blip r:embed="rId3"/>
+          <a:stretch>
+            <a:fillRect/>
+          </a:stretch>
+        </p:blipFill>
+        <p:spPr>
+          <a:xfrm>
+            <a:off x="1468966" y="1964267"/>
+            <a:ext cx="9254067" cy="4770285"/>
+          </a:xfrm>
+          <a:prstGeom prst="rect">
+            <a:avLst/>
+          </a:prstGeom>
+        </p:spPr>
+      </p:pic>
+    </p:spTree>
+    <p:extLst>
+      <p:ext uri="{BB962C8B-B14F-4D97-AF65-F5344CB8AC3E}">
+        <p14:creationId xmlns:p14="http://schemas.microsoft.com/office/powerpoint/2010/main" val="609537339"/>
+      </p:ext>
+    </p:extLst>
+  </p:cSld>
+  <p:clrMapOvr>
+    <a:masterClrMapping/>
+  </p:clrMapOvr>
+</p:sld>
+</file>
+
+<file path=ppt/slides/slide9.xml><?xml version="1.0" encoding="utf-8"?>
 <p:sld xmlns:a="http://schemas.openxmlformats.org/drawingml/2006/main" xmlns:r="http://schemas.openxmlformats.org/officeDocument/2006/relationships" xmlns:p="http://schemas.openxmlformats.org/presentationml/2006/main">
   <p:cSld>
     <p:spTree>
@@ -20226,1506 +22053,7 @@
     </p:spTree>
     <p:extLst>
       <p:ext uri="{BB962C8B-B14F-4D97-AF65-F5344CB8AC3E}">
-        <p14:creationId xmlns:p14="http://schemas.microsoft.com/office/powerpoint/2010/main" val="609537339"/>
-      </p:ext>
-    </p:extLst>
-  </p:cSld>
-  <p:clrMapOvr>
-    <a:masterClrMapping/>
-  </p:clrMapOvr>
-</p:sld>
-</file>
-
-<file path=ppt/slides/slide9.xml><?xml version="1.0" encoding="utf-8"?>
-<p:sld xmlns:a="http://schemas.openxmlformats.org/drawingml/2006/main" xmlns:r="http://schemas.openxmlformats.org/officeDocument/2006/relationships" xmlns:p="http://schemas.openxmlformats.org/presentationml/2006/main">
-  <p:cSld>
-    <p:spTree>
-      <p:nvGrpSpPr>
-        <p:cNvPr id="1" name=""/>
-        <p:cNvGrpSpPr/>
-        <p:nvPr/>
-      </p:nvGrpSpPr>
-      <p:grpSpPr>
-        <a:xfrm>
-          <a:off x="0" y="0"/>
-          <a:ext cx="0" cy="0"/>
-          <a:chOff x="0" y="0"/>
-          <a:chExt cx="0" cy="0"/>
-        </a:xfrm>
-      </p:grpSpPr>
-      <p:sp>
-        <p:nvSpPr>
-          <p:cNvPr id="2" name="Tytuł 1">
-            <a:extLst>
-              <a:ext uri="{FF2B5EF4-FFF2-40B4-BE49-F238E27FC236}">
-                <a16:creationId xmlns:a16="http://schemas.microsoft.com/office/drawing/2014/main" id="{F07E19FF-DAD9-4AB4-9D83-993EE9FE6846}"/>
-              </a:ext>
-            </a:extLst>
-          </p:cNvPr>
-          <p:cNvSpPr>
-            <a:spLocks noGrp="1"/>
-          </p:cNvSpPr>
-          <p:nvPr>
-            <p:ph type="title"/>
-          </p:nvPr>
-        </p:nvSpPr>
-        <p:spPr>
-          <a:xfrm>
-            <a:off x="444500" y="412137"/>
-            <a:ext cx="9146972" cy="640080"/>
-          </a:xfrm>
-        </p:spPr>
-        <p:txBody>
-          <a:bodyPr rtlCol="0">
-            <a:normAutofit/>
-          </a:bodyPr>
-          <a:lstStyle>
-            <a:defPPr>
-              <a:defRPr lang="pl-PL"/>
-            </a:defPPr>
-          </a:lstStyle>
-          <a:p>
-            <a:pPr rtl="0"/>
-            <a:r>
-              <a:rPr lang="pl-PL" b="1">
-                <a:latin typeface="Segoe UI Semibold" panose="020B0502040204020203" pitchFamily="34" charset="0"/>
-                <a:cs typeface="Segoe UI Semibold" panose="020B0502040204020203" pitchFamily="34" charset="0"/>
-              </a:rPr>
-              <a:t>Wypróbuj!</a:t>
-            </a:r>
-          </a:p>
-        </p:txBody>
-      </p:sp>
-      <p:sp>
-        <p:nvSpPr>
-          <p:cNvPr id="40" name="Owal 39" descr="Mały okrąg">
-            <a:extLst>
-              <a:ext uri="{FF2B5EF4-FFF2-40B4-BE49-F238E27FC236}">
-                <a16:creationId xmlns:a16="http://schemas.microsoft.com/office/drawing/2014/main" id="{0C3A28BB-9675-8648-9563-A663628F48F5}"/>
-              </a:ext>
-            </a:extLst>
-          </p:cNvPr>
-          <p:cNvSpPr>
-            <a:spLocks noChangeAspect="1"/>
-          </p:cNvSpPr>
-          <p:nvPr/>
-        </p:nvSpPr>
-        <p:spPr bwMode="blackWhite">
-          <a:xfrm>
-            <a:off x="530197" y="1503788"/>
-            <a:ext cx="409838" cy="409838"/>
-          </a:xfrm>
-          <a:prstGeom prst="ellipse">
-            <a:avLst/>
-          </a:prstGeom>
-          <a:solidFill>
-            <a:schemeClr val="accent2"/>
-          </a:solidFill>
-          <a:ln>
-            <a:noFill/>
-          </a:ln>
-        </p:spPr>
-        <p:style>
-          <a:lnRef idx="2">
-            <a:schemeClr val="accent1">
-              <a:shade val="50000"/>
-            </a:schemeClr>
-          </a:lnRef>
-          <a:fillRef idx="1">
-            <a:schemeClr val="accent1"/>
-          </a:fillRef>
-          <a:effectRef idx="0">
-            <a:schemeClr val="accent1"/>
-          </a:effectRef>
-          <a:fontRef idx="minor">
-            <a:schemeClr val="lt1"/>
-          </a:fontRef>
-        </p:style>
-        <p:txBody>
-          <a:bodyPr rtlCol="0" anchor="ctr"/>
-          <a:lstStyle>
-            <a:defPPr>
-              <a:defRPr lang="pl-PL"/>
-            </a:defPPr>
-          </a:lstStyle>
-          <a:p>
-            <a:pPr algn="ctr" rtl="0"/>
-            <a:endParaRPr lang="pl-PL"/>
-          </a:p>
-        </p:txBody>
-      </p:sp>
-      <p:sp>
-        <p:nvSpPr>
-          <p:cNvPr id="41" name="Pole tekstowe 40" descr="Liczba 1">
-            <a:extLst>
-              <a:ext uri="{FF2B5EF4-FFF2-40B4-BE49-F238E27FC236}">
-                <a16:creationId xmlns:a16="http://schemas.microsoft.com/office/drawing/2014/main" id="{516D502C-EEB8-7641-9141-D6049BAE3252}"/>
-              </a:ext>
-            </a:extLst>
-          </p:cNvPr>
-          <p:cNvSpPr txBox="1">
-            <a:spLocks noChangeAspect="1"/>
-          </p:cNvSpPr>
-          <p:nvPr/>
-        </p:nvSpPr>
-        <p:spPr bwMode="blackWhite">
-          <a:xfrm>
-            <a:off x="457571" y="1520182"/>
-            <a:ext cx="558179" cy="369332"/>
-          </a:xfrm>
-          <a:prstGeom prst="rect">
-            <a:avLst/>
-          </a:prstGeom>
-          <a:noFill/>
-        </p:spPr>
-        <p:txBody>
-          <a:bodyPr wrap="square" rtlCol="0">
-            <a:spAutoFit/>
-          </a:bodyPr>
-          <a:lstStyle>
-            <a:defPPr>
-              <a:defRPr lang="pl-PL"/>
-            </a:defPPr>
-          </a:lstStyle>
-          <a:p>
-            <a:pPr algn="ctr" rtl="0"/>
-            <a:r>
-              <a:rPr lang="pl-PL">
-                <a:solidFill>
-                  <a:schemeClr val="bg1"/>
-                </a:solidFill>
-                <a:cs typeface="Segoe UI Semibold" panose="020B0702040204020203" pitchFamily="34" charset="0"/>
-              </a:rPr>
-              <a:t>1</a:t>
-            </a:r>
-          </a:p>
-        </p:txBody>
-      </p:sp>
-      <p:sp>
-        <p:nvSpPr>
-          <p:cNvPr id="43" name="Owal 42" descr="Mały okrąg">
-            <a:extLst>
-              <a:ext uri="{FF2B5EF4-FFF2-40B4-BE49-F238E27FC236}">
-                <a16:creationId xmlns:a16="http://schemas.microsoft.com/office/drawing/2014/main" id="{E3BF4CBA-96D8-844A-846E-482C93C4A9BA}"/>
-              </a:ext>
-            </a:extLst>
-          </p:cNvPr>
-          <p:cNvSpPr>
-            <a:spLocks noChangeAspect="1"/>
-          </p:cNvSpPr>
-          <p:nvPr/>
-        </p:nvSpPr>
-        <p:spPr bwMode="blackWhite">
-          <a:xfrm>
-            <a:off x="523507" y="2496858"/>
-            <a:ext cx="409838" cy="409838"/>
-          </a:xfrm>
-          <a:prstGeom prst="ellipse">
-            <a:avLst/>
-          </a:prstGeom>
-          <a:solidFill>
-            <a:schemeClr val="accent2"/>
-          </a:solidFill>
-          <a:ln>
-            <a:noFill/>
-          </a:ln>
-        </p:spPr>
-        <p:style>
-          <a:lnRef idx="2">
-            <a:schemeClr val="accent1">
-              <a:shade val="50000"/>
-            </a:schemeClr>
-          </a:lnRef>
-          <a:fillRef idx="1">
-            <a:schemeClr val="accent1"/>
-          </a:fillRef>
-          <a:effectRef idx="0">
-            <a:schemeClr val="accent1"/>
-          </a:effectRef>
-          <a:fontRef idx="minor">
-            <a:schemeClr val="lt1"/>
-          </a:fontRef>
-        </p:style>
-        <p:txBody>
-          <a:bodyPr rtlCol="0" anchor="ctr"/>
-          <a:lstStyle>
-            <a:defPPr>
-              <a:defRPr lang="pl-PL"/>
-            </a:defPPr>
-          </a:lstStyle>
-          <a:p>
-            <a:pPr algn="ctr" rtl="0"/>
-            <a:endParaRPr lang="pl-PL"/>
-          </a:p>
-        </p:txBody>
-      </p:sp>
-      <p:sp>
-        <p:nvSpPr>
-          <p:cNvPr id="44" name="Pole tekstowe 43" descr="Liczba 2">
-            <a:extLst>
-              <a:ext uri="{FF2B5EF4-FFF2-40B4-BE49-F238E27FC236}">
-                <a16:creationId xmlns:a16="http://schemas.microsoft.com/office/drawing/2014/main" id="{4EE65486-1766-B74A-9043-DE141DDF4363}"/>
-              </a:ext>
-            </a:extLst>
-          </p:cNvPr>
-          <p:cNvSpPr txBox="1">
-            <a:spLocks noChangeAspect="1"/>
-          </p:cNvSpPr>
-          <p:nvPr/>
-        </p:nvSpPr>
-        <p:spPr bwMode="blackWhite">
-          <a:xfrm>
-            <a:off x="488894" y="2503896"/>
-            <a:ext cx="493917" cy="369332"/>
-          </a:xfrm>
-          <a:prstGeom prst="rect">
-            <a:avLst/>
-          </a:prstGeom>
-          <a:noFill/>
-        </p:spPr>
-        <p:txBody>
-          <a:bodyPr wrap="square" rtlCol="0">
-            <a:spAutoFit/>
-          </a:bodyPr>
-          <a:lstStyle>
-            <a:defPPr>
-              <a:defRPr lang="pl-PL"/>
-            </a:defPPr>
-          </a:lstStyle>
-          <a:p>
-            <a:pPr algn="ctr" rtl="0"/>
-            <a:r>
-              <a:rPr lang="pl-PL">
-                <a:solidFill>
-                  <a:schemeClr val="bg1"/>
-                </a:solidFill>
-                <a:cs typeface="Segoe UI Semibold" panose="020B0702040204020203" pitchFamily="34" charset="0"/>
-              </a:rPr>
-              <a:t>2</a:t>
-            </a:r>
-          </a:p>
-        </p:txBody>
-      </p:sp>
-      <p:sp>
-        <p:nvSpPr>
-          <p:cNvPr id="45" name="Owal 44" descr="Mały okrąg">
-            <a:extLst>
-              <a:ext uri="{FF2B5EF4-FFF2-40B4-BE49-F238E27FC236}">
-                <a16:creationId xmlns:a16="http://schemas.microsoft.com/office/drawing/2014/main" id="{7BB2B4E3-317E-FC4B-B166-28E804B11BF6}"/>
-              </a:ext>
-            </a:extLst>
-          </p:cNvPr>
-          <p:cNvSpPr>
-            <a:spLocks noChangeAspect="1"/>
-          </p:cNvSpPr>
-          <p:nvPr/>
-        </p:nvSpPr>
-        <p:spPr bwMode="blackWhite">
-          <a:xfrm>
-            <a:off x="511049" y="3127810"/>
-            <a:ext cx="409838" cy="409838"/>
-          </a:xfrm>
-          <a:prstGeom prst="ellipse">
-            <a:avLst/>
-          </a:prstGeom>
-          <a:solidFill>
-            <a:schemeClr val="accent2"/>
-          </a:solidFill>
-          <a:ln>
-            <a:noFill/>
-          </a:ln>
-        </p:spPr>
-        <p:style>
-          <a:lnRef idx="2">
-            <a:schemeClr val="accent1">
-              <a:shade val="50000"/>
-            </a:schemeClr>
-          </a:lnRef>
-          <a:fillRef idx="1">
-            <a:schemeClr val="accent1"/>
-          </a:fillRef>
-          <a:effectRef idx="0">
-            <a:schemeClr val="accent1"/>
-          </a:effectRef>
-          <a:fontRef idx="minor">
-            <a:schemeClr val="lt1"/>
-          </a:fontRef>
-        </p:style>
-        <p:txBody>
-          <a:bodyPr rtlCol="0" anchor="ctr"/>
-          <a:lstStyle>
-            <a:defPPr>
-              <a:defRPr lang="pl-PL"/>
-            </a:defPPr>
-          </a:lstStyle>
-          <a:p>
-            <a:pPr algn="ctr" rtl="0"/>
-            <a:endParaRPr lang="pl-PL"/>
-          </a:p>
-        </p:txBody>
-      </p:sp>
-      <p:sp>
-        <p:nvSpPr>
-          <p:cNvPr id="47" name="Pole tekstowe 46" descr="Liczba 3">
-            <a:extLst>
-              <a:ext uri="{FF2B5EF4-FFF2-40B4-BE49-F238E27FC236}">
-                <a16:creationId xmlns:a16="http://schemas.microsoft.com/office/drawing/2014/main" id="{04248951-1086-2B45-ACBA-B055B8A9B128}"/>
-              </a:ext>
-            </a:extLst>
-          </p:cNvPr>
-          <p:cNvSpPr txBox="1">
-            <a:spLocks noChangeAspect="1"/>
-          </p:cNvSpPr>
-          <p:nvPr/>
-        </p:nvSpPr>
-        <p:spPr bwMode="blackWhite">
-          <a:xfrm>
-            <a:off x="444500" y="3151746"/>
-            <a:ext cx="558179" cy="369332"/>
-          </a:xfrm>
-          <a:prstGeom prst="rect">
-            <a:avLst/>
-          </a:prstGeom>
-          <a:noFill/>
-        </p:spPr>
-        <p:txBody>
-          <a:bodyPr wrap="square" rtlCol="0">
-            <a:spAutoFit/>
-          </a:bodyPr>
-          <a:lstStyle>
-            <a:defPPr>
-              <a:defRPr lang="pl-PL"/>
-            </a:defPPr>
-          </a:lstStyle>
-          <a:p>
-            <a:pPr algn="ctr" rtl="0"/>
-            <a:r>
-              <a:rPr lang="pl-PL">
-                <a:solidFill>
-                  <a:schemeClr val="bg1"/>
-                </a:solidFill>
-                <a:cs typeface="Segoe UI Semibold" panose="020B0702040204020203" pitchFamily="34" charset="0"/>
-              </a:rPr>
-              <a:t>3</a:t>
-            </a:r>
-          </a:p>
-        </p:txBody>
-      </p:sp>
-      <p:sp>
-        <p:nvSpPr>
-          <p:cNvPr id="48" name="Owal 47" descr="Mały okrąg">
-            <a:extLst>
-              <a:ext uri="{FF2B5EF4-FFF2-40B4-BE49-F238E27FC236}">
-                <a16:creationId xmlns:a16="http://schemas.microsoft.com/office/drawing/2014/main" id="{F1C23E2A-8D82-9F46-B7C2-83771AA0906F}"/>
-              </a:ext>
-            </a:extLst>
-          </p:cNvPr>
-          <p:cNvSpPr>
-            <a:spLocks noChangeAspect="1"/>
-          </p:cNvSpPr>
-          <p:nvPr/>
-        </p:nvSpPr>
-        <p:spPr bwMode="blackWhite">
-          <a:xfrm>
-            <a:off x="530159" y="3890648"/>
-            <a:ext cx="409838" cy="409838"/>
-          </a:xfrm>
-          <a:prstGeom prst="ellipse">
-            <a:avLst/>
-          </a:prstGeom>
-          <a:solidFill>
-            <a:schemeClr val="accent2"/>
-          </a:solidFill>
-          <a:ln>
-            <a:noFill/>
-          </a:ln>
-        </p:spPr>
-        <p:style>
-          <a:lnRef idx="2">
-            <a:schemeClr val="accent1">
-              <a:shade val="50000"/>
-            </a:schemeClr>
-          </a:lnRef>
-          <a:fillRef idx="1">
-            <a:schemeClr val="accent1"/>
-          </a:fillRef>
-          <a:effectRef idx="0">
-            <a:schemeClr val="accent1"/>
-          </a:effectRef>
-          <a:fontRef idx="minor">
-            <a:schemeClr val="lt1"/>
-          </a:fontRef>
-        </p:style>
-        <p:txBody>
-          <a:bodyPr rtlCol="0" anchor="ctr"/>
-          <a:lstStyle>
-            <a:defPPr>
-              <a:defRPr lang="pl-PL"/>
-            </a:defPPr>
-          </a:lstStyle>
-          <a:p>
-            <a:pPr algn="ctr" rtl="0"/>
-            <a:endParaRPr lang="pl-PL"/>
-          </a:p>
-        </p:txBody>
-      </p:sp>
-      <p:sp>
-        <p:nvSpPr>
-          <p:cNvPr id="50" name="Pole tekstowe 49" descr="Liczba 3">
-            <a:extLst>
-              <a:ext uri="{FF2B5EF4-FFF2-40B4-BE49-F238E27FC236}">
-                <a16:creationId xmlns:a16="http://schemas.microsoft.com/office/drawing/2014/main" id="{985448E7-EE20-F14F-97AC-EA8BFD8FBA7F}"/>
-              </a:ext>
-            </a:extLst>
-          </p:cNvPr>
-          <p:cNvSpPr txBox="1">
-            <a:spLocks noChangeAspect="1"/>
-          </p:cNvSpPr>
-          <p:nvPr/>
-        </p:nvSpPr>
-        <p:spPr bwMode="blackWhite">
-          <a:xfrm>
-            <a:off x="449185" y="3910901"/>
-            <a:ext cx="558179" cy="369332"/>
-          </a:xfrm>
-          <a:prstGeom prst="rect">
-            <a:avLst/>
-          </a:prstGeom>
-          <a:noFill/>
-        </p:spPr>
-        <p:txBody>
-          <a:bodyPr wrap="square" rtlCol="0">
-            <a:spAutoFit/>
-          </a:bodyPr>
-          <a:lstStyle>
-            <a:defPPr>
-              <a:defRPr lang="pl-PL"/>
-            </a:defPPr>
-          </a:lstStyle>
-          <a:p>
-            <a:pPr algn="ctr" rtl="0"/>
-            <a:r>
-              <a:rPr lang="pl-PL">
-                <a:solidFill>
-                  <a:schemeClr val="bg1"/>
-                </a:solidFill>
-                <a:cs typeface="Segoe UI Semibold" panose="020B0702040204020203" pitchFamily="34" charset="0"/>
-              </a:rPr>
-              <a:t>4</a:t>
-            </a:r>
-          </a:p>
-        </p:txBody>
-      </p:sp>
-      <p:sp>
-        <p:nvSpPr>
-          <p:cNvPr id="51" name="Zawartość — symbol zastępczy 7">
-            <a:extLst>
-              <a:ext uri="{FF2B5EF4-FFF2-40B4-BE49-F238E27FC236}">
-                <a16:creationId xmlns:a16="http://schemas.microsoft.com/office/drawing/2014/main" id="{A6D40621-9F60-B248-A84C-7DCBF898D4DB}"/>
-              </a:ext>
-            </a:extLst>
-          </p:cNvPr>
-          <p:cNvSpPr txBox="1">
-            <a:spLocks/>
-          </p:cNvSpPr>
-          <p:nvPr/>
-        </p:nvSpPr>
-        <p:spPr>
-          <a:xfrm>
-            <a:off x="1039854" y="1509612"/>
-            <a:ext cx="4380515" cy="3652194"/>
-          </a:xfrm>
-          <a:prstGeom prst="rect">
-            <a:avLst/>
-          </a:prstGeom>
-        </p:spPr>
-        <p:txBody>
-          <a:bodyPr vert="horz" lIns="91440" tIns="45720" rIns="91440" bIns="45720" rtlCol="0">
-            <a:normAutofit/>
-          </a:bodyPr>
-          <a:lstStyle>
-            <a:lvl1pPr marL="228598" indent="-228598" algn="l" defTabSz="914391" rtl="0" eaLnBrk="1" latinLnBrk="0" hangingPunct="1">
-              <a:lnSpc>
-                <a:spcPct val="100000"/>
-              </a:lnSpc>
-              <a:spcBef>
-                <a:spcPts val="1000"/>
-              </a:spcBef>
-              <a:buFont typeface="Arial" panose="020B0604020202020204" pitchFamily="34" charset="0"/>
-              <a:buChar char="•"/>
-              <a:defRPr lang="pl-PL" sz="1400" kern="1200" smtClean="0">
-                <a:solidFill>
-                  <a:schemeClr val="tx1">
-                    <a:lumMod val="75000"/>
-                    <a:lumOff val="25000"/>
-                  </a:schemeClr>
-                </a:solidFill>
-                <a:latin typeface="+mn-lt"/>
-                <a:ea typeface="+mn-ea"/>
-                <a:cs typeface="+mn-cs"/>
-              </a:defRPr>
-            </a:lvl1pPr>
-            <a:lvl2pPr marL="685793" indent="-228598" algn="l" defTabSz="914391" rtl="0" eaLnBrk="1" latinLnBrk="0" hangingPunct="1">
-              <a:lnSpc>
-                <a:spcPct val="100000"/>
-              </a:lnSpc>
-              <a:spcBef>
-                <a:spcPts val="500"/>
-              </a:spcBef>
-              <a:buFont typeface="Arial" panose="020B0604020202020204" pitchFamily="34" charset="0"/>
-              <a:buChar char="•"/>
-              <a:defRPr lang="pl-PL" sz="1400" kern="1200" smtClean="0">
-                <a:solidFill>
-                  <a:schemeClr val="tx1">
-                    <a:lumMod val="75000"/>
-                    <a:lumOff val="25000"/>
-                  </a:schemeClr>
-                </a:solidFill>
-                <a:latin typeface="+mn-lt"/>
-                <a:ea typeface="+mn-ea"/>
-                <a:cs typeface="+mn-cs"/>
-              </a:defRPr>
-            </a:lvl2pPr>
-            <a:lvl3pPr marL="1142989" indent="-228598" algn="l" defTabSz="914391" rtl="0" eaLnBrk="1" latinLnBrk="0" hangingPunct="1">
-              <a:lnSpc>
-                <a:spcPct val="100000"/>
-              </a:lnSpc>
-              <a:spcBef>
-                <a:spcPts val="500"/>
-              </a:spcBef>
-              <a:buFont typeface="Arial" panose="020B0604020202020204" pitchFamily="34" charset="0"/>
-              <a:buChar char="•"/>
-              <a:defRPr lang="pl-PL" sz="1400" kern="1200" smtClean="0">
-                <a:solidFill>
-                  <a:schemeClr val="tx1">
-                    <a:lumMod val="75000"/>
-                    <a:lumOff val="25000"/>
-                  </a:schemeClr>
-                </a:solidFill>
-                <a:latin typeface="+mn-lt"/>
-                <a:ea typeface="+mn-ea"/>
-                <a:cs typeface="+mn-cs"/>
-              </a:defRPr>
-            </a:lvl3pPr>
-            <a:lvl4pPr marL="1600185" indent="-228598" algn="l" defTabSz="914391" rtl="0" eaLnBrk="1" latinLnBrk="0" hangingPunct="1">
-              <a:lnSpc>
-                <a:spcPct val="100000"/>
-              </a:lnSpc>
-              <a:spcBef>
-                <a:spcPts val="500"/>
-              </a:spcBef>
-              <a:buFont typeface="Arial" panose="020B0604020202020204" pitchFamily="34" charset="0"/>
-              <a:buChar char="•"/>
-              <a:defRPr lang="pl-PL" sz="1400" kern="1200" smtClean="0">
-                <a:solidFill>
-                  <a:schemeClr val="tx1">
-                    <a:lumMod val="75000"/>
-                    <a:lumOff val="25000"/>
-                  </a:schemeClr>
-                </a:solidFill>
-                <a:latin typeface="+mn-lt"/>
-                <a:ea typeface="+mn-ea"/>
-                <a:cs typeface="+mn-cs"/>
-              </a:defRPr>
-            </a:lvl4pPr>
-            <a:lvl5pPr marL="2057380" indent="-228598" algn="l" defTabSz="914391" rtl="0" eaLnBrk="1" latinLnBrk="0" hangingPunct="1">
-              <a:lnSpc>
-                <a:spcPct val="100000"/>
-              </a:lnSpc>
-              <a:spcBef>
-                <a:spcPts val="500"/>
-              </a:spcBef>
-              <a:buFont typeface="Arial" panose="020B0604020202020204" pitchFamily="34" charset="0"/>
-              <a:buChar char="•"/>
-              <a:defRPr lang="pl-PL" sz="1400" kern="1200">
-                <a:solidFill>
-                  <a:schemeClr val="tx1">
-                    <a:lumMod val="75000"/>
-                    <a:lumOff val="25000"/>
-                  </a:schemeClr>
-                </a:solidFill>
-                <a:latin typeface="+mn-lt"/>
-                <a:ea typeface="+mn-ea"/>
-                <a:cs typeface="+mn-cs"/>
-              </a:defRPr>
-            </a:lvl5pPr>
-            <a:lvl6pPr marL="2514576" indent="-228598" algn="l" defTabSz="914391" rtl="0" eaLnBrk="1" latinLnBrk="0" hangingPunct="1">
-              <a:lnSpc>
-                <a:spcPct val="90000"/>
-              </a:lnSpc>
-              <a:spcBef>
-                <a:spcPts val="500"/>
-              </a:spcBef>
-              <a:buFont typeface="Arial" panose="020B0604020202020204" pitchFamily="34" charset="0"/>
-              <a:buChar char="•"/>
-              <a:defRPr lang="pl-PL" sz="1800" kern="1200">
-                <a:solidFill>
-                  <a:schemeClr val="tx1"/>
-                </a:solidFill>
-                <a:latin typeface="+mn-lt"/>
-                <a:ea typeface="+mn-ea"/>
-                <a:cs typeface="+mn-cs"/>
-              </a:defRPr>
-            </a:lvl6pPr>
-            <a:lvl7pPr marL="2971772" indent="-228598" algn="l" defTabSz="914391" rtl="0" eaLnBrk="1" latinLnBrk="0" hangingPunct="1">
-              <a:lnSpc>
-                <a:spcPct val="90000"/>
-              </a:lnSpc>
-              <a:spcBef>
-                <a:spcPts val="500"/>
-              </a:spcBef>
-              <a:buFont typeface="Arial" panose="020B0604020202020204" pitchFamily="34" charset="0"/>
-              <a:buChar char="•"/>
-              <a:defRPr lang="pl-PL" sz="1800" kern="1200">
-                <a:solidFill>
-                  <a:schemeClr val="tx1"/>
-                </a:solidFill>
-                <a:latin typeface="+mn-lt"/>
-                <a:ea typeface="+mn-ea"/>
-                <a:cs typeface="+mn-cs"/>
-              </a:defRPr>
-            </a:lvl7pPr>
-            <a:lvl8pPr marL="3428967" indent="-228598" algn="l" defTabSz="914391" rtl="0" eaLnBrk="1" latinLnBrk="0" hangingPunct="1">
-              <a:lnSpc>
-                <a:spcPct val="90000"/>
-              </a:lnSpc>
-              <a:spcBef>
-                <a:spcPts val="500"/>
-              </a:spcBef>
-              <a:buFont typeface="Arial" panose="020B0604020202020204" pitchFamily="34" charset="0"/>
-              <a:buChar char="•"/>
-              <a:defRPr lang="pl-PL" sz="1800" kern="1200">
-                <a:solidFill>
-                  <a:schemeClr val="tx1"/>
-                </a:solidFill>
-                <a:latin typeface="+mn-lt"/>
-                <a:ea typeface="+mn-ea"/>
-                <a:cs typeface="+mn-cs"/>
-              </a:defRPr>
-            </a:lvl8pPr>
-            <a:lvl9pPr marL="3886163" indent="-228598" algn="l" defTabSz="914391" rtl="0" eaLnBrk="1" latinLnBrk="0" hangingPunct="1">
-              <a:lnSpc>
-                <a:spcPct val="90000"/>
-              </a:lnSpc>
-              <a:spcBef>
-                <a:spcPts val="500"/>
-              </a:spcBef>
-              <a:buFont typeface="Arial" panose="020B0604020202020204" pitchFamily="34" charset="0"/>
-              <a:buChar char="•"/>
-              <a:defRPr lang="pl-PL" sz="1800" kern="1200">
-                <a:solidFill>
-                  <a:schemeClr val="tx1"/>
-                </a:solidFill>
-                <a:latin typeface="+mn-lt"/>
-                <a:ea typeface="+mn-ea"/>
-                <a:cs typeface="+mn-cs"/>
-              </a:defRPr>
-            </a:lvl9pPr>
-          </a:lstStyle>
-          <a:p>
-            <a:pPr marL="0" indent="0" rtl="0">
-              <a:spcAft>
-                <a:spcPts val="1200"/>
-              </a:spcAft>
-              <a:buNone/>
-            </a:pPr>
-            <a:r>
-              <a:rPr lang="pl-PL" sz="1600">
-                <a:solidFill>
-                  <a:schemeClr val="tx1"/>
-                </a:solidFill>
-              </a:rPr>
-              <a:t>Kliknij pozycję </a:t>
-            </a:r>
-            <a:r>
-              <a:rPr lang="pl-PL" sz="1600" b="1">
-                <a:solidFill>
-                  <a:schemeClr val="tx1"/>
-                </a:solidFill>
-              </a:rPr>
-              <a:t>Wstaw &gt; Kształty</a:t>
-            </a:r>
-            <a:r>
-              <a:rPr lang="pl-PL" sz="1600">
-                <a:solidFill>
-                  <a:schemeClr val="tx1"/>
-                </a:solidFill>
-              </a:rPr>
-              <a:t>, aby wybrać kształty gałęzi i wstawiać linie, aby połączyć każdy temat.</a:t>
-            </a:r>
-          </a:p>
-          <a:p>
-            <a:pPr marL="0" indent="0" rtl="0">
-              <a:spcAft>
-                <a:spcPts val="1200"/>
-              </a:spcAft>
-              <a:buNone/>
-            </a:pPr>
-            <a:r>
-              <a:rPr lang="pl-PL" sz="1600">
-                <a:solidFill>
-                  <a:schemeClr val="tx1"/>
-                </a:solidFill>
-              </a:rPr>
-              <a:t>Kliknij prawym przyciskiem myszy kształt, aby zmienić jego kolor.</a:t>
-            </a:r>
-          </a:p>
-          <a:p>
-            <a:pPr marL="0" indent="0" rtl="0">
-              <a:spcAft>
-                <a:spcPts val="1200"/>
-              </a:spcAft>
-              <a:buNone/>
-            </a:pPr>
-            <a:r>
-              <a:rPr lang="pl-PL" sz="1600">
-                <a:solidFill>
-                  <a:schemeClr val="tx1"/>
-                </a:solidFill>
-              </a:rPr>
-              <a:t>Następnie przejdź do pozycji </a:t>
-            </a:r>
-            <a:r>
-              <a:rPr lang="pl-PL" sz="1600" b="1">
-                <a:solidFill>
-                  <a:schemeClr val="tx1"/>
-                </a:solidFill>
-                <a:cs typeface="Segoe UI Semibold" panose="020B0702040204020203" pitchFamily="34" charset="0"/>
-              </a:rPr>
-              <a:t>Wstaw </a:t>
-            </a:r>
-            <a:r>
-              <a:rPr lang="pl-PL" sz="1600">
-                <a:solidFill>
-                  <a:schemeClr val="tx1"/>
-                </a:solidFill>
-                <a:cs typeface="Segoe UI Semibold" panose="020B0702040204020203" pitchFamily="34" charset="0"/>
-              </a:rPr>
-              <a:t>&gt;</a:t>
-            </a:r>
-            <a:r>
-              <a:rPr lang="pl-PL" sz="1600" b="1">
-                <a:solidFill>
-                  <a:schemeClr val="tx1"/>
-                </a:solidFill>
-                <a:cs typeface="Segoe UI Semibold" panose="020B0702040204020203" pitchFamily="34" charset="0"/>
-              </a:rPr>
-              <a:t> Tekst</a:t>
-            </a:r>
-            <a:r>
-              <a:rPr lang="pl-PL" sz="1600">
-                <a:solidFill>
-                  <a:schemeClr val="tx1"/>
-                </a:solidFill>
-              </a:rPr>
-              <a:t> i wpisz 1 lub 2 słowa kluczowe dla każdej gałęzi.</a:t>
-            </a:r>
-          </a:p>
-          <a:p>
-            <a:pPr marL="0" indent="0" rtl="0">
-              <a:spcAft>
-                <a:spcPts val="1200"/>
-              </a:spcAft>
-              <a:buNone/>
-            </a:pPr>
-            <a:r>
-              <a:rPr lang="pl-PL" sz="1600">
-                <a:solidFill>
-                  <a:schemeClr val="tx1"/>
-                </a:solidFill>
-              </a:rPr>
-              <a:t>Przejdź do pozycji </a:t>
-            </a:r>
-            <a:r>
-              <a:rPr lang="pl-PL" sz="1600" b="1">
-                <a:solidFill>
-                  <a:schemeClr val="tx1"/>
-                </a:solidFill>
-              </a:rPr>
-              <a:t>Wstaw &gt; Obraz</a:t>
-            </a:r>
-            <a:r>
-              <a:rPr lang="pl-PL" sz="1600">
-                <a:solidFill>
-                  <a:schemeClr val="tx1"/>
-                </a:solidFill>
-              </a:rPr>
-              <a:t>, aby dodać obrazy i ikony do kształtów gałęzi.</a:t>
-            </a:r>
-          </a:p>
-        </p:txBody>
-      </p:sp>
-      <p:grpSp>
-        <p:nvGrpSpPr>
-          <p:cNvPr id="3" name="Grupa 2" descr="okręgi połączone liniami z polami tekstowymi">
-            <a:extLst>
-              <a:ext uri="{FF2B5EF4-FFF2-40B4-BE49-F238E27FC236}">
-                <a16:creationId xmlns:a16="http://schemas.microsoft.com/office/drawing/2014/main" id="{1D4EB0E6-31C2-46F7-ABD3-ECF41DD1412C}"/>
-              </a:ext>
-            </a:extLst>
-          </p:cNvPr>
-          <p:cNvGrpSpPr/>
-          <p:nvPr/>
-        </p:nvGrpSpPr>
-        <p:grpSpPr>
-          <a:xfrm>
-            <a:off x="6083842" y="1939633"/>
-            <a:ext cx="5318758" cy="4622299"/>
-            <a:chOff x="6083842" y="1939633"/>
-            <a:chExt cx="5318758" cy="4622299"/>
-          </a:xfrm>
-        </p:grpSpPr>
-        <p:cxnSp>
-          <p:nvCxnSpPr>
-            <p:cNvPr id="30" name="Łącznik prosty 29" descr="linia prosta">
-              <a:extLst>
-                <a:ext uri="{FF2B5EF4-FFF2-40B4-BE49-F238E27FC236}">
-                  <a16:creationId xmlns:a16="http://schemas.microsoft.com/office/drawing/2014/main" id="{63BB2123-A449-8E4F-BBD9-71E27CECBF94}"/>
-                </a:ext>
-              </a:extLst>
-            </p:cNvPr>
-            <p:cNvCxnSpPr>
-              <a:cxnSpLocks/>
-            </p:cNvCxnSpPr>
-            <p:nvPr/>
-          </p:nvCxnSpPr>
-          <p:spPr>
-            <a:xfrm flipH="1">
-              <a:off x="7188401" y="2785215"/>
-              <a:ext cx="768986" cy="88013"/>
-            </a:xfrm>
-            <a:prstGeom prst="line">
-              <a:avLst/>
-            </a:prstGeom>
-            <a:ln/>
-          </p:spPr>
-          <p:style>
-            <a:lnRef idx="3">
-              <a:schemeClr val="dk1"/>
-            </a:lnRef>
-            <a:fillRef idx="0">
-              <a:schemeClr val="dk1"/>
-            </a:fillRef>
-            <a:effectRef idx="2">
-              <a:schemeClr val="dk1"/>
-            </a:effectRef>
-            <a:fontRef idx="minor">
-              <a:schemeClr val="tx1"/>
-            </a:fontRef>
-          </p:style>
-        </p:cxnSp>
-        <p:cxnSp>
-          <p:nvCxnSpPr>
-            <p:cNvPr id="31" name="Łącznik prosty 30" descr="linia prosta">
-              <a:extLst>
-                <a:ext uri="{FF2B5EF4-FFF2-40B4-BE49-F238E27FC236}">
-                  <a16:creationId xmlns:a16="http://schemas.microsoft.com/office/drawing/2014/main" id="{D39C1A7A-D3C2-4440-A9CA-24ECB53715BB}"/>
-                </a:ext>
-              </a:extLst>
-            </p:cNvPr>
-            <p:cNvCxnSpPr>
-              <a:cxnSpLocks/>
-            </p:cNvCxnSpPr>
-            <p:nvPr/>
-          </p:nvCxnSpPr>
-          <p:spPr>
-            <a:xfrm flipH="1">
-              <a:off x="7742360" y="3349872"/>
-              <a:ext cx="552624" cy="945903"/>
-            </a:xfrm>
-            <a:prstGeom prst="line">
-              <a:avLst/>
-            </a:prstGeom>
-            <a:ln/>
-          </p:spPr>
-          <p:style>
-            <a:lnRef idx="3">
-              <a:schemeClr val="dk1"/>
-            </a:lnRef>
-            <a:fillRef idx="0">
-              <a:schemeClr val="dk1"/>
-            </a:fillRef>
-            <a:effectRef idx="2">
-              <a:schemeClr val="dk1"/>
-            </a:effectRef>
-            <a:fontRef idx="minor">
-              <a:schemeClr val="tx1"/>
-            </a:fontRef>
-          </p:style>
-        </p:cxnSp>
-        <p:cxnSp>
-          <p:nvCxnSpPr>
-            <p:cNvPr id="32" name="Łącznik prosty 31" descr="linia prosta">
-              <a:extLst>
-                <a:ext uri="{FF2B5EF4-FFF2-40B4-BE49-F238E27FC236}">
-                  <a16:creationId xmlns:a16="http://schemas.microsoft.com/office/drawing/2014/main" id="{5CAB83FA-6282-AE4B-ABB9-619FD4620C40}"/>
-                </a:ext>
-              </a:extLst>
-            </p:cNvPr>
-            <p:cNvCxnSpPr>
-              <a:cxnSpLocks/>
-            </p:cNvCxnSpPr>
-            <p:nvPr/>
-          </p:nvCxnSpPr>
-          <p:spPr>
-            <a:xfrm>
-              <a:off x="9181218" y="3429000"/>
-              <a:ext cx="836715" cy="1277695"/>
-            </a:xfrm>
-            <a:prstGeom prst="line">
-              <a:avLst/>
-            </a:prstGeom>
-            <a:ln/>
-          </p:spPr>
-          <p:style>
-            <a:lnRef idx="3">
-              <a:schemeClr val="dk1"/>
-            </a:lnRef>
-            <a:fillRef idx="0">
-              <a:schemeClr val="dk1"/>
-            </a:fillRef>
-            <a:effectRef idx="2">
-              <a:schemeClr val="dk1"/>
-            </a:effectRef>
-            <a:fontRef idx="minor">
-              <a:schemeClr val="tx1"/>
-            </a:fontRef>
-          </p:style>
-        </p:cxnSp>
-        <p:cxnSp>
-          <p:nvCxnSpPr>
-            <p:cNvPr id="33" name="Łącznik prosty 32" descr="linia prosta">
-              <a:extLst>
-                <a:ext uri="{FF2B5EF4-FFF2-40B4-BE49-F238E27FC236}">
-                  <a16:creationId xmlns:a16="http://schemas.microsoft.com/office/drawing/2014/main" id="{8D0C2EA0-627C-7346-86F2-A9A5BFEA9186}"/>
-                </a:ext>
-              </a:extLst>
-            </p:cNvPr>
-            <p:cNvCxnSpPr>
-              <a:cxnSpLocks/>
-              <a:stCxn id="55" idx="3"/>
-              <a:endCxn id="49" idx="2"/>
-            </p:cNvCxnSpPr>
-            <p:nvPr/>
-          </p:nvCxnSpPr>
-          <p:spPr>
-            <a:xfrm>
-              <a:off x="9427475" y="2768725"/>
-              <a:ext cx="934835" cy="81085"/>
-            </a:xfrm>
-            <a:prstGeom prst="line">
-              <a:avLst/>
-            </a:prstGeom>
-            <a:ln/>
-          </p:spPr>
-          <p:style>
-            <a:lnRef idx="3">
-              <a:schemeClr val="dk1"/>
-            </a:lnRef>
-            <a:fillRef idx="0">
-              <a:schemeClr val="dk1"/>
-            </a:fillRef>
-            <a:effectRef idx="2">
-              <a:schemeClr val="dk1"/>
-            </a:effectRef>
-            <a:fontRef idx="minor">
-              <a:schemeClr val="tx1"/>
-            </a:fontRef>
-          </p:style>
-        </p:cxnSp>
-        <p:sp>
-          <p:nvSpPr>
-            <p:cNvPr id="34" name="Pole tekstowe 33">
-              <a:extLst>
-                <a:ext uri="{FF2B5EF4-FFF2-40B4-BE49-F238E27FC236}">
-                  <a16:creationId xmlns:a16="http://schemas.microsoft.com/office/drawing/2014/main" id="{A8A858EF-9FF5-2144-9B16-EF5C1A8749A1}"/>
-                </a:ext>
-              </a:extLst>
-            </p:cNvPr>
-            <p:cNvSpPr txBox="1"/>
-            <p:nvPr/>
-          </p:nvSpPr>
-          <p:spPr>
-            <a:xfrm>
-              <a:off x="6083842" y="3410881"/>
-              <a:ext cx="1198880" cy="923330"/>
-            </a:xfrm>
-            <a:prstGeom prst="rect">
-              <a:avLst/>
-            </a:prstGeom>
-            <a:noFill/>
-          </p:spPr>
-          <p:txBody>
-            <a:bodyPr wrap="square" rtlCol="0">
-              <a:spAutoFit/>
-            </a:bodyPr>
-            <a:lstStyle>
-              <a:defPPr>
-                <a:defRPr lang="pl-PL"/>
-              </a:defPPr>
-            </a:lstStyle>
-            <a:p>
-              <a:pPr algn="ctr" rtl="0"/>
-              <a:r>
-                <a:rPr lang="pl-PL"/>
-                <a:t>Dodaj słowo kluczowe</a:t>
-              </a:r>
-            </a:p>
-          </p:txBody>
-        </p:sp>
-        <p:sp>
-          <p:nvSpPr>
-            <p:cNvPr id="35" name="Pole tekstowe 34">
-              <a:extLst>
-                <a:ext uri="{FF2B5EF4-FFF2-40B4-BE49-F238E27FC236}">
-                  <a16:creationId xmlns:a16="http://schemas.microsoft.com/office/drawing/2014/main" id="{A9F78683-D595-A942-B236-4AFF1FD95A8C}"/>
-                </a:ext>
-              </a:extLst>
-            </p:cNvPr>
-            <p:cNvSpPr txBox="1"/>
-            <p:nvPr/>
-          </p:nvSpPr>
-          <p:spPr>
-            <a:xfrm>
-              <a:off x="6973454" y="5320732"/>
-              <a:ext cx="1198880" cy="923330"/>
-            </a:xfrm>
-            <a:prstGeom prst="rect">
-              <a:avLst/>
-            </a:prstGeom>
-            <a:noFill/>
-          </p:spPr>
-          <p:txBody>
-            <a:bodyPr wrap="square" rtlCol="0">
-              <a:spAutoFit/>
-            </a:bodyPr>
-            <a:lstStyle>
-              <a:defPPr>
-                <a:defRPr lang="pl-PL"/>
-              </a:defPPr>
-            </a:lstStyle>
-            <a:p>
-              <a:pPr algn="ctr" rtl="0"/>
-              <a:r>
-                <a:rPr lang="pl-PL"/>
-                <a:t>Dodaj słowo kluczowe</a:t>
-              </a:r>
-            </a:p>
-          </p:txBody>
-        </p:sp>
-        <p:sp>
-          <p:nvSpPr>
-            <p:cNvPr id="37" name="Pole tekstowe 36">
-              <a:extLst>
-                <a:ext uri="{FF2B5EF4-FFF2-40B4-BE49-F238E27FC236}">
-                  <a16:creationId xmlns:a16="http://schemas.microsoft.com/office/drawing/2014/main" id="{EB5412BD-6F42-1645-94A1-A2F98C8F56F0}"/>
-                </a:ext>
-              </a:extLst>
-            </p:cNvPr>
-            <p:cNvSpPr txBox="1"/>
-            <p:nvPr/>
-          </p:nvSpPr>
-          <p:spPr>
-            <a:xfrm>
-              <a:off x="9591472" y="5638602"/>
-              <a:ext cx="1198880" cy="923330"/>
-            </a:xfrm>
-            <a:prstGeom prst="rect">
-              <a:avLst/>
-            </a:prstGeom>
-            <a:noFill/>
-          </p:spPr>
-          <p:txBody>
-            <a:bodyPr wrap="square" rtlCol="0">
-              <a:spAutoFit/>
-            </a:bodyPr>
-            <a:lstStyle>
-              <a:defPPr>
-                <a:defRPr lang="pl-PL"/>
-              </a:defPPr>
-            </a:lstStyle>
-            <a:p>
-              <a:pPr algn="ctr" rtl="0"/>
-              <a:r>
-                <a:rPr lang="pl-PL"/>
-                <a:t>Dodaj słowo kluczowe</a:t>
-              </a:r>
-            </a:p>
-          </p:txBody>
-        </p:sp>
-        <p:sp>
-          <p:nvSpPr>
-            <p:cNvPr id="38" name="Pole tekstowe 37">
-              <a:extLst>
-                <a:ext uri="{FF2B5EF4-FFF2-40B4-BE49-F238E27FC236}">
-                  <a16:creationId xmlns:a16="http://schemas.microsoft.com/office/drawing/2014/main" id="{20DDFF3D-5E90-9D40-86A9-817E6162C0FB}"/>
-                </a:ext>
-              </a:extLst>
-            </p:cNvPr>
-            <p:cNvSpPr txBox="1"/>
-            <p:nvPr/>
-          </p:nvSpPr>
-          <p:spPr>
-            <a:xfrm>
-              <a:off x="10241590" y="3412384"/>
-              <a:ext cx="1161010" cy="923330"/>
-            </a:xfrm>
-            <a:prstGeom prst="rect">
-              <a:avLst/>
-            </a:prstGeom>
-            <a:noFill/>
-          </p:spPr>
-          <p:txBody>
-            <a:bodyPr wrap="square" rtlCol="0">
-              <a:spAutoFit/>
-            </a:bodyPr>
-            <a:lstStyle>
-              <a:defPPr>
-                <a:defRPr lang="pl-PL"/>
-              </a:defPPr>
-            </a:lstStyle>
-            <a:p>
-              <a:pPr algn="ctr" rtl="0"/>
-              <a:r>
-                <a:rPr lang="pl-PL"/>
-                <a:t>Dodaj słowo kluczowe</a:t>
-              </a:r>
-            </a:p>
-          </p:txBody>
-        </p:sp>
-        <p:sp>
-          <p:nvSpPr>
-            <p:cNvPr id="42" name="Owal 41" descr="kształt owalny">
-              <a:extLst>
-                <a:ext uri="{FF2B5EF4-FFF2-40B4-BE49-F238E27FC236}">
-                  <a16:creationId xmlns:a16="http://schemas.microsoft.com/office/drawing/2014/main" id="{10D91E47-9024-2544-A774-5F83E2700F0A}"/>
-                </a:ext>
-              </a:extLst>
-            </p:cNvPr>
-            <p:cNvSpPr/>
-            <p:nvPr/>
-          </p:nvSpPr>
-          <p:spPr>
-            <a:xfrm>
-              <a:off x="9681281" y="4575965"/>
-              <a:ext cx="1000125" cy="1000125"/>
-            </a:xfrm>
-            <a:prstGeom prst="ellipse">
-              <a:avLst/>
-            </a:prstGeom>
-            <a:solidFill>
-              <a:schemeClr val="accent3"/>
-            </a:solidFill>
-            <a:ln>
-              <a:noFill/>
-            </a:ln>
-          </p:spPr>
-          <p:style>
-            <a:lnRef idx="2">
-              <a:schemeClr val="accent1">
-                <a:shade val="50000"/>
-              </a:schemeClr>
-            </a:lnRef>
-            <a:fillRef idx="1">
-              <a:schemeClr val="accent1"/>
-            </a:fillRef>
-            <a:effectRef idx="0">
-              <a:schemeClr val="accent1"/>
-            </a:effectRef>
-            <a:fontRef idx="minor">
-              <a:schemeClr val="lt1"/>
-            </a:fontRef>
-          </p:style>
-          <p:txBody>
-            <a:bodyPr lIns="0" tIns="0" rIns="0" bIns="0" rtlCol="0" anchor="t"/>
-            <a:lstStyle>
-              <a:defPPr>
-                <a:defRPr lang="pl-PL"/>
-              </a:defPPr>
-            </a:lstStyle>
-            <a:p>
-              <a:pPr algn="ctr" rtl="0"/>
-              <a:endParaRPr lang="pl-PL" sz="1000"/>
-            </a:p>
-          </p:txBody>
-        </p:sp>
-        <p:sp>
-          <p:nvSpPr>
-            <p:cNvPr id="46" name="Owal 45" descr="kształt owalny">
-              <a:extLst>
-                <a:ext uri="{FF2B5EF4-FFF2-40B4-BE49-F238E27FC236}">
-                  <a16:creationId xmlns:a16="http://schemas.microsoft.com/office/drawing/2014/main" id="{8CC00D4F-2FB0-C340-B932-176E1760E489}"/>
-                </a:ext>
-              </a:extLst>
-            </p:cNvPr>
-            <p:cNvSpPr/>
-            <p:nvPr/>
-          </p:nvSpPr>
-          <p:spPr>
-            <a:xfrm>
-              <a:off x="6191627" y="2349747"/>
-              <a:ext cx="1000125" cy="1000125"/>
-            </a:xfrm>
-            <a:prstGeom prst="ellipse">
-              <a:avLst/>
-            </a:prstGeom>
-            <a:noFill/>
-            <a:ln w="25400">
-              <a:solidFill>
-                <a:schemeClr val="accent1"/>
-              </a:solidFill>
-              <a:prstDash val="dash"/>
-            </a:ln>
-          </p:spPr>
-          <p:style>
-            <a:lnRef idx="2">
-              <a:schemeClr val="accent1">
-                <a:shade val="50000"/>
-              </a:schemeClr>
-            </a:lnRef>
-            <a:fillRef idx="1">
-              <a:schemeClr val="accent1"/>
-            </a:fillRef>
-            <a:effectRef idx="0">
-              <a:schemeClr val="accent1"/>
-            </a:effectRef>
-            <a:fontRef idx="minor">
-              <a:schemeClr val="lt1"/>
-            </a:fontRef>
-          </p:style>
-          <p:txBody>
-            <a:bodyPr lIns="0" tIns="0" rIns="0" bIns="0" rtlCol="0" anchor="t"/>
-            <a:lstStyle>
-              <a:defPPr>
-                <a:defRPr lang="pl-PL"/>
-              </a:defPPr>
-            </a:lstStyle>
-            <a:p>
-              <a:pPr algn="ctr" rtl="0"/>
-              <a:endParaRPr lang="pl-PL" sz="1000"/>
-            </a:p>
-          </p:txBody>
-        </p:sp>
-        <p:sp>
-          <p:nvSpPr>
-            <p:cNvPr id="49" name="Owal 48" descr="kształt owalny">
-              <a:extLst>
-                <a:ext uri="{FF2B5EF4-FFF2-40B4-BE49-F238E27FC236}">
-                  <a16:creationId xmlns:a16="http://schemas.microsoft.com/office/drawing/2014/main" id="{CDE26E72-3C77-3041-AAF3-D537C0C190BB}"/>
-                </a:ext>
-              </a:extLst>
-            </p:cNvPr>
-            <p:cNvSpPr/>
-            <p:nvPr/>
-          </p:nvSpPr>
-          <p:spPr>
-            <a:xfrm>
-              <a:off x="10362310" y="2349747"/>
-              <a:ext cx="1000125" cy="1000125"/>
-            </a:xfrm>
-            <a:prstGeom prst="ellipse">
-              <a:avLst/>
-            </a:prstGeom>
-            <a:solidFill>
-              <a:schemeClr val="accent2"/>
-            </a:solidFill>
-            <a:ln>
-              <a:noFill/>
-            </a:ln>
-          </p:spPr>
-          <p:style>
-            <a:lnRef idx="2">
-              <a:schemeClr val="accent1">
-                <a:shade val="50000"/>
-              </a:schemeClr>
-            </a:lnRef>
-            <a:fillRef idx="1">
-              <a:schemeClr val="accent1"/>
-            </a:fillRef>
-            <a:effectRef idx="0">
-              <a:schemeClr val="accent1"/>
-            </a:effectRef>
-            <a:fontRef idx="minor">
-              <a:schemeClr val="lt1"/>
-            </a:fontRef>
-          </p:style>
-          <p:txBody>
-            <a:bodyPr lIns="0" tIns="0" rIns="0" bIns="0" rtlCol="0" anchor="t"/>
-            <a:lstStyle>
-              <a:defPPr>
-                <a:defRPr lang="pl-PL"/>
-              </a:defPPr>
-            </a:lstStyle>
-            <a:p>
-              <a:pPr algn="ctr" rtl="0"/>
-              <a:endParaRPr lang="pl-PL" sz="1000"/>
-            </a:p>
-          </p:txBody>
-        </p:sp>
-        <p:sp>
-          <p:nvSpPr>
-            <p:cNvPr id="53" name="Owal 52" descr="kształt owalny">
-              <a:extLst>
-                <a:ext uri="{FF2B5EF4-FFF2-40B4-BE49-F238E27FC236}">
-                  <a16:creationId xmlns:a16="http://schemas.microsoft.com/office/drawing/2014/main" id="{66A5825C-2801-A14C-9E83-5D06EC19285B}"/>
-                </a:ext>
-              </a:extLst>
-            </p:cNvPr>
-            <p:cNvSpPr/>
-            <p:nvPr/>
-          </p:nvSpPr>
-          <p:spPr>
-            <a:xfrm>
-              <a:off x="7960738" y="1939633"/>
-              <a:ext cx="1630734" cy="1630734"/>
-            </a:xfrm>
-            <a:prstGeom prst="ellipse">
-              <a:avLst/>
-            </a:prstGeom>
-            <a:solidFill>
-              <a:schemeClr val="bg2">
-                <a:lumMod val="25000"/>
-              </a:schemeClr>
-            </a:solidFill>
-            <a:ln>
-              <a:noFill/>
-            </a:ln>
-          </p:spPr>
-          <p:style>
-            <a:lnRef idx="2">
-              <a:schemeClr val="accent1">
-                <a:shade val="50000"/>
-              </a:schemeClr>
-            </a:lnRef>
-            <a:fillRef idx="1">
-              <a:schemeClr val="accent1"/>
-            </a:fillRef>
-            <a:effectRef idx="0">
-              <a:schemeClr val="accent1"/>
-            </a:effectRef>
-            <a:fontRef idx="minor">
-              <a:schemeClr val="lt1"/>
-            </a:fontRef>
-          </p:style>
-          <p:txBody>
-            <a:bodyPr rtlCol="0" anchor="ctr"/>
-            <a:lstStyle>
-              <a:defPPr>
-                <a:defRPr lang="pl-PL"/>
-              </a:defPPr>
-            </a:lstStyle>
-            <a:p>
-              <a:pPr algn="ctr" rtl="0"/>
-              <a:endParaRPr lang="pl-PL"/>
-            </a:p>
-          </p:txBody>
-        </p:sp>
-        <p:sp>
-          <p:nvSpPr>
-            <p:cNvPr id="55" name="Pole tekstowe 54">
-              <a:extLst>
-                <a:ext uri="{FF2B5EF4-FFF2-40B4-BE49-F238E27FC236}">
-                  <a16:creationId xmlns:a16="http://schemas.microsoft.com/office/drawing/2014/main" id="{D9B441DE-399E-EA46-A84F-0D58A73CFF03}"/>
-                </a:ext>
-              </a:extLst>
-            </p:cNvPr>
-            <p:cNvSpPr txBox="1"/>
-            <p:nvPr/>
-          </p:nvSpPr>
-          <p:spPr>
-            <a:xfrm>
-              <a:off x="8100607" y="2307060"/>
-              <a:ext cx="1326868" cy="923330"/>
-            </a:xfrm>
-            <a:prstGeom prst="rect">
-              <a:avLst/>
-            </a:prstGeom>
-            <a:noFill/>
-          </p:spPr>
-          <p:txBody>
-            <a:bodyPr wrap="square" rtlCol="0">
-              <a:spAutoFit/>
-            </a:bodyPr>
-            <a:lstStyle>
-              <a:defPPr>
-                <a:defRPr lang="pl-PL"/>
-              </a:defPPr>
-            </a:lstStyle>
-            <a:p>
-              <a:pPr algn="ctr" rtl="0"/>
-              <a:r>
-                <a:rPr lang="pl-PL">
-                  <a:solidFill>
-                    <a:schemeClr val="bg1"/>
-                  </a:solidFill>
-                </a:rPr>
-                <a:t>Dodaj swój centralny pomysł</a:t>
-              </a:r>
-            </a:p>
-          </p:txBody>
-        </p:sp>
-        <p:sp>
-          <p:nvSpPr>
-            <p:cNvPr id="57" name="Owal 56" descr="kształt owalny">
-              <a:extLst>
-                <a:ext uri="{FF2B5EF4-FFF2-40B4-BE49-F238E27FC236}">
-                  <a16:creationId xmlns:a16="http://schemas.microsoft.com/office/drawing/2014/main" id="{BF8329D4-5928-2B49-81AA-F9FA7137D89D}"/>
-                </a:ext>
-              </a:extLst>
-            </p:cNvPr>
-            <p:cNvSpPr/>
-            <p:nvPr/>
-          </p:nvSpPr>
-          <p:spPr>
-            <a:xfrm>
-              <a:off x="7081628" y="4258095"/>
-              <a:ext cx="1000125" cy="1000125"/>
-            </a:xfrm>
-            <a:prstGeom prst="ellipse">
-              <a:avLst/>
-            </a:prstGeom>
-            <a:noFill/>
-            <a:ln w="25400">
-              <a:solidFill>
-                <a:schemeClr val="accent6"/>
-              </a:solidFill>
-              <a:prstDash val="dash"/>
-            </a:ln>
-          </p:spPr>
-          <p:style>
-            <a:lnRef idx="2">
-              <a:schemeClr val="accent1">
-                <a:shade val="50000"/>
-              </a:schemeClr>
-            </a:lnRef>
-            <a:fillRef idx="1">
-              <a:schemeClr val="accent1"/>
-            </a:fillRef>
-            <a:effectRef idx="0">
-              <a:schemeClr val="accent1"/>
-            </a:effectRef>
-            <a:fontRef idx="minor">
-              <a:schemeClr val="lt1"/>
-            </a:fontRef>
-          </p:style>
-          <p:txBody>
-            <a:bodyPr lIns="0" tIns="0" rIns="0" bIns="0" rtlCol="0" anchor="t"/>
-            <a:lstStyle>
-              <a:defPPr>
-                <a:defRPr lang="pl-PL"/>
-              </a:defPPr>
-            </a:lstStyle>
-            <a:p>
-              <a:pPr algn="ctr" rtl="0"/>
-              <a:endParaRPr lang="pl-PL" sz="1000"/>
-            </a:p>
-          </p:txBody>
-        </p:sp>
-      </p:grpSp>
-    </p:spTree>
-    <p:extLst>
-      <p:ext uri="{BB962C8B-B14F-4D97-AF65-F5344CB8AC3E}">
-        <p14:creationId xmlns:p14="http://schemas.microsoft.com/office/powerpoint/2010/main" val="4052214363"/>
+        <p14:creationId xmlns:p14="http://schemas.microsoft.com/office/powerpoint/2010/main" val="3174130271"/>
       </p:ext>
     </p:extLst>
   </p:cSld>
@@ -22232,6 +22560,25 @@
 </file>
 
 <file path=customXml/item1.xml><?xml version="1.0" encoding="utf-8"?>
+<p:properties xmlns:p="http://schemas.microsoft.com/office/2006/metadata/properties" xmlns:xsi="http://www.w3.org/2001/XMLSchema-instance" xmlns:pc="http://schemas.microsoft.com/office/infopath/2007/PartnerControls">
+  <documentManagement>
+    <Status xmlns="71af3243-3dd4-4a8d-8c0d-dd76da1f02a5">Not started</Status>
+    <_ip_UnifiedCompliancePolicyUIAction xmlns="http://schemas.microsoft.com/sharepoint/v3" xsi:nil="true"/>
+    <Image xmlns="71af3243-3dd4-4a8d-8c0d-dd76da1f02a5">
+      <Url xsi:nil="true"/>
+      <Description xsi:nil="true"/>
+    </Image>
+    <_ip_UnifiedCompliancePolicyProperties xmlns="http://schemas.microsoft.com/sharepoint/v3" xsi:nil="true"/>
+    <ImageTagsTaxHTField xmlns="71af3243-3dd4-4a8d-8c0d-dd76da1f02a5">
+      <Terms xmlns="http://schemas.microsoft.com/office/infopath/2007/PartnerControls"/>
+    </ImageTagsTaxHTField>
+    <TaxCatchAll xmlns="230e9df3-be65-4c73-a93b-d1236ebd677e"/>
+    <MediaServiceKeyPoints xmlns="71af3243-3dd4-4a8d-8c0d-dd76da1f02a5" xsi:nil="true"/>
+  </documentManagement>
+</p:properties>
+</file>
+
+<file path=customXml/item2.xml><?xml version="1.0" encoding="utf-8"?>
 <ct:contentTypeSchema xmlns:ct="http://schemas.microsoft.com/office/2006/metadata/contentType" xmlns:ma="http://schemas.microsoft.com/office/2006/metadata/properties/metaAttributes" ct:_="" ma:_="" ma:contentTypeName="Document" ma:contentTypeID="0x01010079F111ED35F8CC479449609E8A0923A6" ma:contentTypeVersion="20" ma:contentTypeDescription="Create a new document." ma:contentTypeScope="" ma:versionID="1267097ee5f5874adfcc408041ae252e">
   <xsd:schema xmlns:xsd="http://www.w3.org/2001/XMLSchema" xmlns:xs="http://www.w3.org/2001/XMLSchema" xmlns:p="http://schemas.microsoft.com/office/2006/metadata/properties" xmlns:ns1="http://schemas.microsoft.com/sharepoint/v3" xmlns:ns2="71af3243-3dd4-4a8d-8c0d-dd76da1f02a5" xmlns:ns3="16c05727-aa75-4e4a-9b5f-8a80a1165891" xmlns:ns4="230e9df3-be65-4c73-a93b-d1236ebd677e" targetNamespace="http://schemas.microsoft.com/office/2006/metadata/properties" ma:root="true" ma:fieldsID="395891a93df65b14727750f2c06c306c" ns1:_="" ns2:_="" ns3:_="" ns4:_="">
     <xsd:import namespace="http://schemas.microsoft.com/sharepoint/v3"/>
@@ -22507,25 +22854,6 @@
 </ct:contentTypeSchema>
 </file>
 
-<file path=customXml/item2.xml><?xml version="1.0" encoding="utf-8"?>
-<p:properties xmlns:p="http://schemas.microsoft.com/office/2006/metadata/properties" xmlns:xsi="http://www.w3.org/2001/XMLSchema-instance" xmlns:pc="http://schemas.microsoft.com/office/infopath/2007/PartnerControls">
-  <documentManagement>
-    <Status xmlns="71af3243-3dd4-4a8d-8c0d-dd76da1f02a5">Not started</Status>
-    <_ip_UnifiedCompliancePolicyUIAction xmlns="http://schemas.microsoft.com/sharepoint/v3" xsi:nil="true"/>
-    <Image xmlns="71af3243-3dd4-4a8d-8c0d-dd76da1f02a5">
-      <Url xsi:nil="true"/>
-      <Description xsi:nil="true"/>
-    </Image>
-    <_ip_UnifiedCompliancePolicyProperties xmlns="http://schemas.microsoft.com/sharepoint/v3" xsi:nil="true"/>
-    <ImageTagsTaxHTField xmlns="71af3243-3dd4-4a8d-8c0d-dd76da1f02a5">
-      <Terms xmlns="http://schemas.microsoft.com/office/infopath/2007/PartnerControls"/>
-    </ImageTagsTaxHTField>
-    <TaxCatchAll xmlns="230e9df3-be65-4c73-a93b-d1236ebd677e"/>
-    <MediaServiceKeyPoints xmlns="71af3243-3dd4-4a8d-8c0d-dd76da1f02a5" xsi:nil="true"/>
-  </documentManagement>
-</p:properties>
-</file>
-
 <file path=customXml/item3.xml><?xml version="1.0" encoding="utf-8"?>
 <?mso-contentType ?>
 <FormTemplates xmlns="http://schemas.microsoft.com/sharepoint/v3/contenttype/forms">
@@ -22536,6 +22864,18 @@
 </file>
 
 <file path=customXml/itemProps1.xml><?xml version="1.0" encoding="utf-8"?>
+<ds:datastoreItem xmlns:ds="http://schemas.openxmlformats.org/officeDocument/2006/customXml" ds:itemID="{1C44B501-5DE1-46D9-B449-400C46FE1425}">
+  <ds:schemaRefs>
+    <ds:schemaRef ds:uri="http://schemas.microsoft.com/office/2006/metadata/properties"/>
+    <ds:schemaRef ds:uri="http://schemas.microsoft.com/office/infopath/2007/PartnerControls"/>
+    <ds:schemaRef ds:uri="71af3243-3dd4-4a8d-8c0d-dd76da1f02a5"/>
+    <ds:schemaRef ds:uri="http://schemas.microsoft.com/sharepoint/v3"/>
+    <ds:schemaRef ds:uri="230e9df3-be65-4c73-a93b-d1236ebd677e"/>
+  </ds:schemaRefs>
+</ds:datastoreItem>
+</file>
+
+<file path=customXml/itemProps2.xml><?xml version="1.0" encoding="utf-8"?>
 <ds:datastoreItem xmlns:ds="http://schemas.openxmlformats.org/officeDocument/2006/customXml" ds:itemID="{B2A44EB6-3BD3-4FF9-B8D1-D973C54C3ED7}">
   <ds:schemaRefs>
     <ds:schemaRef ds:uri="http://schemas.microsoft.com/office/2006/metadata/contentType"/>
@@ -22556,18 +22896,6 @@
 </ds:datastoreItem>
 </file>
 
-<file path=customXml/itemProps2.xml><?xml version="1.0" encoding="utf-8"?>
-<ds:datastoreItem xmlns:ds="http://schemas.openxmlformats.org/officeDocument/2006/customXml" ds:itemID="{1C44B501-5DE1-46D9-B449-400C46FE1425}">
-  <ds:schemaRefs>
-    <ds:schemaRef ds:uri="http://schemas.microsoft.com/office/2006/metadata/properties"/>
-    <ds:schemaRef ds:uri="http://schemas.microsoft.com/office/infopath/2007/PartnerControls"/>
-    <ds:schemaRef ds:uri="71af3243-3dd4-4a8d-8c0d-dd76da1f02a5"/>
-    <ds:schemaRef ds:uri="http://schemas.microsoft.com/sharepoint/v3"/>
-    <ds:schemaRef ds:uri="230e9df3-be65-4c73-a93b-d1236ebd677e"/>
-  </ds:schemaRefs>
-</ds:datastoreItem>
-</file>
-
 <file path=customXml/itemProps3.xml><?xml version="1.0" encoding="utf-8"?>
 <ds:datastoreItem xmlns:ds="http://schemas.openxmlformats.org/officeDocument/2006/customXml" ds:itemID="{77DD0DBF-30B2-4FC6-A5E7-8374DC718037}">
   <ds:schemaRefs>

</xml_diff>

<commit_message>
Slide 10. 12.03 minutes
</commit_message>
<xml_diff>
--- a/Presentation/Analyzing the StackOverflow2013 Database from 2008 to 2013.pptx
+++ b/Presentation/Analyzing the StackOverflow2013 Database from 2008 to 2013.pptx
@@ -5,7 +5,7 @@
     <p:sldMasterId id="2147483648" r:id="rId4"/>
   </p:sldMasterIdLst>
   <p:notesMasterIdLst>
-    <p:notesMasterId r:id="rId19"/>
+    <p:notesMasterId r:id="rId20"/>
   </p:notesMasterIdLst>
   <p:sldIdLst>
     <p:sldId id="259" r:id="rId5"/>
@@ -18,10 +18,11 @@
     <p:sldId id="271" r:id="rId12"/>
     <p:sldId id="275" r:id="rId13"/>
     <p:sldId id="274" r:id="rId14"/>
-    <p:sldId id="265" r:id="rId15"/>
-    <p:sldId id="272" r:id="rId16"/>
-    <p:sldId id="264" r:id="rId17"/>
-    <p:sldId id="263" r:id="rId18"/>
+    <p:sldId id="276" r:id="rId15"/>
+    <p:sldId id="265" r:id="rId16"/>
+    <p:sldId id="272" r:id="rId17"/>
+    <p:sldId id="264" r:id="rId18"/>
+    <p:sldId id="263" r:id="rId19"/>
   </p:sldIdLst>
   <p:sldSz cx="12192000" cy="6858000"/>
   <p:notesSz cx="6858000" cy="9144000"/>
@@ -5246,7 +5247,58 @@
           <a:bodyPr/>
           <a:lstStyle/>
           <a:p>
-            <a:endParaRPr lang="pl-PL"/>
+            <a:pPr algn="just"/>
+            <a:r>
+              <a:rPr lang="en-US" dirty="0"/>
+              <a:t>This slide shows the first step of my data analysis, where I have loaded all Parquet files into Spark </a:t>
+            </a:r>
+            <a:r>
+              <a:rPr lang="en-US" dirty="0" err="1"/>
+              <a:t>DataFrames</a:t>
+            </a:r>
+            <a:r>
+              <a:rPr lang="en-US" dirty="0"/>
+              <a:t>. Each </a:t>
+            </a:r>
+            <a:r>
+              <a:rPr lang="en-US" dirty="0" err="1"/>
+              <a:t>DataFrame</a:t>
+            </a:r>
+            <a:r>
+              <a:rPr lang="en-US" dirty="0"/>
+              <a:t> corresponds to a specific component of the Stack Overflow data captured in Parquet files, which are highly efficient for this kind of processing.</a:t>
+            </a:r>
+          </a:p>
+          <a:p>
+            <a:pPr algn="just"/>
+            <a:endParaRPr lang="en-US" dirty="0"/>
+          </a:p>
+          <a:p>
+            <a:pPr algn="just"/>
+            <a:r>
+              <a:rPr lang="en-US" dirty="0"/>
+              <a:t>By loading these datasets into </a:t>
+            </a:r>
+            <a:r>
+              <a:rPr lang="en-US" dirty="0" err="1"/>
+              <a:t>DataFrames</a:t>
+            </a:r>
+            <a:r>
+              <a:rPr lang="en-US" dirty="0"/>
+              <a:t>, I’ve laid the foundation for further data exploration. </a:t>
+            </a:r>
+          </a:p>
+          <a:p>
+            <a:pPr algn="just"/>
+            <a:endParaRPr lang="en-US" dirty="0"/>
+          </a:p>
+          <a:p>
+            <a:pPr algn="just"/>
+            <a:r>
+              <a:rPr lang="en-US"/>
+              <a:t>0.47’</a:t>
+            </a:r>
+            <a:endParaRPr lang="pl-PL" dirty="0"/>
           </a:p>
         </p:txBody>
       </p:sp>
@@ -5362,6 +5414,91 @@
     </p:spTree>
     <p:extLst>
       <p:ext uri="{BB962C8B-B14F-4D97-AF65-F5344CB8AC3E}">
+        <p14:creationId xmlns:p14="http://schemas.microsoft.com/office/powerpoint/2010/main" val="2684082676"/>
+      </p:ext>
+    </p:extLst>
+  </p:cSld>
+  <p:clrMapOvr>
+    <a:masterClrMapping/>
+  </p:clrMapOvr>
+</p:notes>
+</file>
+
+<file path=ppt/notesSlides/notesSlide12.xml><?xml version="1.0" encoding="utf-8"?>
+<p:notes xmlns:a="http://schemas.openxmlformats.org/drawingml/2006/main" xmlns:r="http://schemas.openxmlformats.org/officeDocument/2006/relationships" xmlns:p="http://schemas.openxmlformats.org/presentationml/2006/main">
+  <p:cSld>
+    <p:spTree>
+      <p:nvGrpSpPr>
+        <p:cNvPr id="1" name=""/>
+        <p:cNvGrpSpPr/>
+        <p:nvPr/>
+      </p:nvGrpSpPr>
+      <p:grpSpPr>
+        <a:xfrm>
+          <a:off x="0" y="0"/>
+          <a:ext cx="0" cy="0"/>
+          <a:chOff x="0" y="0"/>
+          <a:chExt cx="0" cy="0"/>
+        </a:xfrm>
+      </p:grpSpPr>
+      <p:sp>
+        <p:nvSpPr>
+          <p:cNvPr id="2" name="Slide Image Placeholder 1"/>
+          <p:cNvSpPr>
+            <a:spLocks noGrp="1" noRot="1" noChangeAspect="1"/>
+          </p:cNvSpPr>
+          <p:nvPr>
+            <p:ph type="sldImg"/>
+          </p:nvPr>
+        </p:nvSpPr>
+        <p:spPr/>
+      </p:sp>
+      <p:sp>
+        <p:nvSpPr>
+          <p:cNvPr id="3" name="Notes Placeholder 2"/>
+          <p:cNvSpPr>
+            <a:spLocks noGrp="1"/>
+          </p:cNvSpPr>
+          <p:nvPr>
+            <p:ph type="body" idx="1"/>
+          </p:nvPr>
+        </p:nvSpPr>
+        <p:spPr/>
+        <p:txBody>
+          <a:bodyPr/>
+          <a:lstStyle/>
+          <a:p>
+            <a:endParaRPr lang="pl-PL"/>
+          </a:p>
+        </p:txBody>
+      </p:sp>
+      <p:sp>
+        <p:nvSpPr>
+          <p:cNvPr id="4" name="Slide Number Placeholder 3"/>
+          <p:cNvSpPr>
+            <a:spLocks noGrp="1"/>
+          </p:cNvSpPr>
+          <p:nvPr>
+            <p:ph type="sldNum" sz="quarter" idx="5"/>
+          </p:nvPr>
+        </p:nvSpPr>
+        <p:spPr/>
+        <p:txBody>
+          <a:bodyPr/>
+          <a:lstStyle/>
+          <a:p>
+            <a:pPr rtl="0"/>
+            <a:fld id="{BC0C2C40-CB1C-4820-9151-EC51EC2E7E0F}" type="slidenum">
+              <a:rPr lang="pl-PL" smtClean="0"/>
+              <a:t>12</a:t>
+            </a:fld>
+            <a:endParaRPr lang="pl-PL" dirty="0"/>
+          </a:p>
+        </p:txBody>
+      </p:sp>
+    </p:spTree>
+    <p:extLst>
+      <p:ext uri="{BB962C8B-B14F-4D97-AF65-F5344CB8AC3E}">
         <p14:creationId xmlns:p14="http://schemas.microsoft.com/office/powerpoint/2010/main" val="2743713819"/>
       </p:ext>
     </p:extLst>
@@ -5372,7 +5509,7 @@
 </p:notes>
 </file>
 
-<file path=ppt/notesSlides/notesSlide12.xml><?xml version="1.0" encoding="utf-8"?>
+<file path=ppt/notesSlides/notesSlide13.xml><?xml version="1.0" encoding="utf-8"?>
 <p:notes xmlns:a="http://schemas.openxmlformats.org/drawingml/2006/main" xmlns:r="http://schemas.openxmlformats.org/officeDocument/2006/relationships" xmlns:p="http://schemas.openxmlformats.org/presentationml/2006/main">
   <p:cSld>
     <p:spTree>
@@ -5447,7 +5584,7 @@
             <a:pPr rtl="0"/>
             <a:fld id="{BC0C2C40-CB1C-4820-9151-EC51EC2E7E0F}" type="slidenum">
               <a:rPr lang="pl-PL" smtClean="0"/>
-              <a:t>14</a:t>
+              <a:t>15</a:t>
             </a:fld>
             <a:endParaRPr lang="pl-PL" dirty="0"/>
           </a:p>
@@ -10874,6 +11011,111 @@
 </file>
 
 <file path=ppt/slides/slide10.xml><?xml version="1.0" encoding="utf-8"?>
+<p:sld xmlns:a="http://schemas.openxmlformats.org/drawingml/2006/main" xmlns:r="http://schemas.openxmlformats.org/officeDocument/2006/relationships" xmlns:p="http://schemas.openxmlformats.org/presentationml/2006/main">
+  <p:cSld>
+    <p:spTree>
+      <p:nvGrpSpPr>
+        <p:cNvPr id="1" name=""/>
+        <p:cNvGrpSpPr/>
+        <p:nvPr/>
+      </p:nvGrpSpPr>
+      <p:grpSpPr>
+        <a:xfrm>
+          <a:off x="0" y="0"/>
+          <a:ext cx="0" cy="0"/>
+          <a:chOff x="0" y="0"/>
+          <a:chExt cx="0" cy="0"/>
+        </a:xfrm>
+      </p:grpSpPr>
+      <p:sp>
+        <p:nvSpPr>
+          <p:cNvPr id="2" name="Tytuł 1">
+            <a:extLst>
+              <a:ext uri="{FF2B5EF4-FFF2-40B4-BE49-F238E27FC236}">
+                <a16:creationId xmlns:a16="http://schemas.microsoft.com/office/drawing/2014/main" id="{0953BD17-A7FE-4352-9D7A-10482C6865A6}"/>
+              </a:ext>
+            </a:extLst>
+          </p:cNvPr>
+          <p:cNvSpPr>
+            <a:spLocks noGrp="1"/>
+          </p:cNvSpPr>
+          <p:nvPr>
+            <p:ph type="title"/>
+          </p:nvPr>
+        </p:nvSpPr>
+        <p:spPr>
+          <a:xfrm>
+            <a:off x="444500" y="412137"/>
+            <a:ext cx="9146972" cy="640080"/>
+          </a:xfrm>
+        </p:spPr>
+        <p:txBody>
+          <a:bodyPr rtlCol="0"/>
+          <a:lstStyle>
+            <a:defPPr>
+              <a:defRPr lang="pl-PL"/>
+            </a:defPPr>
+          </a:lstStyle>
+          <a:p>
+            <a:pPr rtl="0"/>
+            <a:r>
+              <a:rPr lang="en-US" b="1" dirty="0">
+                <a:latin typeface="Segoe UI Semibold" panose="020B0502040204020203" pitchFamily="34" charset="0"/>
+                <a:cs typeface="Segoe UI Semibold" panose="020B0502040204020203" pitchFamily="34" charset="0"/>
+              </a:rPr>
+              <a:t>Data Analysis</a:t>
+            </a:r>
+            <a:endParaRPr lang="pl-PL" b="1" dirty="0">
+              <a:latin typeface="Segoe UI Semibold" panose="020B0502040204020203" pitchFamily="34" charset="0"/>
+              <a:cs typeface="Segoe UI Semibold" panose="020B0502040204020203" pitchFamily="34" charset="0"/>
+            </a:endParaRPr>
+          </a:p>
+        </p:txBody>
+      </p:sp>
+      <p:pic>
+        <p:nvPicPr>
+          <p:cNvPr id="13" name="Picture 12">
+            <a:extLst>
+              <a:ext uri="{FF2B5EF4-FFF2-40B4-BE49-F238E27FC236}">
+                <a16:creationId xmlns:a16="http://schemas.microsoft.com/office/drawing/2014/main" id="{81BB4627-B5E0-8371-4FD2-730159D5F8B2}"/>
+              </a:ext>
+            </a:extLst>
+          </p:cNvPr>
+          <p:cNvPicPr>
+            <a:picLocks noChangeAspect="1"/>
+          </p:cNvPicPr>
+          <p:nvPr/>
+        </p:nvPicPr>
+        <p:blipFill>
+          <a:blip r:embed="rId3"/>
+          <a:stretch>
+            <a:fillRect/>
+          </a:stretch>
+        </p:blipFill>
+        <p:spPr>
+          <a:xfrm>
+            <a:off x="2679701" y="1334402"/>
+            <a:ext cx="6609861" cy="5278064"/>
+          </a:xfrm>
+          <a:prstGeom prst="rect">
+            <a:avLst/>
+          </a:prstGeom>
+        </p:spPr>
+      </p:pic>
+    </p:spTree>
+    <p:extLst>
+      <p:ext uri="{BB962C8B-B14F-4D97-AF65-F5344CB8AC3E}">
+        <p14:creationId xmlns:p14="http://schemas.microsoft.com/office/powerpoint/2010/main" val="3174130271"/>
+      </p:ext>
+    </p:extLst>
+  </p:cSld>
+  <p:clrMapOvr>
+    <a:masterClrMapping/>
+  </p:clrMapOvr>
+</p:sld>
+</file>
+
+<file path=ppt/slides/slide11.xml><?xml version="1.0" encoding="utf-8"?>
 <p:sld xmlns:a="http://schemas.openxmlformats.org/drawingml/2006/main" xmlns:r="http://schemas.openxmlformats.org/officeDocument/2006/relationships" xmlns:p="http://schemas.openxmlformats.org/presentationml/2006/main">
   <p:cSld>
     <p:spTree>
@@ -11927,7 +12169,7 @@
     </p:spTree>
     <p:extLst>
       <p:ext uri="{BB962C8B-B14F-4D97-AF65-F5344CB8AC3E}">
-        <p14:creationId xmlns:p14="http://schemas.microsoft.com/office/powerpoint/2010/main" val="3174130271"/>
+        <p14:creationId xmlns:p14="http://schemas.microsoft.com/office/powerpoint/2010/main" val="827920520"/>
       </p:ext>
     </p:extLst>
   </p:cSld>
@@ -11937,7 +12179,7 @@
 </p:sld>
 </file>
 
-<file path=ppt/slides/slide11.xml><?xml version="1.0" encoding="utf-8"?>
+<file path=ppt/slides/slide12.xml><?xml version="1.0" encoding="utf-8"?>
 <p:sld xmlns:a="http://schemas.openxmlformats.org/drawingml/2006/main" xmlns:r="http://schemas.openxmlformats.org/officeDocument/2006/relationships" xmlns:p="http://schemas.openxmlformats.org/presentationml/2006/main">
   <p:cSld>
     <p:spTree>
@@ -13436,7 +13678,7 @@
 </p:sld>
 </file>
 
-<file path=ppt/slides/slide12.xml><?xml version="1.0" encoding="utf-8"?>
+<file path=ppt/slides/slide13.xml><?xml version="1.0" encoding="utf-8"?>
 <p:sld xmlns:a="http://schemas.openxmlformats.org/drawingml/2006/main" xmlns:r="http://schemas.openxmlformats.org/officeDocument/2006/relationships" xmlns:p="http://schemas.openxmlformats.org/presentationml/2006/main">
   <p:cSld>
     <p:spTree>
@@ -15224,7 +15466,7 @@
 </p:sld>
 </file>
 
-<file path=ppt/slides/slide13.xml><?xml version="1.0" encoding="utf-8"?>
+<file path=ppt/slides/slide14.xml><?xml version="1.0" encoding="utf-8"?>
 <p:sld xmlns:a="http://schemas.openxmlformats.org/drawingml/2006/main" xmlns:r="http://schemas.openxmlformats.org/officeDocument/2006/relationships" xmlns:p="http://schemas.openxmlformats.org/presentationml/2006/main">
   <p:cSld>
     <p:spTree>
@@ -17272,7 +17514,7 @@
 </p:sld>
 </file>
 
-<file path=ppt/slides/slide14.xml><?xml version="1.0" encoding="utf-8"?>
+<file path=ppt/slides/slide15.xml><?xml version="1.0" encoding="utf-8"?>
 <p:sld xmlns:a="http://schemas.openxmlformats.org/drawingml/2006/main" xmlns:r="http://schemas.openxmlformats.org/officeDocument/2006/relationships" xmlns:p="http://schemas.openxmlformats.org/presentationml/2006/main">
   <p:cSld>
     <p:spTree>
@@ -22877,6 +23119,25 @@
 </file>
 
 <file path=customXml/item1.xml><?xml version="1.0" encoding="utf-8"?>
+<p:properties xmlns:p="http://schemas.microsoft.com/office/2006/metadata/properties" xmlns:xsi="http://www.w3.org/2001/XMLSchema-instance" xmlns:pc="http://schemas.microsoft.com/office/infopath/2007/PartnerControls">
+  <documentManagement>
+    <Status xmlns="71af3243-3dd4-4a8d-8c0d-dd76da1f02a5">Not started</Status>
+    <_ip_UnifiedCompliancePolicyUIAction xmlns="http://schemas.microsoft.com/sharepoint/v3" xsi:nil="true"/>
+    <Image xmlns="71af3243-3dd4-4a8d-8c0d-dd76da1f02a5">
+      <Url xsi:nil="true"/>
+      <Description xsi:nil="true"/>
+    </Image>
+    <_ip_UnifiedCompliancePolicyProperties xmlns="http://schemas.microsoft.com/sharepoint/v3" xsi:nil="true"/>
+    <ImageTagsTaxHTField xmlns="71af3243-3dd4-4a8d-8c0d-dd76da1f02a5">
+      <Terms xmlns="http://schemas.microsoft.com/office/infopath/2007/PartnerControls"/>
+    </ImageTagsTaxHTField>
+    <TaxCatchAll xmlns="230e9df3-be65-4c73-a93b-d1236ebd677e"/>
+    <MediaServiceKeyPoints xmlns="71af3243-3dd4-4a8d-8c0d-dd76da1f02a5" xsi:nil="true"/>
+  </documentManagement>
+</p:properties>
+</file>
+
+<file path=customXml/item2.xml><?xml version="1.0" encoding="utf-8"?>
 <ct:contentTypeSchema xmlns:ct="http://schemas.microsoft.com/office/2006/metadata/contentType" xmlns:ma="http://schemas.microsoft.com/office/2006/metadata/properties/metaAttributes" ct:_="" ma:_="" ma:contentTypeName="Document" ma:contentTypeID="0x01010079F111ED35F8CC479449609E8A0923A6" ma:contentTypeVersion="20" ma:contentTypeDescription="Create a new document." ma:contentTypeScope="" ma:versionID="1267097ee5f5874adfcc408041ae252e">
   <xsd:schema xmlns:xsd="http://www.w3.org/2001/XMLSchema" xmlns:xs="http://www.w3.org/2001/XMLSchema" xmlns:p="http://schemas.microsoft.com/office/2006/metadata/properties" xmlns:ns1="http://schemas.microsoft.com/sharepoint/v3" xmlns:ns2="71af3243-3dd4-4a8d-8c0d-dd76da1f02a5" xmlns:ns3="16c05727-aa75-4e4a-9b5f-8a80a1165891" xmlns:ns4="230e9df3-be65-4c73-a93b-d1236ebd677e" targetNamespace="http://schemas.microsoft.com/office/2006/metadata/properties" ma:root="true" ma:fieldsID="395891a93df65b14727750f2c06c306c" ns1:_="" ns2:_="" ns3:_="" ns4:_="">
     <xsd:import namespace="http://schemas.microsoft.com/sharepoint/v3"/>
@@ -23152,25 +23413,6 @@
 </ct:contentTypeSchema>
 </file>
 
-<file path=customXml/item2.xml><?xml version="1.0" encoding="utf-8"?>
-<p:properties xmlns:p="http://schemas.microsoft.com/office/2006/metadata/properties" xmlns:xsi="http://www.w3.org/2001/XMLSchema-instance" xmlns:pc="http://schemas.microsoft.com/office/infopath/2007/PartnerControls">
-  <documentManagement>
-    <Status xmlns="71af3243-3dd4-4a8d-8c0d-dd76da1f02a5">Not started</Status>
-    <_ip_UnifiedCompliancePolicyUIAction xmlns="http://schemas.microsoft.com/sharepoint/v3" xsi:nil="true"/>
-    <Image xmlns="71af3243-3dd4-4a8d-8c0d-dd76da1f02a5">
-      <Url xsi:nil="true"/>
-      <Description xsi:nil="true"/>
-    </Image>
-    <_ip_UnifiedCompliancePolicyProperties xmlns="http://schemas.microsoft.com/sharepoint/v3" xsi:nil="true"/>
-    <ImageTagsTaxHTField xmlns="71af3243-3dd4-4a8d-8c0d-dd76da1f02a5">
-      <Terms xmlns="http://schemas.microsoft.com/office/infopath/2007/PartnerControls"/>
-    </ImageTagsTaxHTField>
-    <TaxCatchAll xmlns="230e9df3-be65-4c73-a93b-d1236ebd677e"/>
-    <MediaServiceKeyPoints xmlns="71af3243-3dd4-4a8d-8c0d-dd76da1f02a5" xsi:nil="true"/>
-  </documentManagement>
-</p:properties>
-</file>
-
 <file path=customXml/item3.xml><?xml version="1.0" encoding="utf-8"?>
 <?mso-contentType ?>
 <FormTemplates xmlns="http://schemas.microsoft.com/sharepoint/v3/contenttype/forms">
@@ -23181,6 +23423,18 @@
 </file>
 
 <file path=customXml/itemProps1.xml><?xml version="1.0" encoding="utf-8"?>
+<ds:datastoreItem xmlns:ds="http://schemas.openxmlformats.org/officeDocument/2006/customXml" ds:itemID="{1C44B501-5DE1-46D9-B449-400C46FE1425}">
+  <ds:schemaRefs>
+    <ds:schemaRef ds:uri="http://schemas.microsoft.com/office/2006/metadata/properties"/>
+    <ds:schemaRef ds:uri="http://schemas.microsoft.com/office/infopath/2007/PartnerControls"/>
+    <ds:schemaRef ds:uri="71af3243-3dd4-4a8d-8c0d-dd76da1f02a5"/>
+    <ds:schemaRef ds:uri="http://schemas.microsoft.com/sharepoint/v3"/>
+    <ds:schemaRef ds:uri="230e9df3-be65-4c73-a93b-d1236ebd677e"/>
+  </ds:schemaRefs>
+</ds:datastoreItem>
+</file>
+
+<file path=customXml/itemProps2.xml><?xml version="1.0" encoding="utf-8"?>
 <ds:datastoreItem xmlns:ds="http://schemas.openxmlformats.org/officeDocument/2006/customXml" ds:itemID="{B2A44EB6-3BD3-4FF9-B8D1-D973C54C3ED7}">
   <ds:schemaRefs>
     <ds:schemaRef ds:uri="http://schemas.microsoft.com/office/2006/metadata/contentType"/>
@@ -23201,18 +23455,6 @@
 </ds:datastoreItem>
 </file>
 
-<file path=customXml/itemProps2.xml><?xml version="1.0" encoding="utf-8"?>
-<ds:datastoreItem xmlns:ds="http://schemas.openxmlformats.org/officeDocument/2006/customXml" ds:itemID="{1C44B501-5DE1-46D9-B449-400C46FE1425}">
-  <ds:schemaRefs>
-    <ds:schemaRef ds:uri="http://schemas.microsoft.com/office/2006/metadata/properties"/>
-    <ds:schemaRef ds:uri="http://schemas.microsoft.com/office/infopath/2007/PartnerControls"/>
-    <ds:schemaRef ds:uri="71af3243-3dd4-4a8d-8c0d-dd76da1f02a5"/>
-    <ds:schemaRef ds:uri="http://schemas.microsoft.com/sharepoint/v3"/>
-    <ds:schemaRef ds:uri="230e9df3-be65-4c73-a93b-d1236ebd677e"/>
-  </ds:schemaRefs>
-</ds:datastoreItem>
-</file>
-
 <file path=customXml/itemProps3.xml><?xml version="1.0" encoding="utf-8"?>
 <ds:datastoreItem xmlns:ds="http://schemas.openxmlformats.org/officeDocument/2006/customXml" ds:itemID="{77DD0DBF-30B2-4FC6-A5E7-8374DC718037}">
   <ds:schemaRefs>

</xml_diff>

<commit_message>
Slide 11. 13.78 minutes
</commit_message>
<xml_diff>
--- a/Presentation/Analyzing the StackOverflow2013 Database from 2008 to 2013.pptx
+++ b/Presentation/Analyzing the StackOverflow2013 Database from 2008 to 2013.pptx
@@ -5,7 +5,7 @@
     <p:sldMasterId id="2147483648" r:id="rId4"/>
   </p:sldMasterIdLst>
   <p:notesMasterIdLst>
-    <p:notesMasterId r:id="rId20"/>
+    <p:notesMasterId r:id="rId21"/>
   </p:notesMasterIdLst>
   <p:sldIdLst>
     <p:sldId id="259" r:id="rId5"/>
@@ -18,11 +18,12 @@
     <p:sldId id="271" r:id="rId12"/>
     <p:sldId id="275" r:id="rId13"/>
     <p:sldId id="274" r:id="rId14"/>
-    <p:sldId id="276" r:id="rId15"/>
-    <p:sldId id="265" r:id="rId16"/>
-    <p:sldId id="272" r:id="rId17"/>
-    <p:sldId id="264" r:id="rId18"/>
-    <p:sldId id="263" r:id="rId19"/>
+    <p:sldId id="277" r:id="rId15"/>
+    <p:sldId id="276" r:id="rId16"/>
+    <p:sldId id="265" r:id="rId17"/>
+    <p:sldId id="272" r:id="rId18"/>
+    <p:sldId id="264" r:id="rId19"/>
+    <p:sldId id="263" r:id="rId20"/>
   </p:sldIdLst>
   <p:sldSz cx="12192000" cy="6858000"/>
   <p:notesSz cx="6858000" cy="9144000"/>
@@ -5383,7 +5384,45 @@
           <a:bodyPr/>
           <a:lstStyle/>
           <a:p>
-            <a:endParaRPr lang="pl-PL"/>
+            <a:pPr algn="just"/>
+            <a:r>
+              <a:rPr lang="en-US" dirty="0"/>
+              <a:t>This slide presents an analysis aimed at identifying the top 5 active users on Stack Overflow by post count, along with their most engaged tags. I’ve used Spark to filter and process posts, and then to count and rank user activity. By exploding the tags column, I ensured each tag associated with a post was considered individually, which allowed me to determine the most common tags per user.</a:t>
+            </a:r>
+          </a:p>
+          <a:p>
+            <a:pPr algn="just"/>
+            <a:endParaRPr lang="en-US" dirty="0"/>
+          </a:p>
+          <a:p>
+            <a:pPr algn="just"/>
+            <a:r>
+              <a:rPr lang="en-US" dirty="0"/>
+              <a:t>After aggregating the total post counts and the most active tags for each user, I joined this data with the users' details to provide a more comprehensive view. The result of this join operation gave me a table showcasing users' display names, their total post counts, and their primary tags.</a:t>
+            </a:r>
+          </a:p>
+          <a:p>
+            <a:pPr algn="just"/>
+            <a:endParaRPr lang="en-US" dirty="0"/>
+          </a:p>
+          <a:p>
+            <a:pPr algn="just"/>
+            <a:r>
+              <a:rPr lang="en-US" dirty="0"/>
+              <a:t>Finally, I visualized this data using Python's matplotlib and pandas libraries to create the pie chart you see here. This chart  highlights the proportion of contributions from each of the top users.</a:t>
+            </a:r>
+          </a:p>
+          <a:p>
+            <a:pPr algn="just"/>
+            <a:endParaRPr lang="en-US" dirty="0"/>
+          </a:p>
+          <a:p>
+            <a:pPr algn="just"/>
+            <a:r>
+              <a:rPr lang="en-US"/>
+              <a:t>1.75 ‘</a:t>
+            </a:r>
+            <a:endParaRPr lang="pl-PL" dirty="0"/>
           </a:p>
         </p:txBody>
       </p:sp>
@@ -5414,7 +5453,7 @@
     </p:spTree>
     <p:extLst>
       <p:ext uri="{BB962C8B-B14F-4D97-AF65-F5344CB8AC3E}">
-        <p14:creationId xmlns:p14="http://schemas.microsoft.com/office/powerpoint/2010/main" val="2684082676"/>
+        <p14:creationId xmlns:p14="http://schemas.microsoft.com/office/powerpoint/2010/main" val="3968523558"/>
       </p:ext>
     </p:extLst>
   </p:cSld>
@@ -5499,6 +5538,91 @@
     </p:spTree>
     <p:extLst>
       <p:ext uri="{BB962C8B-B14F-4D97-AF65-F5344CB8AC3E}">
+        <p14:creationId xmlns:p14="http://schemas.microsoft.com/office/powerpoint/2010/main" val="2684082676"/>
+      </p:ext>
+    </p:extLst>
+  </p:cSld>
+  <p:clrMapOvr>
+    <a:masterClrMapping/>
+  </p:clrMapOvr>
+</p:notes>
+</file>
+
+<file path=ppt/notesSlides/notesSlide13.xml><?xml version="1.0" encoding="utf-8"?>
+<p:notes xmlns:a="http://schemas.openxmlformats.org/drawingml/2006/main" xmlns:r="http://schemas.openxmlformats.org/officeDocument/2006/relationships" xmlns:p="http://schemas.openxmlformats.org/presentationml/2006/main">
+  <p:cSld>
+    <p:spTree>
+      <p:nvGrpSpPr>
+        <p:cNvPr id="1" name=""/>
+        <p:cNvGrpSpPr/>
+        <p:nvPr/>
+      </p:nvGrpSpPr>
+      <p:grpSpPr>
+        <a:xfrm>
+          <a:off x="0" y="0"/>
+          <a:ext cx="0" cy="0"/>
+          <a:chOff x="0" y="0"/>
+          <a:chExt cx="0" cy="0"/>
+        </a:xfrm>
+      </p:grpSpPr>
+      <p:sp>
+        <p:nvSpPr>
+          <p:cNvPr id="2" name="Slide Image Placeholder 1"/>
+          <p:cNvSpPr>
+            <a:spLocks noGrp="1" noRot="1" noChangeAspect="1"/>
+          </p:cNvSpPr>
+          <p:nvPr>
+            <p:ph type="sldImg"/>
+          </p:nvPr>
+        </p:nvSpPr>
+        <p:spPr/>
+      </p:sp>
+      <p:sp>
+        <p:nvSpPr>
+          <p:cNvPr id="3" name="Notes Placeholder 2"/>
+          <p:cNvSpPr>
+            <a:spLocks noGrp="1"/>
+          </p:cNvSpPr>
+          <p:nvPr>
+            <p:ph type="body" idx="1"/>
+          </p:nvPr>
+        </p:nvSpPr>
+        <p:spPr/>
+        <p:txBody>
+          <a:bodyPr/>
+          <a:lstStyle/>
+          <a:p>
+            <a:endParaRPr lang="pl-PL"/>
+          </a:p>
+        </p:txBody>
+      </p:sp>
+      <p:sp>
+        <p:nvSpPr>
+          <p:cNvPr id="4" name="Slide Number Placeholder 3"/>
+          <p:cNvSpPr>
+            <a:spLocks noGrp="1"/>
+          </p:cNvSpPr>
+          <p:nvPr>
+            <p:ph type="sldNum" sz="quarter" idx="5"/>
+          </p:nvPr>
+        </p:nvSpPr>
+        <p:spPr/>
+        <p:txBody>
+          <a:bodyPr/>
+          <a:lstStyle/>
+          <a:p>
+            <a:pPr rtl="0"/>
+            <a:fld id="{BC0C2C40-CB1C-4820-9151-EC51EC2E7E0F}" type="slidenum">
+              <a:rPr lang="pl-PL" smtClean="0"/>
+              <a:t>13</a:t>
+            </a:fld>
+            <a:endParaRPr lang="pl-PL" dirty="0"/>
+          </a:p>
+        </p:txBody>
+      </p:sp>
+    </p:spTree>
+    <p:extLst>
+      <p:ext uri="{BB962C8B-B14F-4D97-AF65-F5344CB8AC3E}">
         <p14:creationId xmlns:p14="http://schemas.microsoft.com/office/powerpoint/2010/main" val="2743713819"/>
       </p:ext>
     </p:extLst>
@@ -5509,7 +5633,7 @@
 </p:notes>
 </file>
 
-<file path=ppt/notesSlides/notesSlide13.xml><?xml version="1.0" encoding="utf-8"?>
+<file path=ppt/notesSlides/notesSlide14.xml><?xml version="1.0" encoding="utf-8"?>
 <p:notes xmlns:a="http://schemas.openxmlformats.org/drawingml/2006/main" xmlns:r="http://schemas.openxmlformats.org/officeDocument/2006/relationships" xmlns:p="http://schemas.openxmlformats.org/presentationml/2006/main">
   <p:cSld>
     <p:spTree>
@@ -5584,7 +5708,7 @@
             <a:pPr rtl="0"/>
             <a:fld id="{BC0C2C40-CB1C-4820-9151-EC51EC2E7E0F}" type="slidenum">
               <a:rPr lang="pl-PL" smtClean="0"/>
-              <a:t>15</a:t>
+              <a:t>16</a:t>
             </a:fld>
             <a:endParaRPr lang="pl-PL" dirty="0"/>
           </a:p>
@@ -11116,6 +11240,188 @@
 </file>
 
 <file path=ppt/slides/slide11.xml><?xml version="1.0" encoding="utf-8"?>
+<p:sld xmlns:a="http://schemas.openxmlformats.org/drawingml/2006/main" xmlns:r="http://schemas.openxmlformats.org/officeDocument/2006/relationships" xmlns:p="http://schemas.openxmlformats.org/presentationml/2006/main">
+  <p:cSld>
+    <p:spTree>
+      <p:nvGrpSpPr>
+        <p:cNvPr id="1" name=""/>
+        <p:cNvGrpSpPr/>
+        <p:nvPr/>
+      </p:nvGrpSpPr>
+      <p:grpSpPr>
+        <a:xfrm>
+          <a:off x="0" y="0"/>
+          <a:ext cx="0" cy="0"/>
+          <a:chOff x="0" y="0"/>
+          <a:chExt cx="0" cy="0"/>
+        </a:xfrm>
+      </p:grpSpPr>
+      <p:sp>
+        <p:nvSpPr>
+          <p:cNvPr id="2" name="Tytuł 1">
+            <a:extLst>
+              <a:ext uri="{FF2B5EF4-FFF2-40B4-BE49-F238E27FC236}">
+                <a16:creationId xmlns:a16="http://schemas.microsoft.com/office/drawing/2014/main" id="{0953BD17-A7FE-4352-9D7A-10482C6865A6}"/>
+              </a:ext>
+            </a:extLst>
+          </p:cNvPr>
+          <p:cNvSpPr>
+            <a:spLocks noGrp="1"/>
+          </p:cNvSpPr>
+          <p:nvPr>
+            <p:ph type="title"/>
+          </p:nvPr>
+        </p:nvSpPr>
+        <p:spPr>
+          <a:xfrm>
+            <a:off x="444500" y="412137"/>
+            <a:ext cx="9146972" cy="640080"/>
+          </a:xfrm>
+        </p:spPr>
+        <p:txBody>
+          <a:bodyPr rtlCol="0"/>
+          <a:lstStyle>
+            <a:defPPr>
+              <a:defRPr lang="pl-PL"/>
+            </a:defPPr>
+          </a:lstStyle>
+          <a:p>
+            <a:pPr rtl="0"/>
+            <a:r>
+              <a:rPr lang="en-US" b="1" dirty="0">
+                <a:latin typeface="Segoe UI Semibold" panose="020B0502040204020203" pitchFamily="34" charset="0"/>
+                <a:cs typeface="Segoe UI Semibold" panose="020B0502040204020203" pitchFamily="34" charset="0"/>
+              </a:rPr>
+              <a:t>Data Analysis</a:t>
+            </a:r>
+            <a:endParaRPr lang="pl-PL" b="1" dirty="0">
+              <a:latin typeface="Segoe UI Semibold" panose="020B0502040204020203" pitchFamily="34" charset="0"/>
+              <a:cs typeface="Segoe UI Semibold" panose="020B0502040204020203" pitchFamily="34" charset="0"/>
+            </a:endParaRPr>
+          </a:p>
+        </p:txBody>
+      </p:sp>
+      <p:pic>
+        <p:nvPicPr>
+          <p:cNvPr id="4" name="Picture 3">
+            <a:extLst>
+              <a:ext uri="{FF2B5EF4-FFF2-40B4-BE49-F238E27FC236}">
+                <a16:creationId xmlns:a16="http://schemas.microsoft.com/office/drawing/2014/main" id="{4AF747B1-C90C-9A4C-610F-B39799D6DCA3}"/>
+              </a:ext>
+            </a:extLst>
+          </p:cNvPr>
+          <p:cNvPicPr>
+            <a:picLocks noChangeAspect="1"/>
+          </p:cNvPicPr>
+          <p:nvPr/>
+        </p:nvPicPr>
+        <p:blipFill>
+          <a:blip r:embed="rId3"/>
+          <a:stretch>
+            <a:fillRect/>
+          </a:stretch>
+        </p:blipFill>
+        <p:spPr>
+          <a:xfrm>
+            <a:off x="444500" y="1173337"/>
+            <a:ext cx="4330210" cy="5413730"/>
+          </a:xfrm>
+          <a:prstGeom prst="rect">
+            <a:avLst/>
+          </a:prstGeom>
+        </p:spPr>
+      </p:pic>
+      <p:pic>
+        <p:nvPicPr>
+          <p:cNvPr id="6" name="Picture 5">
+            <a:extLst>
+              <a:ext uri="{FF2B5EF4-FFF2-40B4-BE49-F238E27FC236}">
+                <a16:creationId xmlns:a16="http://schemas.microsoft.com/office/drawing/2014/main" id="{38525782-1796-91EC-2FB4-0011A6F8571E}"/>
+              </a:ext>
+            </a:extLst>
+          </p:cNvPr>
+          <p:cNvPicPr>
+            <a:picLocks noChangeAspect="1"/>
+          </p:cNvPicPr>
+          <p:nvPr/>
+        </p:nvPicPr>
+        <p:blipFill>
+          <a:blip r:embed="rId4"/>
+          <a:stretch>
+            <a:fillRect/>
+          </a:stretch>
+        </p:blipFill>
+        <p:spPr>
+          <a:xfrm>
+            <a:off x="6903382" y="1173337"/>
+            <a:ext cx="3881022" cy="2476877"/>
+          </a:xfrm>
+          <a:prstGeom prst="rect">
+            <a:avLst/>
+          </a:prstGeom>
+        </p:spPr>
+      </p:pic>
+      <p:pic>
+        <p:nvPicPr>
+          <p:cNvPr id="1026" name="Picture 2">
+            <a:extLst>
+              <a:ext uri="{FF2B5EF4-FFF2-40B4-BE49-F238E27FC236}">
+                <a16:creationId xmlns:a16="http://schemas.microsoft.com/office/drawing/2014/main" id="{58732892-A8E3-CBA1-605D-E93FE9A0425A}"/>
+              </a:ext>
+            </a:extLst>
+          </p:cNvPr>
+          <p:cNvPicPr>
+            <a:picLocks noChangeAspect="1" noChangeArrowheads="1"/>
+          </p:cNvPicPr>
+          <p:nvPr/>
+        </p:nvPicPr>
+        <p:blipFill>
+          <a:blip r:embed="rId5">
+            <a:extLst>
+              <a:ext uri="{28A0092B-C50C-407E-A947-70E740481C1C}">
+                <a14:useLocalDpi xmlns:a14="http://schemas.microsoft.com/office/drawing/2010/main" val="0"/>
+              </a:ext>
+            </a:extLst>
+          </a:blip>
+          <a:srcRect/>
+          <a:stretch>
+            <a:fillRect/>
+          </a:stretch>
+        </p:blipFill>
+        <p:spPr bwMode="auto">
+          <a:xfrm>
+            <a:off x="5118108" y="3848100"/>
+            <a:ext cx="3210447" cy="2858558"/>
+          </a:xfrm>
+          <a:prstGeom prst="rect">
+            <a:avLst/>
+          </a:prstGeom>
+          <a:noFill/>
+          <a:extLst>
+            <a:ext uri="{909E8E84-426E-40DD-AFC4-6F175D3DCCD1}">
+              <a14:hiddenFill xmlns:a14="http://schemas.microsoft.com/office/drawing/2010/main">
+                <a:solidFill>
+                  <a:srgbClr val="FFFFFF"/>
+                </a:solidFill>
+              </a14:hiddenFill>
+            </a:ext>
+          </a:extLst>
+        </p:spPr>
+      </p:pic>
+    </p:spTree>
+    <p:extLst>
+      <p:ext uri="{BB962C8B-B14F-4D97-AF65-F5344CB8AC3E}">
+        <p14:creationId xmlns:p14="http://schemas.microsoft.com/office/powerpoint/2010/main" val="4294810547"/>
+      </p:ext>
+    </p:extLst>
+  </p:cSld>
+  <p:clrMapOvr>
+    <a:masterClrMapping/>
+  </p:clrMapOvr>
+</p:sld>
+</file>
+
+<file path=ppt/slides/slide12.xml><?xml version="1.0" encoding="utf-8"?>
 <p:sld xmlns:a="http://schemas.openxmlformats.org/drawingml/2006/main" xmlns:r="http://schemas.openxmlformats.org/officeDocument/2006/relationships" xmlns:p="http://schemas.openxmlformats.org/presentationml/2006/main">
   <p:cSld>
     <p:spTree>
@@ -12179,7 +12485,7 @@
 </p:sld>
 </file>
 
-<file path=ppt/slides/slide12.xml><?xml version="1.0" encoding="utf-8"?>
+<file path=ppt/slides/slide13.xml><?xml version="1.0" encoding="utf-8"?>
 <p:sld xmlns:a="http://schemas.openxmlformats.org/drawingml/2006/main" xmlns:r="http://schemas.openxmlformats.org/officeDocument/2006/relationships" xmlns:p="http://schemas.openxmlformats.org/presentationml/2006/main">
   <p:cSld>
     <p:spTree>
@@ -13678,7 +13984,7 @@
 </p:sld>
 </file>
 
-<file path=ppt/slides/slide13.xml><?xml version="1.0" encoding="utf-8"?>
+<file path=ppt/slides/slide14.xml><?xml version="1.0" encoding="utf-8"?>
 <p:sld xmlns:a="http://schemas.openxmlformats.org/drawingml/2006/main" xmlns:r="http://schemas.openxmlformats.org/officeDocument/2006/relationships" xmlns:p="http://schemas.openxmlformats.org/presentationml/2006/main">
   <p:cSld>
     <p:spTree>
@@ -15466,7 +15772,7 @@
 </p:sld>
 </file>
 
-<file path=ppt/slides/slide14.xml><?xml version="1.0" encoding="utf-8"?>
+<file path=ppt/slides/slide15.xml><?xml version="1.0" encoding="utf-8"?>
 <p:sld xmlns:a="http://schemas.openxmlformats.org/drawingml/2006/main" xmlns:r="http://schemas.openxmlformats.org/officeDocument/2006/relationships" xmlns:p="http://schemas.openxmlformats.org/presentationml/2006/main">
   <p:cSld>
     <p:spTree>
@@ -17514,7 +17820,7 @@
 </p:sld>
 </file>
 
-<file path=ppt/slides/slide15.xml><?xml version="1.0" encoding="utf-8"?>
+<file path=ppt/slides/slide16.xml><?xml version="1.0" encoding="utf-8"?>
 <p:sld xmlns:a="http://schemas.openxmlformats.org/drawingml/2006/main" xmlns:r="http://schemas.openxmlformats.org/officeDocument/2006/relationships" xmlns:p="http://schemas.openxmlformats.org/presentationml/2006/main">
   <p:cSld>
     <p:spTree>
@@ -23119,25 +23425,6 @@
 </file>
 
 <file path=customXml/item1.xml><?xml version="1.0" encoding="utf-8"?>
-<p:properties xmlns:p="http://schemas.microsoft.com/office/2006/metadata/properties" xmlns:xsi="http://www.w3.org/2001/XMLSchema-instance" xmlns:pc="http://schemas.microsoft.com/office/infopath/2007/PartnerControls">
-  <documentManagement>
-    <Status xmlns="71af3243-3dd4-4a8d-8c0d-dd76da1f02a5">Not started</Status>
-    <_ip_UnifiedCompliancePolicyUIAction xmlns="http://schemas.microsoft.com/sharepoint/v3" xsi:nil="true"/>
-    <Image xmlns="71af3243-3dd4-4a8d-8c0d-dd76da1f02a5">
-      <Url xsi:nil="true"/>
-      <Description xsi:nil="true"/>
-    </Image>
-    <_ip_UnifiedCompliancePolicyProperties xmlns="http://schemas.microsoft.com/sharepoint/v3" xsi:nil="true"/>
-    <ImageTagsTaxHTField xmlns="71af3243-3dd4-4a8d-8c0d-dd76da1f02a5">
-      <Terms xmlns="http://schemas.microsoft.com/office/infopath/2007/PartnerControls"/>
-    </ImageTagsTaxHTField>
-    <TaxCatchAll xmlns="230e9df3-be65-4c73-a93b-d1236ebd677e"/>
-    <MediaServiceKeyPoints xmlns="71af3243-3dd4-4a8d-8c0d-dd76da1f02a5" xsi:nil="true"/>
-  </documentManagement>
-</p:properties>
-</file>
-
-<file path=customXml/item2.xml><?xml version="1.0" encoding="utf-8"?>
 <ct:contentTypeSchema xmlns:ct="http://schemas.microsoft.com/office/2006/metadata/contentType" xmlns:ma="http://schemas.microsoft.com/office/2006/metadata/properties/metaAttributes" ct:_="" ma:_="" ma:contentTypeName="Document" ma:contentTypeID="0x01010079F111ED35F8CC479449609E8A0923A6" ma:contentTypeVersion="20" ma:contentTypeDescription="Create a new document." ma:contentTypeScope="" ma:versionID="1267097ee5f5874adfcc408041ae252e">
   <xsd:schema xmlns:xsd="http://www.w3.org/2001/XMLSchema" xmlns:xs="http://www.w3.org/2001/XMLSchema" xmlns:p="http://schemas.microsoft.com/office/2006/metadata/properties" xmlns:ns1="http://schemas.microsoft.com/sharepoint/v3" xmlns:ns2="71af3243-3dd4-4a8d-8c0d-dd76da1f02a5" xmlns:ns3="16c05727-aa75-4e4a-9b5f-8a80a1165891" xmlns:ns4="230e9df3-be65-4c73-a93b-d1236ebd677e" targetNamespace="http://schemas.microsoft.com/office/2006/metadata/properties" ma:root="true" ma:fieldsID="395891a93df65b14727750f2c06c306c" ns1:_="" ns2:_="" ns3:_="" ns4:_="">
     <xsd:import namespace="http://schemas.microsoft.com/sharepoint/v3"/>
@@ -23413,6 +23700,25 @@
 </ct:contentTypeSchema>
 </file>
 
+<file path=customXml/item2.xml><?xml version="1.0" encoding="utf-8"?>
+<p:properties xmlns:p="http://schemas.microsoft.com/office/2006/metadata/properties" xmlns:xsi="http://www.w3.org/2001/XMLSchema-instance" xmlns:pc="http://schemas.microsoft.com/office/infopath/2007/PartnerControls">
+  <documentManagement>
+    <Status xmlns="71af3243-3dd4-4a8d-8c0d-dd76da1f02a5">Not started</Status>
+    <_ip_UnifiedCompliancePolicyUIAction xmlns="http://schemas.microsoft.com/sharepoint/v3" xsi:nil="true"/>
+    <Image xmlns="71af3243-3dd4-4a8d-8c0d-dd76da1f02a5">
+      <Url xsi:nil="true"/>
+      <Description xsi:nil="true"/>
+    </Image>
+    <_ip_UnifiedCompliancePolicyProperties xmlns="http://schemas.microsoft.com/sharepoint/v3" xsi:nil="true"/>
+    <ImageTagsTaxHTField xmlns="71af3243-3dd4-4a8d-8c0d-dd76da1f02a5">
+      <Terms xmlns="http://schemas.microsoft.com/office/infopath/2007/PartnerControls"/>
+    </ImageTagsTaxHTField>
+    <TaxCatchAll xmlns="230e9df3-be65-4c73-a93b-d1236ebd677e"/>
+    <MediaServiceKeyPoints xmlns="71af3243-3dd4-4a8d-8c0d-dd76da1f02a5" xsi:nil="true"/>
+  </documentManagement>
+</p:properties>
+</file>
+
 <file path=customXml/item3.xml><?xml version="1.0" encoding="utf-8"?>
 <?mso-contentType ?>
 <FormTemplates xmlns="http://schemas.microsoft.com/sharepoint/v3/contenttype/forms">
@@ -23423,18 +23729,6 @@
 </file>
 
 <file path=customXml/itemProps1.xml><?xml version="1.0" encoding="utf-8"?>
-<ds:datastoreItem xmlns:ds="http://schemas.openxmlformats.org/officeDocument/2006/customXml" ds:itemID="{1C44B501-5DE1-46D9-B449-400C46FE1425}">
-  <ds:schemaRefs>
-    <ds:schemaRef ds:uri="http://schemas.microsoft.com/office/2006/metadata/properties"/>
-    <ds:schemaRef ds:uri="http://schemas.microsoft.com/office/infopath/2007/PartnerControls"/>
-    <ds:schemaRef ds:uri="71af3243-3dd4-4a8d-8c0d-dd76da1f02a5"/>
-    <ds:schemaRef ds:uri="http://schemas.microsoft.com/sharepoint/v3"/>
-    <ds:schemaRef ds:uri="230e9df3-be65-4c73-a93b-d1236ebd677e"/>
-  </ds:schemaRefs>
-</ds:datastoreItem>
-</file>
-
-<file path=customXml/itemProps2.xml><?xml version="1.0" encoding="utf-8"?>
 <ds:datastoreItem xmlns:ds="http://schemas.openxmlformats.org/officeDocument/2006/customXml" ds:itemID="{B2A44EB6-3BD3-4FF9-B8D1-D973C54C3ED7}">
   <ds:schemaRefs>
     <ds:schemaRef ds:uri="http://schemas.microsoft.com/office/2006/metadata/contentType"/>
@@ -23455,6 +23749,18 @@
 </ds:datastoreItem>
 </file>
 
+<file path=customXml/itemProps2.xml><?xml version="1.0" encoding="utf-8"?>
+<ds:datastoreItem xmlns:ds="http://schemas.openxmlformats.org/officeDocument/2006/customXml" ds:itemID="{1C44B501-5DE1-46D9-B449-400C46FE1425}">
+  <ds:schemaRefs>
+    <ds:schemaRef ds:uri="http://schemas.microsoft.com/office/2006/metadata/properties"/>
+    <ds:schemaRef ds:uri="http://schemas.microsoft.com/office/infopath/2007/PartnerControls"/>
+    <ds:schemaRef ds:uri="71af3243-3dd4-4a8d-8c0d-dd76da1f02a5"/>
+    <ds:schemaRef ds:uri="http://schemas.microsoft.com/sharepoint/v3"/>
+    <ds:schemaRef ds:uri="230e9df3-be65-4c73-a93b-d1236ebd677e"/>
+  </ds:schemaRefs>
+</ds:datastoreItem>
+</file>
+
 <file path=customXml/itemProps3.xml><?xml version="1.0" encoding="utf-8"?>
 <ds:datastoreItem xmlns:ds="http://schemas.openxmlformats.org/officeDocument/2006/customXml" ds:itemID="{77DD0DBF-30B2-4FC6-A5E7-8374DC718037}">
   <ds:schemaRefs>

</xml_diff>

<commit_message>
Slide 12. 14.68 minutes
</commit_message>
<xml_diff>
--- a/Presentation/Analyzing the StackOverflow2013 Database from 2008 to 2013.pptx
+++ b/Presentation/Analyzing the StackOverflow2013 Database from 2008 to 2013.pptx
@@ -5,7 +5,7 @@
     <p:sldMasterId id="2147483648" r:id="rId4"/>
   </p:sldMasterIdLst>
   <p:notesMasterIdLst>
-    <p:notesMasterId r:id="rId21"/>
+    <p:notesMasterId r:id="rId23"/>
   </p:notesMasterIdLst>
   <p:sldIdLst>
     <p:sldId id="259" r:id="rId5"/>
@@ -19,11 +19,13 @@
     <p:sldId id="275" r:id="rId13"/>
     <p:sldId id="274" r:id="rId14"/>
     <p:sldId id="277" r:id="rId15"/>
-    <p:sldId id="276" r:id="rId16"/>
-    <p:sldId id="265" r:id="rId17"/>
-    <p:sldId id="272" r:id="rId18"/>
-    <p:sldId id="264" r:id="rId19"/>
-    <p:sldId id="263" r:id="rId20"/>
+    <p:sldId id="278" r:id="rId16"/>
+    <p:sldId id="279" r:id="rId17"/>
+    <p:sldId id="276" r:id="rId18"/>
+    <p:sldId id="265" r:id="rId19"/>
+    <p:sldId id="272" r:id="rId20"/>
+    <p:sldId id="264" r:id="rId21"/>
+    <p:sldId id="263" r:id="rId22"/>
   </p:sldIdLst>
   <p:sldSz cx="12192000" cy="6858000"/>
   <p:notesSz cx="6858000" cy="9144000"/>
@@ -5507,7 +5509,42 @@
           <a:bodyPr/>
           <a:lstStyle/>
           <a:p>
-            <a:endParaRPr lang="pl-PL"/>
+            <a:pPr algn="just"/>
+            <a:r>
+              <a:rPr lang="en-US" dirty="0"/>
+              <a:t>This slide demonstrates a methodical approach to counting annual posts in a forum dataset, specifically focusing on content related to the Scala programming language. Initially, I utilized Spark's </a:t>
+            </a:r>
+            <a:r>
+              <a:rPr lang="en-US" dirty="0" err="1"/>
+              <a:t>DataFrame</a:t>
+            </a:r>
+            <a:r>
+              <a:rPr lang="en-US" dirty="0"/>
+              <a:t> API to filter the dataset for posts tagged with 'Scala'. Next, I extracted the year from each post's creation date and aggregated the count of posts per year. This process involved sorting and grouping the data to facilitate a clearer analysis.</a:t>
+            </a:r>
+          </a:p>
+          <a:p>
+            <a:pPr algn="just"/>
+            <a:endParaRPr lang="en-US" dirty="0"/>
+          </a:p>
+          <a:p>
+            <a:pPr algn="just"/>
+            <a:r>
+              <a:rPr lang="en-US" dirty="0"/>
+              <a:t>To visualize the trends, I employed Python's matplotlib and pandas libraries again, creating a bar chart.</a:t>
+            </a:r>
+          </a:p>
+          <a:p>
+            <a:pPr algn="just"/>
+            <a:endParaRPr lang="en-US" dirty="0"/>
+          </a:p>
+          <a:p>
+            <a:pPr algn="just"/>
+            <a:r>
+              <a:rPr lang="en-US" dirty="0"/>
+              <a:t>0.45’</a:t>
+            </a:r>
+            <a:endParaRPr lang="pl-PL" dirty="0"/>
           </a:p>
         </p:txBody>
       </p:sp>
@@ -5538,7 +5575,7 @@
     </p:spTree>
     <p:extLst>
       <p:ext uri="{BB962C8B-B14F-4D97-AF65-F5344CB8AC3E}">
-        <p14:creationId xmlns:p14="http://schemas.microsoft.com/office/powerpoint/2010/main" val="2684082676"/>
+        <p14:creationId xmlns:p14="http://schemas.microsoft.com/office/powerpoint/2010/main" val="1483687677"/>
       </p:ext>
     </p:extLst>
   </p:cSld>
@@ -5592,7 +5629,45 @@
           <a:bodyPr/>
           <a:lstStyle/>
           <a:p>
-            <a:endParaRPr lang="pl-PL"/>
+            <a:pPr algn="just"/>
+            <a:r>
+              <a:rPr lang="en-US" dirty="0"/>
+              <a:t>This slide focuses on finding the top participant regarding Scala topics. I began by filtering the posts for those tagged with 'Scala' and then prepared a dataset of comments related to these posts. By joining the two datasets and selecting relevant fields, I aggregated scores from both posts and comments for each user.</a:t>
+            </a:r>
+          </a:p>
+          <a:p>
+            <a:pPr algn="just"/>
+            <a:endParaRPr lang="en-US" dirty="0"/>
+          </a:p>
+          <a:p>
+            <a:pPr algn="just"/>
+            <a:r>
+              <a:rPr lang="en-US" dirty="0"/>
+              <a:t>Next, I combined these scores to get a comprehensive view of user engagement. The final step was to identify the top contributor, which I achieved by ordering the combined scores and limiting the results to the single highest score.</a:t>
+            </a:r>
+          </a:p>
+          <a:p>
+            <a:pPr algn="just"/>
+            <a:endParaRPr lang="en-US" dirty="0"/>
+          </a:p>
+          <a:p>
+            <a:pPr algn="just"/>
+            <a:r>
+              <a:rPr lang="en-US" dirty="0"/>
+              <a:t>The outcome of this analysis highlighted a user, showcased on the right of the slide, who emerged as the Scala guru with an impressive total score, reflecting their expertise and active participation in the Scala community.</a:t>
+            </a:r>
+          </a:p>
+          <a:p>
+            <a:pPr algn="just"/>
+            <a:endParaRPr lang="en-US" dirty="0"/>
+          </a:p>
+          <a:p>
+            <a:pPr algn="just"/>
+            <a:r>
+              <a:rPr lang="en-US"/>
+              <a:t>0.45’</a:t>
+            </a:r>
+            <a:endParaRPr lang="pl-PL" dirty="0"/>
           </a:p>
         </p:txBody>
       </p:sp>
@@ -5623,6 +5698,176 @@
     </p:spTree>
     <p:extLst>
       <p:ext uri="{BB962C8B-B14F-4D97-AF65-F5344CB8AC3E}">
+        <p14:creationId xmlns:p14="http://schemas.microsoft.com/office/powerpoint/2010/main" val="449859493"/>
+      </p:ext>
+    </p:extLst>
+  </p:cSld>
+  <p:clrMapOvr>
+    <a:masterClrMapping/>
+  </p:clrMapOvr>
+</p:notes>
+</file>
+
+<file path=ppt/notesSlides/notesSlide14.xml><?xml version="1.0" encoding="utf-8"?>
+<p:notes xmlns:a="http://schemas.openxmlformats.org/drawingml/2006/main" xmlns:r="http://schemas.openxmlformats.org/officeDocument/2006/relationships" xmlns:p="http://schemas.openxmlformats.org/presentationml/2006/main">
+  <p:cSld>
+    <p:spTree>
+      <p:nvGrpSpPr>
+        <p:cNvPr id="1" name=""/>
+        <p:cNvGrpSpPr/>
+        <p:nvPr/>
+      </p:nvGrpSpPr>
+      <p:grpSpPr>
+        <a:xfrm>
+          <a:off x="0" y="0"/>
+          <a:ext cx="0" cy="0"/>
+          <a:chOff x="0" y="0"/>
+          <a:chExt cx="0" cy="0"/>
+        </a:xfrm>
+      </p:grpSpPr>
+      <p:sp>
+        <p:nvSpPr>
+          <p:cNvPr id="2" name="Slide Image Placeholder 1"/>
+          <p:cNvSpPr>
+            <a:spLocks noGrp="1" noRot="1" noChangeAspect="1"/>
+          </p:cNvSpPr>
+          <p:nvPr>
+            <p:ph type="sldImg"/>
+          </p:nvPr>
+        </p:nvSpPr>
+        <p:spPr/>
+      </p:sp>
+      <p:sp>
+        <p:nvSpPr>
+          <p:cNvPr id="3" name="Notes Placeholder 2"/>
+          <p:cNvSpPr>
+            <a:spLocks noGrp="1"/>
+          </p:cNvSpPr>
+          <p:nvPr>
+            <p:ph type="body" idx="1"/>
+          </p:nvPr>
+        </p:nvSpPr>
+        <p:spPr/>
+        <p:txBody>
+          <a:bodyPr/>
+          <a:lstStyle/>
+          <a:p>
+            <a:endParaRPr lang="pl-PL"/>
+          </a:p>
+        </p:txBody>
+      </p:sp>
+      <p:sp>
+        <p:nvSpPr>
+          <p:cNvPr id="4" name="Slide Number Placeholder 3"/>
+          <p:cNvSpPr>
+            <a:spLocks noGrp="1"/>
+          </p:cNvSpPr>
+          <p:nvPr>
+            <p:ph type="sldNum" sz="quarter" idx="5"/>
+          </p:nvPr>
+        </p:nvSpPr>
+        <p:spPr/>
+        <p:txBody>
+          <a:bodyPr/>
+          <a:lstStyle/>
+          <a:p>
+            <a:pPr rtl="0"/>
+            <a:fld id="{BC0C2C40-CB1C-4820-9151-EC51EC2E7E0F}" type="slidenum">
+              <a:rPr lang="pl-PL" smtClean="0"/>
+              <a:t>14</a:t>
+            </a:fld>
+            <a:endParaRPr lang="pl-PL" dirty="0"/>
+          </a:p>
+        </p:txBody>
+      </p:sp>
+    </p:spTree>
+    <p:extLst>
+      <p:ext uri="{BB962C8B-B14F-4D97-AF65-F5344CB8AC3E}">
+        <p14:creationId xmlns:p14="http://schemas.microsoft.com/office/powerpoint/2010/main" val="2684082676"/>
+      </p:ext>
+    </p:extLst>
+  </p:cSld>
+  <p:clrMapOvr>
+    <a:masterClrMapping/>
+  </p:clrMapOvr>
+</p:notes>
+</file>
+
+<file path=ppt/notesSlides/notesSlide15.xml><?xml version="1.0" encoding="utf-8"?>
+<p:notes xmlns:a="http://schemas.openxmlformats.org/drawingml/2006/main" xmlns:r="http://schemas.openxmlformats.org/officeDocument/2006/relationships" xmlns:p="http://schemas.openxmlformats.org/presentationml/2006/main">
+  <p:cSld>
+    <p:spTree>
+      <p:nvGrpSpPr>
+        <p:cNvPr id="1" name=""/>
+        <p:cNvGrpSpPr/>
+        <p:nvPr/>
+      </p:nvGrpSpPr>
+      <p:grpSpPr>
+        <a:xfrm>
+          <a:off x="0" y="0"/>
+          <a:ext cx="0" cy="0"/>
+          <a:chOff x="0" y="0"/>
+          <a:chExt cx="0" cy="0"/>
+        </a:xfrm>
+      </p:grpSpPr>
+      <p:sp>
+        <p:nvSpPr>
+          <p:cNvPr id="2" name="Slide Image Placeholder 1"/>
+          <p:cNvSpPr>
+            <a:spLocks noGrp="1" noRot="1" noChangeAspect="1"/>
+          </p:cNvSpPr>
+          <p:nvPr>
+            <p:ph type="sldImg"/>
+          </p:nvPr>
+        </p:nvSpPr>
+        <p:spPr/>
+      </p:sp>
+      <p:sp>
+        <p:nvSpPr>
+          <p:cNvPr id="3" name="Notes Placeholder 2"/>
+          <p:cNvSpPr>
+            <a:spLocks noGrp="1"/>
+          </p:cNvSpPr>
+          <p:nvPr>
+            <p:ph type="body" idx="1"/>
+          </p:nvPr>
+        </p:nvSpPr>
+        <p:spPr/>
+        <p:txBody>
+          <a:bodyPr/>
+          <a:lstStyle/>
+          <a:p>
+            <a:endParaRPr lang="pl-PL"/>
+          </a:p>
+        </p:txBody>
+      </p:sp>
+      <p:sp>
+        <p:nvSpPr>
+          <p:cNvPr id="4" name="Slide Number Placeholder 3"/>
+          <p:cNvSpPr>
+            <a:spLocks noGrp="1"/>
+          </p:cNvSpPr>
+          <p:nvPr>
+            <p:ph type="sldNum" sz="quarter" idx="5"/>
+          </p:nvPr>
+        </p:nvSpPr>
+        <p:spPr/>
+        <p:txBody>
+          <a:bodyPr/>
+          <a:lstStyle/>
+          <a:p>
+            <a:pPr rtl="0"/>
+            <a:fld id="{BC0C2C40-CB1C-4820-9151-EC51EC2E7E0F}" type="slidenum">
+              <a:rPr lang="pl-PL" smtClean="0"/>
+              <a:t>15</a:t>
+            </a:fld>
+            <a:endParaRPr lang="pl-PL" dirty="0"/>
+          </a:p>
+        </p:txBody>
+      </p:sp>
+    </p:spTree>
+    <p:extLst>
+      <p:ext uri="{BB962C8B-B14F-4D97-AF65-F5344CB8AC3E}">
         <p14:creationId xmlns:p14="http://schemas.microsoft.com/office/powerpoint/2010/main" val="2743713819"/>
       </p:ext>
     </p:extLst>
@@ -5633,7 +5878,7 @@
 </p:notes>
 </file>
 
-<file path=ppt/notesSlides/notesSlide14.xml><?xml version="1.0" encoding="utf-8"?>
+<file path=ppt/notesSlides/notesSlide16.xml><?xml version="1.0" encoding="utf-8"?>
 <p:notes xmlns:a="http://schemas.openxmlformats.org/drawingml/2006/main" xmlns:r="http://schemas.openxmlformats.org/officeDocument/2006/relationships" xmlns:p="http://schemas.openxmlformats.org/presentationml/2006/main">
   <p:cSld>
     <p:spTree>
@@ -5708,7 +5953,7 @@
             <a:pPr rtl="0"/>
             <a:fld id="{BC0C2C40-CB1C-4820-9151-EC51EC2E7E0F}" type="slidenum">
               <a:rPr lang="pl-PL" smtClean="0"/>
-              <a:t>16</a:t>
+              <a:t>18</a:t>
             </a:fld>
             <a:endParaRPr lang="pl-PL" dirty="0"/>
           </a:p>
@@ -11422,6 +11667,321 @@
 </file>
 
 <file path=ppt/slides/slide12.xml><?xml version="1.0" encoding="utf-8"?>
+<p:sld xmlns:a="http://schemas.openxmlformats.org/drawingml/2006/main" xmlns:r="http://schemas.openxmlformats.org/officeDocument/2006/relationships" xmlns:p="http://schemas.openxmlformats.org/presentationml/2006/main">
+  <p:cSld>
+    <p:spTree>
+      <p:nvGrpSpPr>
+        <p:cNvPr id="1" name=""/>
+        <p:cNvGrpSpPr/>
+        <p:nvPr/>
+      </p:nvGrpSpPr>
+      <p:grpSpPr>
+        <a:xfrm>
+          <a:off x="0" y="0"/>
+          <a:ext cx="0" cy="0"/>
+          <a:chOff x="0" y="0"/>
+          <a:chExt cx="0" cy="0"/>
+        </a:xfrm>
+      </p:grpSpPr>
+      <p:sp>
+        <p:nvSpPr>
+          <p:cNvPr id="2" name="Tytuł 1">
+            <a:extLst>
+              <a:ext uri="{FF2B5EF4-FFF2-40B4-BE49-F238E27FC236}">
+                <a16:creationId xmlns:a16="http://schemas.microsoft.com/office/drawing/2014/main" id="{0953BD17-A7FE-4352-9D7A-10482C6865A6}"/>
+              </a:ext>
+            </a:extLst>
+          </p:cNvPr>
+          <p:cNvSpPr>
+            <a:spLocks noGrp="1"/>
+          </p:cNvSpPr>
+          <p:nvPr>
+            <p:ph type="title"/>
+          </p:nvPr>
+        </p:nvSpPr>
+        <p:spPr>
+          <a:xfrm>
+            <a:off x="444500" y="412137"/>
+            <a:ext cx="9146972" cy="640080"/>
+          </a:xfrm>
+        </p:spPr>
+        <p:txBody>
+          <a:bodyPr rtlCol="0"/>
+          <a:lstStyle>
+            <a:defPPr>
+              <a:defRPr lang="pl-PL"/>
+            </a:defPPr>
+          </a:lstStyle>
+          <a:p>
+            <a:pPr rtl="0"/>
+            <a:r>
+              <a:rPr lang="en-US" b="1" dirty="0">
+                <a:latin typeface="Segoe UI Semibold" panose="020B0502040204020203" pitchFamily="34" charset="0"/>
+                <a:cs typeface="Segoe UI Semibold" panose="020B0502040204020203" pitchFamily="34" charset="0"/>
+              </a:rPr>
+              <a:t>Data Analysis</a:t>
+            </a:r>
+            <a:endParaRPr lang="pl-PL" b="1" dirty="0">
+              <a:latin typeface="Segoe UI Semibold" panose="020B0502040204020203" pitchFamily="34" charset="0"/>
+              <a:cs typeface="Segoe UI Semibold" panose="020B0502040204020203" pitchFamily="34" charset="0"/>
+            </a:endParaRPr>
+          </a:p>
+        </p:txBody>
+      </p:sp>
+      <p:pic>
+        <p:nvPicPr>
+          <p:cNvPr id="5" name="Picture 4">
+            <a:extLst>
+              <a:ext uri="{FF2B5EF4-FFF2-40B4-BE49-F238E27FC236}">
+                <a16:creationId xmlns:a16="http://schemas.microsoft.com/office/drawing/2014/main" id="{8E76EBA0-FA13-8D52-9D59-8DB45FF5D33B}"/>
+              </a:ext>
+            </a:extLst>
+          </p:cNvPr>
+          <p:cNvPicPr>
+            <a:picLocks noChangeAspect="1"/>
+          </p:cNvPicPr>
+          <p:nvPr/>
+        </p:nvPicPr>
+        <p:blipFill>
+          <a:blip r:embed="rId3"/>
+          <a:stretch>
+            <a:fillRect/>
+          </a:stretch>
+        </p:blipFill>
+        <p:spPr>
+          <a:xfrm>
+            <a:off x="459317" y="1189164"/>
+            <a:ext cx="5636683" cy="5368270"/>
+          </a:xfrm>
+          <a:prstGeom prst="rect">
+            <a:avLst/>
+          </a:prstGeom>
+        </p:spPr>
+      </p:pic>
+      <p:pic>
+        <p:nvPicPr>
+          <p:cNvPr id="8" name="Picture 7">
+            <a:extLst>
+              <a:ext uri="{FF2B5EF4-FFF2-40B4-BE49-F238E27FC236}">
+                <a16:creationId xmlns:a16="http://schemas.microsoft.com/office/drawing/2014/main" id="{E3638CD4-8237-C4BC-A46A-DF7F3AD84DA0}"/>
+              </a:ext>
+            </a:extLst>
+          </p:cNvPr>
+          <p:cNvPicPr>
+            <a:picLocks noChangeAspect="1"/>
+          </p:cNvPicPr>
+          <p:nvPr/>
+        </p:nvPicPr>
+        <p:blipFill>
+          <a:blip r:embed="rId4"/>
+          <a:stretch>
+            <a:fillRect/>
+          </a:stretch>
+        </p:blipFill>
+        <p:spPr>
+          <a:xfrm>
+            <a:off x="6621667" y="1189164"/>
+            <a:ext cx="4787166" cy="5495152"/>
+          </a:xfrm>
+          <a:prstGeom prst="rect">
+            <a:avLst/>
+          </a:prstGeom>
+        </p:spPr>
+      </p:pic>
+    </p:spTree>
+    <p:extLst>
+      <p:ext uri="{BB962C8B-B14F-4D97-AF65-F5344CB8AC3E}">
+        <p14:creationId xmlns:p14="http://schemas.microsoft.com/office/powerpoint/2010/main" val="271545191"/>
+      </p:ext>
+    </p:extLst>
+  </p:cSld>
+  <p:clrMapOvr>
+    <a:masterClrMapping/>
+  </p:clrMapOvr>
+</p:sld>
+</file>
+
+<file path=ppt/slides/slide13.xml><?xml version="1.0" encoding="utf-8"?>
+<p:sld xmlns:a="http://schemas.openxmlformats.org/drawingml/2006/main" xmlns:r="http://schemas.openxmlformats.org/officeDocument/2006/relationships" xmlns:p="http://schemas.openxmlformats.org/presentationml/2006/main">
+  <p:cSld>
+    <p:spTree>
+      <p:nvGrpSpPr>
+        <p:cNvPr id="1" name=""/>
+        <p:cNvGrpSpPr/>
+        <p:nvPr/>
+      </p:nvGrpSpPr>
+      <p:grpSpPr>
+        <a:xfrm>
+          <a:off x="0" y="0"/>
+          <a:ext cx="0" cy="0"/>
+          <a:chOff x="0" y="0"/>
+          <a:chExt cx="0" cy="0"/>
+        </a:xfrm>
+      </p:grpSpPr>
+      <p:sp>
+        <p:nvSpPr>
+          <p:cNvPr id="2" name="Tytuł 1">
+            <a:extLst>
+              <a:ext uri="{FF2B5EF4-FFF2-40B4-BE49-F238E27FC236}">
+                <a16:creationId xmlns:a16="http://schemas.microsoft.com/office/drawing/2014/main" id="{0953BD17-A7FE-4352-9D7A-10482C6865A6}"/>
+              </a:ext>
+            </a:extLst>
+          </p:cNvPr>
+          <p:cNvSpPr>
+            <a:spLocks noGrp="1"/>
+          </p:cNvSpPr>
+          <p:nvPr>
+            <p:ph type="title"/>
+          </p:nvPr>
+        </p:nvSpPr>
+        <p:spPr>
+          <a:xfrm>
+            <a:off x="444500" y="412137"/>
+            <a:ext cx="9146972" cy="640080"/>
+          </a:xfrm>
+        </p:spPr>
+        <p:txBody>
+          <a:bodyPr rtlCol="0"/>
+          <a:lstStyle>
+            <a:defPPr>
+              <a:defRPr lang="pl-PL"/>
+            </a:defPPr>
+          </a:lstStyle>
+          <a:p>
+            <a:pPr rtl="0"/>
+            <a:r>
+              <a:rPr lang="en-US" b="1" dirty="0">
+                <a:latin typeface="Segoe UI Semibold" panose="020B0502040204020203" pitchFamily="34" charset="0"/>
+                <a:cs typeface="Segoe UI Semibold" panose="020B0502040204020203" pitchFamily="34" charset="0"/>
+              </a:rPr>
+              <a:t>Data Analysis</a:t>
+            </a:r>
+            <a:endParaRPr lang="pl-PL" b="1" dirty="0">
+              <a:latin typeface="Segoe UI Semibold" panose="020B0502040204020203" pitchFamily="34" charset="0"/>
+              <a:cs typeface="Segoe UI Semibold" panose="020B0502040204020203" pitchFamily="34" charset="0"/>
+            </a:endParaRPr>
+          </a:p>
+        </p:txBody>
+      </p:sp>
+      <p:pic>
+        <p:nvPicPr>
+          <p:cNvPr id="4" name="Picture 3">
+            <a:extLst>
+              <a:ext uri="{FF2B5EF4-FFF2-40B4-BE49-F238E27FC236}">
+                <a16:creationId xmlns:a16="http://schemas.microsoft.com/office/drawing/2014/main" id="{389E5AFD-A203-5029-8462-514A2A379405}"/>
+              </a:ext>
+            </a:extLst>
+          </p:cNvPr>
+          <p:cNvPicPr>
+            <a:picLocks noChangeAspect="1"/>
+          </p:cNvPicPr>
+          <p:nvPr/>
+        </p:nvPicPr>
+        <p:blipFill>
+          <a:blip r:embed="rId3"/>
+          <a:stretch>
+            <a:fillRect/>
+          </a:stretch>
+        </p:blipFill>
+        <p:spPr>
+          <a:xfrm>
+            <a:off x="508000" y="1204688"/>
+            <a:ext cx="6847360" cy="5505146"/>
+          </a:xfrm>
+          <a:prstGeom prst="rect">
+            <a:avLst/>
+          </a:prstGeom>
+        </p:spPr>
+      </p:pic>
+      <p:sp>
+        <p:nvSpPr>
+          <p:cNvPr id="6" name="Zawartość — symbol zastępczy 2">
+            <a:extLst>
+              <a:ext uri="{FF2B5EF4-FFF2-40B4-BE49-F238E27FC236}">
+                <a16:creationId xmlns:a16="http://schemas.microsoft.com/office/drawing/2014/main" id="{01D8B89F-CB55-3E32-8E28-AEBC142DB16D}"/>
+              </a:ext>
+            </a:extLst>
+          </p:cNvPr>
+          <p:cNvSpPr>
+            <a:spLocks noGrp="1"/>
+          </p:cNvSpPr>
+          <p:nvPr>
+            <p:ph sz="quarter" idx="10"/>
+          </p:nvPr>
+        </p:nvSpPr>
+        <p:spPr>
+          <a:xfrm>
+            <a:off x="7564967" y="3327400"/>
+            <a:ext cx="4119033" cy="1965118"/>
+          </a:xfrm>
+        </p:spPr>
+        <p:txBody>
+          <a:bodyPr rtlCol="0">
+            <a:noAutofit/>
+          </a:bodyPr>
+          <a:lstStyle>
+            <a:defPPr>
+              <a:defRPr lang="pl-PL"/>
+            </a:defPPr>
+          </a:lstStyle>
+          <a:p>
+            <a:pPr marL="0" indent="0" rtl="0">
+              <a:spcAft>
+                <a:spcPts val="1200"/>
+              </a:spcAft>
+              <a:buNone/>
+            </a:pPr>
+            <a:r>
+              <a:rPr lang="en-US" sz="2000" b="0" i="0" dirty="0">
+                <a:solidFill>
+                  <a:srgbClr val="555555"/>
+                </a:solidFill>
+                <a:effectLst/>
+                <a:latin typeface="Menlo"/>
+              </a:rPr>
+              <a:t>The Scala guru was </a:t>
+            </a:r>
+            <a:r>
+              <a:rPr lang="en-US" sz="2000" b="1" i="0" dirty="0" err="1">
+                <a:solidFill>
+                  <a:srgbClr val="555555"/>
+                </a:solidFill>
+                <a:effectLst/>
+                <a:latin typeface="Menlo"/>
+              </a:rPr>
+              <a:t>oxbow_lakes</a:t>
+            </a:r>
+            <a:r>
+              <a:rPr lang="en-US" sz="2000" b="0" i="0" dirty="0">
+                <a:solidFill>
+                  <a:srgbClr val="555555"/>
+                </a:solidFill>
+                <a:effectLst/>
+                <a:latin typeface="Menlo"/>
+              </a:rPr>
+              <a:t> from London, England United Kingdom with a total score of 3,223.</a:t>
+            </a:r>
+            <a:endParaRPr lang="pl-PL" sz="1600" dirty="0">
+              <a:latin typeface="Segoe UI" panose="020B0502040204020203" pitchFamily="34" charset="0"/>
+              <a:cs typeface="Segoe UI" panose="020B0502040204020203" pitchFamily="34" charset="0"/>
+            </a:endParaRPr>
+          </a:p>
+        </p:txBody>
+      </p:sp>
+    </p:spTree>
+    <p:extLst>
+      <p:ext uri="{BB962C8B-B14F-4D97-AF65-F5344CB8AC3E}">
+        <p14:creationId xmlns:p14="http://schemas.microsoft.com/office/powerpoint/2010/main" val="356478517"/>
+      </p:ext>
+    </p:extLst>
+  </p:cSld>
+  <p:clrMapOvr>
+    <a:masterClrMapping/>
+  </p:clrMapOvr>
+</p:sld>
+</file>
+
+<file path=ppt/slides/slide14.xml><?xml version="1.0" encoding="utf-8"?>
 <p:sld xmlns:a="http://schemas.openxmlformats.org/drawingml/2006/main" xmlns:r="http://schemas.openxmlformats.org/officeDocument/2006/relationships" xmlns:p="http://schemas.openxmlformats.org/presentationml/2006/main">
   <p:cSld>
     <p:spTree>
@@ -12485,7 +13045,7 @@
 </p:sld>
 </file>
 
-<file path=ppt/slides/slide13.xml><?xml version="1.0" encoding="utf-8"?>
+<file path=ppt/slides/slide15.xml><?xml version="1.0" encoding="utf-8"?>
 <p:sld xmlns:a="http://schemas.openxmlformats.org/drawingml/2006/main" xmlns:r="http://schemas.openxmlformats.org/officeDocument/2006/relationships" xmlns:p="http://schemas.openxmlformats.org/presentationml/2006/main">
   <p:cSld>
     <p:spTree>
@@ -13984,7 +14544,7 @@
 </p:sld>
 </file>
 
-<file path=ppt/slides/slide14.xml><?xml version="1.0" encoding="utf-8"?>
+<file path=ppt/slides/slide16.xml><?xml version="1.0" encoding="utf-8"?>
 <p:sld xmlns:a="http://schemas.openxmlformats.org/drawingml/2006/main" xmlns:r="http://schemas.openxmlformats.org/officeDocument/2006/relationships" xmlns:p="http://schemas.openxmlformats.org/presentationml/2006/main">
   <p:cSld>
     <p:spTree>
@@ -15772,7 +16332,7 @@
 </p:sld>
 </file>
 
-<file path=ppt/slides/slide15.xml><?xml version="1.0" encoding="utf-8"?>
+<file path=ppt/slides/slide17.xml><?xml version="1.0" encoding="utf-8"?>
 <p:sld xmlns:a="http://schemas.openxmlformats.org/drawingml/2006/main" xmlns:r="http://schemas.openxmlformats.org/officeDocument/2006/relationships" xmlns:p="http://schemas.openxmlformats.org/presentationml/2006/main">
   <p:cSld>
     <p:spTree>
@@ -17820,7 +18380,7 @@
 </p:sld>
 </file>
 
-<file path=ppt/slides/slide16.xml><?xml version="1.0" encoding="utf-8"?>
+<file path=ppt/slides/slide18.xml><?xml version="1.0" encoding="utf-8"?>
 <p:sld xmlns:a="http://schemas.openxmlformats.org/drawingml/2006/main" xmlns:r="http://schemas.openxmlformats.org/officeDocument/2006/relationships" xmlns:p="http://schemas.openxmlformats.org/presentationml/2006/main">
   <p:cSld>
     <p:spTree>
@@ -23425,6 +23985,25 @@
 </file>
 
 <file path=customXml/item1.xml><?xml version="1.0" encoding="utf-8"?>
+<p:properties xmlns:p="http://schemas.microsoft.com/office/2006/metadata/properties" xmlns:xsi="http://www.w3.org/2001/XMLSchema-instance" xmlns:pc="http://schemas.microsoft.com/office/infopath/2007/PartnerControls">
+  <documentManagement>
+    <Status xmlns="71af3243-3dd4-4a8d-8c0d-dd76da1f02a5">Not started</Status>
+    <_ip_UnifiedCompliancePolicyUIAction xmlns="http://schemas.microsoft.com/sharepoint/v3" xsi:nil="true"/>
+    <Image xmlns="71af3243-3dd4-4a8d-8c0d-dd76da1f02a5">
+      <Url xsi:nil="true"/>
+      <Description xsi:nil="true"/>
+    </Image>
+    <_ip_UnifiedCompliancePolicyProperties xmlns="http://schemas.microsoft.com/sharepoint/v3" xsi:nil="true"/>
+    <ImageTagsTaxHTField xmlns="71af3243-3dd4-4a8d-8c0d-dd76da1f02a5">
+      <Terms xmlns="http://schemas.microsoft.com/office/infopath/2007/PartnerControls"/>
+    </ImageTagsTaxHTField>
+    <TaxCatchAll xmlns="230e9df3-be65-4c73-a93b-d1236ebd677e"/>
+    <MediaServiceKeyPoints xmlns="71af3243-3dd4-4a8d-8c0d-dd76da1f02a5" xsi:nil="true"/>
+  </documentManagement>
+</p:properties>
+</file>
+
+<file path=customXml/item2.xml><?xml version="1.0" encoding="utf-8"?>
 <ct:contentTypeSchema xmlns:ct="http://schemas.microsoft.com/office/2006/metadata/contentType" xmlns:ma="http://schemas.microsoft.com/office/2006/metadata/properties/metaAttributes" ct:_="" ma:_="" ma:contentTypeName="Document" ma:contentTypeID="0x01010079F111ED35F8CC479449609E8A0923A6" ma:contentTypeVersion="20" ma:contentTypeDescription="Create a new document." ma:contentTypeScope="" ma:versionID="1267097ee5f5874adfcc408041ae252e">
   <xsd:schema xmlns:xsd="http://www.w3.org/2001/XMLSchema" xmlns:xs="http://www.w3.org/2001/XMLSchema" xmlns:p="http://schemas.microsoft.com/office/2006/metadata/properties" xmlns:ns1="http://schemas.microsoft.com/sharepoint/v3" xmlns:ns2="71af3243-3dd4-4a8d-8c0d-dd76da1f02a5" xmlns:ns3="16c05727-aa75-4e4a-9b5f-8a80a1165891" xmlns:ns4="230e9df3-be65-4c73-a93b-d1236ebd677e" targetNamespace="http://schemas.microsoft.com/office/2006/metadata/properties" ma:root="true" ma:fieldsID="395891a93df65b14727750f2c06c306c" ns1:_="" ns2:_="" ns3:_="" ns4:_="">
     <xsd:import namespace="http://schemas.microsoft.com/sharepoint/v3"/>
@@ -23700,25 +24279,6 @@
 </ct:contentTypeSchema>
 </file>
 
-<file path=customXml/item2.xml><?xml version="1.0" encoding="utf-8"?>
-<p:properties xmlns:p="http://schemas.microsoft.com/office/2006/metadata/properties" xmlns:xsi="http://www.w3.org/2001/XMLSchema-instance" xmlns:pc="http://schemas.microsoft.com/office/infopath/2007/PartnerControls">
-  <documentManagement>
-    <Status xmlns="71af3243-3dd4-4a8d-8c0d-dd76da1f02a5">Not started</Status>
-    <_ip_UnifiedCompliancePolicyUIAction xmlns="http://schemas.microsoft.com/sharepoint/v3" xsi:nil="true"/>
-    <Image xmlns="71af3243-3dd4-4a8d-8c0d-dd76da1f02a5">
-      <Url xsi:nil="true"/>
-      <Description xsi:nil="true"/>
-    </Image>
-    <_ip_UnifiedCompliancePolicyProperties xmlns="http://schemas.microsoft.com/sharepoint/v3" xsi:nil="true"/>
-    <ImageTagsTaxHTField xmlns="71af3243-3dd4-4a8d-8c0d-dd76da1f02a5">
-      <Terms xmlns="http://schemas.microsoft.com/office/infopath/2007/PartnerControls"/>
-    </ImageTagsTaxHTField>
-    <TaxCatchAll xmlns="230e9df3-be65-4c73-a93b-d1236ebd677e"/>
-    <MediaServiceKeyPoints xmlns="71af3243-3dd4-4a8d-8c0d-dd76da1f02a5" xsi:nil="true"/>
-  </documentManagement>
-</p:properties>
-</file>
-
 <file path=customXml/item3.xml><?xml version="1.0" encoding="utf-8"?>
 <?mso-contentType ?>
 <FormTemplates xmlns="http://schemas.microsoft.com/sharepoint/v3/contenttype/forms">
@@ -23729,6 +24289,18 @@
 </file>
 
 <file path=customXml/itemProps1.xml><?xml version="1.0" encoding="utf-8"?>
+<ds:datastoreItem xmlns:ds="http://schemas.openxmlformats.org/officeDocument/2006/customXml" ds:itemID="{1C44B501-5DE1-46D9-B449-400C46FE1425}">
+  <ds:schemaRefs>
+    <ds:schemaRef ds:uri="http://schemas.microsoft.com/office/2006/metadata/properties"/>
+    <ds:schemaRef ds:uri="http://schemas.microsoft.com/office/infopath/2007/PartnerControls"/>
+    <ds:schemaRef ds:uri="71af3243-3dd4-4a8d-8c0d-dd76da1f02a5"/>
+    <ds:schemaRef ds:uri="http://schemas.microsoft.com/sharepoint/v3"/>
+    <ds:schemaRef ds:uri="230e9df3-be65-4c73-a93b-d1236ebd677e"/>
+  </ds:schemaRefs>
+</ds:datastoreItem>
+</file>
+
+<file path=customXml/itemProps2.xml><?xml version="1.0" encoding="utf-8"?>
 <ds:datastoreItem xmlns:ds="http://schemas.openxmlformats.org/officeDocument/2006/customXml" ds:itemID="{B2A44EB6-3BD3-4FF9-B8D1-D973C54C3ED7}">
   <ds:schemaRefs>
     <ds:schemaRef ds:uri="http://schemas.microsoft.com/office/2006/metadata/contentType"/>
@@ -23749,18 +24321,6 @@
 </ds:datastoreItem>
 </file>
 
-<file path=customXml/itemProps2.xml><?xml version="1.0" encoding="utf-8"?>
-<ds:datastoreItem xmlns:ds="http://schemas.openxmlformats.org/officeDocument/2006/customXml" ds:itemID="{1C44B501-5DE1-46D9-B449-400C46FE1425}">
-  <ds:schemaRefs>
-    <ds:schemaRef ds:uri="http://schemas.microsoft.com/office/2006/metadata/properties"/>
-    <ds:schemaRef ds:uri="http://schemas.microsoft.com/office/infopath/2007/PartnerControls"/>
-    <ds:schemaRef ds:uri="71af3243-3dd4-4a8d-8c0d-dd76da1f02a5"/>
-    <ds:schemaRef ds:uri="http://schemas.microsoft.com/sharepoint/v3"/>
-    <ds:schemaRef ds:uri="230e9df3-be65-4c73-a93b-d1236ebd677e"/>
-  </ds:schemaRefs>
-</ds:datastoreItem>
-</file>
-
 <file path=customXml/itemProps3.xml><?xml version="1.0" encoding="utf-8"?>
 <ds:datastoreItem xmlns:ds="http://schemas.openxmlformats.org/officeDocument/2006/customXml" ds:itemID="{77DD0DBF-30B2-4FC6-A5E7-8374DC718037}">
   <ds:schemaRefs>

</xml_diff>

<commit_message>
Slide 13. 15.1 minutes
</commit_message>
<xml_diff>
--- a/Presentation/Analyzing the StackOverflow2013 Database from 2008 to 2013.pptx
+++ b/Presentation/Analyzing the StackOverflow2013 Database from 2008 to 2013.pptx
@@ -5,7 +5,7 @@
     <p:sldMasterId id="2147483648" r:id="rId4"/>
   </p:sldMasterIdLst>
   <p:notesMasterIdLst>
-    <p:notesMasterId r:id="rId23"/>
+    <p:notesMasterId r:id="rId24"/>
   </p:notesMasterIdLst>
   <p:sldIdLst>
     <p:sldId id="259" r:id="rId5"/>
@@ -21,11 +21,12 @@
     <p:sldId id="277" r:id="rId15"/>
     <p:sldId id="278" r:id="rId16"/>
     <p:sldId id="279" r:id="rId17"/>
-    <p:sldId id="276" r:id="rId18"/>
-    <p:sldId id="265" r:id="rId19"/>
-    <p:sldId id="272" r:id="rId20"/>
-    <p:sldId id="264" r:id="rId21"/>
-    <p:sldId id="263" r:id="rId22"/>
+    <p:sldId id="280" r:id="rId18"/>
+    <p:sldId id="276" r:id="rId19"/>
+    <p:sldId id="265" r:id="rId20"/>
+    <p:sldId id="272" r:id="rId21"/>
+    <p:sldId id="264" r:id="rId22"/>
+    <p:sldId id="263" r:id="rId23"/>
   </p:sldIdLst>
   <p:sldSz cx="12192000" cy="6858000"/>
   <p:notesSz cx="6858000" cy="9144000"/>
@@ -5752,7 +5753,34 @@
           <a:bodyPr/>
           <a:lstStyle/>
           <a:p>
-            <a:endParaRPr lang="pl-PL"/>
+            <a:pPr algn="just"/>
+            <a:r>
+              <a:rPr lang="en-US" dirty="0"/>
+              <a:t>This slide presents a targeted analysis to pinpoint potential Polish users within a dataset. I began by establishing regex patterns to match Polish names and locations. Then, I applied filters on the user data to identify names or contain typical Polish characters, and also to find users from locations in Poland.</a:t>
+            </a:r>
+          </a:p>
+          <a:p>
+            <a:pPr algn="just"/>
+            <a:endParaRPr lang="en-US" dirty="0"/>
+          </a:p>
+          <a:p>
+            <a:pPr algn="just"/>
+            <a:r>
+              <a:rPr lang="en-US" dirty="0"/>
+              <a:t>Subsequently, I filtered posts and comments for matches with the same patterns. By combining these filtered datasets, I could create a comprehensive list of users likely to be Polish. The final step was counting these users, which revealed a total of 12,454 potential Polish users.</a:t>
+            </a:r>
+          </a:p>
+          <a:p>
+            <a:pPr algn="just"/>
+            <a:endParaRPr lang="en-US" dirty="0"/>
+          </a:p>
+          <a:p>
+            <a:pPr algn="just"/>
+            <a:r>
+              <a:rPr lang="en-US"/>
+              <a:t>0.42’</a:t>
+            </a:r>
+            <a:endParaRPr lang="pl-PL" dirty="0"/>
           </a:p>
         </p:txBody>
       </p:sp>
@@ -5783,7 +5811,7 @@
     </p:spTree>
     <p:extLst>
       <p:ext uri="{BB962C8B-B14F-4D97-AF65-F5344CB8AC3E}">
-        <p14:creationId xmlns:p14="http://schemas.microsoft.com/office/powerpoint/2010/main" val="2684082676"/>
+        <p14:creationId xmlns:p14="http://schemas.microsoft.com/office/powerpoint/2010/main" val="2265440199"/>
       </p:ext>
     </p:extLst>
   </p:cSld>
@@ -5868,6 +5896,91 @@
     </p:spTree>
     <p:extLst>
       <p:ext uri="{BB962C8B-B14F-4D97-AF65-F5344CB8AC3E}">
+        <p14:creationId xmlns:p14="http://schemas.microsoft.com/office/powerpoint/2010/main" val="2684082676"/>
+      </p:ext>
+    </p:extLst>
+  </p:cSld>
+  <p:clrMapOvr>
+    <a:masterClrMapping/>
+  </p:clrMapOvr>
+</p:notes>
+</file>
+
+<file path=ppt/notesSlides/notesSlide16.xml><?xml version="1.0" encoding="utf-8"?>
+<p:notes xmlns:a="http://schemas.openxmlformats.org/drawingml/2006/main" xmlns:r="http://schemas.openxmlformats.org/officeDocument/2006/relationships" xmlns:p="http://schemas.openxmlformats.org/presentationml/2006/main">
+  <p:cSld>
+    <p:spTree>
+      <p:nvGrpSpPr>
+        <p:cNvPr id="1" name=""/>
+        <p:cNvGrpSpPr/>
+        <p:nvPr/>
+      </p:nvGrpSpPr>
+      <p:grpSpPr>
+        <a:xfrm>
+          <a:off x="0" y="0"/>
+          <a:ext cx="0" cy="0"/>
+          <a:chOff x="0" y="0"/>
+          <a:chExt cx="0" cy="0"/>
+        </a:xfrm>
+      </p:grpSpPr>
+      <p:sp>
+        <p:nvSpPr>
+          <p:cNvPr id="2" name="Slide Image Placeholder 1"/>
+          <p:cNvSpPr>
+            <a:spLocks noGrp="1" noRot="1" noChangeAspect="1"/>
+          </p:cNvSpPr>
+          <p:nvPr>
+            <p:ph type="sldImg"/>
+          </p:nvPr>
+        </p:nvSpPr>
+        <p:spPr/>
+      </p:sp>
+      <p:sp>
+        <p:nvSpPr>
+          <p:cNvPr id="3" name="Notes Placeholder 2"/>
+          <p:cNvSpPr>
+            <a:spLocks noGrp="1"/>
+          </p:cNvSpPr>
+          <p:nvPr>
+            <p:ph type="body" idx="1"/>
+          </p:nvPr>
+        </p:nvSpPr>
+        <p:spPr/>
+        <p:txBody>
+          <a:bodyPr/>
+          <a:lstStyle/>
+          <a:p>
+            <a:endParaRPr lang="pl-PL"/>
+          </a:p>
+        </p:txBody>
+      </p:sp>
+      <p:sp>
+        <p:nvSpPr>
+          <p:cNvPr id="4" name="Slide Number Placeholder 3"/>
+          <p:cNvSpPr>
+            <a:spLocks noGrp="1"/>
+          </p:cNvSpPr>
+          <p:nvPr>
+            <p:ph type="sldNum" sz="quarter" idx="5"/>
+          </p:nvPr>
+        </p:nvSpPr>
+        <p:spPr/>
+        <p:txBody>
+          <a:bodyPr/>
+          <a:lstStyle/>
+          <a:p>
+            <a:pPr rtl="0"/>
+            <a:fld id="{BC0C2C40-CB1C-4820-9151-EC51EC2E7E0F}" type="slidenum">
+              <a:rPr lang="pl-PL" smtClean="0"/>
+              <a:t>16</a:t>
+            </a:fld>
+            <a:endParaRPr lang="pl-PL" dirty="0"/>
+          </a:p>
+        </p:txBody>
+      </p:sp>
+    </p:spTree>
+    <p:extLst>
+      <p:ext uri="{BB962C8B-B14F-4D97-AF65-F5344CB8AC3E}">
         <p14:creationId xmlns:p14="http://schemas.microsoft.com/office/powerpoint/2010/main" val="2743713819"/>
       </p:ext>
     </p:extLst>
@@ -5878,7 +5991,7 @@
 </p:notes>
 </file>
 
-<file path=ppt/notesSlides/notesSlide16.xml><?xml version="1.0" encoding="utf-8"?>
+<file path=ppt/notesSlides/notesSlide17.xml><?xml version="1.0" encoding="utf-8"?>
 <p:notes xmlns:a="http://schemas.openxmlformats.org/drawingml/2006/main" xmlns:r="http://schemas.openxmlformats.org/officeDocument/2006/relationships" xmlns:p="http://schemas.openxmlformats.org/presentationml/2006/main">
   <p:cSld>
     <p:spTree>
@@ -5953,7 +6066,7 @@
             <a:pPr rtl="0"/>
             <a:fld id="{BC0C2C40-CB1C-4820-9151-EC51EC2E7E0F}" type="slidenum">
               <a:rPr lang="pl-PL" smtClean="0"/>
-              <a:t>18</a:t>
+              <a:t>19</a:t>
             </a:fld>
             <a:endParaRPr lang="pl-PL" dirty="0"/>
           </a:p>
@@ -11982,6 +12095,196 @@
 </file>
 
 <file path=ppt/slides/slide14.xml><?xml version="1.0" encoding="utf-8"?>
+<p:sld xmlns:a="http://schemas.openxmlformats.org/drawingml/2006/main" xmlns:r="http://schemas.openxmlformats.org/officeDocument/2006/relationships" xmlns:p="http://schemas.openxmlformats.org/presentationml/2006/main">
+  <p:cSld>
+    <p:spTree>
+      <p:nvGrpSpPr>
+        <p:cNvPr id="1" name=""/>
+        <p:cNvGrpSpPr/>
+        <p:nvPr/>
+      </p:nvGrpSpPr>
+      <p:grpSpPr>
+        <a:xfrm>
+          <a:off x="0" y="0"/>
+          <a:ext cx="0" cy="0"/>
+          <a:chOff x="0" y="0"/>
+          <a:chExt cx="0" cy="0"/>
+        </a:xfrm>
+      </p:grpSpPr>
+      <p:sp>
+        <p:nvSpPr>
+          <p:cNvPr id="2" name="Tytuł 1">
+            <a:extLst>
+              <a:ext uri="{FF2B5EF4-FFF2-40B4-BE49-F238E27FC236}">
+                <a16:creationId xmlns:a16="http://schemas.microsoft.com/office/drawing/2014/main" id="{0953BD17-A7FE-4352-9D7A-10482C6865A6}"/>
+              </a:ext>
+            </a:extLst>
+          </p:cNvPr>
+          <p:cNvSpPr>
+            <a:spLocks noGrp="1"/>
+          </p:cNvSpPr>
+          <p:nvPr>
+            <p:ph type="title"/>
+          </p:nvPr>
+        </p:nvSpPr>
+        <p:spPr>
+          <a:xfrm>
+            <a:off x="444500" y="412137"/>
+            <a:ext cx="9146972" cy="640080"/>
+          </a:xfrm>
+        </p:spPr>
+        <p:txBody>
+          <a:bodyPr rtlCol="0"/>
+          <a:lstStyle>
+            <a:defPPr>
+              <a:defRPr lang="pl-PL"/>
+            </a:defPPr>
+          </a:lstStyle>
+          <a:p>
+            <a:pPr rtl="0"/>
+            <a:r>
+              <a:rPr lang="en-US" b="1" dirty="0">
+                <a:latin typeface="Segoe UI Semibold" panose="020B0502040204020203" pitchFamily="34" charset="0"/>
+                <a:cs typeface="Segoe UI Semibold" panose="020B0502040204020203" pitchFamily="34" charset="0"/>
+              </a:rPr>
+              <a:t>Data Analysis</a:t>
+            </a:r>
+            <a:endParaRPr lang="pl-PL" b="1" dirty="0">
+              <a:latin typeface="Segoe UI Semibold" panose="020B0502040204020203" pitchFamily="34" charset="0"/>
+              <a:cs typeface="Segoe UI Semibold" panose="020B0502040204020203" pitchFamily="34" charset="0"/>
+            </a:endParaRPr>
+          </a:p>
+        </p:txBody>
+      </p:sp>
+      <p:sp>
+        <p:nvSpPr>
+          <p:cNvPr id="6" name="Zawartość — symbol zastępczy 2">
+            <a:extLst>
+              <a:ext uri="{FF2B5EF4-FFF2-40B4-BE49-F238E27FC236}">
+                <a16:creationId xmlns:a16="http://schemas.microsoft.com/office/drawing/2014/main" id="{01D8B89F-CB55-3E32-8E28-AEBC142DB16D}"/>
+              </a:ext>
+            </a:extLst>
+          </p:cNvPr>
+          <p:cNvSpPr>
+            <a:spLocks noGrp="1"/>
+          </p:cNvSpPr>
+          <p:nvPr>
+            <p:ph sz="quarter" idx="10"/>
+          </p:nvPr>
+        </p:nvSpPr>
+        <p:spPr>
+          <a:xfrm>
+            <a:off x="4440767" y="3987800"/>
+            <a:ext cx="7306734" cy="1965118"/>
+          </a:xfrm>
+        </p:spPr>
+        <p:txBody>
+          <a:bodyPr rtlCol="0">
+            <a:noAutofit/>
+          </a:bodyPr>
+          <a:lstStyle>
+            <a:defPPr>
+              <a:defRPr lang="pl-PL"/>
+            </a:defPPr>
+          </a:lstStyle>
+          <a:p>
+            <a:pPr marL="0" indent="0" rtl="0">
+              <a:spcAft>
+                <a:spcPts val="1200"/>
+              </a:spcAft>
+              <a:buNone/>
+            </a:pPr>
+            <a:r>
+              <a:rPr lang="en-US" sz="2800" b="0" i="0" dirty="0">
+                <a:solidFill>
+                  <a:srgbClr val="555555"/>
+                </a:solidFill>
+                <a:effectLst/>
+                <a:latin typeface="Menlo"/>
+              </a:rPr>
+              <a:t>Total number of potential Polish users: 12,454</a:t>
+            </a:r>
+            <a:endParaRPr lang="pl-PL" sz="1600" dirty="0">
+              <a:latin typeface="Segoe UI" panose="020B0502040204020203" pitchFamily="34" charset="0"/>
+              <a:cs typeface="Segoe UI" panose="020B0502040204020203" pitchFamily="34" charset="0"/>
+            </a:endParaRPr>
+          </a:p>
+        </p:txBody>
+      </p:sp>
+      <p:pic>
+        <p:nvPicPr>
+          <p:cNvPr id="5" name="Picture 4">
+            <a:extLst>
+              <a:ext uri="{FF2B5EF4-FFF2-40B4-BE49-F238E27FC236}">
+                <a16:creationId xmlns:a16="http://schemas.microsoft.com/office/drawing/2014/main" id="{7F6D0B2B-4BBC-EC0A-E8B0-F67A612F7C5C}"/>
+              </a:ext>
+            </a:extLst>
+          </p:cNvPr>
+          <p:cNvPicPr>
+            <a:picLocks noChangeAspect="1"/>
+          </p:cNvPicPr>
+          <p:nvPr/>
+        </p:nvPicPr>
+        <p:blipFill>
+          <a:blip r:embed="rId3"/>
+          <a:stretch>
+            <a:fillRect/>
+          </a:stretch>
+        </p:blipFill>
+        <p:spPr>
+          <a:xfrm>
+            <a:off x="444500" y="1257525"/>
+            <a:ext cx="3718021" cy="5253341"/>
+          </a:xfrm>
+          <a:prstGeom prst="rect">
+            <a:avLst/>
+          </a:prstGeom>
+        </p:spPr>
+      </p:pic>
+      <p:pic>
+        <p:nvPicPr>
+          <p:cNvPr id="8" name="Picture 7">
+            <a:extLst>
+              <a:ext uri="{FF2B5EF4-FFF2-40B4-BE49-F238E27FC236}">
+                <a16:creationId xmlns:a16="http://schemas.microsoft.com/office/drawing/2014/main" id="{4DB94585-B2AA-D443-5786-72A2FF977A13}"/>
+              </a:ext>
+            </a:extLst>
+          </p:cNvPr>
+          <p:cNvPicPr>
+            <a:picLocks noChangeAspect="1"/>
+          </p:cNvPicPr>
+          <p:nvPr/>
+        </p:nvPicPr>
+        <p:blipFill>
+          <a:blip r:embed="rId4"/>
+          <a:stretch>
+            <a:fillRect/>
+          </a:stretch>
+        </p:blipFill>
+        <p:spPr>
+          <a:xfrm>
+            <a:off x="4440766" y="1299377"/>
+            <a:ext cx="7103533" cy="1792612"/>
+          </a:xfrm>
+          <a:prstGeom prst="rect">
+            <a:avLst/>
+          </a:prstGeom>
+        </p:spPr>
+      </p:pic>
+    </p:spTree>
+    <p:extLst>
+      <p:ext uri="{BB962C8B-B14F-4D97-AF65-F5344CB8AC3E}">
+        <p14:creationId xmlns:p14="http://schemas.microsoft.com/office/powerpoint/2010/main" val="137994147"/>
+      </p:ext>
+    </p:extLst>
+  </p:cSld>
+  <p:clrMapOvr>
+    <a:masterClrMapping/>
+  </p:clrMapOvr>
+</p:sld>
+</file>
+
+<file path=ppt/slides/slide15.xml><?xml version="1.0" encoding="utf-8"?>
 <p:sld xmlns:a="http://schemas.openxmlformats.org/drawingml/2006/main" xmlns:r="http://schemas.openxmlformats.org/officeDocument/2006/relationships" xmlns:p="http://schemas.openxmlformats.org/presentationml/2006/main">
   <p:cSld>
     <p:spTree>
@@ -13045,7 +13348,7 @@
 </p:sld>
 </file>
 
-<file path=ppt/slides/slide15.xml><?xml version="1.0" encoding="utf-8"?>
+<file path=ppt/slides/slide16.xml><?xml version="1.0" encoding="utf-8"?>
 <p:sld xmlns:a="http://schemas.openxmlformats.org/drawingml/2006/main" xmlns:r="http://schemas.openxmlformats.org/officeDocument/2006/relationships" xmlns:p="http://schemas.openxmlformats.org/presentationml/2006/main">
   <p:cSld>
     <p:spTree>
@@ -14544,7 +14847,7 @@
 </p:sld>
 </file>
 
-<file path=ppt/slides/slide16.xml><?xml version="1.0" encoding="utf-8"?>
+<file path=ppt/slides/slide17.xml><?xml version="1.0" encoding="utf-8"?>
 <p:sld xmlns:a="http://schemas.openxmlformats.org/drawingml/2006/main" xmlns:r="http://schemas.openxmlformats.org/officeDocument/2006/relationships" xmlns:p="http://schemas.openxmlformats.org/presentationml/2006/main">
   <p:cSld>
     <p:spTree>
@@ -16332,7 +16635,7 @@
 </p:sld>
 </file>
 
-<file path=ppt/slides/slide17.xml><?xml version="1.0" encoding="utf-8"?>
+<file path=ppt/slides/slide18.xml><?xml version="1.0" encoding="utf-8"?>
 <p:sld xmlns:a="http://schemas.openxmlformats.org/drawingml/2006/main" xmlns:r="http://schemas.openxmlformats.org/officeDocument/2006/relationships" xmlns:p="http://schemas.openxmlformats.org/presentationml/2006/main">
   <p:cSld>
     <p:spTree>
@@ -18380,7 +18683,7 @@
 </p:sld>
 </file>
 
-<file path=ppt/slides/slide18.xml><?xml version="1.0" encoding="utf-8"?>
+<file path=ppt/slides/slide19.xml><?xml version="1.0" encoding="utf-8"?>
 <p:sld xmlns:a="http://schemas.openxmlformats.org/drawingml/2006/main" xmlns:r="http://schemas.openxmlformats.org/officeDocument/2006/relationships" xmlns:p="http://schemas.openxmlformats.org/presentationml/2006/main">
   <p:cSld>
     <p:spTree>
@@ -23985,25 +24288,6 @@
 </file>
 
 <file path=customXml/item1.xml><?xml version="1.0" encoding="utf-8"?>
-<p:properties xmlns:p="http://schemas.microsoft.com/office/2006/metadata/properties" xmlns:xsi="http://www.w3.org/2001/XMLSchema-instance" xmlns:pc="http://schemas.microsoft.com/office/infopath/2007/PartnerControls">
-  <documentManagement>
-    <Status xmlns="71af3243-3dd4-4a8d-8c0d-dd76da1f02a5">Not started</Status>
-    <_ip_UnifiedCompliancePolicyUIAction xmlns="http://schemas.microsoft.com/sharepoint/v3" xsi:nil="true"/>
-    <Image xmlns="71af3243-3dd4-4a8d-8c0d-dd76da1f02a5">
-      <Url xsi:nil="true"/>
-      <Description xsi:nil="true"/>
-    </Image>
-    <_ip_UnifiedCompliancePolicyProperties xmlns="http://schemas.microsoft.com/sharepoint/v3" xsi:nil="true"/>
-    <ImageTagsTaxHTField xmlns="71af3243-3dd4-4a8d-8c0d-dd76da1f02a5">
-      <Terms xmlns="http://schemas.microsoft.com/office/infopath/2007/PartnerControls"/>
-    </ImageTagsTaxHTField>
-    <TaxCatchAll xmlns="230e9df3-be65-4c73-a93b-d1236ebd677e"/>
-    <MediaServiceKeyPoints xmlns="71af3243-3dd4-4a8d-8c0d-dd76da1f02a5" xsi:nil="true"/>
-  </documentManagement>
-</p:properties>
-</file>
-
-<file path=customXml/item2.xml><?xml version="1.0" encoding="utf-8"?>
 <ct:contentTypeSchema xmlns:ct="http://schemas.microsoft.com/office/2006/metadata/contentType" xmlns:ma="http://schemas.microsoft.com/office/2006/metadata/properties/metaAttributes" ct:_="" ma:_="" ma:contentTypeName="Document" ma:contentTypeID="0x01010079F111ED35F8CC479449609E8A0923A6" ma:contentTypeVersion="20" ma:contentTypeDescription="Create a new document." ma:contentTypeScope="" ma:versionID="1267097ee5f5874adfcc408041ae252e">
   <xsd:schema xmlns:xsd="http://www.w3.org/2001/XMLSchema" xmlns:xs="http://www.w3.org/2001/XMLSchema" xmlns:p="http://schemas.microsoft.com/office/2006/metadata/properties" xmlns:ns1="http://schemas.microsoft.com/sharepoint/v3" xmlns:ns2="71af3243-3dd4-4a8d-8c0d-dd76da1f02a5" xmlns:ns3="16c05727-aa75-4e4a-9b5f-8a80a1165891" xmlns:ns4="230e9df3-be65-4c73-a93b-d1236ebd677e" targetNamespace="http://schemas.microsoft.com/office/2006/metadata/properties" ma:root="true" ma:fieldsID="395891a93df65b14727750f2c06c306c" ns1:_="" ns2:_="" ns3:_="" ns4:_="">
     <xsd:import namespace="http://schemas.microsoft.com/sharepoint/v3"/>
@@ -24279,6 +24563,25 @@
 </ct:contentTypeSchema>
 </file>
 
+<file path=customXml/item2.xml><?xml version="1.0" encoding="utf-8"?>
+<p:properties xmlns:p="http://schemas.microsoft.com/office/2006/metadata/properties" xmlns:xsi="http://www.w3.org/2001/XMLSchema-instance" xmlns:pc="http://schemas.microsoft.com/office/infopath/2007/PartnerControls">
+  <documentManagement>
+    <Status xmlns="71af3243-3dd4-4a8d-8c0d-dd76da1f02a5">Not started</Status>
+    <_ip_UnifiedCompliancePolicyUIAction xmlns="http://schemas.microsoft.com/sharepoint/v3" xsi:nil="true"/>
+    <Image xmlns="71af3243-3dd4-4a8d-8c0d-dd76da1f02a5">
+      <Url xsi:nil="true"/>
+      <Description xsi:nil="true"/>
+    </Image>
+    <_ip_UnifiedCompliancePolicyProperties xmlns="http://schemas.microsoft.com/sharepoint/v3" xsi:nil="true"/>
+    <ImageTagsTaxHTField xmlns="71af3243-3dd4-4a8d-8c0d-dd76da1f02a5">
+      <Terms xmlns="http://schemas.microsoft.com/office/infopath/2007/PartnerControls"/>
+    </ImageTagsTaxHTField>
+    <TaxCatchAll xmlns="230e9df3-be65-4c73-a93b-d1236ebd677e"/>
+    <MediaServiceKeyPoints xmlns="71af3243-3dd4-4a8d-8c0d-dd76da1f02a5" xsi:nil="true"/>
+  </documentManagement>
+</p:properties>
+</file>
+
 <file path=customXml/item3.xml><?xml version="1.0" encoding="utf-8"?>
 <?mso-contentType ?>
 <FormTemplates xmlns="http://schemas.microsoft.com/sharepoint/v3/contenttype/forms">
@@ -24289,18 +24592,6 @@
 </file>
 
 <file path=customXml/itemProps1.xml><?xml version="1.0" encoding="utf-8"?>
-<ds:datastoreItem xmlns:ds="http://schemas.openxmlformats.org/officeDocument/2006/customXml" ds:itemID="{1C44B501-5DE1-46D9-B449-400C46FE1425}">
-  <ds:schemaRefs>
-    <ds:schemaRef ds:uri="http://schemas.microsoft.com/office/2006/metadata/properties"/>
-    <ds:schemaRef ds:uri="http://schemas.microsoft.com/office/infopath/2007/PartnerControls"/>
-    <ds:schemaRef ds:uri="71af3243-3dd4-4a8d-8c0d-dd76da1f02a5"/>
-    <ds:schemaRef ds:uri="http://schemas.microsoft.com/sharepoint/v3"/>
-    <ds:schemaRef ds:uri="230e9df3-be65-4c73-a93b-d1236ebd677e"/>
-  </ds:schemaRefs>
-</ds:datastoreItem>
-</file>
-
-<file path=customXml/itemProps2.xml><?xml version="1.0" encoding="utf-8"?>
 <ds:datastoreItem xmlns:ds="http://schemas.openxmlformats.org/officeDocument/2006/customXml" ds:itemID="{B2A44EB6-3BD3-4FF9-B8D1-D973C54C3ED7}">
   <ds:schemaRefs>
     <ds:schemaRef ds:uri="http://schemas.microsoft.com/office/2006/metadata/contentType"/>
@@ -24321,6 +24612,18 @@
 </ds:datastoreItem>
 </file>
 
+<file path=customXml/itemProps2.xml><?xml version="1.0" encoding="utf-8"?>
+<ds:datastoreItem xmlns:ds="http://schemas.openxmlformats.org/officeDocument/2006/customXml" ds:itemID="{1C44B501-5DE1-46D9-B449-400C46FE1425}">
+  <ds:schemaRefs>
+    <ds:schemaRef ds:uri="http://schemas.microsoft.com/office/2006/metadata/properties"/>
+    <ds:schemaRef ds:uri="http://schemas.microsoft.com/office/infopath/2007/PartnerControls"/>
+    <ds:schemaRef ds:uri="71af3243-3dd4-4a8d-8c0d-dd76da1f02a5"/>
+    <ds:schemaRef ds:uri="http://schemas.microsoft.com/sharepoint/v3"/>
+    <ds:schemaRef ds:uri="230e9df3-be65-4c73-a93b-d1236ebd677e"/>
+  </ds:schemaRefs>
+</ds:datastoreItem>
+</file>
+
 <file path=customXml/itemProps3.xml><?xml version="1.0" encoding="utf-8"?>
 <ds:datastoreItem xmlns:ds="http://schemas.openxmlformats.org/officeDocument/2006/customXml" ds:itemID="{77DD0DBF-30B2-4FC6-A5E7-8374DC718037}">
   <ds:schemaRefs>

</xml_diff>

<commit_message>
Slide 15. 15.93 minutes
</commit_message>
<xml_diff>
--- a/Presentation/Analyzing the StackOverflow2013 Database from 2008 to 2013.pptx
+++ b/Presentation/Analyzing the StackOverflow2013 Database from 2008 to 2013.pptx
@@ -22,8 +22,8 @@
     <p:sldId id="278" r:id="rId16"/>
     <p:sldId id="279" r:id="rId17"/>
     <p:sldId id="280" r:id="rId18"/>
-    <p:sldId id="276" r:id="rId19"/>
-    <p:sldId id="265" r:id="rId20"/>
+    <p:sldId id="265" r:id="rId19"/>
+    <p:sldId id="276" r:id="rId20"/>
     <p:sldId id="272" r:id="rId21"/>
     <p:sldId id="264" r:id="rId22"/>
     <p:sldId id="263" r:id="rId23"/>
@@ -5865,7 +5865,38 @@
           <a:bodyPr/>
           <a:lstStyle/>
           <a:p>
-            <a:endParaRPr lang="pl-PL"/>
+            <a:pPr algn="just"/>
+            <a:endParaRPr lang="en-US" dirty="0"/>
+          </a:p>
+          <a:p>
+            <a:pPr algn="just"/>
+            <a:r>
+              <a:rPr lang="en-US" dirty="0"/>
+              <a:t>This slide summarizes the key findings from the analysis. The most significant observation is that the bulk of the time was spent on cleaning the data, which underscores the importance of having clean data for accurate analysis. I noted that Spark was highly efficient in handling Parquet files, though it’s crucial to provide the correct schema upfront to ensure smooth processing.</a:t>
+            </a:r>
+          </a:p>
+          <a:p>
+            <a:pPr algn="just"/>
+            <a:endParaRPr lang="en-US" dirty="0"/>
+          </a:p>
+          <a:p>
+            <a:pPr algn="just"/>
+            <a:r>
+              <a:rPr lang="en-US" dirty="0"/>
+              <a:t>Another point of interest is the observation that using regular expressions proved to be quite slow, which suggests the need for more efficient text processing methods in future analyses. Lastly, considering the overall data pipeline performance, deploying a database on Azure SQL Database and connecting it directly to Databricks could offer a more streamlined and faster approach. </a:t>
+            </a:r>
+          </a:p>
+          <a:p>
+            <a:pPr algn="just"/>
+            <a:endParaRPr lang="en-US" dirty="0"/>
+          </a:p>
+          <a:p>
+            <a:pPr algn="just"/>
+            <a:r>
+              <a:rPr lang="en-US" dirty="0"/>
+              <a:t>0.50’</a:t>
+            </a:r>
+            <a:endParaRPr lang="pl-PL" dirty="0"/>
           </a:p>
         </p:txBody>
       </p:sp>
@@ -5896,7 +5927,7 @@
     </p:spTree>
     <p:extLst>
       <p:ext uri="{BB962C8B-B14F-4D97-AF65-F5344CB8AC3E}">
-        <p14:creationId xmlns:p14="http://schemas.microsoft.com/office/powerpoint/2010/main" val="2684082676"/>
+        <p14:creationId xmlns:p14="http://schemas.microsoft.com/office/powerpoint/2010/main" val="2743713819"/>
       </p:ext>
     </p:extLst>
   </p:cSld>
@@ -5981,7 +6012,7 @@
     </p:spTree>
     <p:extLst>
       <p:ext uri="{BB962C8B-B14F-4D97-AF65-F5344CB8AC3E}">
-        <p14:creationId xmlns:p14="http://schemas.microsoft.com/office/powerpoint/2010/main" val="2743713819"/>
+        <p14:creationId xmlns:p14="http://schemas.microsoft.com/office/powerpoint/2010/main" val="2684082676"/>
       </p:ext>
     </p:extLst>
   </p:cSld>
@@ -12285,6 +12316,364 @@
 </file>
 
 <file path=ppt/slides/slide15.xml><?xml version="1.0" encoding="utf-8"?>
+<p:sld xmlns:a="http://schemas.openxmlformats.org/drawingml/2006/main" xmlns:r="http://schemas.openxmlformats.org/officeDocument/2006/relationships" xmlns:p="http://schemas.openxmlformats.org/presentationml/2006/main">
+  <p:cSld>
+    <p:spTree>
+      <p:nvGrpSpPr>
+        <p:cNvPr id="1" name=""/>
+        <p:cNvGrpSpPr/>
+        <p:nvPr/>
+      </p:nvGrpSpPr>
+      <p:grpSpPr>
+        <a:xfrm>
+          <a:off x="0" y="0"/>
+          <a:ext cx="0" cy="0"/>
+          <a:chOff x="0" y="0"/>
+          <a:chExt cx="0" cy="0"/>
+        </a:xfrm>
+      </p:grpSpPr>
+      <p:sp>
+        <p:nvSpPr>
+          <p:cNvPr id="2" name="Tytuł 1">
+            <a:extLst>
+              <a:ext uri="{FF2B5EF4-FFF2-40B4-BE49-F238E27FC236}">
+                <a16:creationId xmlns:a16="http://schemas.microsoft.com/office/drawing/2014/main" id="{F07E19FF-DAD9-4AB4-9D83-993EE9FE6846}"/>
+              </a:ext>
+            </a:extLst>
+          </p:cNvPr>
+          <p:cNvSpPr>
+            <a:spLocks noGrp="1"/>
+          </p:cNvSpPr>
+          <p:nvPr>
+            <p:ph type="title"/>
+          </p:nvPr>
+        </p:nvSpPr>
+        <p:spPr>
+          <a:xfrm>
+            <a:off x="444500" y="412137"/>
+            <a:ext cx="9146972" cy="640080"/>
+          </a:xfrm>
+        </p:spPr>
+        <p:txBody>
+          <a:bodyPr rtlCol="0">
+            <a:normAutofit/>
+          </a:bodyPr>
+          <a:lstStyle>
+            <a:defPPr>
+              <a:defRPr lang="pl-PL"/>
+            </a:defPPr>
+          </a:lstStyle>
+          <a:p>
+            <a:pPr rtl="0"/>
+            <a:r>
+              <a:rPr lang="en-US" b="1" dirty="0">
+                <a:latin typeface="Segoe UI Semibold" panose="020B0502040204020203" pitchFamily="34" charset="0"/>
+                <a:cs typeface="Segoe UI Semibold" panose="020B0502040204020203" pitchFamily="34" charset="0"/>
+              </a:rPr>
+              <a:t>Conclusions</a:t>
+            </a:r>
+            <a:endParaRPr lang="pl-PL" b="1" dirty="0">
+              <a:latin typeface="Segoe UI Semibold" panose="020B0502040204020203" pitchFamily="34" charset="0"/>
+              <a:cs typeface="Segoe UI Semibold" panose="020B0502040204020203" pitchFamily="34" charset="0"/>
+            </a:endParaRPr>
+          </a:p>
+        </p:txBody>
+      </p:sp>
+      <p:sp>
+        <p:nvSpPr>
+          <p:cNvPr id="51" name="Zawartość — symbol zastępczy 7">
+            <a:extLst>
+              <a:ext uri="{FF2B5EF4-FFF2-40B4-BE49-F238E27FC236}">
+                <a16:creationId xmlns:a16="http://schemas.microsoft.com/office/drawing/2014/main" id="{A6D40621-9F60-B248-A84C-7DCBF898D4DB}"/>
+              </a:ext>
+            </a:extLst>
+          </p:cNvPr>
+          <p:cNvSpPr txBox="1">
+            <a:spLocks/>
+          </p:cNvSpPr>
+          <p:nvPr/>
+        </p:nvSpPr>
+        <p:spPr>
+          <a:xfrm>
+            <a:off x="1039854" y="1509612"/>
+            <a:ext cx="9382613" cy="3652194"/>
+          </a:xfrm>
+          <a:prstGeom prst="rect">
+            <a:avLst/>
+          </a:prstGeom>
+        </p:spPr>
+        <p:txBody>
+          <a:bodyPr vert="horz" lIns="91440" tIns="45720" rIns="91440" bIns="45720" rtlCol="0">
+            <a:normAutofit/>
+          </a:bodyPr>
+          <a:lstStyle>
+            <a:lvl1pPr marL="228598" indent="-228598" algn="l" defTabSz="914391" rtl="0" eaLnBrk="1" latinLnBrk="0" hangingPunct="1">
+              <a:lnSpc>
+                <a:spcPct val="100000"/>
+              </a:lnSpc>
+              <a:spcBef>
+                <a:spcPts val="1000"/>
+              </a:spcBef>
+              <a:buFont typeface="Arial" panose="020B0604020202020204" pitchFamily="34" charset="0"/>
+              <a:buChar char="•"/>
+              <a:defRPr lang="pl-PL" sz="1400" kern="1200" smtClean="0">
+                <a:solidFill>
+                  <a:schemeClr val="tx1">
+                    <a:lumMod val="75000"/>
+                    <a:lumOff val="25000"/>
+                  </a:schemeClr>
+                </a:solidFill>
+                <a:latin typeface="+mn-lt"/>
+                <a:ea typeface="+mn-ea"/>
+                <a:cs typeface="+mn-cs"/>
+              </a:defRPr>
+            </a:lvl1pPr>
+            <a:lvl2pPr marL="685793" indent="-228598" algn="l" defTabSz="914391" rtl="0" eaLnBrk="1" latinLnBrk="0" hangingPunct="1">
+              <a:lnSpc>
+                <a:spcPct val="100000"/>
+              </a:lnSpc>
+              <a:spcBef>
+                <a:spcPts val="500"/>
+              </a:spcBef>
+              <a:buFont typeface="Arial" panose="020B0604020202020204" pitchFamily="34" charset="0"/>
+              <a:buChar char="•"/>
+              <a:defRPr lang="pl-PL" sz="1400" kern="1200" smtClean="0">
+                <a:solidFill>
+                  <a:schemeClr val="tx1">
+                    <a:lumMod val="75000"/>
+                    <a:lumOff val="25000"/>
+                  </a:schemeClr>
+                </a:solidFill>
+                <a:latin typeface="+mn-lt"/>
+                <a:ea typeface="+mn-ea"/>
+                <a:cs typeface="+mn-cs"/>
+              </a:defRPr>
+            </a:lvl2pPr>
+            <a:lvl3pPr marL="1142989" indent="-228598" algn="l" defTabSz="914391" rtl="0" eaLnBrk="1" latinLnBrk="0" hangingPunct="1">
+              <a:lnSpc>
+                <a:spcPct val="100000"/>
+              </a:lnSpc>
+              <a:spcBef>
+                <a:spcPts val="500"/>
+              </a:spcBef>
+              <a:buFont typeface="Arial" panose="020B0604020202020204" pitchFamily="34" charset="0"/>
+              <a:buChar char="•"/>
+              <a:defRPr lang="pl-PL" sz="1400" kern="1200" smtClean="0">
+                <a:solidFill>
+                  <a:schemeClr val="tx1">
+                    <a:lumMod val="75000"/>
+                    <a:lumOff val="25000"/>
+                  </a:schemeClr>
+                </a:solidFill>
+                <a:latin typeface="+mn-lt"/>
+                <a:ea typeface="+mn-ea"/>
+                <a:cs typeface="+mn-cs"/>
+              </a:defRPr>
+            </a:lvl3pPr>
+            <a:lvl4pPr marL="1600185" indent="-228598" algn="l" defTabSz="914391" rtl="0" eaLnBrk="1" latinLnBrk="0" hangingPunct="1">
+              <a:lnSpc>
+                <a:spcPct val="100000"/>
+              </a:lnSpc>
+              <a:spcBef>
+                <a:spcPts val="500"/>
+              </a:spcBef>
+              <a:buFont typeface="Arial" panose="020B0604020202020204" pitchFamily="34" charset="0"/>
+              <a:buChar char="•"/>
+              <a:defRPr lang="pl-PL" sz="1400" kern="1200" smtClean="0">
+                <a:solidFill>
+                  <a:schemeClr val="tx1">
+                    <a:lumMod val="75000"/>
+                    <a:lumOff val="25000"/>
+                  </a:schemeClr>
+                </a:solidFill>
+                <a:latin typeface="+mn-lt"/>
+                <a:ea typeface="+mn-ea"/>
+                <a:cs typeface="+mn-cs"/>
+              </a:defRPr>
+            </a:lvl4pPr>
+            <a:lvl5pPr marL="2057380" indent="-228598" algn="l" defTabSz="914391" rtl="0" eaLnBrk="1" latinLnBrk="0" hangingPunct="1">
+              <a:lnSpc>
+                <a:spcPct val="100000"/>
+              </a:lnSpc>
+              <a:spcBef>
+                <a:spcPts val="500"/>
+              </a:spcBef>
+              <a:buFont typeface="Arial" panose="020B0604020202020204" pitchFamily="34" charset="0"/>
+              <a:buChar char="•"/>
+              <a:defRPr lang="pl-PL" sz="1400" kern="1200">
+                <a:solidFill>
+                  <a:schemeClr val="tx1">
+                    <a:lumMod val="75000"/>
+                    <a:lumOff val="25000"/>
+                  </a:schemeClr>
+                </a:solidFill>
+                <a:latin typeface="+mn-lt"/>
+                <a:ea typeface="+mn-ea"/>
+                <a:cs typeface="+mn-cs"/>
+              </a:defRPr>
+            </a:lvl5pPr>
+            <a:lvl6pPr marL="2514576" indent="-228598" algn="l" defTabSz="914391" rtl="0" eaLnBrk="1" latinLnBrk="0" hangingPunct="1">
+              <a:lnSpc>
+                <a:spcPct val="90000"/>
+              </a:lnSpc>
+              <a:spcBef>
+                <a:spcPts val="500"/>
+              </a:spcBef>
+              <a:buFont typeface="Arial" panose="020B0604020202020204" pitchFamily="34" charset="0"/>
+              <a:buChar char="•"/>
+              <a:defRPr lang="pl-PL" sz="1800" kern="1200">
+                <a:solidFill>
+                  <a:schemeClr val="tx1"/>
+                </a:solidFill>
+                <a:latin typeface="+mn-lt"/>
+                <a:ea typeface="+mn-ea"/>
+                <a:cs typeface="+mn-cs"/>
+              </a:defRPr>
+            </a:lvl6pPr>
+            <a:lvl7pPr marL="2971772" indent="-228598" algn="l" defTabSz="914391" rtl="0" eaLnBrk="1" latinLnBrk="0" hangingPunct="1">
+              <a:lnSpc>
+                <a:spcPct val="90000"/>
+              </a:lnSpc>
+              <a:spcBef>
+                <a:spcPts val="500"/>
+              </a:spcBef>
+              <a:buFont typeface="Arial" panose="020B0604020202020204" pitchFamily="34" charset="0"/>
+              <a:buChar char="•"/>
+              <a:defRPr lang="pl-PL" sz="1800" kern="1200">
+                <a:solidFill>
+                  <a:schemeClr val="tx1"/>
+                </a:solidFill>
+                <a:latin typeface="+mn-lt"/>
+                <a:ea typeface="+mn-ea"/>
+                <a:cs typeface="+mn-cs"/>
+              </a:defRPr>
+            </a:lvl7pPr>
+            <a:lvl8pPr marL="3428967" indent="-228598" algn="l" defTabSz="914391" rtl="0" eaLnBrk="1" latinLnBrk="0" hangingPunct="1">
+              <a:lnSpc>
+                <a:spcPct val="90000"/>
+              </a:lnSpc>
+              <a:spcBef>
+                <a:spcPts val="500"/>
+              </a:spcBef>
+              <a:buFont typeface="Arial" panose="020B0604020202020204" pitchFamily="34" charset="0"/>
+              <a:buChar char="•"/>
+              <a:defRPr lang="pl-PL" sz="1800" kern="1200">
+                <a:solidFill>
+                  <a:schemeClr val="tx1"/>
+                </a:solidFill>
+                <a:latin typeface="+mn-lt"/>
+                <a:ea typeface="+mn-ea"/>
+                <a:cs typeface="+mn-cs"/>
+              </a:defRPr>
+            </a:lvl8pPr>
+            <a:lvl9pPr marL="3886163" indent="-228598" algn="l" defTabSz="914391" rtl="0" eaLnBrk="1" latinLnBrk="0" hangingPunct="1">
+              <a:lnSpc>
+                <a:spcPct val="90000"/>
+              </a:lnSpc>
+              <a:spcBef>
+                <a:spcPts val="500"/>
+              </a:spcBef>
+              <a:buFont typeface="Arial" panose="020B0604020202020204" pitchFamily="34" charset="0"/>
+              <a:buChar char="•"/>
+              <a:defRPr lang="pl-PL" sz="1800" kern="1200">
+                <a:solidFill>
+                  <a:schemeClr val="tx1"/>
+                </a:solidFill>
+                <a:latin typeface="+mn-lt"/>
+                <a:ea typeface="+mn-ea"/>
+                <a:cs typeface="+mn-cs"/>
+              </a:defRPr>
+            </a:lvl9pPr>
+          </a:lstStyle>
+          <a:p>
+            <a:pPr marL="342900" indent="-342900" rtl="0">
+              <a:spcAft>
+                <a:spcPts val="1200"/>
+              </a:spcAft>
+              <a:buFont typeface="+mj-lt"/>
+              <a:buAutoNum type="arabicPeriod"/>
+            </a:pPr>
+            <a:r>
+              <a:rPr lang="en-US" sz="1600" dirty="0">
+                <a:solidFill>
+                  <a:schemeClr val="tx1"/>
+                </a:solidFill>
+              </a:rPr>
+              <a:t>Data cleaning required the most substantial time investment.</a:t>
+            </a:r>
+          </a:p>
+          <a:p>
+            <a:pPr marL="342900" indent="-342900" rtl="0">
+              <a:spcAft>
+                <a:spcPts val="1200"/>
+              </a:spcAft>
+              <a:buFont typeface="+mj-lt"/>
+              <a:buAutoNum type="arabicPeriod"/>
+            </a:pPr>
+            <a:r>
+              <a:rPr lang="en-US" sz="1600" dirty="0">
+                <a:solidFill>
+                  <a:schemeClr val="tx1"/>
+                </a:solidFill>
+              </a:rPr>
+              <a:t>Spark worked really well with Parquet files when the schema was set up in advance.</a:t>
+            </a:r>
+          </a:p>
+          <a:p>
+            <a:pPr marL="342900" indent="-342900" rtl="0">
+              <a:spcAft>
+                <a:spcPts val="1200"/>
+              </a:spcAft>
+              <a:buFont typeface="+mj-lt"/>
+              <a:buAutoNum type="arabicPeriod"/>
+            </a:pPr>
+            <a:r>
+              <a:rPr lang="en-US" sz="1600" dirty="0">
+                <a:solidFill>
+                  <a:schemeClr val="tx1"/>
+                </a:solidFill>
+              </a:rPr>
+              <a:t>Regular expression operations significantly slowed down the process</a:t>
+            </a:r>
+          </a:p>
+          <a:p>
+            <a:pPr marL="342900" indent="-342900" rtl="0">
+              <a:spcAft>
+                <a:spcPts val="1200"/>
+              </a:spcAft>
+              <a:buFont typeface="+mj-lt"/>
+              <a:buAutoNum type="arabicPeriod"/>
+            </a:pPr>
+            <a:r>
+              <a:rPr lang="en-US" sz="1600" dirty="0">
+                <a:solidFill>
+                  <a:schemeClr val="tx1"/>
+                </a:solidFill>
+              </a:rPr>
+              <a:t>A more efficient strategy may involve utilizing Azure SQL Database with a direct Databricks integration.</a:t>
+            </a:r>
+            <a:endParaRPr lang="pl-PL" sz="1600" dirty="0">
+              <a:solidFill>
+                <a:schemeClr val="tx1"/>
+              </a:solidFill>
+            </a:endParaRPr>
+          </a:p>
+        </p:txBody>
+      </p:sp>
+    </p:spTree>
+    <p:extLst>
+      <p:ext uri="{BB962C8B-B14F-4D97-AF65-F5344CB8AC3E}">
+        <p14:creationId xmlns:p14="http://schemas.microsoft.com/office/powerpoint/2010/main" val="4052214363"/>
+      </p:ext>
+    </p:extLst>
+  </p:cSld>
+  <p:clrMapOvr>
+    <a:masterClrMapping/>
+  </p:clrMapOvr>
+</p:sld>
+</file>
+
+<file path=ppt/slides/slide16.xml><?xml version="1.0" encoding="utf-8"?>
 <p:sld xmlns:a="http://schemas.openxmlformats.org/drawingml/2006/main" xmlns:r="http://schemas.openxmlformats.org/officeDocument/2006/relationships" xmlns:p="http://schemas.openxmlformats.org/presentationml/2006/main">
   <p:cSld>
     <p:spTree>
@@ -13348,1505 +13737,6 @@
 </p:sld>
 </file>
 
-<file path=ppt/slides/slide16.xml><?xml version="1.0" encoding="utf-8"?>
-<p:sld xmlns:a="http://schemas.openxmlformats.org/drawingml/2006/main" xmlns:r="http://schemas.openxmlformats.org/officeDocument/2006/relationships" xmlns:p="http://schemas.openxmlformats.org/presentationml/2006/main">
-  <p:cSld>
-    <p:spTree>
-      <p:nvGrpSpPr>
-        <p:cNvPr id="1" name=""/>
-        <p:cNvGrpSpPr/>
-        <p:nvPr/>
-      </p:nvGrpSpPr>
-      <p:grpSpPr>
-        <a:xfrm>
-          <a:off x="0" y="0"/>
-          <a:ext cx="0" cy="0"/>
-          <a:chOff x="0" y="0"/>
-          <a:chExt cx="0" cy="0"/>
-        </a:xfrm>
-      </p:grpSpPr>
-      <p:sp>
-        <p:nvSpPr>
-          <p:cNvPr id="2" name="Tytuł 1">
-            <a:extLst>
-              <a:ext uri="{FF2B5EF4-FFF2-40B4-BE49-F238E27FC236}">
-                <a16:creationId xmlns:a16="http://schemas.microsoft.com/office/drawing/2014/main" id="{F07E19FF-DAD9-4AB4-9D83-993EE9FE6846}"/>
-              </a:ext>
-            </a:extLst>
-          </p:cNvPr>
-          <p:cNvSpPr>
-            <a:spLocks noGrp="1"/>
-          </p:cNvSpPr>
-          <p:nvPr>
-            <p:ph type="title"/>
-          </p:nvPr>
-        </p:nvSpPr>
-        <p:spPr>
-          <a:xfrm>
-            <a:off x="444500" y="412137"/>
-            <a:ext cx="9146972" cy="640080"/>
-          </a:xfrm>
-        </p:spPr>
-        <p:txBody>
-          <a:bodyPr rtlCol="0">
-            <a:normAutofit/>
-          </a:bodyPr>
-          <a:lstStyle>
-            <a:defPPr>
-              <a:defRPr lang="pl-PL"/>
-            </a:defPPr>
-          </a:lstStyle>
-          <a:p>
-            <a:pPr rtl="0"/>
-            <a:r>
-              <a:rPr lang="pl-PL" b="1">
-                <a:latin typeface="Segoe UI Semibold" panose="020B0502040204020203" pitchFamily="34" charset="0"/>
-                <a:cs typeface="Segoe UI Semibold" panose="020B0502040204020203" pitchFamily="34" charset="0"/>
-              </a:rPr>
-              <a:t>Wypróbuj!</a:t>
-            </a:r>
-          </a:p>
-        </p:txBody>
-      </p:sp>
-      <p:sp>
-        <p:nvSpPr>
-          <p:cNvPr id="40" name="Owal 39" descr="Mały okrąg">
-            <a:extLst>
-              <a:ext uri="{FF2B5EF4-FFF2-40B4-BE49-F238E27FC236}">
-                <a16:creationId xmlns:a16="http://schemas.microsoft.com/office/drawing/2014/main" id="{0C3A28BB-9675-8648-9563-A663628F48F5}"/>
-              </a:ext>
-            </a:extLst>
-          </p:cNvPr>
-          <p:cNvSpPr>
-            <a:spLocks noChangeAspect="1"/>
-          </p:cNvSpPr>
-          <p:nvPr/>
-        </p:nvSpPr>
-        <p:spPr bwMode="blackWhite">
-          <a:xfrm>
-            <a:off x="530197" y="1503788"/>
-            <a:ext cx="409838" cy="409838"/>
-          </a:xfrm>
-          <a:prstGeom prst="ellipse">
-            <a:avLst/>
-          </a:prstGeom>
-          <a:solidFill>
-            <a:schemeClr val="accent2"/>
-          </a:solidFill>
-          <a:ln>
-            <a:noFill/>
-          </a:ln>
-        </p:spPr>
-        <p:style>
-          <a:lnRef idx="2">
-            <a:schemeClr val="accent1">
-              <a:shade val="50000"/>
-            </a:schemeClr>
-          </a:lnRef>
-          <a:fillRef idx="1">
-            <a:schemeClr val="accent1"/>
-          </a:fillRef>
-          <a:effectRef idx="0">
-            <a:schemeClr val="accent1"/>
-          </a:effectRef>
-          <a:fontRef idx="minor">
-            <a:schemeClr val="lt1"/>
-          </a:fontRef>
-        </p:style>
-        <p:txBody>
-          <a:bodyPr rtlCol="0" anchor="ctr"/>
-          <a:lstStyle>
-            <a:defPPr>
-              <a:defRPr lang="pl-PL"/>
-            </a:defPPr>
-          </a:lstStyle>
-          <a:p>
-            <a:pPr algn="ctr" rtl="0"/>
-            <a:endParaRPr lang="pl-PL"/>
-          </a:p>
-        </p:txBody>
-      </p:sp>
-      <p:sp>
-        <p:nvSpPr>
-          <p:cNvPr id="41" name="Pole tekstowe 40" descr="Liczba 1">
-            <a:extLst>
-              <a:ext uri="{FF2B5EF4-FFF2-40B4-BE49-F238E27FC236}">
-                <a16:creationId xmlns:a16="http://schemas.microsoft.com/office/drawing/2014/main" id="{516D502C-EEB8-7641-9141-D6049BAE3252}"/>
-              </a:ext>
-            </a:extLst>
-          </p:cNvPr>
-          <p:cNvSpPr txBox="1">
-            <a:spLocks noChangeAspect="1"/>
-          </p:cNvSpPr>
-          <p:nvPr/>
-        </p:nvSpPr>
-        <p:spPr bwMode="blackWhite">
-          <a:xfrm>
-            <a:off x="457571" y="1520182"/>
-            <a:ext cx="558179" cy="369332"/>
-          </a:xfrm>
-          <a:prstGeom prst="rect">
-            <a:avLst/>
-          </a:prstGeom>
-          <a:noFill/>
-        </p:spPr>
-        <p:txBody>
-          <a:bodyPr wrap="square" rtlCol="0">
-            <a:spAutoFit/>
-          </a:bodyPr>
-          <a:lstStyle>
-            <a:defPPr>
-              <a:defRPr lang="pl-PL"/>
-            </a:defPPr>
-          </a:lstStyle>
-          <a:p>
-            <a:pPr algn="ctr" rtl="0"/>
-            <a:r>
-              <a:rPr lang="pl-PL">
-                <a:solidFill>
-                  <a:schemeClr val="bg1"/>
-                </a:solidFill>
-                <a:cs typeface="Segoe UI Semibold" panose="020B0702040204020203" pitchFamily="34" charset="0"/>
-              </a:rPr>
-              <a:t>1</a:t>
-            </a:r>
-          </a:p>
-        </p:txBody>
-      </p:sp>
-      <p:sp>
-        <p:nvSpPr>
-          <p:cNvPr id="43" name="Owal 42" descr="Mały okrąg">
-            <a:extLst>
-              <a:ext uri="{FF2B5EF4-FFF2-40B4-BE49-F238E27FC236}">
-                <a16:creationId xmlns:a16="http://schemas.microsoft.com/office/drawing/2014/main" id="{E3BF4CBA-96D8-844A-846E-482C93C4A9BA}"/>
-              </a:ext>
-            </a:extLst>
-          </p:cNvPr>
-          <p:cNvSpPr>
-            <a:spLocks noChangeAspect="1"/>
-          </p:cNvSpPr>
-          <p:nvPr/>
-        </p:nvSpPr>
-        <p:spPr bwMode="blackWhite">
-          <a:xfrm>
-            <a:off x="523507" y="2496858"/>
-            <a:ext cx="409838" cy="409838"/>
-          </a:xfrm>
-          <a:prstGeom prst="ellipse">
-            <a:avLst/>
-          </a:prstGeom>
-          <a:solidFill>
-            <a:schemeClr val="accent2"/>
-          </a:solidFill>
-          <a:ln>
-            <a:noFill/>
-          </a:ln>
-        </p:spPr>
-        <p:style>
-          <a:lnRef idx="2">
-            <a:schemeClr val="accent1">
-              <a:shade val="50000"/>
-            </a:schemeClr>
-          </a:lnRef>
-          <a:fillRef idx="1">
-            <a:schemeClr val="accent1"/>
-          </a:fillRef>
-          <a:effectRef idx="0">
-            <a:schemeClr val="accent1"/>
-          </a:effectRef>
-          <a:fontRef idx="minor">
-            <a:schemeClr val="lt1"/>
-          </a:fontRef>
-        </p:style>
-        <p:txBody>
-          <a:bodyPr rtlCol="0" anchor="ctr"/>
-          <a:lstStyle>
-            <a:defPPr>
-              <a:defRPr lang="pl-PL"/>
-            </a:defPPr>
-          </a:lstStyle>
-          <a:p>
-            <a:pPr algn="ctr" rtl="0"/>
-            <a:endParaRPr lang="pl-PL"/>
-          </a:p>
-        </p:txBody>
-      </p:sp>
-      <p:sp>
-        <p:nvSpPr>
-          <p:cNvPr id="44" name="Pole tekstowe 43" descr="Liczba 2">
-            <a:extLst>
-              <a:ext uri="{FF2B5EF4-FFF2-40B4-BE49-F238E27FC236}">
-                <a16:creationId xmlns:a16="http://schemas.microsoft.com/office/drawing/2014/main" id="{4EE65486-1766-B74A-9043-DE141DDF4363}"/>
-              </a:ext>
-            </a:extLst>
-          </p:cNvPr>
-          <p:cNvSpPr txBox="1">
-            <a:spLocks noChangeAspect="1"/>
-          </p:cNvSpPr>
-          <p:nvPr/>
-        </p:nvSpPr>
-        <p:spPr bwMode="blackWhite">
-          <a:xfrm>
-            <a:off x="488894" y="2503896"/>
-            <a:ext cx="493917" cy="369332"/>
-          </a:xfrm>
-          <a:prstGeom prst="rect">
-            <a:avLst/>
-          </a:prstGeom>
-          <a:noFill/>
-        </p:spPr>
-        <p:txBody>
-          <a:bodyPr wrap="square" rtlCol="0">
-            <a:spAutoFit/>
-          </a:bodyPr>
-          <a:lstStyle>
-            <a:defPPr>
-              <a:defRPr lang="pl-PL"/>
-            </a:defPPr>
-          </a:lstStyle>
-          <a:p>
-            <a:pPr algn="ctr" rtl="0"/>
-            <a:r>
-              <a:rPr lang="pl-PL">
-                <a:solidFill>
-                  <a:schemeClr val="bg1"/>
-                </a:solidFill>
-                <a:cs typeface="Segoe UI Semibold" panose="020B0702040204020203" pitchFamily="34" charset="0"/>
-              </a:rPr>
-              <a:t>2</a:t>
-            </a:r>
-          </a:p>
-        </p:txBody>
-      </p:sp>
-      <p:sp>
-        <p:nvSpPr>
-          <p:cNvPr id="45" name="Owal 44" descr="Mały okrąg">
-            <a:extLst>
-              <a:ext uri="{FF2B5EF4-FFF2-40B4-BE49-F238E27FC236}">
-                <a16:creationId xmlns:a16="http://schemas.microsoft.com/office/drawing/2014/main" id="{7BB2B4E3-317E-FC4B-B166-28E804B11BF6}"/>
-              </a:ext>
-            </a:extLst>
-          </p:cNvPr>
-          <p:cNvSpPr>
-            <a:spLocks noChangeAspect="1"/>
-          </p:cNvSpPr>
-          <p:nvPr/>
-        </p:nvSpPr>
-        <p:spPr bwMode="blackWhite">
-          <a:xfrm>
-            <a:off x="511049" y="3127810"/>
-            <a:ext cx="409838" cy="409838"/>
-          </a:xfrm>
-          <a:prstGeom prst="ellipse">
-            <a:avLst/>
-          </a:prstGeom>
-          <a:solidFill>
-            <a:schemeClr val="accent2"/>
-          </a:solidFill>
-          <a:ln>
-            <a:noFill/>
-          </a:ln>
-        </p:spPr>
-        <p:style>
-          <a:lnRef idx="2">
-            <a:schemeClr val="accent1">
-              <a:shade val="50000"/>
-            </a:schemeClr>
-          </a:lnRef>
-          <a:fillRef idx="1">
-            <a:schemeClr val="accent1"/>
-          </a:fillRef>
-          <a:effectRef idx="0">
-            <a:schemeClr val="accent1"/>
-          </a:effectRef>
-          <a:fontRef idx="minor">
-            <a:schemeClr val="lt1"/>
-          </a:fontRef>
-        </p:style>
-        <p:txBody>
-          <a:bodyPr rtlCol="0" anchor="ctr"/>
-          <a:lstStyle>
-            <a:defPPr>
-              <a:defRPr lang="pl-PL"/>
-            </a:defPPr>
-          </a:lstStyle>
-          <a:p>
-            <a:pPr algn="ctr" rtl="0"/>
-            <a:endParaRPr lang="pl-PL"/>
-          </a:p>
-        </p:txBody>
-      </p:sp>
-      <p:sp>
-        <p:nvSpPr>
-          <p:cNvPr id="47" name="Pole tekstowe 46" descr="Liczba 3">
-            <a:extLst>
-              <a:ext uri="{FF2B5EF4-FFF2-40B4-BE49-F238E27FC236}">
-                <a16:creationId xmlns:a16="http://schemas.microsoft.com/office/drawing/2014/main" id="{04248951-1086-2B45-ACBA-B055B8A9B128}"/>
-              </a:ext>
-            </a:extLst>
-          </p:cNvPr>
-          <p:cNvSpPr txBox="1">
-            <a:spLocks noChangeAspect="1"/>
-          </p:cNvSpPr>
-          <p:nvPr/>
-        </p:nvSpPr>
-        <p:spPr bwMode="blackWhite">
-          <a:xfrm>
-            <a:off x="444500" y="3151746"/>
-            <a:ext cx="558179" cy="369332"/>
-          </a:xfrm>
-          <a:prstGeom prst="rect">
-            <a:avLst/>
-          </a:prstGeom>
-          <a:noFill/>
-        </p:spPr>
-        <p:txBody>
-          <a:bodyPr wrap="square" rtlCol="0">
-            <a:spAutoFit/>
-          </a:bodyPr>
-          <a:lstStyle>
-            <a:defPPr>
-              <a:defRPr lang="pl-PL"/>
-            </a:defPPr>
-          </a:lstStyle>
-          <a:p>
-            <a:pPr algn="ctr" rtl="0"/>
-            <a:r>
-              <a:rPr lang="pl-PL">
-                <a:solidFill>
-                  <a:schemeClr val="bg1"/>
-                </a:solidFill>
-                <a:cs typeface="Segoe UI Semibold" panose="020B0702040204020203" pitchFamily="34" charset="0"/>
-              </a:rPr>
-              <a:t>3</a:t>
-            </a:r>
-          </a:p>
-        </p:txBody>
-      </p:sp>
-      <p:sp>
-        <p:nvSpPr>
-          <p:cNvPr id="48" name="Owal 47" descr="Mały okrąg">
-            <a:extLst>
-              <a:ext uri="{FF2B5EF4-FFF2-40B4-BE49-F238E27FC236}">
-                <a16:creationId xmlns:a16="http://schemas.microsoft.com/office/drawing/2014/main" id="{F1C23E2A-8D82-9F46-B7C2-83771AA0906F}"/>
-              </a:ext>
-            </a:extLst>
-          </p:cNvPr>
-          <p:cNvSpPr>
-            <a:spLocks noChangeAspect="1"/>
-          </p:cNvSpPr>
-          <p:nvPr/>
-        </p:nvSpPr>
-        <p:spPr bwMode="blackWhite">
-          <a:xfrm>
-            <a:off x="530159" y="3890648"/>
-            <a:ext cx="409838" cy="409838"/>
-          </a:xfrm>
-          <a:prstGeom prst="ellipse">
-            <a:avLst/>
-          </a:prstGeom>
-          <a:solidFill>
-            <a:schemeClr val="accent2"/>
-          </a:solidFill>
-          <a:ln>
-            <a:noFill/>
-          </a:ln>
-        </p:spPr>
-        <p:style>
-          <a:lnRef idx="2">
-            <a:schemeClr val="accent1">
-              <a:shade val="50000"/>
-            </a:schemeClr>
-          </a:lnRef>
-          <a:fillRef idx="1">
-            <a:schemeClr val="accent1"/>
-          </a:fillRef>
-          <a:effectRef idx="0">
-            <a:schemeClr val="accent1"/>
-          </a:effectRef>
-          <a:fontRef idx="minor">
-            <a:schemeClr val="lt1"/>
-          </a:fontRef>
-        </p:style>
-        <p:txBody>
-          <a:bodyPr rtlCol="0" anchor="ctr"/>
-          <a:lstStyle>
-            <a:defPPr>
-              <a:defRPr lang="pl-PL"/>
-            </a:defPPr>
-          </a:lstStyle>
-          <a:p>
-            <a:pPr algn="ctr" rtl="0"/>
-            <a:endParaRPr lang="pl-PL"/>
-          </a:p>
-        </p:txBody>
-      </p:sp>
-      <p:sp>
-        <p:nvSpPr>
-          <p:cNvPr id="50" name="Pole tekstowe 49" descr="Liczba 3">
-            <a:extLst>
-              <a:ext uri="{FF2B5EF4-FFF2-40B4-BE49-F238E27FC236}">
-                <a16:creationId xmlns:a16="http://schemas.microsoft.com/office/drawing/2014/main" id="{985448E7-EE20-F14F-97AC-EA8BFD8FBA7F}"/>
-              </a:ext>
-            </a:extLst>
-          </p:cNvPr>
-          <p:cNvSpPr txBox="1">
-            <a:spLocks noChangeAspect="1"/>
-          </p:cNvSpPr>
-          <p:nvPr/>
-        </p:nvSpPr>
-        <p:spPr bwMode="blackWhite">
-          <a:xfrm>
-            <a:off x="449185" y="3910901"/>
-            <a:ext cx="558179" cy="369332"/>
-          </a:xfrm>
-          <a:prstGeom prst="rect">
-            <a:avLst/>
-          </a:prstGeom>
-          <a:noFill/>
-        </p:spPr>
-        <p:txBody>
-          <a:bodyPr wrap="square" rtlCol="0">
-            <a:spAutoFit/>
-          </a:bodyPr>
-          <a:lstStyle>
-            <a:defPPr>
-              <a:defRPr lang="pl-PL"/>
-            </a:defPPr>
-          </a:lstStyle>
-          <a:p>
-            <a:pPr algn="ctr" rtl="0"/>
-            <a:r>
-              <a:rPr lang="pl-PL">
-                <a:solidFill>
-                  <a:schemeClr val="bg1"/>
-                </a:solidFill>
-                <a:cs typeface="Segoe UI Semibold" panose="020B0702040204020203" pitchFamily="34" charset="0"/>
-              </a:rPr>
-              <a:t>4</a:t>
-            </a:r>
-          </a:p>
-        </p:txBody>
-      </p:sp>
-      <p:sp>
-        <p:nvSpPr>
-          <p:cNvPr id="51" name="Zawartość — symbol zastępczy 7">
-            <a:extLst>
-              <a:ext uri="{FF2B5EF4-FFF2-40B4-BE49-F238E27FC236}">
-                <a16:creationId xmlns:a16="http://schemas.microsoft.com/office/drawing/2014/main" id="{A6D40621-9F60-B248-A84C-7DCBF898D4DB}"/>
-              </a:ext>
-            </a:extLst>
-          </p:cNvPr>
-          <p:cNvSpPr txBox="1">
-            <a:spLocks/>
-          </p:cNvSpPr>
-          <p:nvPr/>
-        </p:nvSpPr>
-        <p:spPr>
-          <a:xfrm>
-            <a:off x="1039854" y="1509612"/>
-            <a:ext cx="4380515" cy="3652194"/>
-          </a:xfrm>
-          <a:prstGeom prst="rect">
-            <a:avLst/>
-          </a:prstGeom>
-        </p:spPr>
-        <p:txBody>
-          <a:bodyPr vert="horz" lIns="91440" tIns="45720" rIns="91440" bIns="45720" rtlCol="0">
-            <a:normAutofit/>
-          </a:bodyPr>
-          <a:lstStyle>
-            <a:lvl1pPr marL="228598" indent="-228598" algn="l" defTabSz="914391" rtl="0" eaLnBrk="1" latinLnBrk="0" hangingPunct="1">
-              <a:lnSpc>
-                <a:spcPct val="100000"/>
-              </a:lnSpc>
-              <a:spcBef>
-                <a:spcPts val="1000"/>
-              </a:spcBef>
-              <a:buFont typeface="Arial" panose="020B0604020202020204" pitchFamily="34" charset="0"/>
-              <a:buChar char="•"/>
-              <a:defRPr lang="pl-PL" sz="1400" kern="1200" smtClean="0">
-                <a:solidFill>
-                  <a:schemeClr val="tx1">
-                    <a:lumMod val="75000"/>
-                    <a:lumOff val="25000"/>
-                  </a:schemeClr>
-                </a:solidFill>
-                <a:latin typeface="+mn-lt"/>
-                <a:ea typeface="+mn-ea"/>
-                <a:cs typeface="+mn-cs"/>
-              </a:defRPr>
-            </a:lvl1pPr>
-            <a:lvl2pPr marL="685793" indent="-228598" algn="l" defTabSz="914391" rtl="0" eaLnBrk="1" latinLnBrk="0" hangingPunct="1">
-              <a:lnSpc>
-                <a:spcPct val="100000"/>
-              </a:lnSpc>
-              <a:spcBef>
-                <a:spcPts val="500"/>
-              </a:spcBef>
-              <a:buFont typeface="Arial" panose="020B0604020202020204" pitchFamily="34" charset="0"/>
-              <a:buChar char="•"/>
-              <a:defRPr lang="pl-PL" sz="1400" kern="1200" smtClean="0">
-                <a:solidFill>
-                  <a:schemeClr val="tx1">
-                    <a:lumMod val="75000"/>
-                    <a:lumOff val="25000"/>
-                  </a:schemeClr>
-                </a:solidFill>
-                <a:latin typeface="+mn-lt"/>
-                <a:ea typeface="+mn-ea"/>
-                <a:cs typeface="+mn-cs"/>
-              </a:defRPr>
-            </a:lvl2pPr>
-            <a:lvl3pPr marL="1142989" indent="-228598" algn="l" defTabSz="914391" rtl="0" eaLnBrk="1" latinLnBrk="0" hangingPunct="1">
-              <a:lnSpc>
-                <a:spcPct val="100000"/>
-              </a:lnSpc>
-              <a:spcBef>
-                <a:spcPts val="500"/>
-              </a:spcBef>
-              <a:buFont typeface="Arial" panose="020B0604020202020204" pitchFamily="34" charset="0"/>
-              <a:buChar char="•"/>
-              <a:defRPr lang="pl-PL" sz="1400" kern="1200" smtClean="0">
-                <a:solidFill>
-                  <a:schemeClr val="tx1">
-                    <a:lumMod val="75000"/>
-                    <a:lumOff val="25000"/>
-                  </a:schemeClr>
-                </a:solidFill>
-                <a:latin typeface="+mn-lt"/>
-                <a:ea typeface="+mn-ea"/>
-                <a:cs typeface="+mn-cs"/>
-              </a:defRPr>
-            </a:lvl3pPr>
-            <a:lvl4pPr marL="1600185" indent="-228598" algn="l" defTabSz="914391" rtl="0" eaLnBrk="1" latinLnBrk="0" hangingPunct="1">
-              <a:lnSpc>
-                <a:spcPct val="100000"/>
-              </a:lnSpc>
-              <a:spcBef>
-                <a:spcPts val="500"/>
-              </a:spcBef>
-              <a:buFont typeface="Arial" panose="020B0604020202020204" pitchFamily="34" charset="0"/>
-              <a:buChar char="•"/>
-              <a:defRPr lang="pl-PL" sz="1400" kern="1200" smtClean="0">
-                <a:solidFill>
-                  <a:schemeClr val="tx1">
-                    <a:lumMod val="75000"/>
-                    <a:lumOff val="25000"/>
-                  </a:schemeClr>
-                </a:solidFill>
-                <a:latin typeface="+mn-lt"/>
-                <a:ea typeface="+mn-ea"/>
-                <a:cs typeface="+mn-cs"/>
-              </a:defRPr>
-            </a:lvl4pPr>
-            <a:lvl5pPr marL="2057380" indent="-228598" algn="l" defTabSz="914391" rtl="0" eaLnBrk="1" latinLnBrk="0" hangingPunct="1">
-              <a:lnSpc>
-                <a:spcPct val="100000"/>
-              </a:lnSpc>
-              <a:spcBef>
-                <a:spcPts val="500"/>
-              </a:spcBef>
-              <a:buFont typeface="Arial" panose="020B0604020202020204" pitchFamily="34" charset="0"/>
-              <a:buChar char="•"/>
-              <a:defRPr lang="pl-PL" sz="1400" kern="1200">
-                <a:solidFill>
-                  <a:schemeClr val="tx1">
-                    <a:lumMod val="75000"/>
-                    <a:lumOff val="25000"/>
-                  </a:schemeClr>
-                </a:solidFill>
-                <a:latin typeface="+mn-lt"/>
-                <a:ea typeface="+mn-ea"/>
-                <a:cs typeface="+mn-cs"/>
-              </a:defRPr>
-            </a:lvl5pPr>
-            <a:lvl6pPr marL="2514576" indent="-228598" algn="l" defTabSz="914391" rtl="0" eaLnBrk="1" latinLnBrk="0" hangingPunct="1">
-              <a:lnSpc>
-                <a:spcPct val="90000"/>
-              </a:lnSpc>
-              <a:spcBef>
-                <a:spcPts val="500"/>
-              </a:spcBef>
-              <a:buFont typeface="Arial" panose="020B0604020202020204" pitchFamily="34" charset="0"/>
-              <a:buChar char="•"/>
-              <a:defRPr lang="pl-PL" sz="1800" kern="1200">
-                <a:solidFill>
-                  <a:schemeClr val="tx1"/>
-                </a:solidFill>
-                <a:latin typeface="+mn-lt"/>
-                <a:ea typeface="+mn-ea"/>
-                <a:cs typeface="+mn-cs"/>
-              </a:defRPr>
-            </a:lvl6pPr>
-            <a:lvl7pPr marL="2971772" indent="-228598" algn="l" defTabSz="914391" rtl="0" eaLnBrk="1" latinLnBrk="0" hangingPunct="1">
-              <a:lnSpc>
-                <a:spcPct val="90000"/>
-              </a:lnSpc>
-              <a:spcBef>
-                <a:spcPts val="500"/>
-              </a:spcBef>
-              <a:buFont typeface="Arial" panose="020B0604020202020204" pitchFamily="34" charset="0"/>
-              <a:buChar char="•"/>
-              <a:defRPr lang="pl-PL" sz="1800" kern="1200">
-                <a:solidFill>
-                  <a:schemeClr val="tx1"/>
-                </a:solidFill>
-                <a:latin typeface="+mn-lt"/>
-                <a:ea typeface="+mn-ea"/>
-                <a:cs typeface="+mn-cs"/>
-              </a:defRPr>
-            </a:lvl7pPr>
-            <a:lvl8pPr marL="3428967" indent="-228598" algn="l" defTabSz="914391" rtl="0" eaLnBrk="1" latinLnBrk="0" hangingPunct="1">
-              <a:lnSpc>
-                <a:spcPct val="90000"/>
-              </a:lnSpc>
-              <a:spcBef>
-                <a:spcPts val="500"/>
-              </a:spcBef>
-              <a:buFont typeface="Arial" panose="020B0604020202020204" pitchFamily="34" charset="0"/>
-              <a:buChar char="•"/>
-              <a:defRPr lang="pl-PL" sz="1800" kern="1200">
-                <a:solidFill>
-                  <a:schemeClr val="tx1"/>
-                </a:solidFill>
-                <a:latin typeface="+mn-lt"/>
-                <a:ea typeface="+mn-ea"/>
-                <a:cs typeface="+mn-cs"/>
-              </a:defRPr>
-            </a:lvl8pPr>
-            <a:lvl9pPr marL="3886163" indent="-228598" algn="l" defTabSz="914391" rtl="0" eaLnBrk="1" latinLnBrk="0" hangingPunct="1">
-              <a:lnSpc>
-                <a:spcPct val="90000"/>
-              </a:lnSpc>
-              <a:spcBef>
-                <a:spcPts val="500"/>
-              </a:spcBef>
-              <a:buFont typeface="Arial" panose="020B0604020202020204" pitchFamily="34" charset="0"/>
-              <a:buChar char="•"/>
-              <a:defRPr lang="pl-PL" sz="1800" kern="1200">
-                <a:solidFill>
-                  <a:schemeClr val="tx1"/>
-                </a:solidFill>
-                <a:latin typeface="+mn-lt"/>
-                <a:ea typeface="+mn-ea"/>
-                <a:cs typeface="+mn-cs"/>
-              </a:defRPr>
-            </a:lvl9pPr>
-          </a:lstStyle>
-          <a:p>
-            <a:pPr marL="0" indent="0" rtl="0">
-              <a:spcAft>
-                <a:spcPts val="1200"/>
-              </a:spcAft>
-              <a:buNone/>
-            </a:pPr>
-            <a:r>
-              <a:rPr lang="pl-PL" sz="1600">
-                <a:solidFill>
-                  <a:schemeClr val="tx1"/>
-                </a:solidFill>
-              </a:rPr>
-              <a:t>Kliknij pozycję </a:t>
-            </a:r>
-            <a:r>
-              <a:rPr lang="pl-PL" sz="1600" b="1">
-                <a:solidFill>
-                  <a:schemeClr val="tx1"/>
-                </a:solidFill>
-              </a:rPr>
-              <a:t>Wstaw &gt; Kształty</a:t>
-            </a:r>
-            <a:r>
-              <a:rPr lang="pl-PL" sz="1600">
-                <a:solidFill>
-                  <a:schemeClr val="tx1"/>
-                </a:solidFill>
-              </a:rPr>
-              <a:t>, aby wybrać kształty gałęzi i wstawiać linie, aby połączyć każdy temat.</a:t>
-            </a:r>
-          </a:p>
-          <a:p>
-            <a:pPr marL="0" indent="0" rtl="0">
-              <a:spcAft>
-                <a:spcPts val="1200"/>
-              </a:spcAft>
-              <a:buNone/>
-            </a:pPr>
-            <a:r>
-              <a:rPr lang="pl-PL" sz="1600">
-                <a:solidFill>
-                  <a:schemeClr val="tx1"/>
-                </a:solidFill>
-              </a:rPr>
-              <a:t>Kliknij prawym przyciskiem myszy kształt, aby zmienić jego kolor.</a:t>
-            </a:r>
-          </a:p>
-          <a:p>
-            <a:pPr marL="0" indent="0" rtl="0">
-              <a:spcAft>
-                <a:spcPts val="1200"/>
-              </a:spcAft>
-              <a:buNone/>
-            </a:pPr>
-            <a:r>
-              <a:rPr lang="pl-PL" sz="1600">
-                <a:solidFill>
-                  <a:schemeClr val="tx1"/>
-                </a:solidFill>
-              </a:rPr>
-              <a:t>Następnie przejdź do pozycji </a:t>
-            </a:r>
-            <a:r>
-              <a:rPr lang="pl-PL" sz="1600" b="1">
-                <a:solidFill>
-                  <a:schemeClr val="tx1"/>
-                </a:solidFill>
-                <a:cs typeface="Segoe UI Semibold" panose="020B0702040204020203" pitchFamily="34" charset="0"/>
-              </a:rPr>
-              <a:t>Wstaw </a:t>
-            </a:r>
-            <a:r>
-              <a:rPr lang="pl-PL" sz="1600">
-                <a:solidFill>
-                  <a:schemeClr val="tx1"/>
-                </a:solidFill>
-                <a:cs typeface="Segoe UI Semibold" panose="020B0702040204020203" pitchFamily="34" charset="0"/>
-              </a:rPr>
-              <a:t>&gt;</a:t>
-            </a:r>
-            <a:r>
-              <a:rPr lang="pl-PL" sz="1600" b="1">
-                <a:solidFill>
-                  <a:schemeClr val="tx1"/>
-                </a:solidFill>
-                <a:cs typeface="Segoe UI Semibold" panose="020B0702040204020203" pitchFamily="34" charset="0"/>
-              </a:rPr>
-              <a:t> Tekst</a:t>
-            </a:r>
-            <a:r>
-              <a:rPr lang="pl-PL" sz="1600">
-                <a:solidFill>
-                  <a:schemeClr val="tx1"/>
-                </a:solidFill>
-              </a:rPr>
-              <a:t> i wpisz 1 lub 2 słowa kluczowe dla każdej gałęzi.</a:t>
-            </a:r>
-          </a:p>
-          <a:p>
-            <a:pPr marL="0" indent="0" rtl="0">
-              <a:spcAft>
-                <a:spcPts val="1200"/>
-              </a:spcAft>
-              <a:buNone/>
-            </a:pPr>
-            <a:r>
-              <a:rPr lang="pl-PL" sz="1600">
-                <a:solidFill>
-                  <a:schemeClr val="tx1"/>
-                </a:solidFill>
-              </a:rPr>
-              <a:t>Przejdź do pozycji </a:t>
-            </a:r>
-            <a:r>
-              <a:rPr lang="pl-PL" sz="1600" b="1">
-                <a:solidFill>
-                  <a:schemeClr val="tx1"/>
-                </a:solidFill>
-              </a:rPr>
-              <a:t>Wstaw &gt; Obraz</a:t>
-            </a:r>
-            <a:r>
-              <a:rPr lang="pl-PL" sz="1600">
-                <a:solidFill>
-                  <a:schemeClr val="tx1"/>
-                </a:solidFill>
-              </a:rPr>
-              <a:t>, aby dodać obrazy i ikony do kształtów gałęzi.</a:t>
-            </a:r>
-          </a:p>
-        </p:txBody>
-      </p:sp>
-      <p:grpSp>
-        <p:nvGrpSpPr>
-          <p:cNvPr id="3" name="Grupa 2" descr="okręgi połączone liniami z polami tekstowymi">
-            <a:extLst>
-              <a:ext uri="{FF2B5EF4-FFF2-40B4-BE49-F238E27FC236}">
-                <a16:creationId xmlns:a16="http://schemas.microsoft.com/office/drawing/2014/main" id="{1D4EB0E6-31C2-46F7-ABD3-ECF41DD1412C}"/>
-              </a:ext>
-            </a:extLst>
-          </p:cNvPr>
-          <p:cNvGrpSpPr/>
-          <p:nvPr/>
-        </p:nvGrpSpPr>
-        <p:grpSpPr>
-          <a:xfrm>
-            <a:off x="6083842" y="1939633"/>
-            <a:ext cx="5318758" cy="4622299"/>
-            <a:chOff x="6083842" y="1939633"/>
-            <a:chExt cx="5318758" cy="4622299"/>
-          </a:xfrm>
-        </p:grpSpPr>
-        <p:cxnSp>
-          <p:nvCxnSpPr>
-            <p:cNvPr id="30" name="Łącznik prosty 29" descr="linia prosta">
-              <a:extLst>
-                <a:ext uri="{FF2B5EF4-FFF2-40B4-BE49-F238E27FC236}">
-                  <a16:creationId xmlns:a16="http://schemas.microsoft.com/office/drawing/2014/main" id="{63BB2123-A449-8E4F-BBD9-71E27CECBF94}"/>
-                </a:ext>
-              </a:extLst>
-            </p:cNvPr>
-            <p:cNvCxnSpPr>
-              <a:cxnSpLocks/>
-            </p:cNvCxnSpPr>
-            <p:nvPr/>
-          </p:nvCxnSpPr>
-          <p:spPr>
-            <a:xfrm flipH="1">
-              <a:off x="7188401" y="2785215"/>
-              <a:ext cx="768986" cy="88013"/>
-            </a:xfrm>
-            <a:prstGeom prst="line">
-              <a:avLst/>
-            </a:prstGeom>
-            <a:ln/>
-          </p:spPr>
-          <p:style>
-            <a:lnRef idx="3">
-              <a:schemeClr val="dk1"/>
-            </a:lnRef>
-            <a:fillRef idx="0">
-              <a:schemeClr val="dk1"/>
-            </a:fillRef>
-            <a:effectRef idx="2">
-              <a:schemeClr val="dk1"/>
-            </a:effectRef>
-            <a:fontRef idx="minor">
-              <a:schemeClr val="tx1"/>
-            </a:fontRef>
-          </p:style>
-        </p:cxnSp>
-        <p:cxnSp>
-          <p:nvCxnSpPr>
-            <p:cNvPr id="31" name="Łącznik prosty 30" descr="linia prosta">
-              <a:extLst>
-                <a:ext uri="{FF2B5EF4-FFF2-40B4-BE49-F238E27FC236}">
-                  <a16:creationId xmlns:a16="http://schemas.microsoft.com/office/drawing/2014/main" id="{D39C1A7A-D3C2-4440-A9CA-24ECB53715BB}"/>
-                </a:ext>
-              </a:extLst>
-            </p:cNvPr>
-            <p:cNvCxnSpPr>
-              <a:cxnSpLocks/>
-            </p:cNvCxnSpPr>
-            <p:nvPr/>
-          </p:nvCxnSpPr>
-          <p:spPr>
-            <a:xfrm flipH="1">
-              <a:off x="7742360" y="3349872"/>
-              <a:ext cx="552624" cy="945903"/>
-            </a:xfrm>
-            <a:prstGeom prst="line">
-              <a:avLst/>
-            </a:prstGeom>
-            <a:ln/>
-          </p:spPr>
-          <p:style>
-            <a:lnRef idx="3">
-              <a:schemeClr val="dk1"/>
-            </a:lnRef>
-            <a:fillRef idx="0">
-              <a:schemeClr val="dk1"/>
-            </a:fillRef>
-            <a:effectRef idx="2">
-              <a:schemeClr val="dk1"/>
-            </a:effectRef>
-            <a:fontRef idx="minor">
-              <a:schemeClr val="tx1"/>
-            </a:fontRef>
-          </p:style>
-        </p:cxnSp>
-        <p:cxnSp>
-          <p:nvCxnSpPr>
-            <p:cNvPr id="32" name="Łącznik prosty 31" descr="linia prosta">
-              <a:extLst>
-                <a:ext uri="{FF2B5EF4-FFF2-40B4-BE49-F238E27FC236}">
-                  <a16:creationId xmlns:a16="http://schemas.microsoft.com/office/drawing/2014/main" id="{5CAB83FA-6282-AE4B-ABB9-619FD4620C40}"/>
-                </a:ext>
-              </a:extLst>
-            </p:cNvPr>
-            <p:cNvCxnSpPr>
-              <a:cxnSpLocks/>
-            </p:cNvCxnSpPr>
-            <p:nvPr/>
-          </p:nvCxnSpPr>
-          <p:spPr>
-            <a:xfrm>
-              <a:off x="9181218" y="3429000"/>
-              <a:ext cx="836715" cy="1277695"/>
-            </a:xfrm>
-            <a:prstGeom prst="line">
-              <a:avLst/>
-            </a:prstGeom>
-            <a:ln/>
-          </p:spPr>
-          <p:style>
-            <a:lnRef idx="3">
-              <a:schemeClr val="dk1"/>
-            </a:lnRef>
-            <a:fillRef idx="0">
-              <a:schemeClr val="dk1"/>
-            </a:fillRef>
-            <a:effectRef idx="2">
-              <a:schemeClr val="dk1"/>
-            </a:effectRef>
-            <a:fontRef idx="minor">
-              <a:schemeClr val="tx1"/>
-            </a:fontRef>
-          </p:style>
-        </p:cxnSp>
-        <p:cxnSp>
-          <p:nvCxnSpPr>
-            <p:cNvPr id="33" name="Łącznik prosty 32" descr="linia prosta">
-              <a:extLst>
-                <a:ext uri="{FF2B5EF4-FFF2-40B4-BE49-F238E27FC236}">
-                  <a16:creationId xmlns:a16="http://schemas.microsoft.com/office/drawing/2014/main" id="{8D0C2EA0-627C-7346-86F2-A9A5BFEA9186}"/>
-                </a:ext>
-              </a:extLst>
-            </p:cNvPr>
-            <p:cNvCxnSpPr>
-              <a:cxnSpLocks/>
-              <a:stCxn id="55" idx="3"/>
-              <a:endCxn id="49" idx="2"/>
-            </p:cNvCxnSpPr>
-            <p:nvPr/>
-          </p:nvCxnSpPr>
-          <p:spPr>
-            <a:xfrm>
-              <a:off x="9427475" y="2768725"/>
-              <a:ext cx="934835" cy="81085"/>
-            </a:xfrm>
-            <a:prstGeom prst="line">
-              <a:avLst/>
-            </a:prstGeom>
-            <a:ln/>
-          </p:spPr>
-          <p:style>
-            <a:lnRef idx="3">
-              <a:schemeClr val="dk1"/>
-            </a:lnRef>
-            <a:fillRef idx="0">
-              <a:schemeClr val="dk1"/>
-            </a:fillRef>
-            <a:effectRef idx="2">
-              <a:schemeClr val="dk1"/>
-            </a:effectRef>
-            <a:fontRef idx="minor">
-              <a:schemeClr val="tx1"/>
-            </a:fontRef>
-          </p:style>
-        </p:cxnSp>
-        <p:sp>
-          <p:nvSpPr>
-            <p:cNvPr id="34" name="Pole tekstowe 33">
-              <a:extLst>
-                <a:ext uri="{FF2B5EF4-FFF2-40B4-BE49-F238E27FC236}">
-                  <a16:creationId xmlns:a16="http://schemas.microsoft.com/office/drawing/2014/main" id="{A8A858EF-9FF5-2144-9B16-EF5C1A8749A1}"/>
-                </a:ext>
-              </a:extLst>
-            </p:cNvPr>
-            <p:cNvSpPr txBox="1"/>
-            <p:nvPr/>
-          </p:nvSpPr>
-          <p:spPr>
-            <a:xfrm>
-              <a:off x="6083842" y="3410881"/>
-              <a:ext cx="1198880" cy="923330"/>
-            </a:xfrm>
-            <a:prstGeom prst="rect">
-              <a:avLst/>
-            </a:prstGeom>
-            <a:noFill/>
-          </p:spPr>
-          <p:txBody>
-            <a:bodyPr wrap="square" rtlCol="0">
-              <a:spAutoFit/>
-            </a:bodyPr>
-            <a:lstStyle>
-              <a:defPPr>
-                <a:defRPr lang="pl-PL"/>
-              </a:defPPr>
-            </a:lstStyle>
-            <a:p>
-              <a:pPr algn="ctr" rtl="0"/>
-              <a:r>
-                <a:rPr lang="pl-PL"/>
-                <a:t>Dodaj słowo kluczowe</a:t>
-              </a:r>
-            </a:p>
-          </p:txBody>
-        </p:sp>
-        <p:sp>
-          <p:nvSpPr>
-            <p:cNvPr id="35" name="Pole tekstowe 34">
-              <a:extLst>
-                <a:ext uri="{FF2B5EF4-FFF2-40B4-BE49-F238E27FC236}">
-                  <a16:creationId xmlns:a16="http://schemas.microsoft.com/office/drawing/2014/main" id="{A9F78683-D595-A942-B236-4AFF1FD95A8C}"/>
-                </a:ext>
-              </a:extLst>
-            </p:cNvPr>
-            <p:cNvSpPr txBox="1"/>
-            <p:nvPr/>
-          </p:nvSpPr>
-          <p:spPr>
-            <a:xfrm>
-              <a:off x="6973454" y="5320732"/>
-              <a:ext cx="1198880" cy="923330"/>
-            </a:xfrm>
-            <a:prstGeom prst="rect">
-              <a:avLst/>
-            </a:prstGeom>
-            <a:noFill/>
-          </p:spPr>
-          <p:txBody>
-            <a:bodyPr wrap="square" rtlCol="0">
-              <a:spAutoFit/>
-            </a:bodyPr>
-            <a:lstStyle>
-              <a:defPPr>
-                <a:defRPr lang="pl-PL"/>
-              </a:defPPr>
-            </a:lstStyle>
-            <a:p>
-              <a:pPr algn="ctr" rtl="0"/>
-              <a:r>
-                <a:rPr lang="pl-PL"/>
-                <a:t>Dodaj słowo kluczowe</a:t>
-              </a:r>
-            </a:p>
-          </p:txBody>
-        </p:sp>
-        <p:sp>
-          <p:nvSpPr>
-            <p:cNvPr id="37" name="Pole tekstowe 36">
-              <a:extLst>
-                <a:ext uri="{FF2B5EF4-FFF2-40B4-BE49-F238E27FC236}">
-                  <a16:creationId xmlns:a16="http://schemas.microsoft.com/office/drawing/2014/main" id="{EB5412BD-6F42-1645-94A1-A2F98C8F56F0}"/>
-                </a:ext>
-              </a:extLst>
-            </p:cNvPr>
-            <p:cNvSpPr txBox="1"/>
-            <p:nvPr/>
-          </p:nvSpPr>
-          <p:spPr>
-            <a:xfrm>
-              <a:off x="9591472" y="5638602"/>
-              <a:ext cx="1198880" cy="923330"/>
-            </a:xfrm>
-            <a:prstGeom prst="rect">
-              <a:avLst/>
-            </a:prstGeom>
-            <a:noFill/>
-          </p:spPr>
-          <p:txBody>
-            <a:bodyPr wrap="square" rtlCol="0">
-              <a:spAutoFit/>
-            </a:bodyPr>
-            <a:lstStyle>
-              <a:defPPr>
-                <a:defRPr lang="pl-PL"/>
-              </a:defPPr>
-            </a:lstStyle>
-            <a:p>
-              <a:pPr algn="ctr" rtl="0"/>
-              <a:r>
-                <a:rPr lang="pl-PL"/>
-                <a:t>Dodaj słowo kluczowe</a:t>
-              </a:r>
-            </a:p>
-          </p:txBody>
-        </p:sp>
-        <p:sp>
-          <p:nvSpPr>
-            <p:cNvPr id="38" name="Pole tekstowe 37">
-              <a:extLst>
-                <a:ext uri="{FF2B5EF4-FFF2-40B4-BE49-F238E27FC236}">
-                  <a16:creationId xmlns:a16="http://schemas.microsoft.com/office/drawing/2014/main" id="{20DDFF3D-5E90-9D40-86A9-817E6162C0FB}"/>
-                </a:ext>
-              </a:extLst>
-            </p:cNvPr>
-            <p:cNvSpPr txBox="1"/>
-            <p:nvPr/>
-          </p:nvSpPr>
-          <p:spPr>
-            <a:xfrm>
-              <a:off x="10241590" y="3412384"/>
-              <a:ext cx="1161010" cy="923330"/>
-            </a:xfrm>
-            <a:prstGeom prst="rect">
-              <a:avLst/>
-            </a:prstGeom>
-            <a:noFill/>
-          </p:spPr>
-          <p:txBody>
-            <a:bodyPr wrap="square" rtlCol="0">
-              <a:spAutoFit/>
-            </a:bodyPr>
-            <a:lstStyle>
-              <a:defPPr>
-                <a:defRPr lang="pl-PL"/>
-              </a:defPPr>
-            </a:lstStyle>
-            <a:p>
-              <a:pPr algn="ctr" rtl="0"/>
-              <a:r>
-                <a:rPr lang="pl-PL"/>
-                <a:t>Dodaj słowo kluczowe</a:t>
-              </a:r>
-            </a:p>
-          </p:txBody>
-        </p:sp>
-        <p:sp>
-          <p:nvSpPr>
-            <p:cNvPr id="42" name="Owal 41" descr="kształt owalny">
-              <a:extLst>
-                <a:ext uri="{FF2B5EF4-FFF2-40B4-BE49-F238E27FC236}">
-                  <a16:creationId xmlns:a16="http://schemas.microsoft.com/office/drawing/2014/main" id="{10D91E47-9024-2544-A774-5F83E2700F0A}"/>
-                </a:ext>
-              </a:extLst>
-            </p:cNvPr>
-            <p:cNvSpPr/>
-            <p:nvPr/>
-          </p:nvSpPr>
-          <p:spPr>
-            <a:xfrm>
-              <a:off x="9681281" y="4575965"/>
-              <a:ext cx="1000125" cy="1000125"/>
-            </a:xfrm>
-            <a:prstGeom prst="ellipse">
-              <a:avLst/>
-            </a:prstGeom>
-            <a:solidFill>
-              <a:schemeClr val="accent3"/>
-            </a:solidFill>
-            <a:ln>
-              <a:noFill/>
-            </a:ln>
-          </p:spPr>
-          <p:style>
-            <a:lnRef idx="2">
-              <a:schemeClr val="accent1">
-                <a:shade val="50000"/>
-              </a:schemeClr>
-            </a:lnRef>
-            <a:fillRef idx="1">
-              <a:schemeClr val="accent1"/>
-            </a:fillRef>
-            <a:effectRef idx="0">
-              <a:schemeClr val="accent1"/>
-            </a:effectRef>
-            <a:fontRef idx="minor">
-              <a:schemeClr val="lt1"/>
-            </a:fontRef>
-          </p:style>
-          <p:txBody>
-            <a:bodyPr lIns="0" tIns="0" rIns="0" bIns="0" rtlCol="0" anchor="t"/>
-            <a:lstStyle>
-              <a:defPPr>
-                <a:defRPr lang="pl-PL"/>
-              </a:defPPr>
-            </a:lstStyle>
-            <a:p>
-              <a:pPr algn="ctr" rtl="0"/>
-              <a:endParaRPr lang="pl-PL" sz="1000"/>
-            </a:p>
-          </p:txBody>
-        </p:sp>
-        <p:sp>
-          <p:nvSpPr>
-            <p:cNvPr id="46" name="Owal 45" descr="kształt owalny">
-              <a:extLst>
-                <a:ext uri="{FF2B5EF4-FFF2-40B4-BE49-F238E27FC236}">
-                  <a16:creationId xmlns:a16="http://schemas.microsoft.com/office/drawing/2014/main" id="{8CC00D4F-2FB0-C340-B932-176E1760E489}"/>
-                </a:ext>
-              </a:extLst>
-            </p:cNvPr>
-            <p:cNvSpPr/>
-            <p:nvPr/>
-          </p:nvSpPr>
-          <p:spPr>
-            <a:xfrm>
-              <a:off x="6191627" y="2349747"/>
-              <a:ext cx="1000125" cy="1000125"/>
-            </a:xfrm>
-            <a:prstGeom prst="ellipse">
-              <a:avLst/>
-            </a:prstGeom>
-            <a:noFill/>
-            <a:ln w="25400">
-              <a:solidFill>
-                <a:schemeClr val="accent1"/>
-              </a:solidFill>
-              <a:prstDash val="dash"/>
-            </a:ln>
-          </p:spPr>
-          <p:style>
-            <a:lnRef idx="2">
-              <a:schemeClr val="accent1">
-                <a:shade val="50000"/>
-              </a:schemeClr>
-            </a:lnRef>
-            <a:fillRef idx="1">
-              <a:schemeClr val="accent1"/>
-            </a:fillRef>
-            <a:effectRef idx="0">
-              <a:schemeClr val="accent1"/>
-            </a:effectRef>
-            <a:fontRef idx="minor">
-              <a:schemeClr val="lt1"/>
-            </a:fontRef>
-          </p:style>
-          <p:txBody>
-            <a:bodyPr lIns="0" tIns="0" rIns="0" bIns="0" rtlCol="0" anchor="t"/>
-            <a:lstStyle>
-              <a:defPPr>
-                <a:defRPr lang="pl-PL"/>
-              </a:defPPr>
-            </a:lstStyle>
-            <a:p>
-              <a:pPr algn="ctr" rtl="0"/>
-              <a:endParaRPr lang="pl-PL" sz="1000"/>
-            </a:p>
-          </p:txBody>
-        </p:sp>
-        <p:sp>
-          <p:nvSpPr>
-            <p:cNvPr id="49" name="Owal 48" descr="kształt owalny">
-              <a:extLst>
-                <a:ext uri="{FF2B5EF4-FFF2-40B4-BE49-F238E27FC236}">
-                  <a16:creationId xmlns:a16="http://schemas.microsoft.com/office/drawing/2014/main" id="{CDE26E72-3C77-3041-AAF3-D537C0C190BB}"/>
-                </a:ext>
-              </a:extLst>
-            </p:cNvPr>
-            <p:cNvSpPr/>
-            <p:nvPr/>
-          </p:nvSpPr>
-          <p:spPr>
-            <a:xfrm>
-              <a:off x="10362310" y="2349747"/>
-              <a:ext cx="1000125" cy="1000125"/>
-            </a:xfrm>
-            <a:prstGeom prst="ellipse">
-              <a:avLst/>
-            </a:prstGeom>
-            <a:solidFill>
-              <a:schemeClr val="accent2"/>
-            </a:solidFill>
-            <a:ln>
-              <a:noFill/>
-            </a:ln>
-          </p:spPr>
-          <p:style>
-            <a:lnRef idx="2">
-              <a:schemeClr val="accent1">
-                <a:shade val="50000"/>
-              </a:schemeClr>
-            </a:lnRef>
-            <a:fillRef idx="1">
-              <a:schemeClr val="accent1"/>
-            </a:fillRef>
-            <a:effectRef idx="0">
-              <a:schemeClr val="accent1"/>
-            </a:effectRef>
-            <a:fontRef idx="minor">
-              <a:schemeClr val="lt1"/>
-            </a:fontRef>
-          </p:style>
-          <p:txBody>
-            <a:bodyPr lIns="0" tIns="0" rIns="0" bIns="0" rtlCol="0" anchor="t"/>
-            <a:lstStyle>
-              <a:defPPr>
-                <a:defRPr lang="pl-PL"/>
-              </a:defPPr>
-            </a:lstStyle>
-            <a:p>
-              <a:pPr algn="ctr" rtl="0"/>
-              <a:endParaRPr lang="pl-PL" sz="1000"/>
-            </a:p>
-          </p:txBody>
-        </p:sp>
-        <p:sp>
-          <p:nvSpPr>
-            <p:cNvPr id="53" name="Owal 52" descr="kształt owalny">
-              <a:extLst>
-                <a:ext uri="{FF2B5EF4-FFF2-40B4-BE49-F238E27FC236}">
-                  <a16:creationId xmlns:a16="http://schemas.microsoft.com/office/drawing/2014/main" id="{66A5825C-2801-A14C-9E83-5D06EC19285B}"/>
-                </a:ext>
-              </a:extLst>
-            </p:cNvPr>
-            <p:cNvSpPr/>
-            <p:nvPr/>
-          </p:nvSpPr>
-          <p:spPr>
-            <a:xfrm>
-              <a:off x="7960738" y="1939633"/>
-              <a:ext cx="1630734" cy="1630734"/>
-            </a:xfrm>
-            <a:prstGeom prst="ellipse">
-              <a:avLst/>
-            </a:prstGeom>
-            <a:solidFill>
-              <a:schemeClr val="bg2">
-                <a:lumMod val="25000"/>
-              </a:schemeClr>
-            </a:solidFill>
-            <a:ln>
-              <a:noFill/>
-            </a:ln>
-          </p:spPr>
-          <p:style>
-            <a:lnRef idx="2">
-              <a:schemeClr val="accent1">
-                <a:shade val="50000"/>
-              </a:schemeClr>
-            </a:lnRef>
-            <a:fillRef idx="1">
-              <a:schemeClr val="accent1"/>
-            </a:fillRef>
-            <a:effectRef idx="0">
-              <a:schemeClr val="accent1"/>
-            </a:effectRef>
-            <a:fontRef idx="minor">
-              <a:schemeClr val="lt1"/>
-            </a:fontRef>
-          </p:style>
-          <p:txBody>
-            <a:bodyPr rtlCol="0" anchor="ctr"/>
-            <a:lstStyle>
-              <a:defPPr>
-                <a:defRPr lang="pl-PL"/>
-              </a:defPPr>
-            </a:lstStyle>
-            <a:p>
-              <a:pPr algn="ctr" rtl="0"/>
-              <a:endParaRPr lang="pl-PL"/>
-            </a:p>
-          </p:txBody>
-        </p:sp>
-        <p:sp>
-          <p:nvSpPr>
-            <p:cNvPr id="55" name="Pole tekstowe 54">
-              <a:extLst>
-                <a:ext uri="{FF2B5EF4-FFF2-40B4-BE49-F238E27FC236}">
-                  <a16:creationId xmlns:a16="http://schemas.microsoft.com/office/drawing/2014/main" id="{D9B441DE-399E-EA46-A84F-0D58A73CFF03}"/>
-                </a:ext>
-              </a:extLst>
-            </p:cNvPr>
-            <p:cNvSpPr txBox="1"/>
-            <p:nvPr/>
-          </p:nvSpPr>
-          <p:spPr>
-            <a:xfrm>
-              <a:off x="8100607" y="2307060"/>
-              <a:ext cx="1326868" cy="923330"/>
-            </a:xfrm>
-            <a:prstGeom prst="rect">
-              <a:avLst/>
-            </a:prstGeom>
-            <a:noFill/>
-          </p:spPr>
-          <p:txBody>
-            <a:bodyPr wrap="square" rtlCol="0">
-              <a:spAutoFit/>
-            </a:bodyPr>
-            <a:lstStyle>
-              <a:defPPr>
-                <a:defRPr lang="pl-PL"/>
-              </a:defPPr>
-            </a:lstStyle>
-            <a:p>
-              <a:pPr algn="ctr" rtl="0"/>
-              <a:r>
-                <a:rPr lang="pl-PL">
-                  <a:solidFill>
-                    <a:schemeClr val="bg1"/>
-                  </a:solidFill>
-                </a:rPr>
-                <a:t>Dodaj swój centralny pomysł</a:t>
-              </a:r>
-            </a:p>
-          </p:txBody>
-        </p:sp>
-        <p:sp>
-          <p:nvSpPr>
-            <p:cNvPr id="57" name="Owal 56" descr="kształt owalny">
-              <a:extLst>
-                <a:ext uri="{FF2B5EF4-FFF2-40B4-BE49-F238E27FC236}">
-                  <a16:creationId xmlns:a16="http://schemas.microsoft.com/office/drawing/2014/main" id="{BF8329D4-5928-2B49-81AA-F9FA7137D89D}"/>
-                </a:ext>
-              </a:extLst>
-            </p:cNvPr>
-            <p:cNvSpPr/>
-            <p:nvPr/>
-          </p:nvSpPr>
-          <p:spPr>
-            <a:xfrm>
-              <a:off x="7081628" y="4258095"/>
-              <a:ext cx="1000125" cy="1000125"/>
-            </a:xfrm>
-            <a:prstGeom prst="ellipse">
-              <a:avLst/>
-            </a:prstGeom>
-            <a:noFill/>
-            <a:ln w="25400">
-              <a:solidFill>
-                <a:schemeClr val="accent6"/>
-              </a:solidFill>
-              <a:prstDash val="dash"/>
-            </a:ln>
-          </p:spPr>
-          <p:style>
-            <a:lnRef idx="2">
-              <a:schemeClr val="accent1">
-                <a:shade val="50000"/>
-              </a:schemeClr>
-            </a:lnRef>
-            <a:fillRef idx="1">
-              <a:schemeClr val="accent1"/>
-            </a:fillRef>
-            <a:effectRef idx="0">
-              <a:schemeClr val="accent1"/>
-            </a:effectRef>
-            <a:fontRef idx="minor">
-              <a:schemeClr val="lt1"/>
-            </a:fontRef>
-          </p:style>
-          <p:txBody>
-            <a:bodyPr lIns="0" tIns="0" rIns="0" bIns="0" rtlCol="0" anchor="t"/>
-            <a:lstStyle>
-              <a:defPPr>
-                <a:defRPr lang="pl-PL"/>
-              </a:defPPr>
-            </a:lstStyle>
-            <a:p>
-              <a:pPr algn="ctr" rtl="0"/>
-              <a:endParaRPr lang="pl-PL" sz="1000"/>
-            </a:p>
-          </p:txBody>
-        </p:sp>
-      </p:grpSp>
-    </p:spTree>
-    <p:extLst>
-      <p:ext uri="{BB962C8B-B14F-4D97-AF65-F5344CB8AC3E}">
-        <p14:creationId xmlns:p14="http://schemas.microsoft.com/office/powerpoint/2010/main" val="4052214363"/>
-      </p:ext>
-    </p:extLst>
-  </p:cSld>
-  <p:clrMapOvr>
-    <a:masterClrMapping/>
-  </p:clrMapOvr>
-</p:sld>
-</file>
-
 <file path=ppt/slides/slide17.xml><?xml version="1.0" encoding="utf-8"?>
 <p:sld xmlns:a="http://schemas.openxmlformats.org/drawingml/2006/main" xmlns:r="http://schemas.openxmlformats.org/officeDocument/2006/relationships" xmlns:p="http://schemas.openxmlformats.org/presentationml/2006/main">
   <p:cSld>
@@ -24288,6 +23178,25 @@
 </file>
 
 <file path=customXml/item1.xml><?xml version="1.0" encoding="utf-8"?>
+<p:properties xmlns:p="http://schemas.microsoft.com/office/2006/metadata/properties" xmlns:xsi="http://www.w3.org/2001/XMLSchema-instance" xmlns:pc="http://schemas.microsoft.com/office/infopath/2007/PartnerControls">
+  <documentManagement>
+    <Status xmlns="71af3243-3dd4-4a8d-8c0d-dd76da1f02a5">Not started</Status>
+    <_ip_UnifiedCompliancePolicyUIAction xmlns="http://schemas.microsoft.com/sharepoint/v3" xsi:nil="true"/>
+    <Image xmlns="71af3243-3dd4-4a8d-8c0d-dd76da1f02a5">
+      <Url xsi:nil="true"/>
+      <Description xsi:nil="true"/>
+    </Image>
+    <_ip_UnifiedCompliancePolicyProperties xmlns="http://schemas.microsoft.com/sharepoint/v3" xsi:nil="true"/>
+    <ImageTagsTaxHTField xmlns="71af3243-3dd4-4a8d-8c0d-dd76da1f02a5">
+      <Terms xmlns="http://schemas.microsoft.com/office/infopath/2007/PartnerControls"/>
+    </ImageTagsTaxHTField>
+    <TaxCatchAll xmlns="230e9df3-be65-4c73-a93b-d1236ebd677e"/>
+    <MediaServiceKeyPoints xmlns="71af3243-3dd4-4a8d-8c0d-dd76da1f02a5" xsi:nil="true"/>
+  </documentManagement>
+</p:properties>
+</file>
+
+<file path=customXml/item2.xml><?xml version="1.0" encoding="utf-8"?>
 <ct:contentTypeSchema xmlns:ct="http://schemas.microsoft.com/office/2006/metadata/contentType" xmlns:ma="http://schemas.microsoft.com/office/2006/metadata/properties/metaAttributes" ct:_="" ma:_="" ma:contentTypeName="Document" ma:contentTypeID="0x01010079F111ED35F8CC479449609E8A0923A6" ma:contentTypeVersion="20" ma:contentTypeDescription="Create a new document." ma:contentTypeScope="" ma:versionID="1267097ee5f5874adfcc408041ae252e">
   <xsd:schema xmlns:xsd="http://www.w3.org/2001/XMLSchema" xmlns:xs="http://www.w3.org/2001/XMLSchema" xmlns:p="http://schemas.microsoft.com/office/2006/metadata/properties" xmlns:ns1="http://schemas.microsoft.com/sharepoint/v3" xmlns:ns2="71af3243-3dd4-4a8d-8c0d-dd76da1f02a5" xmlns:ns3="16c05727-aa75-4e4a-9b5f-8a80a1165891" xmlns:ns4="230e9df3-be65-4c73-a93b-d1236ebd677e" targetNamespace="http://schemas.microsoft.com/office/2006/metadata/properties" ma:root="true" ma:fieldsID="395891a93df65b14727750f2c06c306c" ns1:_="" ns2:_="" ns3:_="" ns4:_="">
     <xsd:import namespace="http://schemas.microsoft.com/sharepoint/v3"/>
@@ -24563,25 +23472,6 @@
 </ct:contentTypeSchema>
 </file>
 
-<file path=customXml/item2.xml><?xml version="1.0" encoding="utf-8"?>
-<p:properties xmlns:p="http://schemas.microsoft.com/office/2006/metadata/properties" xmlns:xsi="http://www.w3.org/2001/XMLSchema-instance" xmlns:pc="http://schemas.microsoft.com/office/infopath/2007/PartnerControls">
-  <documentManagement>
-    <Status xmlns="71af3243-3dd4-4a8d-8c0d-dd76da1f02a5">Not started</Status>
-    <_ip_UnifiedCompliancePolicyUIAction xmlns="http://schemas.microsoft.com/sharepoint/v3" xsi:nil="true"/>
-    <Image xmlns="71af3243-3dd4-4a8d-8c0d-dd76da1f02a5">
-      <Url xsi:nil="true"/>
-      <Description xsi:nil="true"/>
-    </Image>
-    <_ip_UnifiedCompliancePolicyProperties xmlns="http://schemas.microsoft.com/sharepoint/v3" xsi:nil="true"/>
-    <ImageTagsTaxHTField xmlns="71af3243-3dd4-4a8d-8c0d-dd76da1f02a5">
-      <Terms xmlns="http://schemas.microsoft.com/office/infopath/2007/PartnerControls"/>
-    </ImageTagsTaxHTField>
-    <TaxCatchAll xmlns="230e9df3-be65-4c73-a93b-d1236ebd677e"/>
-    <MediaServiceKeyPoints xmlns="71af3243-3dd4-4a8d-8c0d-dd76da1f02a5" xsi:nil="true"/>
-  </documentManagement>
-</p:properties>
-</file>
-
 <file path=customXml/item3.xml><?xml version="1.0" encoding="utf-8"?>
 <?mso-contentType ?>
 <FormTemplates xmlns="http://schemas.microsoft.com/sharepoint/v3/contenttype/forms">
@@ -24592,6 +23482,18 @@
 </file>
 
 <file path=customXml/itemProps1.xml><?xml version="1.0" encoding="utf-8"?>
+<ds:datastoreItem xmlns:ds="http://schemas.openxmlformats.org/officeDocument/2006/customXml" ds:itemID="{1C44B501-5DE1-46D9-B449-400C46FE1425}">
+  <ds:schemaRefs>
+    <ds:schemaRef ds:uri="http://schemas.microsoft.com/office/2006/metadata/properties"/>
+    <ds:schemaRef ds:uri="http://schemas.microsoft.com/office/infopath/2007/PartnerControls"/>
+    <ds:schemaRef ds:uri="71af3243-3dd4-4a8d-8c0d-dd76da1f02a5"/>
+    <ds:schemaRef ds:uri="http://schemas.microsoft.com/sharepoint/v3"/>
+    <ds:schemaRef ds:uri="230e9df3-be65-4c73-a93b-d1236ebd677e"/>
+  </ds:schemaRefs>
+</ds:datastoreItem>
+</file>
+
+<file path=customXml/itemProps2.xml><?xml version="1.0" encoding="utf-8"?>
 <ds:datastoreItem xmlns:ds="http://schemas.openxmlformats.org/officeDocument/2006/customXml" ds:itemID="{B2A44EB6-3BD3-4FF9-B8D1-D973C54C3ED7}">
   <ds:schemaRefs>
     <ds:schemaRef ds:uri="http://schemas.microsoft.com/office/2006/metadata/contentType"/>
@@ -24612,18 +23514,6 @@
 </ds:datastoreItem>
 </file>
 
-<file path=customXml/itemProps2.xml><?xml version="1.0" encoding="utf-8"?>
-<ds:datastoreItem xmlns:ds="http://schemas.openxmlformats.org/officeDocument/2006/customXml" ds:itemID="{1C44B501-5DE1-46D9-B449-400C46FE1425}">
-  <ds:schemaRefs>
-    <ds:schemaRef ds:uri="http://schemas.microsoft.com/office/2006/metadata/properties"/>
-    <ds:schemaRef ds:uri="http://schemas.microsoft.com/office/infopath/2007/PartnerControls"/>
-    <ds:schemaRef ds:uri="71af3243-3dd4-4a8d-8c0d-dd76da1f02a5"/>
-    <ds:schemaRef ds:uri="http://schemas.microsoft.com/sharepoint/v3"/>
-    <ds:schemaRef ds:uri="230e9df3-be65-4c73-a93b-d1236ebd677e"/>
-  </ds:schemaRefs>
-</ds:datastoreItem>
-</file>
-
 <file path=customXml/itemProps3.xml><?xml version="1.0" encoding="utf-8"?>
 <ds:datastoreItem xmlns:ds="http://schemas.openxmlformats.org/officeDocument/2006/customXml" ds:itemID="{77DD0DBF-30B2-4FC6-A5E7-8374DC718037}">
   <ds:schemaRefs>

</xml_diff>